<commit_message>
temp and update gitignore
</commit_message>
<xml_diff>
--- a/mohinh.pptx
+++ b/mohinh.pptx
@@ -9,6 +9,8 @@
     <p:sldId id="260" r:id="rId3"/>
     <p:sldId id="261" r:id="rId4"/>
     <p:sldId id="262" r:id="rId5"/>
+    <p:sldId id="263" r:id="rId6"/>
+    <p:sldId id="264" r:id="rId7"/>
   </p:sldIdLst>
   <p:sldSz cx="12192000" cy="6858000"/>
   <p:notesSz cx="6858000" cy="9144000"/>
@@ -7100,6 +7102,2735 @@
 </p:sld>
 </file>
 
+<file path=ppt/slides/slide5.xml><?xml version="1.0" encoding="utf-8"?>
+<p:sld xmlns:a="http://schemas.openxmlformats.org/drawingml/2006/main" xmlns:r="http://schemas.openxmlformats.org/officeDocument/2006/relationships" xmlns:p="http://schemas.openxmlformats.org/presentationml/2006/main">
+  <p:cSld>
+    <p:spTree>
+      <p:nvGrpSpPr>
+        <p:cNvPr id="1" name=""/>
+        <p:cNvGrpSpPr/>
+        <p:nvPr/>
+      </p:nvGrpSpPr>
+      <p:grpSpPr>
+        <a:xfrm>
+          <a:off x="0" y="0"/>
+          <a:ext cx="0" cy="0"/>
+          <a:chOff x="0" y="0"/>
+          <a:chExt cx="0" cy="0"/>
+        </a:xfrm>
+      </p:grpSpPr>
+      <p:sp>
+        <p:nvSpPr>
+          <p:cNvPr id="4" name="Rectangle 3"/>
+          <p:cNvSpPr/>
+          <p:nvPr/>
+        </p:nvSpPr>
+        <p:spPr>
+          <a:xfrm>
+            <a:off x="4543011" y="-1740176"/>
+            <a:ext cx="1828800" cy="622852"/>
+          </a:xfrm>
+          <a:prstGeom prst="rect">
+            <a:avLst/>
+          </a:prstGeom>
+          <a:noFill/>
+          <a:ln>
+            <a:solidFill>
+              <a:schemeClr val="tx1"/>
+            </a:solidFill>
+          </a:ln>
+        </p:spPr>
+        <p:style>
+          <a:lnRef idx="2">
+            <a:schemeClr val="accent1">
+              <a:shade val="50000"/>
+            </a:schemeClr>
+          </a:lnRef>
+          <a:fillRef idx="1">
+            <a:schemeClr val="accent1"/>
+          </a:fillRef>
+          <a:effectRef idx="0">
+            <a:schemeClr val="accent1"/>
+          </a:effectRef>
+          <a:fontRef idx="minor">
+            <a:schemeClr val="lt1"/>
+          </a:fontRef>
+        </p:style>
+        <p:txBody>
+          <a:bodyPr rtlCol="0" anchor="ctr"/>
+          <a:lstStyle/>
+          <a:p>
+            <a:pPr algn="ctr"/>
+            <a:r>
+              <a:rPr lang="en-US">
+                <a:solidFill>
+                  <a:schemeClr val="tx1"/>
+                </a:solidFill>
+              </a:rPr>
+              <a:t>Câu s</a:t>
+            </a:r>
+            <a:endParaRPr lang="en-US">
+              <a:solidFill>
+                <a:schemeClr val="tx1"/>
+              </a:solidFill>
+            </a:endParaRPr>
+          </a:p>
+        </p:txBody>
+      </p:sp>
+      <p:sp>
+        <p:nvSpPr>
+          <p:cNvPr id="5" name="Rectangle 4"/>
+          <p:cNvSpPr/>
+          <p:nvPr/>
+        </p:nvSpPr>
+        <p:spPr>
+          <a:xfrm>
+            <a:off x="4543011" y="-650184"/>
+            <a:ext cx="1828800" cy="622852"/>
+          </a:xfrm>
+          <a:prstGeom prst="rect">
+            <a:avLst/>
+          </a:prstGeom>
+          <a:noFill/>
+          <a:ln>
+            <a:solidFill>
+              <a:schemeClr val="tx1"/>
+            </a:solidFill>
+          </a:ln>
+        </p:spPr>
+        <p:style>
+          <a:lnRef idx="2">
+            <a:schemeClr val="accent1">
+              <a:shade val="50000"/>
+            </a:schemeClr>
+          </a:lnRef>
+          <a:fillRef idx="1">
+            <a:schemeClr val="accent1"/>
+          </a:fillRef>
+          <a:effectRef idx="0">
+            <a:schemeClr val="accent1"/>
+          </a:effectRef>
+          <a:fontRef idx="minor">
+            <a:schemeClr val="lt1"/>
+          </a:fontRef>
+        </p:style>
+        <p:txBody>
+          <a:bodyPr rtlCol="0" anchor="ctr"/>
+          <a:lstStyle/>
+          <a:p>
+            <a:pPr algn="ctr"/>
+            <a:r>
+              <a:rPr lang="en-US">
+                <a:solidFill>
+                  <a:schemeClr val="tx1"/>
+                </a:solidFill>
+              </a:rPr>
+              <a:t>Lặp qua các từ w</a:t>
+            </a:r>
+            <a:r>
+              <a:rPr lang="en-US" baseline="-25000">
+                <a:solidFill>
+                  <a:schemeClr val="tx1"/>
+                </a:solidFill>
+              </a:rPr>
+              <a:t>i</a:t>
+            </a:r>
+            <a:endParaRPr lang="en-US">
+              <a:solidFill>
+                <a:schemeClr val="tx1"/>
+              </a:solidFill>
+            </a:endParaRPr>
+          </a:p>
+        </p:txBody>
+      </p:sp>
+      <mc:AlternateContent xmlns:mc="http://schemas.openxmlformats.org/markup-compatibility/2006">
+        <mc:Choice xmlns:a14="http://schemas.microsoft.com/office/drawing/2010/main" Requires="a14">
+          <p:sp>
+            <p:nvSpPr>
+              <p:cNvPr id="6" name="Diamond 5"/>
+              <p:cNvSpPr/>
+              <p:nvPr/>
+            </p:nvSpPr>
+            <p:spPr>
+              <a:xfrm>
+                <a:off x="4103618" y="439808"/>
+                <a:ext cx="2707585" cy="1215059"/>
+              </a:xfrm>
+              <a:prstGeom prst="diamond">
+                <a:avLst/>
+              </a:prstGeom>
+              <a:noFill/>
+              <a:ln>
+                <a:solidFill>
+                  <a:schemeClr val="tx1"/>
+                </a:solidFill>
+              </a:ln>
+            </p:spPr>
+            <p:style>
+              <a:lnRef idx="2">
+                <a:schemeClr val="dk1">
+                  <a:shade val="50000"/>
+                </a:schemeClr>
+              </a:lnRef>
+              <a:fillRef idx="1">
+                <a:schemeClr val="dk1"/>
+              </a:fillRef>
+              <a:effectRef idx="0">
+                <a:schemeClr val="dk1"/>
+              </a:effectRef>
+              <a:fontRef idx="minor">
+                <a:schemeClr val="lt1"/>
+              </a:fontRef>
+            </p:style>
+            <p:txBody>
+              <a:bodyPr rtlCol="0" anchor="ctr"/>
+              <a:lstStyle/>
+              <a:p>
+                <a:pPr algn="ctr"/>
+                <a14:m>
+                  <m:oMathPara xmlns:m="http://schemas.openxmlformats.org/officeDocument/2006/math">
+                    <m:oMathParaPr>
+                      <m:jc m:val="centerGroup"/>
+                    </m:oMathParaPr>
+                    <m:oMath xmlns:m="http://schemas.openxmlformats.org/officeDocument/2006/math">
+                      <m:sSub>
+                        <m:sSubPr>
+                          <m:ctrlPr>
+                            <a:rPr lang="en-US" b="0" i="1" smtClean="0">
+                              <a:solidFill>
+                                <a:schemeClr val="tx1"/>
+                              </a:solidFill>
+                              <a:latin typeface="Cambria Math" panose="02040503050406030204" pitchFamily="18" charset="0"/>
+                            </a:rPr>
+                          </m:ctrlPr>
+                        </m:sSubPr>
+                        <m:e>
+                          <m:r>
+                            <a:rPr lang="en-US" b="0" i="1" smtClean="0">
+                              <a:solidFill>
+                                <a:schemeClr val="tx1"/>
+                              </a:solidFill>
+                              <a:latin typeface="Cambria Math" panose="02040503050406030204" pitchFamily="18" charset="0"/>
+                            </a:rPr>
+                            <m:t>𝑤</m:t>
+                          </m:r>
+                        </m:e>
+                        <m:sub>
+                          <m:r>
+                            <a:rPr lang="en-US" b="0" i="1" smtClean="0">
+                              <a:solidFill>
+                                <a:schemeClr val="tx1"/>
+                              </a:solidFill>
+                              <a:latin typeface="Cambria Math" panose="02040503050406030204" pitchFamily="18" charset="0"/>
+                            </a:rPr>
+                            <m:t>𝑖</m:t>
+                          </m:r>
+                        </m:sub>
+                      </m:sSub>
+                      <m:r>
+                        <a:rPr lang="en-US" b="0" i="1" smtClean="0">
+                          <a:solidFill>
+                            <a:schemeClr val="tx1"/>
+                          </a:solidFill>
+                          <a:latin typeface="Cambria Math" panose="02040503050406030204" pitchFamily="18" charset="0"/>
+                          <a:ea typeface="Cambria Math" panose="02040503050406030204" pitchFamily="18" charset="0"/>
+                        </a:rPr>
+                        <m:t>∈</m:t>
+                      </m:r>
+                      <m:r>
+                        <a:rPr lang="en-US" b="0" i="1" smtClean="0">
+                          <a:solidFill>
+                            <a:schemeClr val="tx1"/>
+                          </a:solidFill>
+                          <a:latin typeface="Cambria Math" panose="02040503050406030204" pitchFamily="18" charset="0"/>
+                          <a:ea typeface="Cambria Math" panose="02040503050406030204" pitchFamily="18" charset="0"/>
+                        </a:rPr>
+                        <m:t>𝑀𝑂𝑅𝐸</m:t>
+                      </m:r>
+                    </m:oMath>
+                  </m:oMathPara>
+                </a14:m>
+                <a:endParaRPr lang="en-US">
+                  <a:solidFill>
+                    <a:schemeClr val="tx1"/>
+                  </a:solidFill>
+                </a:endParaRPr>
+              </a:p>
+            </p:txBody>
+          </p:sp>
+        </mc:Choice>
+        <mc:Fallback>
+          <p:sp>
+            <p:nvSpPr>
+              <p:cNvPr id="6" name="Diamond 5"/>
+              <p:cNvSpPr>
+                <a:spLocks noRot="1" noChangeAspect="1" noMove="1" noResize="1" noEditPoints="1" noAdjustHandles="1" noChangeArrowheads="1" noChangeShapeType="1" noTextEdit="1"/>
+              </p:cNvSpPr>
+              <p:nvPr/>
+            </p:nvSpPr>
+            <p:spPr>
+              <a:xfrm>
+                <a:off x="4103618" y="439808"/>
+                <a:ext cx="2707585" cy="1215059"/>
+              </a:xfrm>
+              <a:prstGeom prst="diamond">
+                <a:avLst/>
+              </a:prstGeom>
+              <a:blipFill>
+                <a:blip r:embed="rId2"/>
+                <a:stretch>
+                  <a:fillRect/>
+                </a:stretch>
+              </a:blipFill>
+              <a:ln>
+                <a:solidFill>
+                  <a:schemeClr val="tx1"/>
+                </a:solidFill>
+              </a:ln>
+            </p:spPr>
+            <p:txBody>
+              <a:bodyPr/>
+              <a:lstStyle/>
+              <a:p>
+                <a:r>
+                  <a:rPr lang="en-US">
+                    <a:noFill/>
+                  </a:rPr>
+                  <a:t> </a:t>
+                </a:r>
+              </a:p>
+            </p:txBody>
+          </p:sp>
+        </mc:Fallback>
+      </mc:AlternateContent>
+      <p:sp>
+        <p:nvSpPr>
+          <p:cNvPr id="7" name="Rectangle 6"/>
+          <p:cNvSpPr/>
+          <p:nvPr/>
+        </p:nvSpPr>
+        <p:spPr>
+          <a:xfrm>
+            <a:off x="7765849" y="2338594"/>
+            <a:ext cx="2325756" cy="622852"/>
+          </a:xfrm>
+          <a:prstGeom prst="rect">
+            <a:avLst/>
+          </a:prstGeom>
+          <a:noFill/>
+          <a:ln>
+            <a:solidFill>
+              <a:schemeClr val="tx1"/>
+            </a:solidFill>
+          </a:ln>
+        </p:spPr>
+        <p:style>
+          <a:lnRef idx="2">
+            <a:schemeClr val="accent1">
+              <a:shade val="50000"/>
+            </a:schemeClr>
+          </a:lnRef>
+          <a:fillRef idx="1">
+            <a:schemeClr val="accent1"/>
+          </a:fillRef>
+          <a:effectRef idx="0">
+            <a:schemeClr val="accent1"/>
+          </a:effectRef>
+          <a:fontRef idx="minor">
+            <a:schemeClr val="lt1"/>
+          </a:fontRef>
+        </p:style>
+        <p:txBody>
+          <a:bodyPr rtlCol="0" anchor="ctr"/>
+          <a:lstStyle/>
+          <a:p>
+            <a:pPr algn="ctr"/>
+            <a:r>
+              <a:rPr lang="en-US">
+                <a:solidFill>
+                  <a:schemeClr val="tx1"/>
+                </a:solidFill>
+              </a:rPr>
+              <a:t>Thêm tag _MORE</a:t>
+            </a:r>
+            <a:endParaRPr lang="en-US">
+              <a:solidFill>
+                <a:schemeClr val="tx1"/>
+              </a:solidFill>
+            </a:endParaRPr>
+          </a:p>
+        </p:txBody>
+      </p:sp>
+      <p:sp>
+        <p:nvSpPr>
+          <p:cNvPr id="8" name="Rectangle 7"/>
+          <p:cNvSpPr/>
+          <p:nvPr/>
+        </p:nvSpPr>
+        <p:spPr>
+          <a:xfrm>
+            <a:off x="7765849" y="3725946"/>
+            <a:ext cx="2325756" cy="742122"/>
+          </a:xfrm>
+          <a:prstGeom prst="rect">
+            <a:avLst/>
+          </a:prstGeom>
+          <a:noFill/>
+          <a:ln>
+            <a:solidFill>
+              <a:schemeClr val="tx1"/>
+            </a:solidFill>
+          </a:ln>
+        </p:spPr>
+        <p:style>
+          <a:lnRef idx="2">
+            <a:schemeClr val="accent1">
+              <a:shade val="50000"/>
+            </a:schemeClr>
+          </a:lnRef>
+          <a:fillRef idx="1">
+            <a:schemeClr val="accent1"/>
+          </a:fillRef>
+          <a:effectRef idx="0">
+            <a:schemeClr val="accent1"/>
+          </a:effectRef>
+          <a:fontRef idx="minor">
+            <a:schemeClr val="lt1"/>
+          </a:fontRef>
+        </p:style>
+        <p:txBody>
+          <a:bodyPr rtlCol="0" anchor="ctr"/>
+          <a:lstStyle/>
+          <a:p>
+            <a:pPr algn="ctr"/>
+            <a:r>
+              <a:rPr lang="en-US">
+                <a:solidFill>
+                  <a:schemeClr val="tx1"/>
+                </a:solidFill>
+              </a:rPr>
+              <a:t>Lặp qua các từ w</a:t>
+            </a:r>
+            <a:r>
+              <a:rPr lang="en-US" baseline="-25000">
+                <a:solidFill>
+                  <a:schemeClr val="tx1"/>
+                </a:solidFill>
+              </a:rPr>
+              <a:t>j</a:t>
+            </a:r>
+            <a:r>
+              <a:rPr lang="en-US">
+                <a:solidFill>
+                  <a:schemeClr val="tx1"/>
+                </a:solidFill>
+              </a:rPr>
+              <a:t> từ vị trí của w</a:t>
+            </a:r>
+            <a:r>
+              <a:rPr lang="en-US" baseline="-25000">
+                <a:solidFill>
+                  <a:schemeClr val="tx1"/>
+                </a:solidFill>
+              </a:rPr>
+              <a:t>i</a:t>
+            </a:r>
+            <a:r>
+              <a:rPr lang="en-US">
+                <a:solidFill>
+                  <a:schemeClr val="tx1"/>
+                </a:solidFill>
+              </a:rPr>
+              <a:t> đến hết câu</a:t>
+            </a:r>
+            <a:endParaRPr lang="en-US">
+              <a:solidFill>
+                <a:schemeClr val="tx1"/>
+              </a:solidFill>
+            </a:endParaRPr>
+          </a:p>
+        </p:txBody>
+      </p:sp>
+      <p:sp>
+        <p:nvSpPr>
+          <p:cNvPr id="9" name="Rectangle 8"/>
+          <p:cNvSpPr/>
+          <p:nvPr/>
+        </p:nvSpPr>
+        <p:spPr>
+          <a:xfrm>
+            <a:off x="7765849" y="7017455"/>
+            <a:ext cx="2325756" cy="742122"/>
+          </a:xfrm>
+          <a:prstGeom prst="rect">
+            <a:avLst/>
+          </a:prstGeom>
+          <a:noFill/>
+          <a:ln>
+            <a:solidFill>
+              <a:schemeClr val="tx1"/>
+            </a:solidFill>
+          </a:ln>
+        </p:spPr>
+        <p:style>
+          <a:lnRef idx="2">
+            <a:schemeClr val="accent1">
+              <a:shade val="50000"/>
+            </a:schemeClr>
+          </a:lnRef>
+          <a:fillRef idx="1">
+            <a:schemeClr val="accent1"/>
+          </a:fillRef>
+          <a:effectRef idx="0">
+            <a:schemeClr val="accent1"/>
+          </a:effectRef>
+          <a:fontRef idx="minor">
+            <a:schemeClr val="lt1"/>
+          </a:fontRef>
+        </p:style>
+        <p:txBody>
+          <a:bodyPr rtlCol="0" anchor="ctr"/>
+          <a:lstStyle/>
+          <a:p>
+            <a:pPr algn="ctr"/>
+            <a:r>
+              <a:rPr lang="en-US">
+                <a:solidFill>
+                  <a:schemeClr val="tx1"/>
+                </a:solidFill>
+              </a:rPr>
+              <a:t>Câu thuộc mẫu </a:t>
+            </a:r>
+            <a:br>
+              <a:rPr lang="en-US">
+                <a:solidFill>
+                  <a:schemeClr val="tx1"/>
+                </a:solidFill>
+              </a:rPr>
+            </a:br>
+            <a:r>
+              <a:rPr lang="en-US">
+                <a:solidFill>
+                  <a:schemeClr val="tx1"/>
+                </a:solidFill>
+              </a:rPr>
+              <a:t>MORE-GOOD</a:t>
+            </a:r>
+            <a:endParaRPr lang="en-US">
+              <a:solidFill>
+                <a:schemeClr val="tx1"/>
+              </a:solidFill>
+            </a:endParaRPr>
+          </a:p>
+        </p:txBody>
+      </p:sp>
+      <mc:AlternateContent xmlns:mc="http://schemas.openxmlformats.org/markup-compatibility/2006">
+        <mc:Choice xmlns:a14="http://schemas.microsoft.com/office/drawing/2010/main" Requires="a14">
+          <p:sp>
+            <p:nvSpPr>
+              <p:cNvPr id="10" name="Diamond 9"/>
+              <p:cNvSpPr/>
+              <p:nvPr/>
+            </p:nvSpPr>
+            <p:spPr>
+              <a:xfrm>
+                <a:off x="7595227" y="5143929"/>
+                <a:ext cx="2667000" cy="1197665"/>
+              </a:xfrm>
+              <a:prstGeom prst="diamond">
+                <a:avLst/>
+              </a:prstGeom>
+              <a:noFill/>
+              <a:ln>
+                <a:solidFill>
+                  <a:schemeClr val="tx1"/>
+                </a:solidFill>
+              </a:ln>
+            </p:spPr>
+            <p:style>
+              <a:lnRef idx="2">
+                <a:schemeClr val="dk1">
+                  <a:shade val="50000"/>
+                </a:schemeClr>
+              </a:lnRef>
+              <a:fillRef idx="1">
+                <a:schemeClr val="dk1"/>
+              </a:fillRef>
+              <a:effectRef idx="0">
+                <a:schemeClr val="dk1"/>
+              </a:effectRef>
+              <a:fontRef idx="minor">
+                <a:schemeClr val="lt1"/>
+              </a:fontRef>
+            </p:style>
+            <p:txBody>
+              <a:bodyPr rtlCol="0" anchor="ctr"/>
+              <a:lstStyle/>
+              <a:p>
+                <a:pPr algn="ctr"/>
+                <a14:m>
+                  <m:oMathPara xmlns:m="http://schemas.openxmlformats.org/officeDocument/2006/math">
+                    <m:oMathParaPr>
+                      <m:jc m:val="centerGroup"/>
+                    </m:oMathParaPr>
+                    <m:oMath xmlns:m="http://schemas.openxmlformats.org/officeDocument/2006/math">
+                      <m:sSub>
+                        <m:sSubPr>
+                          <m:ctrlPr>
+                            <a:rPr lang="en-US" b="0" i="1" smtClean="0">
+                              <a:solidFill>
+                                <a:schemeClr val="tx1"/>
+                              </a:solidFill>
+                              <a:latin typeface="Cambria Math" panose="02040503050406030204" pitchFamily="18" charset="0"/>
+                            </a:rPr>
+                          </m:ctrlPr>
+                        </m:sSubPr>
+                        <m:e>
+                          <m:r>
+                            <a:rPr lang="en-US" b="0" i="1" smtClean="0">
+                              <a:solidFill>
+                                <a:schemeClr val="tx1"/>
+                              </a:solidFill>
+                              <a:latin typeface="Cambria Math" panose="02040503050406030204" pitchFamily="18" charset="0"/>
+                            </a:rPr>
+                            <m:t>𝑤</m:t>
+                          </m:r>
+                        </m:e>
+                        <m:sub>
+                          <m:r>
+                            <a:rPr lang="en-US" b="0" i="1" smtClean="0">
+                              <a:solidFill>
+                                <a:schemeClr val="tx1"/>
+                              </a:solidFill>
+                              <a:latin typeface="Cambria Math" panose="02040503050406030204" pitchFamily="18" charset="0"/>
+                            </a:rPr>
+                            <m:t>𝑗</m:t>
+                          </m:r>
+                        </m:sub>
+                      </m:sSub>
+                      <m:r>
+                        <a:rPr lang="en-US" b="0" i="1" smtClean="0">
+                          <a:solidFill>
+                            <a:schemeClr val="tx1"/>
+                          </a:solidFill>
+                          <a:latin typeface="Cambria Math" panose="02040503050406030204" pitchFamily="18" charset="0"/>
+                          <a:ea typeface="Cambria Math" panose="02040503050406030204" pitchFamily="18" charset="0"/>
+                        </a:rPr>
+                        <m:t>∈</m:t>
+                      </m:r>
+                      <m:r>
+                        <a:rPr lang="en-US" b="0" i="1" smtClean="0">
+                          <a:solidFill>
+                            <a:schemeClr val="tx1"/>
+                          </a:solidFill>
+                          <a:latin typeface="Cambria Math" panose="02040503050406030204" pitchFamily="18" charset="0"/>
+                          <a:ea typeface="Cambria Math" panose="02040503050406030204" pitchFamily="18" charset="0"/>
+                        </a:rPr>
+                        <m:t>𝐺𝑂𝑂𝐷</m:t>
+                      </m:r>
+                    </m:oMath>
+                  </m:oMathPara>
+                </a14:m>
+                <a:endParaRPr lang="en-US">
+                  <a:solidFill>
+                    <a:schemeClr val="tx1"/>
+                  </a:solidFill>
+                </a:endParaRPr>
+              </a:p>
+            </p:txBody>
+          </p:sp>
+        </mc:Choice>
+        <mc:Fallback>
+          <p:sp>
+            <p:nvSpPr>
+              <p:cNvPr id="10" name="Diamond 9"/>
+              <p:cNvSpPr>
+                <a:spLocks noRot="1" noChangeAspect="1" noMove="1" noResize="1" noEditPoints="1" noAdjustHandles="1" noChangeArrowheads="1" noChangeShapeType="1" noTextEdit="1"/>
+              </p:cNvSpPr>
+              <p:nvPr/>
+            </p:nvSpPr>
+            <p:spPr>
+              <a:xfrm>
+                <a:off x="7595227" y="5143929"/>
+                <a:ext cx="2667000" cy="1197665"/>
+              </a:xfrm>
+              <a:prstGeom prst="diamond">
+                <a:avLst/>
+              </a:prstGeom>
+              <a:blipFill>
+                <a:blip r:embed="rId3"/>
+                <a:stretch>
+                  <a:fillRect/>
+                </a:stretch>
+              </a:blipFill>
+              <a:ln>
+                <a:solidFill>
+                  <a:schemeClr val="tx1"/>
+                </a:solidFill>
+              </a:ln>
+            </p:spPr>
+            <p:txBody>
+              <a:bodyPr/>
+              <a:lstStyle/>
+              <a:p>
+                <a:r>
+                  <a:rPr lang="en-US">
+                    <a:noFill/>
+                  </a:rPr>
+                  <a:t> </a:t>
+                </a:r>
+              </a:p>
+            </p:txBody>
+          </p:sp>
+        </mc:Fallback>
+      </mc:AlternateContent>
+      <p:sp>
+        <p:nvSpPr>
+          <p:cNvPr id="11" name="Rectangle 10"/>
+          <p:cNvSpPr/>
+          <p:nvPr/>
+        </p:nvSpPr>
+        <p:spPr>
+          <a:xfrm>
+            <a:off x="10971109" y="7022426"/>
+            <a:ext cx="2325756" cy="742122"/>
+          </a:xfrm>
+          <a:prstGeom prst="rect">
+            <a:avLst/>
+          </a:prstGeom>
+          <a:noFill/>
+          <a:ln>
+            <a:solidFill>
+              <a:schemeClr val="tx1"/>
+            </a:solidFill>
+          </a:ln>
+        </p:spPr>
+        <p:style>
+          <a:lnRef idx="2">
+            <a:schemeClr val="accent1">
+              <a:shade val="50000"/>
+            </a:schemeClr>
+          </a:lnRef>
+          <a:fillRef idx="1">
+            <a:schemeClr val="accent1"/>
+          </a:fillRef>
+          <a:effectRef idx="0">
+            <a:schemeClr val="accent1"/>
+          </a:effectRef>
+          <a:fontRef idx="minor">
+            <a:schemeClr val="lt1"/>
+          </a:fontRef>
+        </p:style>
+        <p:txBody>
+          <a:bodyPr rtlCol="0" anchor="ctr"/>
+          <a:lstStyle/>
+          <a:p>
+            <a:pPr algn="ctr"/>
+            <a:r>
+              <a:rPr lang="en-US">
+                <a:solidFill>
+                  <a:schemeClr val="tx1"/>
+                </a:solidFill>
+              </a:rPr>
+              <a:t>Câu thuộc mẫu </a:t>
+            </a:r>
+            <a:br>
+              <a:rPr lang="en-US">
+                <a:solidFill>
+                  <a:schemeClr val="tx1"/>
+                </a:solidFill>
+              </a:rPr>
+            </a:br>
+            <a:r>
+              <a:rPr lang="en-US">
+                <a:solidFill>
+                  <a:schemeClr val="tx1"/>
+                </a:solidFill>
+              </a:rPr>
+              <a:t>MORE-BAD</a:t>
+            </a:r>
+            <a:endParaRPr lang="en-US">
+              <a:solidFill>
+                <a:schemeClr val="tx1"/>
+              </a:solidFill>
+            </a:endParaRPr>
+          </a:p>
+        </p:txBody>
+      </p:sp>
+      <mc:AlternateContent xmlns:mc="http://schemas.openxmlformats.org/markup-compatibility/2006">
+        <mc:Choice xmlns:a14="http://schemas.microsoft.com/office/drawing/2010/main" Requires="a14">
+          <p:sp>
+            <p:nvSpPr>
+              <p:cNvPr id="12" name="Diamond 11"/>
+              <p:cNvSpPr/>
+              <p:nvPr/>
+            </p:nvSpPr>
+            <p:spPr>
+              <a:xfrm>
+                <a:off x="10800487" y="5143929"/>
+                <a:ext cx="2667000" cy="1197665"/>
+              </a:xfrm>
+              <a:prstGeom prst="diamond">
+                <a:avLst/>
+              </a:prstGeom>
+              <a:noFill/>
+              <a:ln>
+                <a:solidFill>
+                  <a:schemeClr val="tx1"/>
+                </a:solidFill>
+              </a:ln>
+            </p:spPr>
+            <p:style>
+              <a:lnRef idx="2">
+                <a:schemeClr val="dk1">
+                  <a:shade val="50000"/>
+                </a:schemeClr>
+              </a:lnRef>
+              <a:fillRef idx="1">
+                <a:schemeClr val="dk1"/>
+              </a:fillRef>
+              <a:effectRef idx="0">
+                <a:schemeClr val="dk1"/>
+              </a:effectRef>
+              <a:fontRef idx="minor">
+                <a:schemeClr val="lt1"/>
+              </a:fontRef>
+            </p:style>
+            <p:txBody>
+              <a:bodyPr rtlCol="0" anchor="ctr"/>
+              <a:lstStyle/>
+              <a:p>
+                <a:pPr algn="ctr"/>
+                <a14:m>
+                  <m:oMathPara xmlns:m="http://schemas.openxmlformats.org/officeDocument/2006/math">
+                    <m:oMathParaPr>
+                      <m:jc m:val="centerGroup"/>
+                    </m:oMathParaPr>
+                    <m:oMath xmlns:m="http://schemas.openxmlformats.org/officeDocument/2006/math">
+                      <m:sSub>
+                        <m:sSubPr>
+                          <m:ctrlPr>
+                            <a:rPr lang="en-US" b="0" i="1" smtClean="0">
+                              <a:solidFill>
+                                <a:schemeClr val="tx1"/>
+                              </a:solidFill>
+                              <a:latin typeface="Cambria Math" panose="02040503050406030204" pitchFamily="18" charset="0"/>
+                            </a:rPr>
+                          </m:ctrlPr>
+                        </m:sSubPr>
+                        <m:e>
+                          <m:r>
+                            <a:rPr lang="en-US" b="0" i="1" smtClean="0">
+                              <a:solidFill>
+                                <a:schemeClr val="tx1"/>
+                              </a:solidFill>
+                              <a:latin typeface="Cambria Math" panose="02040503050406030204" pitchFamily="18" charset="0"/>
+                            </a:rPr>
+                            <m:t>𝑤</m:t>
+                          </m:r>
+                        </m:e>
+                        <m:sub>
+                          <m:r>
+                            <a:rPr lang="en-US" b="0" i="1" smtClean="0">
+                              <a:solidFill>
+                                <a:schemeClr val="tx1"/>
+                              </a:solidFill>
+                              <a:latin typeface="Cambria Math" panose="02040503050406030204" pitchFamily="18" charset="0"/>
+                            </a:rPr>
+                            <m:t>𝑗</m:t>
+                          </m:r>
+                        </m:sub>
+                      </m:sSub>
+                      <m:r>
+                        <a:rPr lang="en-US" b="0" i="1" smtClean="0">
+                          <a:solidFill>
+                            <a:schemeClr val="tx1"/>
+                          </a:solidFill>
+                          <a:latin typeface="Cambria Math" panose="02040503050406030204" pitchFamily="18" charset="0"/>
+                          <a:ea typeface="Cambria Math" panose="02040503050406030204" pitchFamily="18" charset="0"/>
+                        </a:rPr>
+                        <m:t>∈</m:t>
+                      </m:r>
+                      <m:r>
+                        <a:rPr lang="en-US" b="0" i="1" smtClean="0">
+                          <a:solidFill>
+                            <a:schemeClr val="tx1"/>
+                          </a:solidFill>
+                          <a:latin typeface="Cambria Math" panose="02040503050406030204" pitchFamily="18" charset="0"/>
+                          <a:ea typeface="Cambria Math" panose="02040503050406030204" pitchFamily="18" charset="0"/>
+                        </a:rPr>
+                        <m:t>𝐵𝐴𝐷</m:t>
+                      </m:r>
+                    </m:oMath>
+                  </m:oMathPara>
+                </a14:m>
+                <a:endParaRPr lang="en-US">
+                  <a:solidFill>
+                    <a:schemeClr val="tx1"/>
+                  </a:solidFill>
+                </a:endParaRPr>
+              </a:p>
+            </p:txBody>
+          </p:sp>
+        </mc:Choice>
+        <mc:Fallback>
+          <p:sp>
+            <p:nvSpPr>
+              <p:cNvPr id="12" name="Diamond 11"/>
+              <p:cNvSpPr>
+                <a:spLocks noRot="1" noChangeAspect="1" noMove="1" noResize="1" noEditPoints="1" noAdjustHandles="1" noChangeArrowheads="1" noChangeShapeType="1" noTextEdit="1"/>
+              </p:cNvSpPr>
+              <p:nvPr/>
+            </p:nvSpPr>
+            <p:spPr>
+              <a:xfrm>
+                <a:off x="10800487" y="5143929"/>
+                <a:ext cx="2667000" cy="1197665"/>
+              </a:xfrm>
+              <a:prstGeom prst="diamond">
+                <a:avLst/>
+              </a:prstGeom>
+              <a:blipFill>
+                <a:blip r:embed="rId4"/>
+                <a:stretch>
+                  <a:fillRect/>
+                </a:stretch>
+              </a:blipFill>
+              <a:ln>
+                <a:solidFill>
+                  <a:schemeClr val="tx1"/>
+                </a:solidFill>
+              </a:ln>
+            </p:spPr>
+            <p:txBody>
+              <a:bodyPr/>
+              <a:lstStyle/>
+              <a:p>
+                <a:r>
+                  <a:rPr lang="en-US">
+                    <a:noFill/>
+                  </a:rPr>
+                  <a:t> </a:t>
+                </a:r>
+              </a:p>
+            </p:txBody>
+          </p:sp>
+        </mc:Fallback>
+      </mc:AlternateContent>
+      <p:sp>
+        <p:nvSpPr>
+          <p:cNvPr id="13" name="Rectangle 12"/>
+          <p:cNvSpPr/>
+          <p:nvPr/>
+        </p:nvSpPr>
+        <p:spPr>
+          <a:xfrm>
+            <a:off x="938030" y="2338594"/>
+            <a:ext cx="2325756" cy="622852"/>
+          </a:xfrm>
+          <a:prstGeom prst="rect">
+            <a:avLst/>
+          </a:prstGeom>
+          <a:noFill/>
+          <a:ln>
+            <a:solidFill>
+              <a:schemeClr val="tx1"/>
+            </a:solidFill>
+          </a:ln>
+        </p:spPr>
+        <p:style>
+          <a:lnRef idx="2">
+            <a:schemeClr val="accent1">
+              <a:shade val="50000"/>
+            </a:schemeClr>
+          </a:lnRef>
+          <a:fillRef idx="1">
+            <a:schemeClr val="accent1"/>
+          </a:fillRef>
+          <a:effectRef idx="0">
+            <a:schemeClr val="accent1"/>
+          </a:effectRef>
+          <a:fontRef idx="minor">
+            <a:schemeClr val="lt1"/>
+          </a:fontRef>
+        </p:style>
+        <p:txBody>
+          <a:bodyPr rtlCol="0" anchor="ctr"/>
+          <a:lstStyle/>
+          <a:p>
+            <a:pPr algn="ctr"/>
+            <a:r>
+              <a:rPr lang="en-US">
+                <a:solidFill>
+                  <a:schemeClr val="tx1"/>
+                </a:solidFill>
+              </a:rPr>
+              <a:t>Thêm tag _MORE</a:t>
+            </a:r>
+            <a:endParaRPr lang="en-US">
+              <a:solidFill>
+                <a:schemeClr val="tx1"/>
+              </a:solidFill>
+            </a:endParaRPr>
+          </a:p>
+        </p:txBody>
+      </p:sp>
+      <p:sp>
+        <p:nvSpPr>
+          <p:cNvPr id="14" name="Rectangle 13"/>
+          <p:cNvSpPr/>
+          <p:nvPr/>
+        </p:nvSpPr>
+        <p:spPr>
+          <a:xfrm>
+            <a:off x="938030" y="3725946"/>
+            <a:ext cx="2325756" cy="742122"/>
+          </a:xfrm>
+          <a:prstGeom prst="rect">
+            <a:avLst/>
+          </a:prstGeom>
+          <a:noFill/>
+          <a:ln>
+            <a:solidFill>
+              <a:schemeClr val="tx1"/>
+            </a:solidFill>
+          </a:ln>
+        </p:spPr>
+        <p:style>
+          <a:lnRef idx="2">
+            <a:schemeClr val="accent1">
+              <a:shade val="50000"/>
+            </a:schemeClr>
+          </a:lnRef>
+          <a:fillRef idx="1">
+            <a:schemeClr val="accent1"/>
+          </a:fillRef>
+          <a:effectRef idx="0">
+            <a:schemeClr val="accent1"/>
+          </a:effectRef>
+          <a:fontRef idx="minor">
+            <a:schemeClr val="lt1"/>
+          </a:fontRef>
+        </p:style>
+        <p:txBody>
+          <a:bodyPr rtlCol="0" anchor="ctr"/>
+          <a:lstStyle/>
+          <a:p>
+            <a:pPr algn="ctr"/>
+            <a:r>
+              <a:rPr lang="en-US">
+                <a:solidFill>
+                  <a:schemeClr val="tx1"/>
+                </a:solidFill>
+              </a:rPr>
+              <a:t>Lặp qua các từ w</a:t>
+            </a:r>
+            <a:r>
+              <a:rPr lang="en-US" baseline="-25000">
+                <a:solidFill>
+                  <a:schemeClr val="tx1"/>
+                </a:solidFill>
+              </a:rPr>
+              <a:t>j</a:t>
+            </a:r>
+            <a:r>
+              <a:rPr lang="en-US">
+                <a:solidFill>
+                  <a:schemeClr val="tx1"/>
+                </a:solidFill>
+              </a:rPr>
+              <a:t> từ vị trí của w</a:t>
+            </a:r>
+            <a:r>
+              <a:rPr lang="en-US" baseline="-25000">
+                <a:solidFill>
+                  <a:schemeClr val="tx1"/>
+                </a:solidFill>
+              </a:rPr>
+              <a:t>i</a:t>
+            </a:r>
+            <a:r>
+              <a:rPr lang="en-US">
+                <a:solidFill>
+                  <a:schemeClr val="tx1"/>
+                </a:solidFill>
+              </a:rPr>
+              <a:t> đến hết câu</a:t>
+            </a:r>
+            <a:endParaRPr lang="en-US">
+              <a:solidFill>
+                <a:schemeClr val="tx1"/>
+              </a:solidFill>
+            </a:endParaRPr>
+          </a:p>
+        </p:txBody>
+      </p:sp>
+      <p:sp>
+        <p:nvSpPr>
+          <p:cNvPr id="15" name="Rectangle 14"/>
+          <p:cNvSpPr/>
+          <p:nvPr/>
+        </p:nvSpPr>
+        <p:spPr>
+          <a:xfrm>
+            <a:off x="938030" y="7017455"/>
+            <a:ext cx="2325756" cy="742122"/>
+          </a:xfrm>
+          <a:prstGeom prst="rect">
+            <a:avLst/>
+          </a:prstGeom>
+          <a:noFill/>
+          <a:ln>
+            <a:solidFill>
+              <a:schemeClr val="tx1"/>
+            </a:solidFill>
+          </a:ln>
+        </p:spPr>
+        <p:style>
+          <a:lnRef idx="2">
+            <a:schemeClr val="accent1">
+              <a:shade val="50000"/>
+            </a:schemeClr>
+          </a:lnRef>
+          <a:fillRef idx="1">
+            <a:schemeClr val="accent1"/>
+          </a:fillRef>
+          <a:effectRef idx="0">
+            <a:schemeClr val="accent1"/>
+          </a:effectRef>
+          <a:fontRef idx="minor">
+            <a:schemeClr val="lt1"/>
+          </a:fontRef>
+        </p:style>
+        <p:txBody>
+          <a:bodyPr rtlCol="0" anchor="ctr"/>
+          <a:lstStyle/>
+          <a:p>
+            <a:pPr algn="ctr"/>
+            <a:r>
+              <a:rPr lang="en-US">
+                <a:solidFill>
+                  <a:schemeClr val="tx1"/>
+                </a:solidFill>
+              </a:rPr>
+              <a:t>Câu thuộc mẫu </a:t>
+            </a:r>
+            <a:br>
+              <a:rPr lang="en-US">
+                <a:solidFill>
+                  <a:schemeClr val="tx1"/>
+                </a:solidFill>
+              </a:rPr>
+            </a:br>
+            <a:r>
+              <a:rPr lang="en-US">
+                <a:solidFill>
+                  <a:schemeClr val="tx1"/>
+                </a:solidFill>
+              </a:rPr>
+              <a:t>MORE-GOOD</a:t>
+            </a:r>
+            <a:endParaRPr lang="en-US">
+              <a:solidFill>
+                <a:schemeClr val="tx1"/>
+              </a:solidFill>
+            </a:endParaRPr>
+          </a:p>
+        </p:txBody>
+      </p:sp>
+      <mc:AlternateContent xmlns:mc="http://schemas.openxmlformats.org/markup-compatibility/2006">
+        <mc:Choice xmlns:a14="http://schemas.microsoft.com/office/drawing/2010/main" Requires="a14">
+          <p:sp>
+            <p:nvSpPr>
+              <p:cNvPr id="16" name="Diamond 15"/>
+              <p:cNvSpPr/>
+              <p:nvPr/>
+            </p:nvSpPr>
+            <p:spPr>
+              <a:xfrm>
+                <a:off x="767408" y="5143929"/>
+                <a:ext cx="2667000" cy="1197665"/>
+              </a:xfrm>
+              <a:prstGeom prst="diamond">
+                <a:avLst/>
+              </a:prstGeom>
+              <a:noFill/>
+              <a:ln>
+                <a:solidFill>
+                  <a:schemeClr val="tx1"/>
+                </a:solidFill>
+              </a:ln>
+            </p:spPr>
+            <p:style>
+              <a:lnRef idx="2">
+                <a:schemeClr val="dk1">
+                  <a:shade val="50000"/>
+                </a:schemeClr>
+              </a:lnRef>
+              <a:fillRef idx="1">
+                <a:schemeClr val="dk1"/>
+              </a:fillRef>
+              <a:effectRef idx="0">
+                <a:schemeClr val="dk1"/>
+              </a:effectRef>
+              <a:fontRef idx="minor">
+                <a:schemeClr val="lt1"/>
+              </a:fontRef>
+            </p:style>
+            <p:txBody>
+              <a:bodyPr rtlCol="0" anchor="ctr"/>
+              <a:lstStyle/>
+              <a:p>
+                <a:pPr algn="ctr"/>
+                <a14:m>
+                  <m:oMathPara xmlns:m="http://schemas.openxmlformats.org/officeDocument/2006/math">
+                    <m:oMathParaPr>
+                      <m:jc m:val="centerGroup"/>
+                    </m:oMathParaPr>
+                    <m:oMath xmlns:m="http://schemas.openxmlformats.org/officeDocument/2006/math">
+                      <m:sSub>
+                        <m:sSubPr>
+                          <m:ctrlPr>
+                            <a:rPr lang="en-US" b="0" i="1" smtClean="0">
+                              <a:solidFill>
+                                <a:schemeClr val="tx1"/>
+                              </a:solidFill>
+                              <a:latin typeface="Cambria Math" panose="02040503050406030204" pitchFamily="18" charset="0"/>
+                            </a:rPr>
+                          </m:ctrlPr>
+                        </m:sSubPr>
+                        <m:e>
+                          <m:r>
+                            <a:rPr lang="en-US" b="0" i="1" smtClean="0">
+                              <a:solidFill>
+                                <a:schemeClr val="tx1"/>
+                              </a:solidFill>
+                              <a:latin typeface="Cambria Math" panose="02040503050406030204" pitchFamily="18" charset="0"/>
+                            </a:rPr>
+                            <m:t>𝑤</m:t>
+                          </m:r>
+                        </m:e>
+                        <m:sub>
+                          <m:r>
+                            <a:rPr lang="en-US" b="0" i="1" smtClean="0">
+                              <a:solidFill>
+                                <a:schemeClr val="tx1"/>
+                              </a:solidFill>
+                              <a:latin typeface="Cambria Math" panose="02040503050406030204" pitchFamily="18" charset="0"/>
+                            </a:rPr>
+                            <m:t>𝑗</m:t>
+                          </m:r>
+                        </m:sub>
+                      </m:sSub>
+                      <m:r>
+                        <a:rPr lang="en-US" b="0" i="1" smtClean="0">
+                          <a:solidFill>
+                            <a:schemeClr val="tx1"/>
+                          </a:solidFill>
+                          <a:latin typeface="Cambria Math" panose="02040503050406030204" pitchFamily="18" charset="0"/>
+                          <a:ea typeface="Cambria Math" panose="02040503050406030204" pitchFamily="18" charset="0"/>
+                        </a:rPr>
+                        <m:t>∈</m:t>
+                      </m:r>
+                      <m:r>
+                        <a:rPr lang="en-US" b="0" i="1" smtClean="0">
+                          <a:solidFill>
+                            <a:schemeClr val="tx1"/>
+                          </a:solidFill>
+                          <a:latin typeface="Cambria Math" panose="02040503050406030204" pitchFamily="18" charset="0"/>
+                          <a:ea typeface="Cambria Math" panose="02040503050406030204" pitchFamily="18" charset="0"/>
+                        </a:rPr>
+                        <m:t>𝐺𝑂𝑂𝐷</m:t>
+                      </m:r>
+                    </m:oMath>
+                  </m:oMathPara>
+                </a14:m>
+                <a:endParaRPr lang="en-US">
+                  <a:solidFill>
+                    <a:schemeClr val="tx1"/>
+                  </a:solidFill>
+                </a:endParaRPr>
+              </a:p>
+            </p:txBody>
+          </p:sp>
+        </mc:Choice>
+        <mc:Fallback>
+          <p:sp>
+            <p:nvSpPr>
+              <p:cNvPr id="16" name="Diamond 15"/>
+              <p:cNvSpPr>
+                <a:spLocks noRot="1" noChangeAspect="1" noMove="1" noResize="1" noEditPoints="1" noAdjustHandles="1" noChangeArrowheads="1" noChangeShapeType="1" noTextEdit="1"/>
+              </p:cNvSpPr>
+              <p:nvPr/>
+            </p:nvSpPr>
+            <p:spPr>
+              <a:xfrm>
+                <a:off x="767408" y="5143929"/>
+                <a:ext cx="2667000" cy="1197665"/>
+              </a:xfrm>
+              <a:prstGeom prst="diamond">
+                <a:avLst/>
+              </a:prstGeom>
+              <a:blipFill>
+                <a:blip r:embed="rId5"/>
+                <a:stretch>
+                  <a:fillRect/>
+                </a:stretch>
+              </a:blipFill>
+              <a:ln>
+                <a:solidFill>
+                  <a:schemeClr val="tx1"/>
+                </a:solidFill>
+              </a:ln>
+            </p:spPr>
+            <p:txBody>
+              <a:bodyPr/>
+              <a:lstStyle/>
+              <a:p>
+                <a:r>
+                  <a:rPr lang="en-US">
+                    <a:noFill/>
+                  </a:rPr>
+                  <a:t> </a:t>
+                </a:r>
+              </a:p>
+            </p:txBody>
+          </p:sp>
+        </mc:Fallback>
+      </mc:AlternateContent>
+      <mc:AlternateContent xmlns:mc="http://schemas.openxmlformats.org/markup-compatibility/2006">
+        <mc:Choice xmlns:a14="http://schemas.microsoft.com/office/drawing/2010/main" Requires="a14">
+          <p:sp>
+            <p:nvSpPr>
+              <p:cNvPr id="19" name="Diamond 18"/>
+              <p:cNvSpPr/>
+              <p:nvPr/>
+            </p:nvSpPr>
+            <p:spPr>
+              <a:xfrm>
+                <a:off x="4103618" y="2042491"/>
+                <a:ext cx="2707585" cy="1215059"/>
+              </a:xfrm>
+              <a:prstGeom prst="diamond">
+                <a:avLst/>
+              </a:prstGeom>
+              <a:noFill/>
+              <a:ln>
+                <a:solidFill>
+                  <a:schemeClr val="tx1"/>
+                </a:solidFill>
+              </a:ln>
+            </p:spPr>
+            <p:style>
+              <a:lnRef idx="2">
+                <a:schemeClr val="dk1">
+                  <a:shade val="50000"/>
+                </a:schemeClr>
+              </a:lnRef>
+              <a:fillRef idx="1">
+                <a:schemeClr val="dk1"/>
+              </a:fillRef>
+              <a:effectRef idx="0">
+                <a:schemeClr val="dk1"/>
+              </a:effectRef>
+              <a:fontRef idx="minor">
+                <a:schemeClr val="lt1"/>
+              </a:fontRef>
+            </p:style>
+            <p:txBody>
+              <a:bodyPr rtlCol="0" anchor="ctr"/>
+              <a:lstStyle/>
+              <a:p>
+                <a:pPr algn="ctr"/>
+                <a14:m>
+                  <m:oMathPara xmlns:m="http://schemas.openxmlformats.org/officeDocument/2006/math">
+                    <m:oMathParaPr>
+                      <m:jc m:val="centerGroup"/>
+                    </m:oMathParaPr>
+                    <m:oMath xmlns:m="http://schemas.openxmlformats.org/officeDocument/2006/math">
+                      <m:sSub>
+                        <m:sSubPr>
+                          <m:ctrlPr>
+                            <a:rPr lang="en-US" b="0" i="1" smtClean="0">
+                              <a:solidFill>
+                                <a:schemeClr val="tx1"/>
+                              </a:solidFill>
+                              <a:latin typeface="Cambria Math" panose="02040503050406030204" pitchFamily="18" charset="0"/>
+                            </a:rPr>
+                          </m:ctrlPr>
+                        </m:sSubPr>
+                        <m:e>
+                          <m:r>
+                            <a:rPr lang="en-US" b="0" i="1" smtClean="0">
+                              <a:solidFill>
+                                <a:schemeClr val="tx1"/>
+                              </a:solidFill>
+                              <a:latin typeface="Cambria Math" panose="02040503050406030204" pitchFamily="18" charset="0"/>
+                            </a:rPr>
+                            <m:t>𝑤</m:t>
+                          </m:r>
+                        </m:e>
+                        <m:sub>
+                          <m:r>
+                            <a:rPr lang="en-US" b="0" i="1" smtClean="0">
+                              <a:solidFill>
+                                <a:schemeClr val="tx1"/>
+                              </a:solidFill>
+                              <a:latin typeface="Cambria Math" panose="02040503050406030204" pitchFamily="18" charset="0"/>
+                            </a:rPr>
+                            <m:t>𝑖</m:t>
+                          </m:r>
+                        </m:sub>
+                      </m:sSub>
+                      <m:r>
+                        <a:rPr lang="en-US" b="0" i="1" smtClean="0">
+                          <a:solidFill>
+                            <a:schemeClr val="tx1"/>
+                          </a:solidFill>
+                          <a:latin typeface="Cambria Math" panose="02040503050406030204" pitchFamily="18" charset="0"/>
+                          <a:ea typeface="Cambria Math" panose="02040503050406030204" pitchFamily="18" charset="0"/>
+                        </a:rPr>
+                        <m:t>∈</m:t>
+                      </m:r>
+                      <m:r>
+                        <a:rPr lang="en-US" b="0" i="1" smtClean="0">
+                          <a:solidFill>
+                            <a:schemeClr val="tx1"/>
+                          </a:solidFill>
+                          <a:latin typeface="Cambria Math" panose="02040503050406030204" pitchFamily="18" charset="0"/>
+                          <a:ea typeface="Cambria Math" panose="02040503050406030204" pitchFamily="18" charset="0"/>
+                        </a:rPr>
+                        <m:t>𝐿𝐸𝑆𝑆</m:t>
+                      </m:r>
+                    </m:oMath>
+                  </m:oMathPara>
+                </a14:m>
+                <a:endParaRPr lang="en-US">
+                  <a:solidFill>
+                    <a:schemeClr val="tx1"/>
+                  </a:solidFill>
+                </a:endParaRPr>
+              </a:p>
+            </p:txBody>
+          </p:sp>
+        </mc:Choice>
+        <mc:Fallback>
+          <p:sp>
+            <p:nvSpPr>
+              <p:cNvPr id="19" name="Diamond 18"/>
+              <p:cNvSpPr>
+                <a:spLocks noRot="1" noChangeAspect="1" noMove="1" noResize="1" noEditPoints="1" noAdjustHandles="1" noChangeArrowheads="1" noChangeShapeType="1" noTextEdit="1"/>
+              </p:cNvSpPr>
+              <p:nvPr/>
+            </p:nvSpPr>
+            <p:spPr>
+              <a:xfrm>
+                <a:off x="4103618" y="2042491"/>
+                <a:ext cx="2707585" cy="1215059"/>
+              </a:xfrm>
+              <a:prstGeom prst="diamond">
+                <a:avLst/>
+              </a:prstGeom>
+              <a:blipFill>
+                <a:blip r:embed="rId6"/>
+                <a:stretch>
+                  <a:fillRect/>
+                </a:stretch>
+              </a:blipFill>
+              <a:ln>
+                <a:solidFill>
+                  <a:schemeClr val="tx1"/>
+                </a:solidFill>
+              </a:ln>
+            </p:spPr>
+            <p:txBody>
+              <a:bodyPr/>
+              <a:lstStyle/>
+              <a:p>
+                <a:r>
+                  <a:rPr lang="en-US">
+                    <a:noFill/>
+                  </a:rPr>
+                  <a:t> </a:t>
+                </a:r>
+              </a:p>
+            </p:txBody>
+          </p:sp>
+        </mc:Fallback>
+      </mc:AlternateContent>
+      <p:sp>
+        <p:nvSpPr>
+          <p:cNvPr id="20" name="Rectangle 19"/>
+          <p:cNvSpPr/>
+          <p:nvPr/>
+        </p:nvSpPr>
+        <p:spPr>
+          <a:xfrm>
+            <a:off x="4543011" y="9243126"/>
+            <a:ext cx="1828800" cy="622852"/>
+          </a:xfrm>
+          <a:prstGeom prst="rect">
+            <a:avLst/>
+          </a:prstGeom>
+          <a:noFill/>
+          <a:ln>
+            <a:solidFill>
+              <a:schemeClr val="tx1"/>
+            </a:solidFill>
+          </a:ln>
+        </p:spPr>
+        <p:style>
+          <a:lnRef idx="2">
+            <a:schemeClr val="accent1">
+              <a:shade val="50000"/>
+            </a:schemeClr>
+          </a:lnRef>
+          <a:fillRef idx="1">
+            <a:schemeClr val="accent1"/>
+          </a:fillRef>
+          <a:effectRef idx="0">
+            <a:schemeClr val="accent1"/>
+          </a:effectRef>
+          <a:fontRef idx="minor">
+            <a:schemeClr val="lt1"/>
+          </a:fontRef>
+        </p:style>
+        <p:txBody>
+          <a:bodyPr rtlCol="0" anchor="ctr"/>
+          <a:lstStyle/>
+          <a:p>
+            <a:pPr algn="ctr"/>
+            <a:r>
+              <a:rPr lang="en-US">
+                <a:solidFill>
+                  <a:schemeClr val="tx1"/>
+                </a:solidFill>
+              </a:rPr>
+              <a:t>Xét đến từ tiếp theo w</a:t>
+            </a:r>
+            <a:r>
+              <a:rPr lang="en-US" baseline="-25000">
+                <a:solidFill>
+                  <a:schemeClr val="tx1"/>
+                </a:solidFill>
+              </a:rPr>
+              <a:t>i+1</a:t>
+            </a:r>
+            <a:endParaRPr lang="en-US">
+              <a:solidFill>
+                <a:schemeClr val="tx1"/>
+              </a:solidFill>
+            </a:endParaRPr>
+          </a:p>
+        </p:txBody>
+      </p:sp>
+      <p:cxnSp>
+        <p:nvCxnSpPr>
+          <p:cNvPr id="22" name="Straight Arrow Connector 21"/>
+          <p:cNvCxnSpPr>
+            <a:stCxn id="4" idx="2"/>
+            <a:endCxn id="5" idx="0"/>
+          </p:cNvCxnSpPr>
+          <p:nvPr/>
+        </p:nvCxnSpPr>
+        <p:spPr>
+          <a:xfrm>
+            <a:off x="5457411" y="-1117324"/>
+            <a:ext cx="0" cy="467140"/>
+          </a:xfrm>
+          <a:prstGeom prst="straightConnector1">
+            <a:avLst/>
+          </a:prstGeom>
+          <a:ln w="12700">
+            <a:solidFill>
+              <a:schemeClr val="tx1"/>
+            </a:solidFill>
+            <a:tailEnd type="triangle"/>
+          </a:ln>
+        </p:spPr>
+        <p:style>
+          <a:lnRef idx="1">
+            <a:schemeClr val="accent1"/>
+          </a:lnRef>
+          <a:fillRef idx="0">
+            <a:schemeClr val="accent1"/>
+          </a:fillRef>
+          <a:effectRef idx="0">
+            <a:schemeClr val="accent1"/>
+          </a:effectRef>
+          <a:fontRef idx="minor">
+            <a:schemeClr val="tx1"/>
+          </a:fontRef>
+        </p:style>
+      </p:cxnSp>
+      <p:cxnSp>
+        <p:nvCxnSpPr>
+          <p:cNvPr id="23" name="Straight Arrow Connector 22"/>
+          <p:cNvCxnSpPr>
+            <a:stCxn id="5" idx="2"/>
+            <a:endCxn id="6" idx="0"/>
+          </p:cNvCxnSpPr>
+          <p:nvPr/>
+        </p:nvCxnSpPr>
+        <p:spPr>
+          <a:xfrm>
+            <a:off x="5457411" y="-27332"/>
+            <a:ext cx="0" cy="467140"/>
+          </a:xfrm>
+          <a:prstGeom prst="straightConnector1">
+            <a:avLst/>
+          </a:prstGeom>
+          <a:ln w="12700">
+            <a:solidFill>
+              <a:schemeClr val="tx1"/>
+            </a:solidFill>
+            <a:tailEnd type="triangle"/>
+          </a:ln>
+        </p:spPr>
+        <p:style>
+          <a:lnRef idx="1">
+            <a:schemeClr val="accent1"/>
+          </a:lnRef>
+          <a:fillRef idx="0">
+            <a:schemeClr val="accent1"/>
+          </a:fillRef>
+          <a:effectRef idx="0">
+            <a:schemeClr val="accent1"/>
+          </a:effectRef>
+          <a:fontRef idx="minor">
+            <a:schemeClr val="tx1"/>
+          </a:fontRef>
+        </p:style>
+      </p:cxnSp>
+      <p:cxnSp>
+        <p:nvCxnSpPr>
+          <p:cNvPr id="26" name="Straight Arrow Connector 25"/>
+          <p:cNvCxnSpPr>
+            <a:stCxn id="6" idx="2"/>
+            <a:endCxn id="19" idx="0"/>
+          </p:cNvCxnSpPr>
+          <p:nvPr/>
+        </p:nvCxnSpPr>
+        <p:spPr>
+          <a:xfrm>
+            <a:off x="5457411" y="1654867"/>
+            <a:ext cx="0" cy="387624"/>
+          </a:xfrm>
+          <a:prstGeom prst="straightConnector1">
+            <a:avLst/>
+          </a:prstGeom>
+          <a:ln w="12700">
+            <a:solidFill>
+              <a:schemeClr val="tx1"/>
+            </a:solidFill>
+            <a:tailEnd type="triangle"/>
+          </a:ln>
+        </p:spPr>
+        <p:style>
+          <a:lnRef idx="1">
+            <a:schemeClr val="accent1"/>
+          </a:lnRef>
+          <a:fillRef idx="0">
+            <a:schemeClr val="accent1"/>
+          </a:fillRef>
+          <a:effectRef idx="0">
+            <a:schemeClr val="accent1"/>
+          </a:effectRef>
+          <a:fontRef idx="minor">
+            <a:schemeClr val="tx1"/>
+          </a:fontRef>
+        </p:style>
+      </p:cxnSp>
+      <p:cxnSp>
+        <p:nvCxnSpPr>
+          <p:cNvPr id="33" name="Straight Arrow Connector 32"/>
+          <p:cNvCxnSpPr>
+            <a:stCxn id="19" idx="1"/>
+            <a:endCxn id="13" idx="3"/>
+          </p:cNvCxnSpPr>
+          <p:nvPr/>
+        </p:nvCxnSpPr>
+        <p:spPr>
+          <a:xfrm flipH="1" flipV="1">
+            <a:off x="3263786" y="2650020"/>
+            <a:ext cx="839832" cy="1"/>
+          </a:xfrm>
+          <a:prstGeom prst="straightConnector1">
+            <a:avLst/>
+          </a:prstGeom>
+          <a:ln w="12700">
+            <a:solidFill>
+              <a:schemeClr val="tx1"/>
+            </a:solidFill>
+            <a:tailEnd type="triangle"/>
+          </a:ln>
+        </p:spPr>
+        <p:style>
+          <a:lnRef idx="1">
+            <a:schemeClr val="accent1"/>
+          </a:lnRef>
+          <a:fillRef idx="0">
+            <a:schemeClr val="accent1"/>
+          </a:fillRef>
+          <a:effectRef idx="0">
+            <a:schemeClr val="accent1"/>
+          </a:effectRef>
+          <a:fontRef idx="minor">
+            <a:schemeClr val="tx1"/>
+          </a:fontRef>
+        </p:style>
+      </p:cxnSp>
+      <p:cxnSp>
+        <p:nvCxnSpPr>
+          <p:cNvPr id="38" name="Connector: Elbow 37"/>
+          <p:cNvCxnSpPr>
+            <a:stCxn id="6" idx="3"/>
+            <a:endCxn id="7" idx="0"/>
+          </p:cNvCxnSpPr>
+          <p:nvPr/>
+        </p:nvCxnSpPr>
+        <p:spPr>
+          <a:xfrm>
+            <a:off x="6811203" y="1047338"/>
+            <a:ext cx="2117524" cy="1291256"/>
+          </a:xfrm>
+          <a:prstGeom prst="bentConnector2">
+            <a:avLst/>
+          </a:prstGeom>
+          <a:ln w="12700">
+            <a:solidFill>
+              <a:schemeClr val="tx1"/>
+            </a:solidFill>
+            <a:tailEnd type="triangle"/>
+          </a:ln>
+        </p:spPr>
+        <p:style>
+          <a:lnRef idx="1">
+            <a:schemeClr val="accent1"/>
+          </a:lnRef>
+          <a:fillRef idx="0">
+            <a:schemeClr val="accent1"/>
+          </a:fillRef>
+          <a:effectRef idx="0">
+            <a:schemeClr val="accent1"/>
+          </a:effectRef>
+          <a:fontRef idx="minor">
+            <a:schemeClr val="tx1"/>
+          </a:fontRef>
+        </p:style>
+      </p:cxnSp>
+      <p:sp>
+        <p:nvSpPr>
+          <p:cNvPr id="39" name="TextBox 38"/>
+          <p:cNvSpPr txBox="1"/>
+          <p:nvPr/>
+        </p:nvSpPr>
+        <p:spPr>
+          <a:xfrm>
+            <a:off x="7425050" y="678005"/>
+            <a:ext cx="681597" cy="369332"/>
+          </a:xfrm>
+          <a:prstGeom prst="rect">
+            <a:avLst/>
+          </a:prstGeom>
+          <a:noFill/>
+        </p:spPr>
+        <p:txBody>
+          <a:bodyPr wrap="none" rtlCol="0">
+            <a:spAutoFit/>
+          </a:bodyPr>
+          <a:lstStyle/>
+          <a:p>
+            <a:r>
+              <a:rPr lang="en-US"/>
+              <a:t>Đúng</a:t>
+            </a:r>
+            <a:endParaRPr lang="en-US"/>
+          </a:p>
+        </p:txBody>
+      </p:sp>
+      <p:sp>
+        <p:nvSpPr>
+          <p:cNvPr id="40" name="TextBox 39"/>
+          <p:cNvSpPr txBox="1"/>
+          <p:nvPr/>
+        </p:nvSpPr>
+        <p:spPr>
+          <a:xfrm>
+            <a:off x="5441333" y="1627608"/>
+            <a:ext cx="453970" cy="369332"/>
+          </a:xfrm>
+          <a:prstGeom prst="rect">
+            <a:avLst/>
+          </a:prstGeom>
+          <a:noFill/>
+        </p:spPr>
+        <p:txBody>
+          <a:bodyPr wrap="none" rtlCol="0">
+            <a:spAutoFit/>
+          </a:bodyPr>
+          <a:lstStyle/>
+          <a:p>
+            <a:r>
+              <a:rPr lang="en-US"/>
+              <a:t>Sai</a:t>
+            </a:r>
+            <a:endParaRPr lang="en-US"/>
+          </a:p>
+        </p:txBody>
+      </p:sp>
+      <p:sp>
+        <p:nvSpPr>
+          <p:cNvPr id="41" name="TextBox 40"/>
+          <p:cNvSpPr txBox="1"/>
+          <p:nvPr/>
+        </p:nvSpPr>
+        <p:spPr>
+          <a:xfrm>
+            <a:off x="3514124" y="2338594"/>
+            <a:ext cx="681597" cy="369332"/>
+          </a:xfrm>
+          <a:prstGeom prst="rect">
+            <a:avLst/>
+          </a:prstGeom>
+          <a:noFill/>
+        </p:spPr>
+        <p:txBody>
+          <a:bodyPr wrap="none" rtlCol="0">
+            <a:spAutoFit/>
+          </a:bodyPr>
+          <a:lstStyle/>
+          <a:p>
+            <a:r>
+              <a:rPr lang="en-US"/>
+              <a:t>Đúng</a:t>
+            </a:r>
+            <a:endParaRPr lang="en-US"/>
+          </a:p>
+        </p:txBody>
+      </p:sp>
+      <p:sp>
+        <p:nvSpPr>
+          <p:cNvPr id="42" name="TextBox 41"/>
+          <p:cNvSpPr txBox="1"/>
+          <p:nvPr/>
+        </p:nvSpPr>
+        <p:spPr>
+          <a:xfrm>
+            <a:off x="5457410" y="3316446"/>
+            <a:ext cx="453970" cy="369332"/>
+          </a:xfrm>
+          <a:prstGeom prst="rect">
+            <a:avLst/>
+          </a:prstGeom>
+          <a:noFill/>
+        </p:spPr>
+        <p:txBody>
+          <a:bodyPr wrap="none" rtlCol="0">
+            <a:spAutoFit/>
+          </a:bodyPr>
+          <a:lstStyle/>
+          <a:p>
+            <a:r>
+              <a:rPr lang="en-US"/>
+              <a:t>Sai</a:t>
+            </a:r>
+            <a:endParaRPr lang="en-US"/>
+          </a:p>
+        </p:txBody>
+      </p:sp>
+      <p:cxnSp>
+        <p:nvCxnSpPr>
+          <p:cNvPr id="43" name="Straight Arrow Connector 42"/>
+          <p:cNvCxnSpPr>
+            <a:stCxn id="19" idx="2"/>
+            <a:endCxn id="20" idx="0"/>
+          </p:cNvCxnSpPr>
+          <p:nvPr/>
+        </p:nvCxnSpPr>
+        <p:spPr>
+          <a:xfrm>
+            <a:off x="5457411" y="3257550"/>
+            <a:ext cx="0" cy="5985576"/>
+          </a:xfrm>
+          <a:prstGeom prst="straightConnector1">
+            <a:avLst/>
+          </a:prstGeom>
+          <a:ln w="12700">
+            <a:solidFill>
+              <a:schemeClr val="tx1"/>
+            </a:solidFill>
+            <a:tailEnd type="triangle"/>
+          </a:ln>
+        </p:spPr>
+        <p:style>
+          <a:lnRef idx="1">
+            <a:schemeClr val="accent1"/>
+          </a:lnRef>
+          <a:fillRef idx="0">
+            <a:schemeClr val="accent1"/>
+          </a:fillRef>
+          <a:effectRef idx="0">
+            <a:schemeClr val="accent1"/>
+          </a:effectRef>
+          <a:fontRef idx="minor">
+            <a:schemeClr val="tx1"/>
+          </a:fontRef>
+        </p:style>
+      </p:cxnSp>
+      <p:cxnSp>
+        <p:nvCxnSpPr>
+          <p:cNvPr id="46" name="Straight Arrow Connector 45"/>
+          <p:cNvCxnSpPr>
+            <a:stCxn id="13" idx="2"/>
+            <a:endCxn id="14" idx="0"/>
+          </p:cNvCxnSpPr>
+          <p:nvPr/>
+        </p:nvCxnSpPr>
+        <p:spPr>
+          <a:xfrm>
+            <a:off x="2100908" y="2961446"/>
+            <a:ext cx="0" cy="764500"/>
+          </a:xfrm>
+          <a:prstGeom prst="straightConnector1">
+            <a:avLst/>
+          </a:prstGeom>
+          <a:ln w="12700">
+            <a:solidFill>
+              <a:schemeClr val="tx1"/>
+            </a:solidFill>
+            <a:tailEnd type="triangle"/>
+          </a:ln>
+        </p:spPr>
+        <p:style>
+          <a:lnRef idx="1">
+            <a:schemeClr val="accent1"/>
+          </a:lnRef>
+          <a:fillRef idx="0">
+            <a:schemeClr val="accent1"/>
+          </a:fillRef>
+          <a:effectRef idx="0">
+            <a:schemeClr val="accent1"/>
+          </a:effectRef>
+          <a:fontRef idx="minor">
+            <a:schemeClr val="tx1"/>
+          </a:fontRef>
+        </p:style>
+      </p:cxnSp>
+      <p:cxnSp>
+        <p:nvCxnSpPr>
+          <p:cNvPr id="49" name="Straight Arrow Connector 48"/>
+          <p:cNvCxnSpPr>
+            <a:stCxn id="14" idx="2"/>
+            <a:endCxn id="16" idx="0"/>
+          </p:cNvCxnSpPr>
+          <p:nvPr/>
+        </p:nvCxnSpPr>
+        <p:spPr>
+          <a:xfrm>
+            <a:off x="2100908" y="4468068"/>
+            <a:ext cx="0" cy="675861"/>
+          </a:xfrm>
+          <a:prstGeom prst="straightConnector1">
+            <a:avLst/>
+          </a:prstGeom>
+          <a:ln w="12700">
+            <a:solidFill>
+              <a:schemeClr val="tx1"/>
+            </a:solidFill>
+            <a:tailEnd type="triangle"/>
+          </a:ln>
+        </p:spPr>
+        <p:style>
+          <a:lnRef idx="1">
+            <a:schemeClr val="accent1"/>
+          </a:lnRef>
+          <a:fillRef idx="0">
+            <a:schemeClr val="accent1"/>
+          </a:fillRef>
+          <a:effectRef idx="0">
+            <a:schemeClr val="accent1"/>
+          </a:effectRef>
+          <a:fontRef idx="minor">
+            <a:schemeClr val="tx1"/>
+          </a:fontRef>
+        </p:style>
+      </p:cxnSp>
+      <p:cxnSp>
+        <p:nvCxnSpPr>
+          <p:cNvPr id="52" name="Straight Arrow Connector 51"/>
+          <p:cNvCxnSpPr>
+            <a:stCxn id="16" idx="2"/>
+            <a:endCxn id="15" idx="0"/>
+          </p:cNvCxnSpPr>
+          <p:nvPr/>
+        </p:nvCxnSpPr>
+        <p:spPr>
+          <a:xfrm>
+            <a:off x="2100908" y="6341594"/>
+            <a:ext cx="0" cy="675861"/>
+          </a:xfrm>
+          <a:prstGeom prst="straightConnector1">
+            <a:avLst/>
+          </a:prstGeom>
+          <a:ln w="12700">
+            <a:solidFill>
+              <a:schemeClr val="tx1"/>
+            </a:solidFill>
+            <a:tailEnd type="triangle"/>
+          </a:ln>
+        </p:spPr>
+        <p:style>
+          <a:lnRef idx="1">
+            <a:schemeClr val="accent1"/>
+          </a:lnRef>
+          <a:fillRef idx="0">
+            <a:schemeClr val="accent1"/>
+          </a:fillRef>
+          <a:effectRef idx="0">
+            <a:schemeClr val="accent1"/>
+          </a:effectRef>
+          <a:fontRef idx="minor">
+            <a:schemeClr val="tx1"/>
+          </a:fontRef>
+        </p:style>
+      </p:cxnSp>
+      <p:sp>
+        <p:nvSpPr>
+          <p:cNvPr id="55" name="TextBox 54"/>
+          <p:cNvSpPr txBox="1"/>
+          <p:nvPr/>
+        </p:nvSpPr>
+        <p:spPr>
+          <a:xfrm>
+            <a:off x="313438" y="5361020"/>
+            <a:ext cx="453970" cy="369332"/>
+          </a:xfrm>
+          <a:prstGeom prst="rect">
+            <a:avLst/>
+          </a:prstGeom>
+          <a:noFill/>
+        </p:spPr>
+        <p:txBody>
+          <a:bodyPr wrap="none" rtlCol="0">
+            <a:spAutoFit/>
+          </a:bodyPr>
+          <a:lstStyle/>
+          <a:p>
+            <a:r>
+              <a:rPr lang="en-US"/>
+              <a:t>Sai</a:t>
+            </a:r>
+            <a:endParaRPr lang="en-US"/>
+          </a:p>
+        </p:txBody>
+      </p:sp>
+      <p:sp>
+        <p:nvSpPr>
+          <p:cNvPr id="56" name="TextBox 55"/>
+          <p:cNvSpPr txBox="1"/>
+          <p:nvPr/>
+        </p:nvSpPr>
+        <p:spPr>
+          <a:xfrm>
+            <a:off x="2117529" y="6465885"/>
+            <a:ext cx="681597" cy="369332"/>
+          </a:xfrm>
+          <a:prstGeom prst="rect">
+            <a:avLst/>
+          </a:prstGeom>
+          <a:noFill/>
+        </p:spPr>
+        <p:txBody>
+          <a:bodyPr wrap="none" rtlCol="0">
+            <a:spAutoFit/>
+          </a:bodyPr>
+          <a:lstStyle/>
+          <a:p>
+            <a:r>
+              <a:rPr lang="en-US"/>
+              <a:t>Đúng</a:t>
+            </a:r>
+            <a:endParaRPr lang="en-US"/>
+          </a:p>
+        </p:txBody>
+      </p:sp>
+      <p:cxnSp>
+        <p:nvCxnSpPr>
+          <p:cNvPr id="57" name="Straight Arrow Connector 56"/>
+          <p:cNvCxnSpPr>
+            <a:stCxn id="16" idx="1"/>
+            <a:endCxn id="18" idx="3"/>
+          </p:cNvCxnSpPr>
+          <p:nvPr/>
+        </p:nvCxnSpPr>
+        <p:spPr>
+          <a:xfrm flipH="1">
+            <a:off x="229659" y="5742762"/>
+            <a:ext cx="537749" cy="0"/>
+          </a:xfrm>
+          <a:prstGeom prst="straightConnector1">
+            <a:avLst/>
+          </a:prstGeom>
+          <a:ln w="12700">
+            <a:solidFill>
+              <a:schemeClr val="tx1"/>
+            </a:solidFill>
+            <a:tailEnd type="triangle"/>
+          </a:ln>
+        </p:spPr>
+        <p:style>
+          <a:lnRef idx="1">
+            <a:schemeClr val="accent1"/>
+          </a:lnRef>
+          <a:fillRef idx="0">
+            <a:schemeClr val="accent1"/>
+          </a:fillRef>
+          <a:effectRef idx="0">
+            <a:schemeClr val="accent1"/>
+          </a:effectRef>
+          <a:fontRef idx="minor">
+            <a:schemeClr val="tx1"/>
+          </a:fontRef>
+        </p:style>
+      </p:cxnSp>
+      <p:grpSp>
+        <p:nvGrpSpPr>
+          <p:cNvPr id="67" name="Group 66"/>
+          <p:cNvGrpSpPr/>
+          <p:nvPr/>
+        </p:nvGrpSpPr>
+        <p:grpSpPr>
+          <a:xfrm>
+            <a:off x="-2437341" y="5143929"/>
+            <a:ext cx="2667000" cy="2620619"/>
+            <a:chOff x="-2437341" y="5143929"/>
+            <a:chExt cx="2667000" cy="2620619"/>
+          </a:xfrm>
+        </p:grpSpPr>
+        <p:sp>
+          <p:nvSpPr>
+            <p:cNvPr id="17" name="Rectangle 16"/>
+            <p:cNvSpPr/>
+            <p:nvPr/>
+          </p:nvSpPr>
+          <p:spPr>
+            <a:xfrm>
+              <a:off x="-2266719" y="7022426"/>
+              <a:ext cx="2325756" cy="742122"/>
+            </a:xfrm>
+            <a:prstGeom prst="rect">
+              <a:avLst/>
+            </a:prstGeom>
+            <a:noFill/>
+            <a:ln>
+              <a:solidFill>
+                <a:schemeClr val="tx1"/>
+              </a:solidFill>
+            </a:ln>
+          </p:spPr>
+          <p:style>
+            <a:lnRef idx="2">
+              <a:schemeClr val="accent1">
+                <a:shade val="50000"/>
+              </a:schemeClr>
+            </a:lnRef>
+            <a:fillRef idx="1">
+              <a:schemeClr val="accent1"/>
+            </a:fillRef>
+            <a:effectRef idx="0">
+              <a:schemeClr val="accent1"/>
+            </a:effectRef>
+            <a:fontRef idx="minor">
+              <a:schemeClr val="lt1"/>
+            </a:fontRef>
+          </p:style>
+          <p:txBody>
+            <a:bodyPr rtlCol="0" anchor="ctr"/>
+            <a:lstStyle/>
+            <a:p>
+              <a:pPr algn="ctr"/>
+              <a:r>
+                <a:rPr lang="en-US">
+                  <a:solidFill>
+                    <a:schemeClr val="tx1"/>
+                  </a:solidFill>
+                </a:rPr>
+                <a:t>Câu thuộc mẫu </a:t>
+              </a:r>
+              <a:br>
+                <a:rPr lang="en-US">
+                  <a:solidFill>
+                    <a:schemeClr val="tx1"/>
+                  </a:solidFill>
+                </a:rPr>
+              </a:br>
+              <a:r>
+                <a:rPr lang="en-US">
+                  <a:solidFill>
+                    <a:schemeClr val="tx1"/>
+                  </a:solidFill>
+                </a:rPr>
+                <a:t>MORE-BAD</a:t>
+              </a:r>
+              <a:endParaRPr lang="en-US">
+                <a:solidFill>
+                  <a:schemeClr val="tx1"/>
+                </a:solidFill>
+              </a:endParaRPr>
+            </a:p>
+          </p:txBody>
+        </p:sp>
+        <mc:AlternateContent xmlns:mc="http://schemas.openxmlformats.org/markup-compatibility/2006">
+          <mc:Choice xmlns:a14="http://schemas.microsoft.com/office/drawing/2010/main" Requires="a14">
+            <p:sp>
+              <p:nvSpPr>
+                <p:cNvPr id="18" name="Diamond 17"/>
+                <p:cNvSpPr/>
+                <p:nvPr/>
+              </p:nvSpPr>
+              <p:spPr>
+                <a:xfrm>
+                  <a:off x="-2437341" y="5143929"/>
+                  <a:ext cx="2667000" cy="1197665"/>
+                </a:xfrm>
+                <a:prstGeom prst="diamond">
+                  <a:avLst/>
+                </a:prstGeom>
+                <a:noFill/>
+                <a:ln>
+                  <a:solidFill>
+                    <a:schemeClr val="tx1"/>
+                  </a:solidFill>
+                </a:ln>
+              </p:spPr>
+              <p:style>
+                <a:lnRef idx="2">
+                  <a:schemeClr val="dk1">
+                    <a:shade val="50000"/>
+                  </a:schemeClr>
+                </a:lnRef>
+                <a:fillRef idx="1">
+                  <a:schemeClr val="dk1"/>
+                </a:fillRef>
+                <a:effectRef idx="0">
+                  <a:schemeClr val="dk1"/>
+                </a:effectRef>
+                <a:fontRef idx="minor">
+                  <a:schemeClr val="lt1"/>
+                </a:fontRef>
+              </p:style>
+              <p:txBody>
+                <a:bodyPr rtlCol="0" anchor="ctr"/>
+                <a:lstStyle/>
+                <a:p>
+                  <a:pPr algn="ctr"/>
+                  <a14:m>
+                    <m:oMathPara xmlns:m="http://schemas.openxmlformats.org/officeDocument/2006/math">
+                      <m:oMathParaPr>
+                        <m:jc m:val="centerGroup"/>
+                      </m:oMathParaPr>
+                      <m:oMath xmlns:m="http://schemas.openxmlformats.org/officeDocument/2006/math">
+                        <m:sSub>
+                          <m:sSubPr>
+                            <m:ctrlPr>
+                              <a:rPr lang="en-US" b="0" i="1" smtClean="0">
+                                <a:solidFill>
+                                  <a:schemeClr val="tx1"/>
+                                </a:solidFill>
+                                <a:latin typeface="Cambria Math" panose="02040503050406030204" pitchFamily="18" charset="0"/>
+                              </a:rPr>
+                            </m:ctrlPr>
+                          </m:sSubPr>
+                          <m:e>
+                            <m:r>
+                              <a:rPr lang="en-US" b="0" i="1" smtClean="0">
+                                <a:solidFill>
+                                  <a:schemeClr val="tx1"/>
+                                </a:solidFill>
+                                <a:latin typeface="Cambria Math" panose="02040503050406030204" pitchFamily="18" charset="0"/>
+                              </a:rPr>
+                              <m:t>𝑤</m:t>
+                            </m:r>
+                          </m:e>
+                          <m:sub>
+                            <m:r>
+                              <a:rPr lang="en-US" b="0" i="1" smtClean="0">
+                                <a:solidFill>
+                                  <a:schemeClr val="tx1"/>
+                                </a:solidFill>
+                                <a:latin typeface="Cambria Math" panose="02040503050406030204" pitchFamily="18" charset="0"/>
+                              </a:rPr>
+                              <m:t>𝑗</m:t>
+                            </m:r>
+                          </m:sub>
+                        </m:sSub>
+                        <m:r>
+                          <a:rPr lang="en-US" b="0" i="1" smtClean="0">
+                            <a:solidFill>
+                              <a:schemeClr val="tx1"/>
+                            </a:solidFill>
+                            <a:latin typeface="Cambria Math" panose="02040503050406030204" pitchFamily="18" charset="0"/>
+                            <a:ea typeface="Cambria Math" panose="02040503050406030204" pitchFamily="18" charset="0"/>
+                          </a:rPr>
+                          <m:t>∈</m:t>
+                        </m:r>
+                        <m:r>
+                          <a:rPr lang="en-US" b="0" i="1" smtClean="0">
+                            <a:solidFill>
+                              <a:schemeClr val="tx1"/>
+                            </a:solidFill>
+                            <a:latin typeface="Cambria Math" panose="02040503050406030204" pitchFamily="18" charset="0"/>
+                            <a:ea typeface="Cambria Math" panose="02040503050406030204" pitchFamily="18" charset="0"/>
+                          </a:rPr>
+                          <m:t>𝐵𝐴𝐷</m:t>
+                        </m:r>
+                      </m:oMath>
+                    </m:oMathPara>
+                  </a14:m>
+                  <a:endParaRPr lang="en-US">
+                    <a:solidFill>
+                      <a:schemeClr val="tx1"/>
+                    </a:solidFill>
+                  </a:endParaRPr>
+                </a:p>
+              </p:txBody>
+            </p:sp>
+          </mc:Choice>
+          <mc:Fallback>
+            <p:sp>
+              <p:nvSpPr>
+                <p:cNvPr id="18" name="Diamond 17"/>
+                <p:cNvSpPr>
+                  <a:spLocks noRot="1" noChangeAspect="1" noMove="1" noResize="1" noEditPoints="1" noAdjustHandles="1" noChangeArrowheads="1" noChangeShapeType="1" noTextEdit="1"/>
+                </p:cNvSpPr>
+                <p:nvPr/>
+              </p:nvSpPr>
+              <p:spPr>
+                <a:xfrm>
+                  <a:off x="-2437341" y="5143929"/>
+                  <a:ext cx="2667000" cy="1197665"/>
+                </a:xfrm>
+                <a:prstGeom prst="diamond">
+                  <a:avLst/>
+                </a:prstGeom>
+                <a:blipFill>
+                  <a:blip r:embed="rId7"/>
+                  <a:stretch>
+                    <a:fillRect/>
+                  </a:stretch>
+                </a:blipFill>
+                <a:ln>
+                  <a:solidFill>
+                    <a:schemeClr val="tx1"/>
+                  </a:solidFill>
+                </a:ln>
+              </p:spPr>
+              <p:txBody>
+                <a:bodyPr/>
+                <a:lstStyle/>
+                <a:p>
+                  <a:r>
+                    <a:rPr lang="en-US">
+                      <a:noFill/>
+                    </a:rPr>
+                    <a:t> </a:t>
+                  </a:r>
+                </a:p>
+              </p:txBody>
+            </p:sp>
+          </mc:Fallback>
+        </mc:AlternateContent>
+        <p:cxnSp>
+          <p:nvCxnSpPr>
+            <p:cNvPr id="61" name="Straight Arrow Connector 60"/>
+            <p:cNvCxnSpPr>
+              <a:stCxn id="18" idx="2"/>
+              <a:endCxn id="17" idx="0"/>
+            </p:cNvCxnSpPr>
+            <p:nvPr/>
+          </p:nvCxnSpPr>
+          <p:spPr>
+            <a:xfrm>
+              <a:off x="-1103841" y="6341594"/>
+              <a:ext cx="0" cy="680832"/>
+            </a:xfrm>
+            <a:prstGeom prst="straightConnector1">
+              <a:avLst/>
+            </a:prstGeom>
+            <a:ln w="12700">
+              <a:solidFill>
+                <a:schemeClr val="tx1"/>
+              </a:solidFill>
+              <a:tailEnd type="triangle"/>
+            </a:ln>
+          </p:spPr>
+          <p:style>
+            <a:lnRef idx="1">
+              <a:schemeClr val="accent1"/>
+            </a:lnRef>
+            <a:fillRef idx="0">
+              <a:schemeClr val="accent1"/>
+            </a:fillRef>
+            <a:effectRef idx="0">
+              <a:schemeClr val="accent1"/>
+            </a:effectRef>
+            <a:fontRef idx="minor">
+              <a:schemeClr val="tx1"/>
+            </a:fontRef>
+          </p:style>
+        </p:cxnSp>
+        <p:sp>
+          <p:nvSpPr>
+            <p:cNvPr id="64" name="TextBox 63"/>
+            <p:cNvSpPr txBox="1"/>
+            <p:nvPr/>
+          </p:nvSpPr>
+          <p:spPr>
+            <a:xfrm>
+              <a:off x="-1103841" y="6463415"/>
+              <a:ext cx="681597" cy="369332"/>
+            </a:xfrm>
+            <a:prstGeom prst="rect">
+              <a:avLst/>
+            </a:prstGeom>
+            <a:noFill/>
+          </p:spPr>
+          <p:txBody>
+            <a:bodyPr wrap="none" rtlCol="0">
+              <a:spAutoFit/>
+            </a:bodyPr>
+            <a:lstStyle/>
+            <a:p>
+              <a:r>
+                <a:rPr lang="en-US"/>
+                <a:t>Đúng</a:t>
+              </a:r>
+              <a:endParaRPr lang="en-US"/>
+            </a:p>
+          </p:txBody>
+        </p:sp>
+      </p:grpSp>
+      <p:cxnSp>
+        <p:nvCxnSpPr>
+          <p:cNvPr id="71" name="Straight Arrow Connector 70"/>
+          <p:cNvCxnSpPr>
+            <a:stCxn id="7" idx="2"/>
+            <a:endCxn id="8" idx="0"/>
+          </p:cNvCxnSpPr>
+          <p:nvPr/>
+        </p:nvCxnSpPr>
+        <p:spPr>
+          <a:xfrm>
+            <a:off x="8928727" y="2961446"/>
+            <a:ext cx="0" cy="764500"/>
+          </a:xfrm>
+          <a:prstGeom prst="straightConnector1">
+            <a:avLst/>
+          </a:prstGeom>
+          <a:ln w="12700">
+            <a:solidFill>
+              <a:schemeClr val="tx1"/>
+            </a:solidFill>
+            <a:tailEnd type="triangle"/>
+          </a:ln>
+        </p:spPr>
+        <p:style>
+          <a:lnRef idx="1">
+            <a:schemeClr val="accent1"/>
+          </a:lnRef>
+          <a:fillRef idx="0">
+            <a:schemeClr val="accent1"/>
+          </a:fillRef>
+          <a:effectRef idx="0">
+            <a:schemeClr val="accent1"/>
+          </a:effectRef>
+          <a:fontRef idx="minor">
+            <a:schemeClr val="tx1"/>
+          </a:fontRef>
+        </p:style>
+      </p:cxnSp>
+      <p:cxnSp>
+        <p:nvCxnSpPr>
+          <p:cNvPr id="74" name="Straight Arrow Connector 73"/>
+          <p:cNvCxnSpPr>
+            <a:stCxn id="8" idx="2"/>
+            <a:endCxn id="10" idx="0"/>
+          </p:cNvCxnSpPr>
+          <p:nvPr/>
+        </p:nvCxnSpPr>
+        <p:spPr>
+          <a:xfrm>
+            <a:off x="8928727" y="4468068"/>
+            <a:ext cx="0" cy="675861"/>
+          </a:xfrm>
+          <a:prstGeom prst="straightConnector1">
+            <a:avLst/>
+          </a:prstGeom>
+          <a:ln w="12700">
+            <a:solidFill>
+              <a:schemeClr val="tx1"/>
+            </a:solidFill>
+            <a:tailEnd type="triangle"/>
+          </a:ln>
+        </p:spPr>
+        <p:style>
+          <a:lnRef idx="1">
+            <a:schemeClr val="accent1"/>
+          </a:lnRef>
+          <a:fillRef idx="0">
+            <a:schemeClr val="accent1"/>
+          </a:fillRef>
+          <a:effectRef idx="0">
+            <a:schemeClr val="accent1"/>
+          </a:effectRef>
+          <a:fontRef idx="minor">
+            <a:schemeClr val="tx1"/>
+          </a:fontRef>
+        </p:style>
+      </p:cxnSp>
+      <p:cxnSp>
+        <p:nvCxnSpPr>
+          <p:cNvPr id="77" name="Straight Arrow Connector 76"/>
+          <p:cNvCxnSpPr>
+            <a:stCxn id="10" idx="2"/>
+            <a:endCxn id="9" idx="0"/>
+          </p:cNvCxnSpPr>
+          <p:nvPr/>
+        </p:nvCxnSpPr>
+        <p:spPr>
+          <a:xfrm>
+            <a:off x="8928727" y="6341594"/>
+            <a:ext cx="0" cy="675861"/>
+          </a:xfrm>
+          <a:prstGeom prst="straightConnector1">
+            <a:avLst/>
+          </a:prstGeom>
+          <a:ln w="12700">
+            <a:solidFill>
+              <a:schemeClr val="tx1"/>
+            </a:solidFill>
+            <a:tailEnd type="triangle"/>
+          </a:ln>
+        </p:spPr>
+        <p:style>
+          <a:lnRef idx="1">
+            <a:schemeClr val="accent1"/>
+          </a:lnRef>
+          <a:fillRef idx="0">
+            <a:schemeClr val="accent1"/>
+          </a:fillRef>
+          <a:effectRef idx="0">
+            <a:schemeClr val="accent1"/>
+          </a:effectRef>
+          <a:fontRef idx="minor">
+            <a:schemeClr val="tx1"/>
+          </a:fontRef>
+        </p:style>
+      </p:cxnSp>
+      <p:cxnSp>
+        <p:nvCxnSpPr>
+          <p:cNvPr id="80" name="Straight Arrow Connector 79"/>
+          <p:cNvCxnSpPr>
+            <a:stCxn id="10" idx="3"/>
+            <a:endCxn id="12" idx="1"/>
+          </p:cNvCxnSpPr>
+          <p:nvPr/>
+        </p:nvCxnSpPr>
+        <p:spPr>
+          <a:xfrm>
+            <a:off x="10262227" y="5742762"/>
+            <a:ext cx="538260" cy="0"/>
+          </a:xfrm>
+          <a:prstGeom prst="straightConnector1">
+            <a:avLst/>
+          </a:prstGeom>
+          <a:ln w="12700">
+            <a:solidFill>
+              <a:schemeClr val="tx1"/>
+            </a:solidFill>
+            <a:tailEnd type="triangle"/>
+          </a:ln>
+        </p:spPr>
+        <p:style>
+          <a:lnRef idx="1">
+            <a:schemeClr val="accent1"/>
+          </a:lnRef>
+          <a:fillRef idx="0">
+            <a:schemeClr val="accent1"/>
+          </a:fillRef>
+          <a:effectRef idx="0">
+            <a:schemeClr val="accent1"/>
+          </a:effectRef>
+          <a:fontRef idx="minor">
+            <a:schemeClr val="tx1"/>
+          </a:fontRef>
+        </p:style>
+      </p:cxnSp>
+      <p:cxnSp>
+        <p:nvCxnSpPr>
+          <p:cNvPr id="83" name="Straight Arrow Connector 82"/>
+          <p:cNvCxnSpPr>
+            <a:stCxn id="12" idx="2"/>
+            <a:endCxn id="11" idx="0"/>
+          </p:cNvCxnSpPr>
+          <p:nvPr/>
+        </p:nvCxnSpPr>
+        <p:spPr>
+          <a:xfrm>
+            <a:off x="12133987" y="6341594"/>
+            <a:ext cx="0" cy="680832"/>
+          </a:xfrm>
+          <a:prstGeom prst="straightConnector1">
+            <a:avLst/>
+          </a:prstGeom>
+          <a:ln w="12700">
+            <a:solidFill>
+              <a:schemeClr val="tx1"/>
+            </a:solidFill>
+            <a:tailEnd type="triangle"/>
+          </a:ln>
+        </p:spPr>
+        <p:style>
+          <a:lnRef idx="1">
+            <a:schemeClr val="accent1"/>
+          </a:lnRef>
+          <a:fillRef idx="0">
+            <a:schemeClr val="accent1"/>
+          </a:fillRef>
+          <a:effectRef idx="0">
+            <a:schemeClr val="accent1"/>
+          </a:effectRef>
+          <a:fontRef idx="minor">
+            <a:schemeClr val="tx1"/>
+          </a:fontRef>
+        </p:style>
+      </p:cxnSp>
+      <p:cxnSp>
+        <p:nvCxnSpPr>
+          <p:cNvPr id="86" name="Connector: Elbow 85"/>
+          <p:cNvCxnSpPr>
+            <a:stCxn id="12" idx="3"/>
+            <a:endCxn id="20" idx="3"/>
+          </p:cNvCxnSpPr>
+          <p:nvPr/>
+        </p:nvCxnSpPr>
+        <p:spPr>
+          <a:xfrm flipH="1">
+            <a:off x="6371811" y="5742762"/>
+            <a:ext cx="7095676" cy="3811790"/>
+          </a:xfrm>
+          <a:prstGeom prst="bentConnector3">
+            <a:avLst>
+              <a:gd name="adj1" fmla="val -3222"/>
+            </a:avLst>
+          </a:prstGeom>
+          <a:ln w="12700">
+            <a:solidFill>
+              <a:schemeClr val="tx1"/>
+            </a:solidFill>
+            <a:tailEnd type="triangle"/>
+          </a:ln>
+        </p:spPr>
+        <p:style>
+          <a:lnRef idx="1">
+            <a:schemeClr val="accent1"/>
+          </a:lnRef>
+          <a:fillRef idx="0">
+            <a:schemeClr val="accent1"/>
+          </a:fillRef>
+          <a:effectRef idx="0">
+            <a:schemeClr val="accent1"/>
+          </a:effectRef>
+          <a:fontRef idx="minor">
+            <a:schemeClr val="tx1"/>
+          </a:fontRef>
+        </p:style>
+      </p:cxnSp>
+      <p:cxnSp>
+        <p:nvCxnSpPr>
+          <p:cNvPr id="91" name="Connector: Elbow 90"/>
+          <p:cNvCxnSpPr>
+            <a:stCxn id="18" idx="1"/>
+            <a:endCxn id="20" idx="1"/>
+          </p:cNvCxnSpPr>
+          <p:nvPr/>
+        </p:nvCxnSpPr>
+        <p:spPr>
+          <a:xfrm rot="10800000" flipH="1" flipV="1">
+            <a:off x="-2437341" y="5742762"/>
+            <a:ext cx="6980352" cy="3811790"/>
+          </a:xfrm>
+          <a:prstGeom prst="bentConnector3">
+            <a:avLst>
+              <a:gd name="adj1" fmla="val -3275"/>
+            </a:avLst>
+          </a:prstGeom>
+          <a:ln w="12700">
+            <a:solidFill>
+              <a:schemeClr val="tx1"/>
+            </a:solidFill>
+            <a:tailEnd type="triangle"/>
+          </a:ln>
+        </p:spPr>
+        <p:style>
+          <a:lnRef idx="1">
+            <a:schemeClr val="accent1"/>
+          </a:lnRef>
+          <a:fillRef idx="0">
+            <a:schemeClr val="accent1"/>
+          </a:fillRef>
+          <a:effectRef idx="0">
+            <a:schemeClr val="accent1"/>
+          </a:effectRef>
+          <a:fontRef idx="minor">
+            <a:schemeClr val="tx1"/>
+          </a:fontRef>
+        </p:style>
+      </p:cxnSp>
+    </p:spTree>
+    <p:extLst>
+      <p:ext uri="{BB962C8B-B14F-4D97-AF65-F5344CB8AC3E}">
+        <p14:creationId xmlns:p14="http://schemas.microsoft.com/office/powerpoint/2010/main" val="2519456940"/>
+      </p:ext>
+    </p:extLst>
+  </p:cSld>
+  <p:clrMapOvr>
+    <a:masterClrMapping/>
+  </p:clrMapOvr>
+</p:sld>
+</file>
+
+<file path=ppt/slides/slide6.xml><?xml version="1.0" encoding="utf-8"?>
+<p:sld xmlns:a="http://schemas.openxmlformats.org/drawingml/2006/main" xmlns:r="http://schemas.openxmlformats.org/officeDocument/2006/relationships" xmlns:p="http://schemas.openxmlformats.org/presentationml/2006/main">
+  <p:cSld>
+    <p:spTree>
+      <p:nvGrpSpPr>
+        <p:cNvPr id="1" name=""/>
+        <p:cNvGrpSpPr/>
+        <p:nvPr/>
+      </p:nvGrpSpPr>
+      <p:grpSpPr>
+        <a:xfrm>
+          <a:off x="0" y="0"/>
+          <a:ext cx="0" cy="0"/>
+          <a:chOff x="0" y="0"/>
+          <a:chExt cx="0" cy="0"/>
+        </a:xfrm>
+      </p:grpSpPr>
+    </p:spTree>
+    <p:extLst>
+      <p:ext uri="{BB962C8B-B14F-4D97-AF65-F5344CB8AC3E}">
+        <p14:creationId xmlns:p14="http://schemas.microsoft.com/office/powerpoint/2010/main" val="2402387845"/>
+      </p:ext>
+    </p:extLst>
+  </p:cSld>
+  <p:clrMapOvr>
+    <a:masterClrMapping/>
+  </p:clrMapOvr>
+</p:sld>
+</file>
+
 <file path=ppt/theme/theme1.xml><?xml version="1.0" encoding="utf-8"?>
 <a:theme xmlns:a="http://schemas.openxmlformats.org/drawingml/2006/main" name="Office Theme">
   <a:themeElements>

</xml_diff>

<commit_message>
dang viet Hien thuc he thong
</commit_message>
<xml_diff>
--- a/mohinh.pptx
+++ b/mohinh.pptx
@@ -2039,7 +2039,7 @@
           <a:p>
             <a:fld id="{4A5F161B-FF7E-4ABE-89D0-93661BD281ED}" type="datetimeFigureOut">
               <a:rPr lang="en-US" smtClean="0"/>
-              <a:t>12/7/2016</a:t>
+              <a:t>12/10/2016</a:t>
             </a:fld>
             <a:endParaRPr lang="en-US"/>
           </a:p>
@@ -2207,7 +2207,7 @@
           <a:p>
             <a:fld id="{4A5F161B-FF7E-4ABE-89D0-93661BD281ED}" type="datetimeFigureOut">
               <a:rPr lang="en-US" smtClean="0"/>
-              <a:t>12/7/2016</a:t>
+              <a:t>12/10/2016</a:t>
             </a:fld>
             <a:endParaRPr lang="en-US"/>
           </a:p>
@@ -2385,7 +2385,7 @@
           <a:p>
             <a:fld id="{4A5F161B-FF7E-4ABE-89D0-93661BD281ED}" type="datetimeFigureOut">
               <a:rPr lang="en-US" smtClean="0"/>
-              <a:t>12/7/2016</a:t>
+              <a:t>12/10/2016</a:t>
             </a:fld>
             <a:endParaRPr lang="en-US"/>
           </a:p>
@@ -2553,7 +2553,7 @@
           <a:p>
             <a:fld id="{4A5F161B-FF7E-4ABE-89D0-93661BD281ED}" type="datetimeFigureOut">
               <a:rPr lang="en-US" smtClean="0"/>
-              <a:t>12/7/2016</a:t>
+              <a:t>12/10/2016</a:t>
             </a:fld>
             <a:endParaRPr lang="en-US"/>
           </a:p>
@@ -2798,7 +2798,7 @@
           <a:p>
             <a:fld id="{4A5F161B-FF7E-4ABE-89D0-93661BD281ED}" type="datetimeFigureOut">
               <a:rPr lang="en-US" smtClean="0"/>
-              <a:t>12/7/2016</a:t>
+              <a:t>12/10/2016</a:t>
             </a:fld>
             <a:endParaRPr lang="en-US"/>
           </a:p>
@@ -3027,7 +3027,7 @@
           <a:p>
             <a:fld id="{4A5F161B-FF7E-4ABE-89D0-93661BD281ED}" type="datetimeFigureOut">
               <a:rPr lang="en-US" smtClean="0"/>
-              <a:t>12/7/2016</a:t>
+              <a:t>12/10/2016</a:t>
             </a:fld>
             <a:endParaRPr lang="en-US"/>
           </a:p>
@@ -3391,7 +3391,7 @@
           <a:p>
             <a:fld id="{4A5F161B-FF7E-4ABE-89D0-93661BD281ED}" type="datetimeFigureOut">
               <a:rPr lang="en-US" smtClean="0"/>
-              <a:t>12/7/2016</a:t>
+              <a:t>12/10/2016</a:t>
             </a:fld>
             <a:endParaRPr lang="en-US"/>
           </a:p>
@@ -3508,7 +3508,7 @@
           <a:p>
             <a:fld id="{4A5F161B-FF7E-4ABE-89D0-93661BD281ED}" type="datetimeFigureOut">
               <a:rPr lang="en-US" smtClean="0"/>
-              <a:t>12/7/2016</a:t>
+              <a:t>12/10/2016</a:t>
             </a:fld>
             <a:endParaRPr lang="en-US"/>
           </a:p>
@@ -3603,7 +3603,7 @@
           <a:p>
             <a:fld id="{4A5F161B-FF7E-4ABE-89D0-93661BD281ED}" type="datetimeFigureOut">
               <a:rPr lang="en-US" smtClean="0"/>
-              <a:t>12/7/2016</a:t>
+              <a:t>12/10/2016</a:t>
             </a:fld>
             <a:endParaRPr lang="en-US"/>
           </a:p>
@@ -3878,7 +3878,7 @@
           <a:p>
             <a:fld id="{4A5F161B-FF7E-4ABE-89D0-93661BD281ED}" type="datetimeFigureOut">
               <a:rPr lang="en-US" smtClean="0"/>
-              <a:t>12/7/2016</a:t>
+              <a:t>12/10/2016</a:t>
             </a:fld>
             <a:endParaRPr lang="en-US"/>
           </a:p>
@@ -4130,7 +4130,7 @@
           <a:p>
             <a:fld id="{4A5F161B-FF7E-4ABE-89D0-93661BD281ED}" type="datetimeFigureOut">
               <a:rPr lang="en-US" smtClean="0"/>
-              <a:t>12/7/2016</a:t>
+              <a:t>12/10/2016</a:t>
             </a:fld>
             <a:endParaRPr lang="en-US"/>
           </a:p>
@@ -4341,7 +4341,7 @@
           <a:p>
             <a:fld id="{4A5F161B-FF7E-4ABE-89D0-93661BD281ED}" type="datetimeFigureOut">
               <a:rPr lang="en-US" smtClean="0"/>
-              <a:t>12/7/2016</a:t>
+              <a:t>12/10/2016</a:t>
             </a:fld>
             <a:endParaRPr lang="en-US"/>
           </a:p>
@@ -6829,11 +6829,6 @@
                   </a:rPr>
                   <a:t>Tập từ vựng T</a:t>
                 </a:r>
-                <a:endParaRPr lang="en-US" sz="2300">
-                  <a:solidFill>
-                    <a:schemeClr val="tx1"/>
-                  </a:solidFill>
-                </a:endParaRPr>
               </a:p>
             </p:txBody>
           </p:sp>
@@ -7054,7 +7049,6 @@
                 <a:rPr lang="en-US" sz="2300"/>
                 <a:t>(1)</a:t>
               </a:r>
-              <a:endParaRPr lang="en-US" sz="2300"/>
             </a:p>
           </p:txBody>
         </p:sp>
@@ -7084,7 +7078,6 @@
                 <a:rPr lang="en-US" sz="2300"/>
                 <a:t>(2)</a:t>
               </a:r>
-              <a:endParaRPr lang="en-US" sz="2300"/>
             </a:p>
           </p:txBody>
         </p:sp>
@@ -7169,11 +7162,6 @@
               </a:rPr>
               <a:t>Câu s</a:t>
             </a:r>
-            <a:endParaRPr lang="en-US">
-              <a:solidFill>
-                <a:schemeClr val="tx1"/>
-              </a:solidFill>
-            </a:endParaRPr>
           </a:p>
         </p:txBody>
       </p:sp>
@@ -7243,8 +7231,8 @@
           </a:p>
         </p:txBody>
       </p:sp>
-      <mc:AlternateContent xmlns:mc="http://schemas.openxmlformats.org/markup-compatibility/2006">
-        <mc:Choice xmlns:a14="http://schemas.microsoft.com/office/drawing/2010/main" Requires="a14">
+      <mc:AlternateContent xmlns:mc="http://schemas.openxmlformats.org/markup-compatibility/2006" xmlns:a14="http://schemas.microsoft.com/office/drawing/2010/main">
+        <mc:Choice Requires="a14">
           <p:sp>
             <p:nvSpPr>
               <p:cNvPr id="6" name="Diamond 5"/>
@@ -7359,7 +7347,7 @@
             </p:txBody>
           </p:sp>
         </mc:Choice>
-        <mc:Fallback>
+        <mc:Fallback xmlns="">
           <p:sp>
             <p:nvSpPr>
               <p:cNvPr id="6" name="Diamond 5"/>
@@ -7453,11 +7441,6 @@
               </a:rPr>
               <a:t>Thêm tag _MORE</a:t>
             </a:r>
-            <a:endParaRPr lang="en-US">
-              <a:solidFill>
-                <a:schemeClr val="tx1"/>
-              </a:solidFill>
-            </a:endParaRPr>
           </a:p>
         </p:txBody>
       </p:sp>
@@ -7543,11 +7526,6 @@
               </a:rPr>
               <a:t> đến hết câu</a:t>
             </a:r>
-            <a:endParaRPr lang="en-US">
-              <a:solidFill>
-                <a:schemeClr val="tx1"/>
-              </a:solidFill>
-            </a:endParaRPr>
           </a:p>
         </p:txBody>
       </p:sp>
@@ -7616,16 +7594,11 @@
               </a:rPr>
               <a:t>MORE-GOOD</a:t>
             </a:r>
-            <a:endParaRPr lang="en-US">
-              <a:solidFill>
-                <a:schemeClr val="tx1"/>
-              </a:solidFill>
-            </a:endParaRPr>
           </a:p>
         </p:txBody>
       </p:sp>
-      <mc:AlternateContent xmlns:mc="http://schemas.openxmlformats.org/markup-compatibility/2006">
-        <mc:Choice xmlns:a14="http://schemas.microsoft.com/office/drawing/2010/main" Requires="a14">
+      <mc:AlternateContent xmlns:mc="http://schemas.openxmlformats.org/markup-compatibility/2006" xmlns:a14="http://schemas.microsoft.com/office/drawing/2010/main">
+        <mc:Choice Requires="a14">
           <p:sp>
             <p:nvSpPr>
               <p:cNvPr id="10" name="Diamond 9"/>
@@ -7740,7 +7713,7 @@
             </p:txBody>
           </p:sp>
         </mc:Choice>
-        <mc:Fallback>
+        <mc:Fallback xmlns="">
           <p:sp>
             <p:nvSpPr>
               <p:cNvPr id="10" name="Diamond 9"/>
@@ -7849,16 +7822,11 @@
               </a:rPr>
               <a:t>MORE-BAD</a:t>
             </a:r>
-            <a:endParaRPr lang="en-US">
-              <a:solidFill>
-                <a:schemeClr val="tx1"/>
-              </a:solidFill>
-            </a:endParaRPr>
           </a:p>
         </p:txBody>
       </p:sp>
-      <mc:AlternateContent xmlns:mc="http://schemas.openxmlformats.org/markup-compatibility/2006">
-        <mc:Choice xmlns:a14="http://schemas.microsoft.com/office/drawing/2010/main" Requires="a14">
+      <mc:AlternateContent xmlns:mc="http://schemas.openxmlformats.org/markup-compatibility/2006" xmlns:a14="http://schemas.microsoft.com/office/drawing/2010/main">
+        <mc:Choice Requires="a14">
           <p:sp>
             <p:nvSpPr>
               <p:cNvPr id="12" name="Diamond 11"/>
@@ -7973,7 +7941,7 @@
             </p:txBody>
           </p:sp>
         </mc:Choice>
-        <mc:Fallback>
+        <mc:Fallback xmlns="">
           <p:sp>
             <p:nvSpPr>
               <p:cNvPr id="12" name="Diamond 11"/>
@@ -8067,11 +8035,6 @@
               </a:rPr>
               <a:t>Thêm tag _MORE</a:t>
             </a:r>
-            <a:endParaRPr lang="en-US">
-              <a:solidFill>
-                <a:schemeClr val="tx1"/>
-              </a:solidFill>
-            </a:endParaRPr>
           </a:p>
         </p:txBody>
       </p:sp>
@@ -8157,11 +8120,6 @@
               </a:rPr>
               <a:t> đến hết câu</a:t>
             </a:r>
-            <a:endParaRPr lang="en-US">
-              <a:solidFill>
-                <a:schemeClr val="tx1"/>
-              </a:solidFill>
-            </a:endParaRPr>
           </a:p>
         </p:txBody>
       </p:sp>
@@ -8230,16 +8188,11 @@
               </a:rPr>
               <a:t>MORE-GOOD</a:t>
             </a:r>
-            <a:endParaRPr lang="en-US">
-              <a:solidFill>
-                <a:schemeClr val="tx1"/>
-              </a:solidFill>
-            </a:endParaRPr>
           </a:p>
         </p:txBody>
       </p:sp>
-      <mc:AlternateContent xmlns:mc="http://schemas.openxmlformats.org/markup-compatibility/2006">
-        <mc:Choice xmlns:a14="http://schemas.microsoft.com/office/drawing/2010/main" Requires="a14">
+      <mc:AlternateContent xmlns:mc="http://schemas.openxmlformats.org/markup-compatibility/2006" xmlns:a14="http://schemas.microsoft.com/office/drawing/2010/main">
+        <mc:Choice Requires="a14">
           <p:sp>
             <p:nvSpPr>
               <p:cNvPr id="16" name="Diamond 15"/>
@@ -8354,7 +8307,7 @@
             </p:txBody>
           </p:sp>
         </mc:Choice>
-        <mc:Fallback>
+        <mc:Fallback xmlns="">
           <p:sp>
             <p:nvSpPr>
               <p:cNvPr id="16" name="Diamond 15"/>
@@ -8398,8 +8351,8 @@
           </p:sp>
         </mc:Fallback>
       </mc:AlternateContent>
-      <mc:AlternateContent xmlns:mc="http://schemas.openxmlformats.org/markup-compatibility/2006">
-        <mc:Choice xmlns:a14="http://schemas.microsoft.com/office/drawing/2010/main" Requires="a14">
+      <mc:AlternateContent xmlns:mc="http://schemas.openxmlformats.org/markup-compatibility/2006" xmlns:a14="http://schemas.microsoft.com/office/drawing/2010/main">
+        <mc:Choice Requires="a14">
           <p:sp>
             <p:nvSpPr>
               <p:cNvPr id="19" name="Diamond 18"/>
@@ -8514,7 +8467,7 @@
             </p:txBody>
           </p:sp>
         </mc:Choice>
-        <mc:Fallback>
+        <mc:Fallback xmlns="">
           <p:sp>
             <p:nvSpPr>
               <p:cNvPr id="19" name="Diamond 18"/>
@@ -8845,7 +8798,6 @@
               <a:rPr lang="en-US"/>
               <a:t>Đúng</a:t>
             </a:r>
-            <a:endParaRPr lang="en-US"/>
           </a:p>
         </p:txBody>
       </p:sp>
@@ -8875,7 +8827,6 @@
               <a:rPr lang="en-US"/>
               <a:t>Sai</a:t>
             </a:r>
-            <a:endParaRPr lang="en-US"/>
           </a:p>
         </p:txBody>
       </p:sp>
@@ -8905,7 +8856,6 @@
               <a:rPr lang="en-US"/>
               <a:t>Đúng</a:t>
             </a:r>
-            <a:endParaRPr lang="en-US"/>
           </a:p>
         </p:txBody>
       </p:sp>
@@ -8935,7 +8885,6 @@
               <a:rPr lang="en-US"/>
               <a:t>Sai</a:t>
             </a:r>
-            <a:endParaRPr lang="en-US"/>
           </a:p>
         </p:txBody>
       </p:sp>
@@ -9121,7 +9070,6 @@
               <a:rPr lang="en-US"/>
               <a:t>Sai</a:t>
             </a:r>
-            <a:endParaRPr lang="en-US"/>
           </a:p>
         </p:txBody>
       </p:sp>
@@ -9151,7 +9099,6 @@
               <a:rPr lang="en-US"/>
               <a:t>Đúng</a:t>
             </a:r>
-            <a:endParaRPr lang="en-US"/>
           </a:p>
         </p:txBody>
       </p:sp>
@@ -9273,16 +9220,11 @@
                 </a:rPr>
                 <a:t>MORE-BAD</a:t>
               </a:r>
-              <a:endParaRPr lang="en-US">
-                <a:solidFill>
-                  <a:schemeClr val="tx1"/>
-                </a:solidFill>
-              </a:endParaRPr>
             </a:p>
           </p:txBody>
         </p:sp>
-        <mc:AlternateContent xmlns:mc="http://schemas.openxmlformats.org/markup-compatibility/2006">
-          <mc:Choice xmlns:a14="http://schemas.microsoft.com/office/drawing/2010/main" Requires="a14">
+        <mc:AlternateContent xmlns:mc="http://schemas.openxmlformats.org/markup-compatibility/2006" xmlns:a14="http://schemas.microsoft.com/office/drawing/2010/main">
+          <mc:Choice Requires="a14">
             <p:sp>
               <p:nvSpPr>
                 <p:cNvPr id="18" name="Diamond 17"/>
@@ -9397,7 +9339,7 @@
               </p:txBody>
             </p:sp>
           </mc:Choice>
-          <mc:Fallback>
+          <mc:Fallback xmlns="">
             <p:sp>
               <p:nvSpPr>
                 <p:cNvPr id="18" name="Diamond 17"/>
@@ -9506,7 +9448,6 @@
                 <a:rPr lang="en-US"/>
                 <a:t>Đúng</a:t>
               </a:r>
-              <a:endParaRPr lang="en-US"/>
             </a:p>
           </p:txBody>
         </p:sp>
@@ -9818,6 +9759,3733 @@
           <a:chExt cx="0" cy="0"/>
         </a:xfrm>
       </p:grpSpPr>
+      <p:grpSp>
+        <p:nvGrpSpPr>
+          <p:cNvPr id="85" name="Group 84"/>
+          <p:cNvGrpSpPr/>
+          <p:nvPr/>
+        </p:nvGrpSpPr>
+        <p:grpSpPr>
+          <a:xfrm>
+            <a:off x="-4775337" y="377686"/>
+            <a:ext cx="17974501" cy="6949932"/>
+            <a:chOff x="-4775337" y="377686"/>
+            <a:chExt cx="17974501" cy="6949932"/>
+          </a:xfrm>
+        </p:grpSpPr>
+        <p:grpSp>
+          <p:nvGrpSpPr>
+            <p:cNvPr id="80" name="Group 79"/>
+            <p:cNvGrpSpPr/>
+            <p:nvPr/>
+          </p:nvGrpSpPr>
+          <p:grpSpPr>
+            <a:xfrm>
+              <a:off x="-4775337" y="377686"/>
+              <a:ext cx="15528817" cy="6949932"/>
+              <a:chOff x="-2908437" y="244336"/>
+              <a:chExt cx="15528817" cy="6949932"/>
+            </a:xfrm>
+          </p:grpSpPr>
+          <p:sp>
+            <p:nvSpPr>
+              <p:cNvPr id="3" name="Rectangle: Single Corner Snipped 2"/>
+              <p:cNvSpPr/>
+              <p:nvPr/>
+            </p:nvSpPr>
+            <p:spPr>
+              <a:xfrm>
+                <a:off x="571501" y="2795378"/>
+                <a:ext cx="1722783" cy="622852"/>
+              </a:xfrm>
+              <a:prstGeom prst="snip1Rect">
+                <a:avLst/>
+              </a:prstGeom>
+              <a:ln>
+                <a:solidFill>
+                  <a:schemeClr val="tx1"/>
+                </a:solidFill>
+              </a:ln>
+            </p:spPr>
+            <p:style>
+              <a:lnRef idx="2">
+                <a:schemeClr val="dk1"/>
+              </a:lnRef>
+              <a:fillRef idx="1">
+                <a:schemeClr val="lt1"/>
+              </a:fillRef>
+              <a:effectRef idx="0">
+                <a:schemeClr val="dk1"/>
+              </a:effectRef>
+              <a:fontRef idx="minor">
+                <a:schemeClr val="dk1"/>
+              </a:fontRef>
+            </p:style>
+            <p:txBody>
+              <a:bodyPr rtlCol="0" anchor="ctr"/>
+              <a:lstStyle/>
+              <a:p>
+                <a:pPr algn="ctr"/>
+                <a:r>
+                  <a:rPr lang="en-US">
+                    <a:solidFill>
+                      <a:schemeClr val="tx1"/>
+                    </a:solidFill>
+                  </a:rPr>
+                  <a:t>N-gram</a:t>
+                </a:r>
+                <a:endParaRPr lang="en-US">
+                  <a:solidFill>
+                    <a:schemeClr val="tx1"/>
+                  </a:solidFill>
+                </a:endParaRPr>
+              </a:p>
+            </p:txBody>
+          </p:sp>
+          <p:sp>
+            <p:nvSpPr>
+              <p:cNvPr id="4" name="Rectangle: Single Corner Snipped 3"/>
+              <p:cNvSpPr/>
+              <p:nvPr/>
+            </p:nvSpPr>
+            <p:spPr>
+              <a:xfrm>
+                <a:off x="571500" y="4435335"/>
+                <a:ext cx="1722783" cy="622852"/>
+              </a:xfrm>
+              <a:prstGeom prst="snip1Rect">
+                <a:avLst/>
+              </a:prstGeom>
+              <a:ln>
+                <a:solidFill>
+                  <a:schemeClr val="tx1"/>
+                </a:solidFill>
+              </a:ln>
+            </p:spPr>
+            <p:style>
+              <a:lnRef idx="2">
+                <a:schemeClr val="dk1"/>
+              </a:lnRef>
+              <a:fillRef idx="1">
+                <a:schemeClr val="lt1"/>
+              </a:fillRef>
+              <a:effectRef idx="0">
+                <a:schemeClr val="dk1"/>
+              </a:effectRef>
+              <a:fontRef idx="minor">
+                <a:schemeClr val="dk1"/>
+              </a:fontRef>
+            </p:style>
+            <p:txBody>
+              <a:bodyPr rtlCol="0" anchor="ctr"/>
+              <a:lstStyle/>
+              <a:p>
+                <a:pPr algn="ctr"/>
+                <a:r>
+                  <a:rPr lang="en-US">
+                    <a:solidFill>
+                      <a:schemeClr val="tx1"/>
+                    </a:solidFill>
+                  </a:rPr>
+                  <a:t>Change phrase</a:t>
+                </a:r>
+                <a:endParaRPr lang="en-US">
+                  <a:solidFill>
+                    <a:schemeClr val="tx1"/>
+                  </a:solidFill>
+                </a:endParaRPr>
+              </a:p>
+            </p:txBody>
+          </p:sp>
+          <p:sp>
+            <p:nvSpPr>
+              <p:cNvPr id="5" name="Rectangle: Single Corner Snipped 4"/>
+              <p:cNvSpPr/>
+              <p:nvPr/>
+            </p:nvSpPr>
+            <p:spPr>
+              <a:xfrm>
+                <a:off x="571502" y="244336"/>
+                <a:ext cx="1722783" cy="622852"/>
+              </a:xfrm>
+              <a:prstGeom prst="snip1Rect">
+                <a:avLst/>
+              </a:prstGeom>
+              <a:ln>
+                <a:solidFill>
+                  <a:schemeClr val="tx1"/>
+                </a:solidFill>
+              </a:ln>
+            </p:spPr>
+            <p:style>
+              <a:lnRef idx="2">
+                <a:schemeClr val="dk1"/>
+              </a:lnRef>
+              <a:fillRef idx="1">
+                <a:schemeClr val="lt1"/>
+              </a:fillRef>
+              <a:effectRef idx="0">
+                <a:schemeClr val="dk1"/>
+              </a:effectRef>
+              <a:fontRef idx="minor">
+                <a:schemeClr val="dk1"/>
+              </a:fontRef>
+            </p:style>
+            <p:txBody>
+              <a:bodyPr rtlCol="0" anchor="ctr"/>
+              <a:lstStyle/>
+              <a:p>
+                <a:pPr algn="ctr"/>
+                <a:r>
+                  <a:rPr lang="en-US">
+                    <a:solidFill>
+                      <a:schemeClr val="tx1"/>
+                    </a:solidFill>
+                  </a:rPr>
+                  <a:t>Đặc trưng phủ định</a:t>
+                </a:r>
+                <a:endParaRPr lang="en-US">
+                  <a:solidFill>
+                    <a:schemeClr val="tx1"/>
+                  </a:solidFill>
+                </a:endParaRPr>
+              </a:p>
+            </p:txBody>
+          </p:sp>
+          <p:sp>
+            <p:nvSpPr>
+              <p:cNvPr id="6" name="Rectangle 5"/>
+              <p:cNvSpPr/>
+              <p:nvPr/>
+            </p:nvSpPr>
+            <p:spPr>
+              <a:xfrm>
+                <a:off x="-2908437" y="4435333"/>
+                <a:ext cx="1722783" cy="622852"/>
+              </a:xfrm>
+              <a:prstGeom prst="rect">
+                <a:avLst/>
+              </a:prstGeom>
+              <a:noFill/>
+              <a:ln>
+                <a:solidFill>
+                  <a:schemeClr val="tx1"/>
+                </a:solidFill>
+              </a:ln>
+            </p:spPr>
+            <p:style>
+              <a:lnRef idx="2">
+                <a:schemeClr val="accent1">
+                  <a:shade val="50000"/>
+                </a:schemeClr>
+              </a:lnRef>
+              <a:fillRef idx="1">
+                <a:schemeClr val="accent1"/>
+              </a:fillRef>
+              <a:effectRef idx="0">
+                <a:schemeClr val="accent1"/>
+              </a:effectRef>
+              <a:fontRef idx="minor">
+                <a:schemeClr val="lt1"/>
+              </a:fontRef>
+            </p:style>
+            <p:txBody>
+              <a:bodyPr rtlCol="0" anchor="ctr"/>
+              <a:lstStyle/>
+              <a:p>
+                <a:pPr algn="ctr"/>
+                <a:r>
+                  <a:rPr lang="en-US">
+                    <a:solidFill>
+                      <a:schemeClr val="tx1"/>
+                    </a:solidFill>
+                  </a:rPr>
+                  <a:t>Tập dữ liệu training</a:t>
+                </a:r>
+                <a:endParaRPr lang="en-US">
+                  <a:solidFill>
+                    <a:schemeClr val="tx1"/>
+                  </a:solidFill>
+                </a:endParaRPr>
+              </a:p>
+            </p:txBody>
+          </p:sp>
+          <p:sp>
+            <p:nvSpPr>
+              <p:cNvPr id="9" name="Rectangle 8"/>
+              <p:cNvSpPr/>
+              <p:nvPr/>
+            </p:nvSpPr>
+            <p:spPr>
+              <a:xfrm>
+                <a:off x="571501" y="1347578"/>
+                <a:ext cx="1722783" cy="881272"/>
+              </a:xfrm>
+              <a:prstGeom prst="rect">
+                <a:avLst/>
+              </a:prstGeom>
+              <a:noFill/>
+              <a:ln>
+                <a:solidFill>
+                  <a:schemeClr val="tx1"/>
+                </a:solidFill>
+              </a:ln>
+            </p:spPr>
+            <p:style>
+              <a:lnRef idx="2">
+                <a:schemeClr val="accent1">
+                  <a:shade val="50000"/>
+                </a:schemeClr>
+              </a:lnRef>
+              <a:fillRef idx="1">
+                <a:schemeClr val="accent1"/>
+              </a:fillRef>
+              <a:effectRef idx="0">
+                <a:schemeClr val="accent1"/>
+              </a:effectRef>
+              <a:fontRef idx="minor">
+                <a:schemeClr val="lt1"/>
+              </a:fontRef>
+            </p:style>
+            <p:txBody>
+              <a:bodyPr rtlCol="0" anchor="ctr"/>
+              <a:lstStyle/>
+              <a:p>
+                <a:pPr algn="ctr"/>
+                <a:r>
+                  <a:rPr lang="en-US">
+                    <a:solidFill>
+                      <a:schemeClr val="tx1"/>
+                    </a:solidFill>
+                  </a:rPr>
+                  <a:t>Thay các từ phủ định bằng nhãn NEGATION</a:t>
+                </a:r>
+                <a:endParaRPr lang="en-US">
+                  <a:solidFill>
+                    <a:schemeClr val="tx1"/>
+                  </a:solidFill>
+                </a:endParaRPr>
+              </a:p>
+            </p:txBody>
+          </p:sp>
+          <p:cxnSp>
+            <p:nvCxnSpPr>
+              <p:cNvPr id="10" name="Straight Arrow Connector 9"/>
+              <p:cNvCxnSpPr>
+                <a:endCxn id="9" idx="0"/>
+              </p:cNvCxnSpPr>
+              <p:nvPr/>
+            </p:nvCxnSpPr>
+            <p:spPr>
+              <a:xfrm flipH="1">
+                <a:off x="1432893" y="867188"/>
+                <a:ext cx="1" cy="480390"/>
+              </a:xfrm>
+              <a:prstGeom prst="straightConnector1">
+                <a:avLst/>
+              </a:prstGeom>
+              <a:ln w="19050">
+                <a:solidFill>
+                  <a:schemeClr val="tx1"/>
+                </a:solidFill>
+                <a:tailEnd type="triangle"/>
+              </a:ln>
+            </p:spPr>
+            <p:style>
+              <a:lnRef idx="1">
+                <a:schemeClr val="accent1"/>
+              </a:lnRef>
+              <a:fillRef idx="0">
+                <a:schemeClr val="accent1"/>
+              </a:fillRef>
+              <a:effectRef idx="0">
+                <a:schemeClr val="accent1"/>
+              </a:effectRef>
+              <a:fontRef idx="minor">
+                <a:schemeClr val="tx1"/>
+              </a:fontRef>
+            </p:style>
+          </p:cxnSp>
+          <p:cxnSp>
+            <p:nvCxnSpPr>
+              <p:cNvPr id="20" name="Straight Arrow Connector 19"/>
+              <p:cNvCxnSpPr>
+                <a:stCxn id="9" idx="2"/>
+              </p:cNvCxnSpPr>
+              <p:nvPr/>
+            </p:nvCxnSpPr>
+            <p:spPr>
+              <a:xfrm>
+                <a:off x="1432893" y="2228850"/>
+                <a:ext cx="0" cy="566528"/>
+              </a:xfrm>
+              <a:prstGeom prst="straightConnector1">
+                <a:avLst/>
+              </a:prstGeom>
+              <a:ln w="19050">
+                <a:solidFill>
+                  <a:schemeClr val="tx1"/>
+                </a:solidFill>
+                <a:tailEnd type="triangle"/>
+              </a:ln>
+            </p:spPr>
+            <p:style>
+              <a:lnRef idx="1">
+                <a:schemeClr val="accent1"/>
+              </a:lnRef>
+              <a:fillRef idx="0">
+                <a:schemeClr val="accent1"/>
+              </a:fillRef>
+              <a:effectRef idx="0">
+                <a:schemeClr val="accent1"/>
+              </a:effectRef>
+              <a:fontRef idx="minor">
+                <a:schemeClr val="tx1"/>
+              </a:fontRef>
+            </p:style>
+          </p:cxnSp>
+          <p:cxnSp>
+            <p:nvCxnSpPr>
+              <p:cNvPr id="23" name="Straight Arrow Connector 22"/>
+              <p:cNvCxnSpPr/>
+              <p:nvPr/>
+            </p:nvCxnSpPr>
+            <p:spPr>
+              <a:xfrm>
+                <a:off x="2294284" y="3106804"/>
+                <a:ext cx="1577010" cy="0"/>
+              </a:xfrm>
+              <a:prstGeom prst="straightConnector1">
+                <a:avLst/>
+              </a:prstGeom>
+              <a:ln w="19050">
+                <a:solidFill>
+                  <a:schemeClr val="tx1"/>
+                </a:solidFill>
+                <a:tailEnd type="triangle"/>
+              </a:ln>
+            </p:spPr>
+            <p:style>
+              <a:lnRef idx="1">
+                <a:schemeClr val="accent1"/>
+              </a:lnRef>
+              <a:fillRef idx="0">
+                <a:schemeClr val="accent1"/>
+              </a:fillRef>
+              <a:effectRef idx="0">
+                <a:schemeClr val="accent1"/>
+              </a:effectRef>
+              <a:fontRef idx="minor">
+                <a:schemeClr val="tx1"/>
+              </a:fontRef>
+            </p:style>
+          </p:cxnSp>
+          <mc:AlternateContent xmlns:mc="http://schemas.openxmlformats.org/markup-compatibility/2006">
+            <mc:Choice xmlns:a14="http://schemas.microsoft.com/office/drawing/2010/main" Requires="a14">
+              <p:sp>
+                <p:nvSpPr>
+                  <p:cNvPr id="26" name="Rectangle 25"/>
+                  <p:cNvSpPr/>
+                  <p:nvPr/>
+                </p:nvSpPr>
+                <p:spPr>
+                  <a:xfrm>
+                    <a:off x="3871294" y="2417691"/>
+                    <a:ext cx="2411896" cy="1378225"/>
+                  </a:xfrm>
+                  <a:prstGeom prst="rect">
+                    <a:avLst/>
+                  </a:prstGeom>
+                  <a:noFill/>
+                  <a:ln>
+                    <a:solidFill>
+                      <a:schemeClr val="tx1"/>
+                    </a:solidFill>
+                  </a:ln>
+                </p:spPr>
+                <p:style>
+                  <a:lnRef idx="2">
+                    <a:schemeClr val="accent1">
+                      <a:shade val="50000"/>
+                    </a:schemeClr>
+                  </a:lnRef>
+                  <a:fillRef idx="1">
+                    <a:schemeClr val="accent1"/>
+                  </a:fillRef>
+                  <a:effectRef idx="0">
+                    <a:schemeClr val="accent1"/>
+                  </a:effectRef>
+                  <a:fontRef idx="minor">
+                    <a:schemeClr val="lt1"/>
+                  </a:fontRef>
+                </p:style>
+                <p:txBody>
+                  <a:bodyPr rtlCol="0" anchor="ctr"/>
+                  <a:lstStyle/>
+                  <a:p>
+                    <a14:m>
+                      <m:oMathPara xmlns:m="http://schemas.openxmlformats.org/officeDocument/2006/math">
+                        <m:oMathParaPr>
+                          <m:jc m:val="centerGroup"/>
+                        </m:oMathParaPr>
+                        <m:oMath xmlns:m="http://schemas.openxmlformats.org/officeDocument/2006/math">
+                          <m:d>
+                            <m:dPr>
+                              <m:begChr m:val="["/>
+                              <m:endChr m:val="]"/>
+                              <m:ctrlPr>
+                                <a:rPr lang="en-US" i="1" smtClean="0">
+                                  <a:solidFill>
+                                    <a:schemeClr val="tx1"/>
+                                  </a:solidFill>
+                                  <a:latin typeface="Cambria Math" panose="02040503050406030204" pitchFamily="18" charset="0"/>
+                                </a:rPr>
+                              </m:ctrlPr>
+                            </m:dPr>
+                            <m:e>
+                              <m:eqArr>
+                                <m:eqArrPr>
+                                  <m:ctrlPr>
+                                    <a:rPr lang="en-US" i="1" smtClean="0">
+                                      <a:solidFill>
+                                        <a:schemeClr val="tx1"/>
+                                      </a:solidFill>
+                                      <a:latin typeface="Cambria Math" panose="02040503050406030204" pitchFamily="18" charset="0"/>
+                                    </a:rPr>
+                                  </m:ctrlPr>
+                                </m:eqArrPr>
+                                <m:e>
+                                  <m:sSub>
+                                    <m:sSubPr>
+                                      <m:ctrlPr>
+                                        <a:rPr lang="en-US" i="1" smtClean="0">
+                                          <a:solidFill>
+                                            <a:schemeClr val="tx1"/>
+                                          </a:solidFill>
+                                          <a:latin typeface="Cambria Math" panose="02040503050406030204" pitchFamily="18" charset="0"/>
+                                        </a:rPr>
+                                      </m:ctrlPr>
+                                    </m:sSubPr>
+                                    <m:e>
+                                      <m:r>
+                                        <a:rPr lang="en-US" b="0" i="1" smtClean="0">
+                                          <a:solidFill>
+                                            <a:schemeClr val="tx1"/>
+                                          </a:solidFill>
+                                          <a:latin typeface="Cambria Math" panose="02040503050406030204" pitchFamily="18" charset="0"/>
+                                        </a:rPr>
+                                        <m:t>𝑎</m:t>
+                                      </m:r>
+                                    </m:e>
+                                    <m:sub>
+                                      <m:r>
+                                        <a:rPr lang="en-US" b="0" i="1" smtClean="0">
+                                          <a:solidFill>
+                                            <a:schemeClr val="tx1"/>
+                                          </a:solidFill>
+                                          <a:latin typeface="Cambria Math" panose="02040503050406030204" pitchFamily="18" charset="0"/>
+                                        </a:rPr>
+                                        <m:t>11</m:t>
+                                      </m:r>
+                                    </m:sub>
+                                  </m:sSub>
+                                  <m:sSub>
+                                    <m:sSubPr>
+                                      <m:ctrlPr>
+                                        <a:rPr lang="en-US" i="1">
+                                          <a:solidFill>
+                                            <a:schemeClr val="tx1"/>
+                                          </a:solidFill>
+                                          <a:latin typeface="Cambria Math" panose="02040503050406030204" pitchFamily="18" charset="0"/>
+                                        </a:rPr>
+                                      </m:ctrlPr>
+                                    </m:sSubPr>
+                                    <m:e>
+                                      <m:r>
+                                        <a:rPr lang="en-US" i="1">
+                                          <a:solidFill>
+                                            <a:schemeClr val="tx1"/>
+                                          </a:solidFill>
+                                          <a:latin typeface="Cambria Math" panose="02040503050406030204" pitchFamily="18" charset="0"/>
+                                        </a:rPr>
+                                        <m:t>𝑎</m:t>
+                                      </m:r>
+                                    </m:e>
+                                    <m:sub>
+                                      <m:r>
+                                        <a:rPr lang="en-US" b="0" i="1" smtClean="0">
+                                          <a:solidFill>
+                                            <a:schemeClr val="tx1"/>
+                                          </a:solidFill>
+                                          <a:latin typeface="Cambria Math" panose="02040503050406030204" pitchFamily="18" charset="0"/>
+                                        </a:rPr>
+                                        <m:t>12</m:t>
+                                      </m:r>
+                                    </m:sub>
+                                  </m:sSub>
+                                  <m:sSub>
+                                    <m:sSubPr>
+                                      <m:ctrlPr>
+                                        <a:rPr lang="en-US" i="1">
+                                          <a:solidFill>
+                                            <a:schemeClr val="tx1"/>
+                                          </a:solidFill>
+                                          <a:latin typeface="Cambria Math" panose="02040503050406030204" pitchFamily="18" charset="0"/>
+                                        </a:rPr>
+                                      </m:ctrlPr>
+                                    </m:sSubPr>
+                                    <m:e>
+                                      <m:r>
+                                        <a:rPr lang="en-US" i="1">
+                                          <a:solidFill>
+                                            <a:schemeClr val="tx1"/>
+                                          </a:solidFill>
+                                          <a:latin typeface="Cambria Math" panose="02040503050406030204" pitchFamily="18" charset="0"/>
+                                        </a:rPr>
+                                        <m:t>𝑎</m:t>
+                                      </m:r>
+                                    </m:e>
+                                    <m:sub>
+                                      <m:r>
+                                        <a:rPr lang="en-US" b="0" i="1" smtClean="0">
+                                          <a:solidFill>
+                                            <a:schemeClr val="tx1"/>
+                                          </a:solidFill>
+                                          <a:latin typeface="Cambria Math" panose="02040503050406030204" pitchFamily="18" charset="0"/>
+                                        </a:rPr>
+                                        <m:t>13</m:t>
+                                      </m:r>
+                                    </m:sub>
+                                  </m:sSub>
+                                  <m:sSub>
+                                    <m:sSubPr>
+                                      <m:ctrlPr>
+                                        <a:rPr lang="en-US" i="1">
+                                          <a:solidFill>
+                                            <a:schemeClr val="tx1"/>
+                                          </a:solidFill>
+                                          <a:latin typeface="Cambria Math" panose="02040503050406030204" pitchFamily="18" charset="0"/>
+                                        </a:rPr>
+                                      </m:ctrlPr>
+                                    </m:sSubPr>
+                                    <m:e>
+                                      <m:r>
+                                        <a:rPr lang="en-US" b="0" i="1" smtClean="0">
+                                          <a:solidFill>
+                                            <a:schemeClr val="tx1"/>
+                                          </a:solidFill>
+                                          <a:latin typeface="Cambria Math" panose="02040503050406030204" pitchFamily="18" charset="0"/>
+                                        </a:rPr>
+                                        <m:t>…</m:t>
+                                      </m:r>
+                                      <m:r>
+                                        <a:rPr lang="en-US" i="1">
+                                          <a:solidFill>
+                                            <a:schemeClr val="tx1"/>
+                                          </a:solidFill>
+                                          <a:latin typeface="Cambria Math" panose="02040503050406030204" pitchFamily="18" charset="0"/>
+                                        </a:rPr>
+                                        <m:t>𝑎</m:t>
+                                      </m:r>
+                                    </m:e>
+                                    <m:sub>
+                                      <m:r>
+                                        <a:rPr lang="en-US" b="0" i="1" smtClean="0">
+                                          <a:solidFill>
+                                            <a:schemeClr val="tx1"/>
+                                          </a:solidFill>
+                                          <a:latin typeface="Cambria Math" panose="02040503050406030204" pitchFamily="18" charset="0"/>
+                                        </a:rPr>
+                                        <m:t>1</m:t>
+                                      </m:r>
+                                      <m:r>
+                                        <a:rPr lang="en-US" b="0" i="1" smtClean="0">
+                                          <a:solidFill>
+                                            <a:schemeClr val="tx1"/>
+                                          </a:solidFill>
+                                          <a:latin typeface="Cambria Math" panose="02040503050406030204" pitchFamily="18" charset="0"/>
+                                        </a:rPr>
+                                        <m:t>𝑛</m:t>
+                                      </m:r>
+                                    </m:sub>
+                                  </m:sSub>
+                                </m:e>
+                                <m:e>
+                                  <m:sSub>
+                                    <m:sSubPr>
+                                      <m:ctrlPr>
+                                        <a:rPr lang="en-US" i="1">
+                                          <a:solidFill>
+                                            <a:schemeClr val="tx1"/>
+                                          </a:solidFill>
+                                          <a:latin typeface="Cambria Math" panose="02040503050406030204" pitchFamily="18" charset="0"/>
+                                        </a:rPr>
+                                      </m:ctrlPr>
+                                    </m:sSubPr>
+                                    <m:e>
+                                      <m:r>
+                                        <a:rPr lang="en-US" i="1">
+                                          <a:solidFill>
+                                            <a:schemeClr val="tx1"/>
+                                          </a:solidFill>
+                                          <a:latin typeface="Cambria Math" panose="02040503050406030204" pitchFamily="18" charset="0"/>
+                                        </a:rPr>
+                                        <m:t>𝑎</m:t>
+                                      </m:r>
+                                    </m:e>
+                                    <m:sub>
+                                      <m:r>
+                                        <a:rPr lang="en-US" b="0" i="1" smtClean="0">
+                                          <a:solidFill>
+                                            <a:schemeClr val="tx1"/>
+                                          </a:solidFill>
+                                          <a:latin typeface="Cambria Math" panose="02040503050406030204" pitchFamily="18" charset="0"/>
+                                        </a:rPr>
+                                        <m:t>2</m:t>
+                                      </m:r>
+                                      <m:r>
+                                        <a:rPr lang="en-US" i="1">
+                                          <a:solidFill>
+                                            <a:schemeClr val="tx1"/>
+                                          </a:solidFill>
+                                          <a:latin typeface="Cambria Math" panose="02040503050406030204" pitchFamily="18" charset="0"/>
+                                        </a:rPr>
+                                        <m:t>1</m:t>
+                                      </m:r>
+                                    </m:sub>
+                                  </m:sSub>
+                                  <m:sSub>
+                                    <m:sSubPr>
+                                      <m:ctrlPr>
+                                        <a:rPr lang="en-US" i="1">
+                                          <a:solidFill>
+                                            <a:schemeClr val="tx1"/>
+                                          </a:solidFill>
+                                          <a:latin typeface="Cambria Math" panose="02040503050406030204" pitchFamily="18" charset="0"/>
+                                        </a:rPr>
+                                      </m:ctrlPr>
+                                    </m:sSubPr>
+                                    <m:e>
+                                      <m:r>
+                                        <a:rPr lang="en-US" i="1">
+                                          <a:solidFill>
+                                            <a:schemeClr val="tx1"/>
+                                          </a:solidFill>
+                                          <a:latin typeface="Cambria Math" panose="02040503050406030204" pitchFamily="18" charset="0"/>
+                                        </a:rPr>
+                                        <m:t>𝑎</m:t>
+                                      </m:r>
+                                    </m:e>
+                                    <m:sub>
+                                      <m:r>
+                                        <a:rPr lang="en-US" b="0" i="1" smtClean="0">
+                                          <a:solidFill>
+                                            <a:schemeClr val="tx1"/>
+                                          </a:solidFill>
+                                          <a:latin typeface="Cambria Math" panose="02040503050406030204" pitchFamily="18" charset="0"/>
+                                        </a:rPr>
+                                        <m:t>2</m:t>
+                                      </m:r>
+                                      <m:r>
+                                        <a:rPr lang="en-US" i="1">
+                                          <a:solidFill>
+                                            <a:schemeClr val="tx1"/>
+                                          </a:solidFill>
+                                          <a:latin typeface="Cambria Math" panose="02040503050406030204" pitchFamily="18" charset="0"/>
+                                        </a:rPr>
+                                        <m:t>2</m:t>
+                                      </m:r>
+                                    </m:sub>
+                                  </m:sSub>
+                                  <m:sSub>
+                                    <m:sSubPr>
+                                      <m:ctrlPr>
+                                        <a:rPr lang="en-US" i="1">
+                                          <a:solidFill>
+                                            <a:schemeClr val="tx1"/>
+                                          </a:solidFill>
+                                          <a:latin typeface="Cambria Math" panose="02040503050406030204" pitchFamily="18" charset="0"/>
+                                        </a:rPr>
+                                      </m:ctrlPr>
+                                    </m:sSubPr>
+                                    <m:e>
+                                      <m:r>
+                                        <a:rPr lang="en-US" i="1">
+                                          <a:solidFill>
+                                            <a:schemeClr val="tx1"/>
+                                          </a:solidFill>
+                                          <a:latin typeface="Cambria Math" panose="02040503050406030204" pitchFamily="18" charset="0"/>
+                                        </a:rPr>
+                                        <m:t>𝑎</m:t>
+                                      </m:r>
+                                    </m:e>
+                                    <m:sub>
+                                      <m:r>
+                                        <a:rPr lang="en-US" b="0" i="1" smtClean="0">
+                                          <a:solidFill>
+                                            <a:schemeClr val="tx1"/>
+                                          </a:solidFill>
+                                          <a:latin typeface="Cambria Math" panose="02040503050406030204" pitchFamily="18" charset="0"/>
+                                        </a:rPr>
+                                        <m:t>2</m:t>
+                                      </m:r>
+                                      <m:r>
+                                        <a:rPr lang="en-US" i="1">
+                                          <a:solidFill>
+                                            <a:schemeClr val="tx1"/>
+                                          </a:solidFill>
+                                          <a:latin typeface="Cambria Math" panose="02040503050406030204" pitchFamily="18" charset="0"/>
+                                        </a:rPr>
+                                        <m:t>3</m:t>
+                                      </m:r>
+                                    </m:sub>
+                                  </m:sSub>
+                                  <m:sSub>
+                                    <m:sSubPr>
+                                      <m:ctrlPr>
+                                        <a:rPr lang="en-US" i="1">
+                                          <a:solidFill>
+                                            <a:schemeClr val="tx1"/>
+                                          </a:solidFill>
+                                          <a:latin typeface="Cambria Math" panose="02040503050406030204" pitchFamily="18" charset="0"/>
+                                        </a:rPr>
+                                      </m:ctrlPr>
+                                    </m:sSubPr>
+                                    <m:e>
+                                      <m:r>
+                                        <a:rPr lang="en-US" i="1">
+                                          <a:solidFill>
+                                            <a:schemeClr val="tx1"/>
+                                          </a:solidFill>
+                                          <a:latin typeface="Cambria Math" panose="02040503050406030204" pitchFamily="18" charset="0"/>
+                                        </a:rPr>
+                                        <m:t>…</m:t>
+                                      </m:r>
+                                      <m:r>
+                                        <a:rPr lang="en-US" i="1">
+                                          <a:solidFill>
+                                            <a:schemeClr val="tx1"/>
+                                          </a:solidFill>
+                                          <a:latin typeface="Cambria Math" panose="02040503050406030204" pitchFamily="18" charset="0"/>
+                                        </a:rPr>
+                                        <m:t>𝑎</m:t>
+                                      </m:r>
+                                    </m:e>
+                                    <m:sub>
+                                      <m:r>
+                                        <a:rPr lang="en-US" b="0" i="1" smtClean="0">
+                                          <a:solidFill>
+                                            <a:schemeClr val="tx1"/>
+                                          </a:solidFill>
+                                          <a:latin typeface="Cambria Math" panose="02040503050406030204" pitchFamily="18" charset="0"/>
+                                        </a:rPr>
+                                        <m:t>2</m:t>
+                                      </m:r>
+                                      <m:r>
+                                        <a:rPr lang="en-US" i="1">
+                                          <a:solidFill>
+                                            <a:schemeClr val="tx1"/>
+                                          </a:solidFill>
+                                          <a:latin typeface="Cambria Math" panose="02040503050406030204" pitchFamily="18" charset="0"/>
+                                        </a:rPr>
+                                        <m:t>𝑛</m:t>
+                                      </m:r>
+                                    </m:sub>
+                                  </m:sSub>
+                                </m:e>
+                                <m:e>
+                                  <m:r>
+                                    <a:rPr lang="en-US" b="0" i="1" smtClean="0">
+                                      <a:solidFill>
+                                        <a:schemeClr val="tx1"/>
+                                      </a:solidFill>
+                                      <a:latin typeface="Cambria Math" panose="02040503050406030204" pitchFamily="18" charset="0"/>
+                                    </a:rPr>
+                                    <m:t>…</m:t>
+                                  </m:r>
+                                </m:e>
+                                <m:e>
+                                  <m:sSub>
+                                    <m:sSubPr>
+                                      <m:ctrlPr>
+                                        <a:rPr lang="en-US" i="1">
+                                          <a:solidFill>
+                                            <a:schemeClr val="tx1"/>
+                                          </a:solidFill>
+                                          <a:latin typeface="Cambria Math" panose="02040503050406030204" pitchFamily="18" charset="0"/>
+                                        </a:rPr>
+                                      </m:ctrlPr>
+                                    </m:sSubPr>
+                                    <m:e>
+                                      <m:r>
+                                        <a:rPr lang="en-US" i="1">
+                                          <a:solidFill>
+                                            <a:schemeClr val="tx1"/>
+                                          </a:solidFill>
+                                          <a:latin typeface="Cambria Math" panose="02040503050406030204" pitchFamily="18" charset="0"/>
+                                        </a:rPr>
+                                        <m:t>𝑎</m:t>
+                                      </m:r>
+                                    </m:e>
+                                    <m:sub>
+                                      <m:r>
+                                        <a:rPr lang="en-US" b="0" i="1" smtClean="0">
+                                          <a:solidFill>
+                                            <a:schemeClr val="tx1"/>
+                                          </a:solidFill>
+                                          <a:latin typeface="Cambria Math" panose="02040503050406030204" pitchFamily="18" charset="0"/>
+                                        </a:rPr>
+                                        <m:t>𝑚</m:t>
+                                      </m:r>
+                                      <m:r>
+                                        <a:rPr lang="en-US" i="1">
+                                          <a:solidFill>
+                                            <a:schemeClr val="tx1"/>
+                                          </a:solidFill>
+                                          <a:latin typeface="Cambria Math" panose="02040503050406030204" pitchFamily="18" charset="0"/>
+                                        </a:rPr>
+                                        <m:t>1</m:t>
+                                      </m:r>
+                                    </m:sub>
+                                  </m:sSub>
+                                  <m:sSub>
+                                    <m:sSubPr>
+                                      <m:ctrlPr>
+                                        <a:rPr lang="en-US" i="1">
+                                          <a:solidFill>
+                                            <a:schemeClr val="tx1"/>
+                                          </a:solidFill>
+                                          <a:latin typeface="Cambria Math" panose="02040503050406030204" pitchFamily="18" charset="0"/>
+                                        </a:rPr>
+                                      </m:ctrlPr>
+                                    </m:sSubPr>
+                                    <m:e>
+                                      <m:r>
+                                        <a:rPr lang="en-US" i="1">
+                                          <a:solidFill>
+                                            <a:schemeClr val="tx1"/>
+                                          </a:solidFill>
+                                          <a:latin typeface="Cambria Math" panose="02040503050406030204" pitchFamily="18" charset="0"/>
+                                        </a:rPr>
+                                        <m:t>𝑎</m:t>
+                                      </m:r>
+                                    </m:e>
+                                    <m:sub>
+                                      <m:r>
+                                        <a:rPr lang="en-US" b="0" i="1" smtClean="0">
+                                          <a:solidFill>
+                                            <a:schemeClr val="tx1"/>
+                                          </a:solidFill>
+                                          <a:latin typeface="Cambria Math" panose="02040503050406030204" pitchFamily="18" charset="0"/>
+                                        </a:rPr>
+                                        <m:t>𝑚</m:t>
+                                      </m:r>
+                                      <m:r>
+                                        <a:rPr lang="en-US" i="1">
+                                          <a:solidFill>
+                                            <a:schemeClr val="tx1"/>
+                                          </a:solidFill>
+                                          <a:latin typeface="Cambria Math" panose="02040503050406030204" pitchFamily="18" charset="0"/>
+                                        </a:rPr>
+                                        <m:t>2</m:t>
+                                      </m:r>
+                                    </m:sub>
+                                  </m:sSub>
+                                  <m:sSub>
+                                    <m:sSubPr>
+                                      <m:ctrlPr>
+                                        <a:rPr lang="en-US" i="1">
+                                          <a:solidFill>
+                                            <a:schemeClr val="tx1"/>
+                                          </a:solidFill>
+                                          <a:latin typeface="Cambria Math" panose="02040503050406030204" pitchFamily="18" charset="0"/>
+                                        </a:rPr>
+                                      </m:ctrlPr>
+                                    </m:sSubPr>
+                                    <m:e>
+                                      <m:r>
+                                        <a:rPr lang="en-US" i="1">
+                                          <a:solidFill>
+                                            <a:schemeClr val="tx1"/>
+                                          </a:solidFill>
+                                          <a:latin typeface="Cambria Math" panose="02040503050406030204" pitchFamily="18" charset="0"/>
+                                        </a:rPr>
+                                        <m:t>𝑎</m:t>
+                                      </m:r>
+                                    </m:e>
+                                    <m:sub>
+                                      <m:r>
+                                        <a:rPr lang="en-US" b="0" i="1" smtClean="0">
+                                          <a:solidFill>
+                                            <a:schemeClr val="tx1"/>
+                                          </a:solidFill>
+                                          <a:latin typeface="Cambria Math" panose="02040503050406030204" pitchFamily="18" charset="0"/>
+                                        </a:rPr>
+                                        <m:t>𝑚</m:t>
+                                      </m:r>
+                                      <m:r>
+                                        <a:rPr lang="en-US" i="1">
+                                          <a:solidFill>
+                                            <a:schemeClr val="tx1"/>
+                                          </a:solidFill>
+                                          <a:latin typeface="Cambria Math" panose="02040503050406030204" pitchFamily="18" charset="0"/>
+                                        </a:rPr>
+                                        <m:t>3</m:t>
+                                      </m:r>
+                                    </m:sub>
+                                  </m:sSub>
+                                  <m:sSub>
+                                    <m:sSubPr>
+                                      <m:ctrlPr>
+                                        <a:rPr lang="en-US" i="1">
+                                          <a:solidFill>
+                                            <a:schemeClr val="tx1"/>
+                                          </a:solidFill>
+                                          <a:latin typeface="Cambria Math" panose="02040503050406030204" pitchFamily="18" charset="0"/>
+                                        </a:rPr>
+                                      </m:ctrlPr>
+                                    </m:sSubPr>
+                                    <m:e>
+                                      <m:r>
+                                        <a:rPr lang="en-US" i="1">
+                                          <a:solidFill>
+                                            <a:schemeClr val="tx1"/>
+                                          </a:solidFill>
+                                          <a:latin typeface="Cambria Math" panose="02040503050406030204" pitchFamily="18" charset="0"/>
+                                        </a:rPr>
+                                        <m:t>…</m:t>
+                                      </m:r>
+                                      <m:r>
+                                        <a:rPr lang="en-US" i="1">
+                                          <a:solidFill>
+                                            <a:schemeClr val="tx1"/>
+                                          </a:solidFill>
+                                          <a:latin typeface="Cambria Math" panose="02040503050406030204" pitchFamily="18" charset="0"/>
+                                        </a:rPr>
+                                        <m:t>𝑎</m:t>
+                                      </m:r>
+                                    </m:e>
+                                    <m:sub>
+                                      <m:r>
+                                        <a:rPr lang="en-US" b="0" i="1" smtClean="0">
+                                          <a:solidFill>
+                                            <a:schemeClr val="tx1"/>
+                                          </a:solidFill>
+                                          <a:latin typeface="Cambria Math" panose="02040503050406030204" pitchFamily="18" charset="0"/>
+                                        </a:rPr>
+                                        <m:t>𝑚</m:t>
+                                      </m:r>
+                                      <m:r>
+                                        <a:rPr lang="en-US" i="1">
+                                          <a:solidFill>
+                                            <a:schemeClr val="tx1"/>
+                                          </a:solidFill>
+                                          <a:latin typeface="Cambria Math" panose="02040503050406030204" pitchFamily="18" charset="0"/>
+                                        </a:rPr>
+                                        <m:t>𝑛</m:t>
+                                      </m:r>
+                                    </m:sub>
+                                  </m:sSub>
+                                </m:e>
+                              </m:eqArr>
+                            </m:e>
+                          </m:d>
+                        </m:oMath>
+                      </m:oMathPara>
+                    </a14:m>
+                    <a:endParaRPr lang="en-US">
+                      <a:solidFill>
+                        <a:schemeClr val="tx1"/>
+                      </a:solidFill>
+                    </a:endParaRPr>
+                  </a:p>
+                  <a:p>
+                    <a:endParaRPr lang="en-US">
+                      <a:solidFill>
+                        <a:schemeClr val="tx1"/>
+                      </a:solidFill>
+                    </a:endParaRPr>
+                  </a:p>
+                </p:txBody>
+              </p:sp>
+            </mc:Choice>
+            <mc:Fallback>
+              <p:sp>
+                <p:nvSpPr>
+                  <p:cNvPr id="26" name="Rectangle 25"/>
+                  <p:cNvSpPr>
+                    <a:spLocks noRot="1" noChangeAspect="1" noMove="1" noResize="1" noEditPoints="1" noAdjustHandles="1" noChangeArrowheads="1" noChangeShapeType="1" noTextEdit="1"/>
+                  </p:cNvSpPr>
+                  <p:nvPr/>
+                </p:nvSpPr>
+                <p:spPr>
+                  <a:xfrm>
+                    <a:off x="3871294" y="2417691"/>
+                    <a:ext cx="2411896" cy="1378225"/>
+                  </a:xfrm>
+                  <a:prstGeom prst="rect">
+                    <a:avLst/>
+                  </a:prstGeom>
+                  <a:blipFill>
+                    <a:blip r:embed="rId2"/>
+                    <a:stretch>
+                      <a:fillRect/>
+                    </a:stretch>
+                  </a:blipFill>
+                  <a:ln>
+                    <a:solidFill>
+                      <a:schemeClr val="tx1"/>
+                    </a:solidFill>
+                  </a:ln>
+                </p:spPr>
+                <p:txBody>
+                  <a:bodyPr/>
+                  <a:lstStyle/>
+                  <a:p>
+                    <a:r>
+                      <a:rPr lang="en-US">
+                        <a:noFill/>
+                      </a:rPr>
+                      <a:t> </a:t>
+                    </a:r>
+                  </a:p>
+                </p:txBody>
+              </p:sp>
+            </mc:Fallback>
+          </mc:AlternateContent>
+          <p:sp>
+            <p:nvSpPr>
+              <p:cNvPr id="27" name="Rectangle 26"/>
+              <p:cNvSpPr/>
+              <p:nvPr/>
+            </p:nvSpPr>
+            <p:spPr>
+              <a:xfrm>
+                <a:off x="8778738" y="867188"/>
+                <a:ext cx="3841642" cy="646331"/>
+              </a:xfrm>
+              <a:prstGeom prst="rect">
+                <a:avLst/>
+              </a:prstGeom>
+            </p:spPr>
+            <p:txBody>
+              <a:bodyPr wrap="square">
+                <a:spAutoFit/>
+              </a:bodyPr>
+              <a:lstStyle/>
+              <a:p>
+                <a:r>
+                  <a:rPr lang="en-US" i="1"/>
+                  <a:t>m</a:t>
+                </a:r>
+                <a:r>
+                  <a:rPr lang="en-US" i="1"/>
+                  <a:t>:số lượng câu</a:t>
+                </a:r>
+              </a:p>
+              <a:p>
+                <a:r>
+                  <a:rPr lang="en-US" i="1"/>
+                  <a:t>n</a:t>
+                </a:r>
+                <a:r>
+                  <a:rPr lang="en-US" i="1"/>
+                  <a:t>:kích </a:t>
+                </a:r>
+                <a:r>
+                  <a:rPr lang="en-US" i="1"/>
+                  <a:t>thước tập </a:t>
+                </a:r>
+                <a:r>
+                  <a:rPr lang="en-US" i="1"/>
+                  <a:t>từ vựng</a:t>
+                </a:r>
+                <a:endParaRPr lang="en-US" i="1"/>
+              </a:p>
+            </p:txBody>
+          </p:sp>
+          <p:cxnSp>
+            <p:nvCxnSpPr>
+              <p:cNvPr id="28" name="Straight Arrow Connector 27"/>
+              <p:cNvCxnSpPr/>
+              <p:nvPr/>
+            </p:nvCxnSpPr>
+            <p:spPr>
+              <a:xfrm>
+                <a:off x="2294284" y="4746761"/>
+                <a:ext cx="1577010" cy="0"/>
+              </a:xfrm>
+              <a:prstGeom prst="straightConnector1">
+                <a:avLst/>
+              </a:prstGeom>
+              <a:ln w="19050">
+                <a:solidFill>
+                  <a:schemeClr val="tx1"/>
+                </a:solidFill>
+                <a:tailEnd type="triangle"/>
+              </a:ln>
+            </p:spPr>
+            <p:style>
+              <a:lnRef idx="1">
+                <a:schemeClr val="accent1"/>
+              </a:lnRef>
+              <a:fillRef idx="0">
+                <a:schemeClr val="accent1"/>
+              </a:fillRef>
+              <a:effectRef idx="0">
+                <a:schemeClr val="accent1"/>
+              </a:effectRef>
+              <a:fontRef idx="minor">
+                <a:schemeClr val="tx1"/>
+              </a:fontRef>
+            </p:style>
+          </p:cxnSp>
+          <mc:AlternateContent xmlns:mc="http://schemas.openxmlformats.org/markup-compatibility/2006">
+            <mc:Choice xmlns:a14="http://schemas.microsoft.com/office/drawing/2010/main" Requires="a14">
+              <p:sp>
+                <p:nvSpPr>
+                  <p:cNvPr id="29" name="Rectangle 28"/>
+                  <p:cNvSpPr/>
+                  <p:nvPr/>
+                </p:nvSpPr>
+                <p:spPr>
+                  <a:xfrm>
+                    <a:off x="3871294" y="4057648"/>
+                    <a:ext cx="2411896" cy="1378225"/>
+                  </a:xfrm>
+                  <a:prstGeom prst="rect">
+                    <a:avLst/>
+                  </a:prstGeom>
+                  <a:noFill/>
+                  <a:ln>
+                    <a:solidFill>
+                      <a:schemeClr val="tx1"/>
+                    </a:solidFill>
+                  </a:ln>
+                </p:spPr>
+                <p:style>
+                  <a:lnRef idx="2">
+                    <a:schemeClr val="accent1">
+                      <a:shade val="50000"/>
+                    </a:schemeClr>
+                  </a:lnRef>
+                  <a:fillRef idx="1">
+                    <a:schemeClr val="accent1"/>
+                  </a:fillRef>
+                  <a:effectRef idx="0">
+                    <a:schemeClr val="accent1"/>
+                  </a:effectRef>
+                  <a:fontRef idx="minor">
+                    <a:schemeClr val="lt1"/>
+                  </a:fontRef>
+                </p:style>
+                <p:txBody>
+                  <a:bodyPr rtlCol="0" anchor="ctr"/>
+                  <a:lstStyle/>
+                  <a:p>
+                    <a14:m>
+                      <m:oMathPara xmlns:m="http://schemas.openxmlformats.org/officeDocument/2006/math">
+                        <m:oMathParaPr>
+                          <m:jc m:val="centerGroup"/>
+                        </m:oMathParaPr>
+                        <m:oMath xmlns:m="http://schemas.openxmlformats.org/officeDocument/2006/math">
+                          <m:d>
+                            <m:dPr>
+                              <m:begChr m:val="["/>
+                              <m:endChr m:val="]"/>
+                              <m:ctrlPr>
+                                <a:rPr lang="en-US" i="1" smtClean="0">
+                                  <a:solidFill>
+                                    <a:schemeClr val="tx1"/>
+                                  </a:solidFill>
+                                  <a:latin typeface="Cambria Math" panose="02040503050406030204" pitchFamily="18" charset="0"/>
+                                </a:rPr>
+                              </m:ctrlPr>
+                            </m:dPr>
+                            <m:e>
+                              <m:eqArr>
+                                <m:eqArrPr>
+                                  <m:ctrlPr>
+                                    <a:rPr lang="en-US" i="1" smtClean="0">
+                                      <a:solidFill>
+                                        <a:schemeClr val="tx1"/>
+                                      </a:solidFill>
+                                      <a:latin typeface="Cambria Math" panose="02040503050406030204" pitchFamily="18" charset="0"/>
+                                    </a:rPr>
+                                  </m:ctrlPr>
+                                </m:eqArrPr>
+                                <m:e>
+                                  <m:sSub>
+                                    <m:sSubPr>
+                                      <m:ctrlPr>
+                                        <a:rPr lang="en-US" i="1" smtClean="0">
+                                          <a:solidFill>
+                                            <a:schemeClr val="tx1"/>
+                                          </a:solidFill>
+                                          <a:latin typeface="Cambria Math" panose="02040503050406030204" pitchFamily="18" charset="0"/>
+                                        </a:rPr>
+                                      </m:ctrlPr>
+                                    </m:sSubPr>
+                                    <m:e>
+                                      <m:r>
+                                        <a:rPr lang="en-US" b="0" i="1" smtClean="0">
+                                          <a:solidFill>
+                                            <a:schemeClr val="tx1"/>
+                                          </a:solidFill>
+                                          <a:latin typeface="Cambria Math" panose="02040503050406030204" pitchFamily="18" charset="0"/>
+                                        </a:rPr>
+                                        <m:t>𝑏</m:t>
+                                      </m:r>
+                                    </m:e>
+                                    <m:sub>
+                                      <m:r>
+                                        <a:rPr lang="en-US" b="0" i="1" smtClean="0">
+                                          <a:solidFill>
+                                            <a:schemeClr val="tx1"/>
+                                          </a:solidFill>
+                                          <a:latin typeface="Cambria Math" panose="02040503050406030204" pitchFamily="18" charset="0"/>
+                                        </a:rPr>
+                                        <m:t>11</m:t>
+                                      </m:r>
+                                    </m:sub>
+                                  </m:sSub>
+                                  <m:sSub>
+                                    <m:sSubPr>
+                                      <m:ctrlPr>
+                                        <a:rPr lang="en-US" i="1" smtClean="0">
+                                          <a:solidFill>
+                                            <a:schemeClr val="tx1"/>
+                                          </a:solidFill>
+                                          <a:latin typeface="Cambria Math" panose="02040503050406030204" pitchFamily="18" charset="0"/>
+                                        </a:rPr>
+                                      </m:ctrlPr>
+                                    </m:sSubPr>
+                                    <m:e>
+                                      <m:r>
+                                        <a:rPr lang="en-US" b="0" i="1" smtClean="0">
+                                          <a:solidFill>
+                                            <a:schemeClr val="tx1"/>
+                                          </a:solidFill>
+                                          <a:latin typeface="Cambria Math" panose="02040503050406030204" pitchFamily="18" charset="0"/>
+                                        </a:rPr>
+                                        <m:t>𝑏</m:t>
+                                      </m:r>
+                                    </m:e>
+                                    <m:sub>
+                                      <m:r>
+                                        <a:rPr lang="en-US" b="0" i="1" smtClean="0">
+                                          <a:solidFill>
+                                            <a:schemeClr val="tx1"/>
+                                          </a:solidFill>
+                                          <a:latin typeface="Cambria Math" panose="02040503050406030204" pitchFamily="18" charset="0"/>
+                                        </a:rPr>
+                                        <m:t>12</m:t>
+                                      </m:r>
+                                    </m:sub>
+                                  </m:sSub>
+                                  <m:sSub>
+                                    <m:sSubPr>
+                                      <m:ctrlPr>
+                                        <a:rPr lang="en-US" i="1">
+                                          <a:solidFill>
+                                            <a:schemeClr val="tx1"/>
+                                          </a:solidFill>
+                                          <a:latin typeface="Cambria Math" panose="02040503050406030204" pitchFamily="18" charset="0"/>
+                                        </a:rPr>
+                                      </m:ctrlPr>
+                                    </m:sSubPr>
+                                    <m:e>
+                                      <m:r>
+                                        <a:rPr lang="en-US" b="0" i="1" smtClean="0">
+                                          <a:solidFill>
+                                            <a:schemeClr val="tx1"/>
+                                          </a:solidFill>
+                                          <a:latin typeface="Cambria Math" panose="02040503050406030204" pitchFamily="18" charset="0"/>
+                                        </a:rPr>
+                                        <m:t>𝑏</m:t>
+                                      </m:r>
+                                    </m:e>
+                                    <m:sub>
+                                      <m:r>
+                                        <a:rPr lang="en-US" b="0" i="1" smtClean="0">
+                                          <a:solidFill>
+                                            <a:schemeClr val="tx1"/>
+                                          </a:solidFill>
+                                          <a:latin typeface="Cambria Math" panose="02040503050406030204" pitchFamily="18" charset="0"/>
+                                        </a:rPr>
+                                        <m:t>13</m:t>
+                                      </m:r>
+                                    </m:sub>
+                                  </m:sSub>
+                                  <m:sSub>
+                                    <m:sSubPr>
+                                      <m:ctrlPr>
+                                        <a:rPr lang="en-US" i="1">
+                                          <a:solidFill>
+                                            <a:schemeClr val="tx1"/>
+                                          </a:solidFill>
+                                          <a:latin typeface="Cambria Math" panose="02040503050406030204" pitchFamily="18" charset="0"/>
+                                        </a:rPr>
+                                      </m:ctrlPr>
+                                    </m:sSubPr>
+                                    <m:e>
+                                      <m:r>
+                                        <a:rPr lang="en-US" b="0" i="1" smtClean="0">
+                                          <a:solidFill>
+                                            <a:schemeClr val="tx1"/>
+                                          </a:solidFill>
+                                          <a:latin typeface="Cambria Math" panose="02040503050406030204" pitchFamily="18" charset="0"/>
+                                        </a:rPr>
+                                        <m:t>𝑏</m:t>
+                                      </m:r>
+                                    </m:e>
+                                    <m:sub>
+                                      <m:r>
+                                        <a:rPr lang="en-US" b="0" i="1" smtClean="0">
+                                          <a:solidFill>
+                                            <a:schemeClr val="tx1"/>
+                                          </a:solidFill>
+                                          <a:latin typeface="Cambria Math" panose="02040503050406030204" pitchFamily="18" charset="0"/>
+                                        </a:rPr>
+                                        <m:t>14</m:t>
+                                      </m:r>
+                                    </m:sub>
+                                  </m:sSub>
+                                </m:e>
+                                <m:e>
+                                  <m:sSub>
+                                    <m:sSubPr>
+                                      <m:ctrlPr>
+                                        <a:rPr lang="en-US" i="1">
+                                          <a:solidFill>
+                                            <a:schemeClr val="tx1"/>
+                                          </a:solidFill>
+                                          <a:latin typeface="Cambria Math" panose="02040503050406030204" pitchFamily="18" charset="0"/>
+                                        </a:rPr>
+                                      </m:ctrlPr>
+                                    </m:sSubPr>
+                                    <m:e>
+                                      <m:r>
+                                        <a:rPr lang="en-US" b="0" i="1" smtClean="0">
+                                          <a:solidFill>
+                                            <a:schemeClr val="tx1"/>
+                                          </a:solidFill>
+                                          <a:latin typeface="Cambria Math" panose="02040503050406030204" pitchFamily="18" charset="0"/>
+                                        </a:rPr>
+                                        <m:t>𝑏</m:t>
+                                      </m:r>
+                                    </m:e>
+                                    <m:sub>
+                                      <m:r>
+                                        <a:rPr lang="en-US" i="1">
+                                          <a:solidFill>
+                                            <a:schemeClr val="tx1"/>
+                                          </a:solidFill>
+                                          <a:latin typeface="Cambria Math" panose="02040503050406030204" pitchFamily="18" charset="0"/>
+                                        </a:rPr>
+                                        <m:t>11</m:t>
+                                      </m:r>
+                                    </m:sub>
+                                  </m:sSub>
+                                  <m:sSub>
+                                    <m:sSubPr>
+                                      <m:ctrlPr>
+                                        <a:rPr lang="en-US" i="1">
+                                          <a:solidFill>
+                                            <a:schemeClr val="tx1"/>
+                                          </a:solidFill>
+                                          <a:latin typeface="Cambria Math" panose="02040503050406030204" pitchFamily="18" charset="0"/>
+                                        </a:rPr>
+                                      </m:ctrlPr>
+                                    </m:sSubPr>
+                                    <m:e>
+                                      <m:r>
+                                        <a:rPr lang="en-US" b="0" i="1" smtClean="0">
+                                          <a:solidFill>
+                                            <a:schemeClr val="tx1"/>
+                                          </a:solidFill>
+                                          <a:latin typeface="Cambria Math" panose="02040503050406030204" pitchFamily="18" charset="0"/>
+                                        </a:rPr>
+                                        <m:t>𝑏</m:t>
+                                      </m:r>
+                                    </m:e>
+                                    <m:sub>
+                                      <m:r>
+                                        <a:rPr lang="en-US" i="1">
+                                          <a:solidFill>
+                                            <a:schemeClr val="tx1"/>
+                                          </a:solidFill>
+                                          <a:latin typeface="Cambria Math" panose="02040503050406030204" pitchFamily="18" charset="0"/>
+                                        </a:rPr>
+                                        <m:t>12</m:t>
+                                      </m:r>
+                                    </m:sub>
+                                  </m:sSub>
+                                  <m:sSub>
+                                    <m:sSubPr>
+                                      <m:ctrlPr>
+                                        <a:rPr lang="en-US" i="1">
+                                          <a:solidFill>
+                                            <a:schemeClr val="tx1"/>
+                                          </a:solidFill>
+                                          <a:latin typeface="Cambria Math" panose="02040503050406030204" pitchFamily="18" charset="0"/>
+                                        </a:rPr>
+                                      </m:ctrlPr>
+                                    </m:sSubPr>
+                                    <m:e>
+                                      <m:r>
+                                        <a:rPr lang="en-US" b="0" i="1" smtClean="0">
+                                          <a:solidFill>
+                                            <a:schemeClr val="tx1"/>
+                                          </a:solidFill>
+                                          <a:latin typeface="Cambria Math" panose="02040503050406030204" pitchFamily="18" charset="0"/>
+                                        </a:rPr>
+                                        <m:t>𝑏</m:t>
+                                      </m:r>
+                                    </m:e>
+                                    <m:sub>
+                                      <m:r>
+                                        <a:rPr lang="en-US" i="1">
+                                          <a:solidFill>
+                                            <a:schemeClr val="tx1"/>
+                                          </a:solidFill>
+                                          <a:latin typeface="Cambria Math" panose="02040503050406030204" pitchFamily="18" charset="0"/>
+                                        </a:rPr>
+                                        <m:t>13</m:t>
+                                      </m:r>
+                                    </m:sub>
+                                  </m:sSub>
+                                  <m:sSub>
+                                    <m:sSubPr>
+                                      <m:ctrlPr>
+                                        <a:rPr lang="en-US" i="1">
+                                          <a:solidFill>
+                                            <a:schemeClr val="tx1"/>
+                                          </a:solidFill>
+                                          <a:latin typeface="Cambria Math" panose="02040503050406030204" pitchFamily="18" charset="0"/>
+                                        </a:rPr>
+                                      </m:ctrlPr>
+                                    </m:sSubPr>
+                                    <m:e>
+                                      <m:r>
+                                        <a:rPr lang="en-US" b="0" i="1" smtClean="0">
+                                          <a:solidFill>
+                                            <a:schemeClr val="tx1"/>
+                                          </a:solidFill>
+                                          <a:latin typeface="Cambria Math" panose="02040503050406030204" pitchFamily="18" charset="0"/>
+                                        </a:rPr>
+                                        <m:t>𝑏</m:t>
+                                      </m:r>
+                                    </m:e>
+                                    <m:sub>
+                                      <m:r>
+                                        <a:rPr lang="en-US" i="1">
+                                          <a:solidFill>
+                                            <a:schemeClr val="tx1"/>
+                                          </a:solidFill>
+                                          <a:latin typeface="Cambria Math" panose="02040503050406030204" pitchFamily="18" charset="0"/>
+                                        </a:rPr>
+                                        <m:t>14</m:t>
+                                      </m:r>
+                                    </m:sub>
+                                  </m:sSub>
+                                </m:e>
+                                <m:e>
+                                  <m:r>
+                                    <a:rPr lang="en-US" b="0" i="1" smtClean="0">
+                                      <a:solidFill>
+                                        <a:schemeClr val="tx1"/>
+                                      </a:solidFill>
+                                      <a:latin typeface="Cambria Math" panose="02040503050406030204" pitchFamily="18" charset="0"/>
+                                    </a:rPr>
+                                    <m:t>…</m:t>
+                                  </m:r>
+                                </m:e>
+                                <m:e>
+                                  <m:sSub>
+                                    <m:sSubPr>
+                                      <m:ctrlPr>
+                                        <a:rPr lang="en-US" i="1">
+                                          <a:solidFill>
+                                            <a:schemeClr val="tx1"/>
+                                          </a:solidFill>
+                                          <a:latin typeface="Cambria Math" panose="02040503050406030204" pitchFamily="18" charset="0"/>
+                                        </a:rPr>
+                                      </m:ctrlPr>
+                                    </m:sSubPr>
+                                    <m:e>
+                                      <m:r>
+                                        <a:rPr lang="en-US" b="0" i="1" smtClean="0">
+                                          <a:solidFill>
+                                            <a:schemeClr val="tx1"/>
+                                          </a:solidFill>
+                                          <a:latin typeface="Cambria Math" panose="02040503050406030204" pitchFamily="18" charset="0"/>
+                                        </a:rPr>
+                                        <m:t>𝑏</m:t>
+                                      </m:r>
+                                    </m:e>
+                                    <m:sub>
+                                      <m:r>
+                                        <a:rPr lang="en-US" b="0" i="1" smtClean="0">
+                                          <a:solidFill>
+                                            <a:schemeClr val="tx1"/>
+                                          </a:solidFill>
+                                          <a:latin typeface="Cambria Math" panose="02040503050406030204" pitchFamily="18" charset="0"/>
+                                        </a:rPr>
+                                        <m:t>𝑚</m:t>
+                                      </m:r>
+                                      <m:r>
+                                        <a:rPr lang="en-US" i="1">
+                                          <a:solidFill>
+                                            <a:schemeClr val="tx1"/>
+                                          </a:solidFill>
+                                          <a:latin typeface="Cambria Math" panose="02040503050406030204" pitchFamily="18" charset="0"/>
+                                        </a:rPr>
+                                        <m:t>1</m:t>
+                                      </m:r>
+                                    </m:sub>
+                                  </m:sSub>
+                                  <m:sSub>
+                                    <m:sSubPr>
+                                      <m:ctrlPr>
+                                        <a:rPr lang="en-US" i="1">
+                                          <a:solidFill>
+                                            <a:schemeClr val="tx1"/>
+                                          </a:solidFill>
+                                          <a:latin typeface="Cambria Math" panose="02040503050406030204" pitchFamily="18" charset="0"/>
+                                        </a:rPr>
+                                      </m:ctrlPr>
+                                    </m:sSubPr>
+                                    <m:e>
+                                      <m:r>
+                                        <a:rPr lang="en-US" b="0" i="1" smtClean="0">
+                                          <a:solidFill>
+                                            <a:schemeClr val="tx1"/>
+                                          </a:solidFill>
+                                          <a:latin typeface="Cambria Math" panose="02040503050406030204" pitchFamily="18" charset="0"/>
+                                        </a:rPr>
+                                        <m:t>𝑏</m:t>
+                                      </m:r>
+                                    </m:e>
+                                    <m:sub>
+                                      <m:r>
+                                        <a:rPr lang="en-US" b="0" i="1" smtClean="0">
+                                          <a:solidFill>
+                                            <a:schemeClr val="tx1"/>
+                                          </a:solidFill>
+                                          <a:latin typeface="Cambria Math" panose="02040503050406030204" pitchFamily="18" charset="0"/>
+                                        </a:rPr>
+                                        <m:t>𝑚</m:t>
+                                      </m:r>
+                                      <m:r>
+                                        <a:rPr lang="en-US" i="1">
+                                          <a:solidFill>
+                                            <a:schemeClr val="tx1"/>
+                                          </a:solidFill>
+                                          <a:latin typeface="Cambria Math" panose="02040503050406030204" pitchFamily="18" charset="0"/>
+                                        </a:rPr>
+                                        <m:t>2</m:t>
+                                      </m:r>
+                                    </m:sub>
+                                  </m:sSub>
+                                  <m:sSub>
+                                    <m:sSubPr>
+                                      <m:ctrlPr>
+                                        <a:rPr lang="en-US" i="1">
+                                          <a:solidFill>
+                                            <a:schemeClr val="tx1"/>
+                                          </a:solidFill>
+                                          <a:latin typeface="Cambria Math" panose="02040503050406030204" pitchFamily="18" charset="0"/>
+                                        </a:rPr>
+                                      </m:ctrlPr>
+                                    </m:sSubPr>
+                                    <m:e>
+                                      <m:r>
+                                        <a:rPr lang="en-US" b="0" i="1" smtClean="0">
+                                          <a:solidFill>
+                                            <a:schemeClr val="tx1"/>
+                                          </a:solidFill>
+                                          <a:latin typeface="Cambria Math" panose="02040503050406030204" pitchFamily="18" charset="0"/>
+                                        </a:rPr>
+                                        <m:t>𝑏</m:t>
+                                      </m:r>
+                                    </m:e>
+                                    <m:sub>
+                                      <m:r>
+                                        <a:rPr lang="en-US" b="0" i="1" smtClean="0">
+                                          <a:solidFill>
+                                            <a:schemeClr val="tx1"/>
+                                          </a:solidFill>
+                                          <a:latin typeface="Cambria Math" panose="02040503050406030204" pitchFamily="18" charset="0"/>
+                                        </a:rPr>
+                                        <m:t>𝑚</m:t>
+                                      </m:r>
+                                      <m:r>
+                                        <a:rPr lang="en-US" i="1">
+                                          <a:solidFill>
+                                            <a:schemeClr val="tx1"/>
+                                          </a:solidFill>
+                                          <a:latin typeface="Cambria Math" panose="02040503050406030204" pitchFamily="18" charset="0"/>
+                                        </a:rPr>
+                                        <m:t>3</m:t>
+                                      </m:r>
+                                    </m:sub>
+                                  </m:sSub>
+                                  <m:sSub>
+                                    <m:sSubPr>
+                                      <m:ctrlPr>
+                                        <a:rPr lang="en-US" i="1">
+                                          <a:solidFill>
+                                            <a:schemeClr val="tx1"/>
+                                          </a:solidFill>
+                                          <a:latin typeface="Cambria Math" panose="02040503050406030204" pitchFamily="18" charset="0"/>
+                                        </a:rPr>
+                                      </m:ctrlPr>
+                                    </m:sSubPr>
+                                    <m:e>
+                                      <m:r>
+                                        <a:rPr lang="en-US" b="0" i="1" smtClean="0">
+                                          <a:solidFill>
+                                            <a:schemeClr val="tx1"/>
+                                          </a:solidFill>
+                                          <a:latin typeface="Cambria Math" panose="02040503050406030204" pitchFamily="18" charset="0"/>
+                                        </a:rPr>
+                                        <m:t>𝑏</m:t>
+                                      </m:r>
+                                    </m:e>
+                                    <m:sub>
+                                      <m:r>
+                                        <a:rPr lang="en-US" b="0" i="1" smtClean="0">
+                                          <a:solidFill>
+                                            <a:schemeClr val="tx1"/>
+                                          </a:solidFill>
+                                          <a:latin typeface="Cambria Math" panose="02040503050406030204" pitchFamily="18" charset="0"/>
+                                        </a:rPr>
+                                        <m:t>𝑚</m:t>
+                                      </m:r>
+                                      <m:r>
+                                        <a:rPr lang="en-US" i="1">
+                                          <a:solidFill>
+                                            <a:schemeClr val="tx1"/>
+                                          </a:solidFill>
+                                          <a:latin typeface="Cambria Math" panose="02040503050406030204" pitchFamily="18" charset="0"/>
+                                        </a:rPr>
+                                        <m:t>4</m:t>
+                                      </m:r>
+                                    </m:sub>
+                                  </m:sSub>
+                                </m:e>
+                              </m:eqArr>
+                            </m:e>
+                          </m:d>
+                        </m:oMath>
+                      </m:oMathPara>
+                    </a14:m>
+                    <a:endParaRPr lang="en-US">
+                      <a:solidFill>
+                        <a:schemeClr val="tx1"/>
+                      </a:solidFill>
+                    </a:endParaRPr>
+                  </a:p>
+                  <a:p>
+                    <a:endParaRPr lang="en-US">
+                      <a:solidFill>
+                        <a:schemeClr val="tx1"/>
+                      </a:solidFill>
+                    </a:endParaRPr>
+                  </a:p>
+                </p:txBody>
+              </p:sp>
+            </mc:Choice>
+            <mc:Fallback>
+              <p:sp>
+                <p:nvSpPr>
+                  <p:cNvPr id="29" name="Rectangle 28"/>
+                  <p:cNvSpPr>
+                    <a:spLocks noRot="1" noChangeAspect="1" noMove="1" noResize="1" noEditPoints="1" noAdjustHandles="1" noChangeArrowheads="1" noChangeShapeType="1" noTextEdit="1"/>
+                  </p:cNvSpPr>
+                  <p:nvPr/>
+                </p:nvSpPr>
+                <p:spPr>
+                  <a:xfrm>
+                    <a:off x="3871294" y="4057648"/>
+                    <a:ext cx="2411896" cy="1378225"/>
+                  </a:xfrm>
+                  <a:prstGeom prst="rect">
+                    <a:avLst/>
+                  </a:prstGeom>
+                  <a:blipFill>
+                    <a:blip r:embed="rId3"/>
+                    <a:stretch>
+                      <a:fillRect/>
+                    </a:stretch>
+                  </a:blipFill>
+                  <a:ln>
+                    <a:solidFill>
+                      <a:schemeClr val="tx1"/>
+                    </a:solidFill>
+                  </a:ln>
+                </p:spPr>
+                <p:txBody>
+                  <a:bodyPr/>
+                  <a:lstStyle/>
+                  <a:p>
+                    <a:r>
+                      <a:rPr lang="en-US">
+                        <a:noFill/>
+                      </a:rPr>
+                      <a:t> </a:t>
+                    </a:r>
+                  </a:p>
+                </p:txBody>
+              </p:sp>
+            </mc:Fallback>
+          </mc:AlternateContent>
+          <p:sp>
+            <p:nvSpPr>
+              <p:cNvPr id="30" name="Rectangle: Single Corner Snipped 29"/>
+              <p:cNvSpPr/>
+              <p:nvPr/>
+            </p:nvSpPr>
+            <p:spPr>
+              <a:xfrm>
+                <a:off x="571500" y="6193730"/>
+                <a:ext cx="1722783" cy="622852"/>
+              </a:xfrm>
+              <a:prstGeom prst="snip1Rect">
+                <a:avLst/>
+              </a:prstGeom>
+              <a:ln>
+                <a:solidFill>
+                  <a:schemeClr val="tx1"/>
+                </a:solidFill>
+              </a:ln>
+            </p:spPr>
+            <p:style>
+              <a:lnRef idx="2">
+                <a:schemeClr val="dk1"/>
+              </a:lnRef>
+              <a:fillRef idx="1">
+                <a:schemeClr val="lt1"/>
+              </a:fillRef>
+              <a:effectRef idx="0">
+                <a:schemeClr val="dk1"/>
+              </a:effectRef>
+              <a:fontRef idx="minor">
+                <a:schemeClr val="dk1"/>
+              </a:fontRef>
+            </p:style>
+            <p:txBody>
+              <a:bodyPr rtlCol="0" anchor="ctr"/>
+              <a:lstStyle/>
+              <a:p>
+                <a:pPr algn="ctr"/>
+                <a:r>
+                  <a:rPr lang="en-US">
+                    <a:solidFill>
+                      <a:schemeClr val="tx1"/>
+                    </a:solidFill>
+                  </a:rPr>
+                  <a:t>SO-CAL</a:t>
+                </a:r>
+                <a:endParaRPr lang="en-US">
+                  <a:solidFill>
+                    <a:schemeClr val="tx1"/>
+                  </a:solidFill>
+                </a:endParaRPr>
+              </a:p>
+            </p:txBody>
+          </p:sp>
+          <mc:AlternateContent xmlns:mc="http://schemas.openxmlformats.org/markup-compatibility/2006">
+            <mc:Choice xmlns:a14="http://schemas.microsoft.com/office/drawing/2010/main" Requires="a14">
+              <p:sp>
+                <p:nvSpPr>
+                  <p:cNvPr id="31" name="Rectangle 30"/>
+                  <p:cNvSpPr/>
+                  <p:nvPr/>
+                </p:nvSpPr>
+                <p:spPr>
+                  <a:xfrm>
+                    <a:off x="3871294" y="5816043"/>
+                    <a:ext cx="2411896" cy="1378225"/>
+                  </a:xfrm>
+                  <a:prstGeom prst="rect">
+                    <a:avLst/>
+                  </a:prstGeom>
+                  <a:noFill/>
+                  <a:ln>
+                    <a:solidFill>
+                      <a:schemeClr val="tx1"/>
+                    </a:solidFill>
+                  </a:ln>
+                </p:spPr>
+                <p:style>
+                  <a:lnRef idx="2">
+                    <a:schemeClr val="accent1">
+                      <a:shade val="50000"/>
+                    </a:schemeClr>
+                  </a:lnRef>
+                  <a:fillRef idx="1">
+                    <a:schemeClr val="accent1"/>
+                  </a:fillRef>
+                  <a:effectRef idx="0">
+                    <a:schemeClr val="accent1"/>
+                  </a:effectRef>
+                  <a:fontRef idx="minor">
+                    <a:schemeClr val="lt1"/>
+                  </a:fontRef>
+                </p:style>
+                <p:txBody>
+                  <a:bodyPr rtlCol="0" anchor="ctr"/>
+                  <a:lstStyle/>
+                  <a:p>
+                    <a14:m>
+                      <m:oMathPara xmlns:m="http://schemas.openxmlformats.org/officeDocument/2006/math">
+                        <m:oMathParaPr>
+                          <m:jc m:val="centerGroup"/>
+                        </m:oMathParaPr>
+                        <m:oMath xmlns:m="http://schemas.openxmlformats.org/officeDocument/2006/math">
+                          <m:d>
+                            <m:dPr>
+                              <m:begChr m:val="["/>
+                              <m:endChr m:val="]"/>
+                              <m:ctrlPr>
+                                <a:rPr lang="en-US" i="1" smtClean="0">
+                                  <a:solidFill>
+                                    <a:schemeClr val="tx1"/>
+                                  </a:solidFill>
+                                  <a:latin typeface="Cambria Math" panose="02040503050406030204" pitchFamily="18" charset="0"/>
+                                </a:rPr>
+                              </m:ctrlPr>
+                            </m:dPr>
+                            <m:e>
+                              <m:eqArr>
+                                <m:eqArrPr>
+                                  <m:ctrlPr>
+                                    <a:rPr lang="en-US" i="1" smtClean="0">
+                                      <a:solidFill>
+                                        <a:schemeClr val="tx1"/>
+                                      </a:solidFill>
+                                      <a:latin typeface="Cambria Math" panose="02040503050406030204" pitchFamily="18" charset="0"/>
+                                    </a:rPr>
+                                  </m:ctrlPr>
+                                </m:eqArrPr>
+                                <m:e>
+                                  <m:sSub>
+                                    <m:sSubPr>
+                                      <m:ctrlPr>
+                                        <a:rPr lang="en-US" i="1" smtClean="0">
+                                          <a:solidFill>
+                                            <a:schemeClr val="tx1"/>
+                                          </a:solidFill>
+                                          <a:latin typeface="Cambria Math" panose="02040503050406030204" pitchFamily="18" charset="0"/>
+                                        </a:rPr>
+                                      </m:ctrlPr>
+                                    </m:sSubPr>
+                                    <m:e>
+                                      <m:r>
+                                        <a:rPr lang="en-US" b="0" i="1" smtClean="0">
+                                          <a:solidFill>
+                                            <a:schemeClr val="tx1"/>
+                                          </a:solidFill>
+                                          <a:latin typeface="Cambria Math" panose="02040503050406030204" pitchFamily="18" charset="0"/>
+                                        </a:rPr>
+                                        <m:t>𝑐</m:t>
+                                      </m:r>
+                                    </m:e>
+                                    <m:sub>
+                                      <m:r>
+                                        <a:rPr lang="en-US" b="0" i="1" smtClean="0">
+                                          <a:solidFill>
+                                            <a:schemeClr val="tx1"/>
+                                          </a:solidFill>
+                                          <a:latin typeface="Cambria Math" panose="02040503050406030204" pitchFamily="18" charset="0"/>
+                                        </a:rPr>
+                                        <m:t>11</m:t>
+                                      </m:r>
+                                    </m:sub>
+                                  </m:sSub>
+                                </m:e>
+                                <m:e>
+                                  <m:sSub>
+                                    <m:sSubPr>
+                                      <m:ctrlPr>
+                                        <a:rPr lang="en-US" i="1">
+                                          <a:solidFill>
+                                            <a:schemeClr val="tx1"/>
+                                          </a:solidFill>
+                                          <a:latin typeface="Cambria Math" panose="02040503050406030204" pitchFamily="18" charset="0"/>
+                                        </a:rPr>
+                                      </m:ctrlPr>
+                                    </m:sSubPr>
+                                    <m:e>
+                                      <m:r>
+                                        <a:rPr lang="en-US" b="0" i="1" smtClean="0">
+                                          <a:solidFill>
+                                            <a:schemeClr val="tx1"/>
+                                          </a:solidFill>
+                                          <a:latin typeface="Cambria Math" panose="02040503050406030204" pitchFamily="18" charset="0"/>
+                                        </a:rPr>
+                                        <m:t>𝑐</m:t>
+                                      </m:r>
+                                    </m:e>
+                                    <m:sub>
+                                      <m:r>
+                                        <a:rPr lang="en-US" b="0" i="1" smtClean="0">
+                                          <a:solidFill>
+                                            <a:schemeClr val="tx1"/>
+                                          </a:solidFill>
+                                          <a:latin typeface="Cambria Math" panose="02040503050406030204" pitchFamily="18" charset="0"/>
+                                        </a:rPr>
+                                        <m:t>2</m:t>
+                                      </m:r>
+                                      <m:r>
+                                        <a:rPr lang="en-US" i="1">
+                                          <a:solidFill>
+                                            <a:schemeClr val="tx1"/>
+                                          </a:solidFill>
+                                          <a:latin typeface="Cambria Math" panose="02040503050406030204" pitchFamily="18" charset="0"/>
+                                        </a:rPr>
+                                        <m:t>1</m:t>
+                                      </m:r>
+                                    </m:sub>
+                                  </m:sSub>
+                                </m:e>
+                                <m:e>
+                                  <m:r>
+                                    <a:rPr lang="en-US" b="0" i="1" smtClean="0">
+                                      <a:solidFill>
+                                        <a:schemeClr val="tx1"/>
+                                      </a:solidFill>
+                                      <a:latin typeface="Cambria Math" panose="02040503050406030204" pitchFamily="18" charset="0"/>
+                                    </a:rPr>
+                                    <m:t>…</m:t>
+                                  </m:r>
+                                </m:e>
+                                <m:e>
+                                  <m:sSub>
+                                    <m:sSubPr>
+                                      <m:ctrlPr>
+                                        <a:rPr lang="en-US" i="1">
+                                          <a:solidFill>
+                                            <a:schemeClr val="tx1"/>
+                                          </a:solidFill>
+                                          <a:latin typeface="Cambria Math" panose="02040503050406030204" pitchFamily="18" charset="0"/>
+                                        </a:rPr>
+                                      </m:ctrlPr>
+                                    </m:sSubPr>
+                                    <m:e>
+                                      <m:r>
+                                        <a:rPr lang="en-US" b="0" i="1" smtClean="0">
+                                          <a:solidFill>
+                                            <a:schemeClr val="tx1"/>
+                                          </a:solidFill>
+                                          <a:latin typeface="Cambria Math" panose="02040503050406030204" pitchFamily="18" charset="0"/>
+                                        </a:rPr>
+                                        <m:t>𝑐</m:t>
+                                      </m:r>
+                                    </m:e>
+                                    <m:sub>
+                                      <m:r>
+                                        <a:rPr lang="en-US" b="0" i="1" smtClean="0">
+                                          <a:solidFill>
+                                            <a:schemeClr val="tx1"/>
+                                          </a:solidFill>
+                                          <a:latin typeface="Cambria Math" panose="02040503050406030204" pitchFamily="18" charset="0"/>
+                                        </a:rPr>
+                                        <m:t>𝑚</m:t>
+                                      </m:r>
+                                      <m:r>
+                                        <a:rPr lang="en-US" i="1">
+                                          <a:solidFill>
+                                            <a:schemeClr val="tx1"/>
+                                          </a:solidFill>
+                                          <a:latin typeface="Cambria Math" panose="02040503050406030204" pitchFamily="18" charset="0"/>
+                                        </a:rPr>
+                                        <m:t>1</m:t>
+                                      </m:r>
+                                    </m:sub>
+                                  </m:sSub>
+                                </m:e>
+                              </m:eqArr>
+                            </m:e>
+                          </m:d>
+                        </m:oMath>
+                      </m:oMathPara>
+                    </a14:m>
+                    <a:endParaRPr lang="en-US">
+                      <a:solidFill>
+                        <a:schemeClr val="tx1"/>
+                      </a:solidFill>
+                    </a:endParaRPr>
+                  </a:p>
+                  <a:p>
+                    <a:endParaRPr lang="en-US">
+                      <a:solidFill>
+                        <a:schemeClr val="tx1"/>
+                      </a:solidFill>
+                    </a:endParaRPr>
+                  </a:p>
+                </p:txBody>
+              </p:sp>
+            </mc:Choice>
+            <mc:Fallback>
+              <p:sp>
+                <p:nvSpPr>
+                  <p:cNvPr id="31" name="Rectangle 30"/>
+                  <p:cNvSpPr>
+                    <a:spLocks noRot="1" noChangeAspect="1" noMove="1" noResize="1" noEditPoints="1" noAdjustHandles="1" noChangeArrowheads="1" noChangeShapeType="1" noTextEdit="1"/>
+                  </p:cNvSpPr>
+                  <p:nvPr/>
+                </p:nvSpPr>
+                <p:spPr>
+                  <a:xfrm>
+                    <a:off x="3871294" y="5816043"/>
+                    <a:ext cx="2411896" cy="1378225"/>
+                  </a:xfrm>
+                  <a:prstGeom prst="rect">
+                    <a:avLst/>
+                  </a:prstGeom>
+                  <a:blipFill>
+                    <a:blip r:embed="rId4"/>
+                    <a:stretch>
+                      <a:fillRect/>
+                    </a:stretch>
+                  </a:blipFill>
+                  <a:ln>
+                    <a:solidFill>
+                      <a:schemeClr val="tx1"/>
+                    </a:solidFill>
+                  </a:ln>
+                </p:spPr>
+                <p:txBody>
+                  <a:bodyPr/>
+                  <a:lstStyle/>
+                  <a:p>
+                    <a:r>
+                      <a:rPr lang="en-US">
+                        <a:noFill/>
+                      </a:rPr>
+                      <a:t> </a:t>
+                    </a:r>
+                  </a:p>
+                </p:txBody>
+              </p:sp>
+            </mc:Fallback>
+          </mc:AlternateContent>
+          <p:cxnSp>
+            <p:nvCxnSpPr>
+              <p:cNvPr id="32" name="Straight Arrow Connector 31"/>
+              <p:cNvCxnSpPr>
+                <a:endCxn id="31" idx="1"/>
+              </p:cNvCxnSpPr>
+              <p:nvPr/>
+            </p:nvCxnSpPr>
+            <p:spPr>
+              <a:xfrm>
+                <a:off x="2294283" y="6505156"/>
+                <a:ext cx="1577011" cy="0"/>
+              </a:xfrm>
+              <a:prstGeom prst="straightConnector1">
+                <a:avLst/>
+              </a:prstGeom>
+              <a:ln w="19050">
+                <a:solidFill>
+                  <a:schemeClr val="tx1"/>
+                </a:solidFill>
+                <a:tailEnd type="triangle"/>
+              </a:ln>
+            </p:spPr>
+            <p:style>
+              <a:lnRef idx="1">
+                <a:schemeClr val="accent1"/>
+              </a:lnRef>
+              <a:fillRef idx="0">
+                <a:schemeClr val="accent1"/>
+              </a:fillRef>
+              <a:effectRef idx="0">
+                <a:schemeClr val="accent1"/>
+              </a:effectRef>
+              <a:fontRef idx="minor">
+                <a:schemeClr val="tx1"/>
+              </a:fontRef>
+            </p:style>
+          </p:cxnSp>
+          <p:cxnSp>
+            <p:nvCxnSpPr>
+              <p:cNvPr id="36" name="Connector: Elbow 35"/>
+              <p:cNvCxnSpPr>
+                <a:stCxn id="26" idx="3"/>
+                <a:endCxn id="37" idx="1"/>
+              </p:cNvCxnSpPr>
+              <p:nvPr/>
+            </p:nvCxnSpPr>
+            <p:spPr>
+              <a:xfrm>
+                <a:off x="6283190" y="3106804"/>
+                <a:ext cx="1757154" cy="1639956"/>
+              </a:xfrm>
+              <a:prstGeom prst="bentConnector3">
+                <a:avLst/>
+              </a:prstGeom>
+              <a:ln w="19050">
+                <a:solidFill>
+                  <a:schemeClr val="tx1"/>
+                </a:solidFill>
+                <a:tailEnd type="triangle"/>
+              </a:ln>
+            </p:spPr>
+            <p:style>
+              <a:lnRef idx="1">
+                <a:schemeClr val="accent1"/>
+              </a:lnRef>
+              <a:fillRef idx="0">
+                <a:schemeClr val="accent1"/>
+              </a:fillRef>
+              <a:effectRef idx="0">
+                <a:schemeClr val="accent1"/>
+              </a:effectRef>
+              <a:fontRef idx="minor">
+                <a:schemeClr val="tx1"/>
+              </a:fontRef>
+            </p:style>
+          </p:cxnSp>
+          <mc:AlternateContent xmlns:mc="http://schemas.openxmlformats.org/markup-compatibility/2006">
+            <mc:Choice xmlns:a14="http://schemas.microsoft.com/office/drawing/2010/main" Requires="a14">
+              <p:sp>
+                <p:nvSpPr>
+                  <p:cNvPr id="37" name="Rectangle 36"/>
+                  <p:cNvSpPr/>
+                  <p:nvPr/>
+                </p:nvSpPr>
+                <p:spPr>
+                  <a:xfrm>
+                    <a:off x="8040344" y="3969575"/>
+                    <a:ext cx="4289563" cy="1554369"/>
+                  </a:xfrm>
+                  <a:prstGeom prst="rect">
+                    <a:avLst/>
+                  </a:prstGeom>
+                  <a:noFill/>
+                  <a:ln>
+                    <a:solidFill>
+                      <a:schemeClr val="tx1"/>
+                    </a:solidFill>
+                  </a:ln>
+                </p:spPr>
+                <p:style>
+                  <a:lnRef idx="2">
+                    <a:schemeClr val="accent1">
+                      <a:shade val="50000"/>
+                    </a:schemeClr>
+                  </a:lnRef>
+                  <a:fillRef idx="1">
+                    <a:schemeClr val="accent1"/>
+                  </a:fillRef>
+                  <a:effectRef idx="0">
+                    <a:schemeClr val="accent1"/>
+                  </a:effectRef>
+                  <a:fontRef idx="minor">
+                    <a:schemeClr val="lt1"/>
+                  </a:fontRef>
+                </p:style>
+                <p:txBody>
+                  <a:bodyPr rtlCol="0" anchor="ctr"/>
+                  <a:lstStyle/>
+                  <a:p>
+                    <a14:m>
+                      <m:oMathPara xmlns:m="http://schemas.openxmlformats.org/officeDocument/2006/math">
+                        <m:oMathParaPr>
+                          <m:jc m:val="centerGroup"/>
+                        </m:oMathParaPr>
+                        <m:oMath xmlns:m="http://schemas.openxmlformats.org/officeDocument/2006/math">
+                          <m:d>
+                            <m:dPr>
+                              <m:begChr m:val="["/>
+                              <m:endChr m:val="]"/>
+                              <m:ctrlPr>
+                                <a:rPr lang="en-US" i="1" smtClean="0">
+                                  <a:solidFill>
+                                    <a:schemeClr val="tx1"/>
+                                  </a:solidFill>
+                                  <a:latin typeface="Cambria Math" panose="02040503050406030204" pitchFamily="18" charset="0"/>
+                                </a:rPr>
+                              </m:ctrlPr>
+                            </m:dPr>
+                            <m:e>
+                              <m:eqArr>
+                                <m:eqArrPr>
+                                  <m:ctrlPr>
+                                    <a:rPr lang="en-US" i="1" smtClean="0">
+                                      <a:solidFill>
+                                        <a:schemeClr val="tx1"/>
+                                      </a:solidFill>
+                                      <a:latin typeface="Cambria Math" panose="02040503050406030204" pitchFamily="18" charset="0"/>
+                                    </a:rPr>
+                                  </m:ctrlPr>
+                                </m:eqArrPr>
+                                <m:e>
+                                  <m:sSub>
+                                    <m:sSubPr>
+                                      <m:ctrlPr>
+                                        <a:rPr lang="en-US" i="1" smtClean="0">
+                                          <a:solidFill>
+                                            <a:schemeClr val="tx1"/>
+                                          </a:solidFill>
+                                          <a:latin typeface="Cambria Math" panose="02040503050406030204" pitchFamily="18" charset="0"/>
+                                        </a:rPr>
+                                      </m:ctrlPr>
+                                    </m:sSubPr>
+                                    <m:e>
+                                      <m:r>
+                                        <a:rPr lang="en-US" b="0" i="1" smtClean="0">
+                                          <a:solidFill>
+                                            <a:schemeClr val="tx1"/>
+                                          </a:solidFill>
+                                          <a:latin typeface="Cambria Math" panose="02040503050406030204" pitchFamily="18" charset="0"/>
+                                        </a:rPr>
+                                        <m:t>𝑎</m:t>
+                                      </m:r>
+                                    </m:e>
+                                    <m:sub>
+                                      <m:r>
+                                        <a:rPr lang="en-US" b="0" i="1" smtClean="0">
+                                          <a:solidFill>
+                                            <a:schemeClr val="tx1"/>
+                                          </a:solidFill>
+                                          <a:latin typeface="Cambria Math" panose="02040503050406030204" pitchFamily="18" charset="0"/>
+                                        </a:rPr>
+                                        <m:t>11</m:t>
+                                      </m:r>
+                                    </m:sub>
+                                  </m:sSub>
+                                  <m:sSub>
+                                    <m:sSubPr>
+                                      <m:ctrlPr>
+                                        <a:rPr lang="en-US" i="1">
+                                          <a:solidFill>
+                                            <a:schemeClr val="tx1"/>
+                                          </a:solidFill>
+                                          <a:latin typeface="Cambria Math" panose="02040503050406030204" pitchFamily="18" charset="0"/>
+                                        </a:rPr>
+                                      </m:ctrlPr>
+                                    </m:sSubPr>
+                                    <m:e>
+                                      <m:r>
+                                        <a:rPr lang="en-US" i="1">
+                                          <a:solidFill>
+                                            <a:schemeClr val="tx1"/>
+                                          </a:solidFill>
+                                          <a:latin typeface="Cambria Math" panose="02040503050406030204" pitchFamily="18" charset="0"/>
+                                        </a:rPr>
+                                        <m:t>𝑎</m:t>
+                                      </m:r>
+                                    </m:e>
+                                    <m:sub>
+                                      <m:r>
+                                        <a:rPr lang="en-US" b="0" i="1" smtClean="0">
+                                          <a:solidFill>
+                                            <a:schemeClr val="tx1"/>
+                                          </a:solidFill>
+                                          <a:latin typeface="Cambria Math" panose="02040503050406030204" pitchFamily="18" charset="0"/>
+                                        </a:rPr>
+                                        <m:t>12</m:t>
+                                      </m:r>
+                                    </m:sub>
+                                  </m:sSub>
+                                  <m:sSub>
+                                    <m:sSubPr>
+                                      <m:ctrlPr>
+                                        <a:rPr lang="en-US" i="1">
+                                          <a:solidFill>
+                                            <a:schemeClr val="tx1"/>
+                                          </a:solidFill>
+                                          <a:latin typeface="Cambria Math" panose="02040503050406030204" pitchFamily="18" charset="0"/>
+                                        </a:rPr>
+                                      </m:ctrlPr>
+                                    </m:sSubPr>
+                                    <m:e>
+                                      <m:r>
+                                        <a:rPr lang="en-US" i="1">
+                                          <a:solidFill>
+                                            <a:schemeClr val="tx1"/>
+                                          </a:solidFill>
+                                          <a:latin typeface="Cambria Math" panose="02040503050406030204" pitchFamily="18" charset="0"/>
+                                        </a:rPr>
+                                        <m:t>𝑎</m:t>
+                                      </m:r>
+                                    </m:e>
+                                    <m:sub>
+                                      <m:r>
+                                        <a:rPr lang="en-US" b="0" i="1" smtClean="0">
+                                          <a:solidFill>
+                                            <a:schemeClr val="tx1"/>
+                                          </a:solidFill>
+                                          <a:latin typeface="Cambria Math" panose="02040503050406030204" pitchFamily="18" charset="0"/>
+                                        </a:rPr>
+                                        <m:t>13</m:t>
+                                      </m:r>
+                                    </m:sub>
+                                  </m:sSub>
+                                  <m:sSub>
+                                    <m:sSubPr>
+                                      <m:ctrlPr>
+                                        <a:rPr lang="en-US" i="1">
+                                          <a:solidFill>
+                                            <a:schemeClr val="tx1"/>
+                                          </a:solidFill>
+                                          <a:latin typeface="Cambria Math" panose="02040503050406030204" pitchFamily="18" charset="0"/>
+                                        </a:rPr>
+                                      </m:ctrlPr>
+                                    </m:sSubPr>
+                                    <m:e>
+                                      <m:r>
+                                        <a:rPr lang="en-US" b="0" i="1" smtClean="0">
+                                          <a:solidFill>
+                                            <a:schemeClr val="tx1"/>
+                                          </a:solidFill>
+                                          <a:latin typeface="Cambria Math" panose="02040503050406030204" pitchFamily="18" charset="0"/>
+                                        </a:rPr>
+                                        <m:t>…</m:t>
+                                      </m:r>
+                                      <m:r>
+                                        <a:rPr lang="en-US" i="1">
+                                          <a:solidFill>
+                                            <a:schemeClr val="tx1"/>
+                                          </a:solidFill>
+                                          <a:latin typeface="Cambria Math" panose="02040503050406030204" pitchFamily="18" charset="0"/>
+                                        </a:rPr>
+                                        <m:t>𝑎</m:t>
+                                      </m:r>
+                                    </m:e>
+                                    <m:sub>
+                                      <m:r>
+                                        <a:rPr lang="en-US" b="0" i="1" smtClean="0">
+                                          <a:solidFill>
+                                            <a:schemeClr val="tx1"/>
+                                          </a:solidFill>
+                                          <a:latin typeface="Cambria Math" panose="02040503050406030204" pitchFamily="18" charset="0"/>
+                                        </a:rPr>
+                                        <m:t>1</m:t>
+                                      </m:r>
+                                      <m:r>
+                                        <a:rPr lang="en-US" b="0" i="1" smtClean="0">
+                                          <a:solidFill>
+                                            <a:schemeClr val="tx1"/>
+                                          </a:solidFill>
+                                          <a:latin typeface="Cambria Math" panose="02040503050406030204" pitchFamily="18" charset="0"/>
+                                        </a:rPr>
+                                        <m:t>𝑛</m:t>
+                                      </m:r>
+                                    </m:sub>
+                                  </m:sSub>
+                                  <m:sSub>
+                                    <m:sSubPr>
+                                      <m:ctrlPr>
+                                        <a:rPr lang="en-US" i="1">
+                                          <a:solidFill>
+                                            <a:schemeClr val="tx1"/>
+                                          </a:solidFill>
+                                          <a:latin typeface="Cambria Math" panose="02040503050406030204" pitchFamily="18" charset="0"/>
+                                        </a:rPr>
+                                      </m:ctrlPr>
+                                    </m:sSubPr>
+                                    <m:e>
+                                      <m:r>
+                                        <a:rPr lang="en-US" i="1">
+                                          <a:solidFill>
+                                            <a:schemeClr val="tx1"/>
+                                          </a:solidFill>
+                                          <a:latin typeface="Cambria Math" panose="02040503050406030204" pitchFamily="18" charset="0"/>
+                                        </a:rPr>
+                                        <m:t>𝑏</m:t>
+                                      </m:r>
+                                    </m:e>
+                                    <m:sub>
+                                      <m:r>
+                                        <a:rPr lang="en-US" i="1">
+                                          <a:solidFill>
+                                            <a:schemeClr val="tx1"/>
+                                          </a:solidFill>
+                                          <a:latin typeface="Cambria Math" panose="02040503050406030204" pitchFamily="18" charset="0"/>
+                                        </a:rPr>
+                                        <m:t>11</m:t>
+                                      </m:r>
+                                    </m:sub>
+                                  </m:sSub>
+                                  <m:sSub>
+                                    <m:sSubPr>
+                                      <m:ctrlPr>
+                                        <a:rPr lang="en-US" i="1">
+                                          <a:solidFill>
+                                            <a:schemeClr val="tx1"/>
+                                          </a:solidFill>
+                                          <a:latin typeface="Cambria Math" panose="02040503050406030204" pitchFamily="18" charset="0"/>
+                                        </a:rPr>
+                                      </m:ctrlPr>
+                                    </m:sSubPr>
+                                    <m:e>
+                                      <m:r>
+                                        <a:rPr lang="en-US" i="1">
+                                          <a:solidFill>
+                                            <a:schemeClr val="tx1"/>
+                                          </a:solidFill>
+                                          <a:latin typeface="Cambria Math" panose="02040503050406030204" pitchFamily="18" charset="0"/>
+                                        </a:rPr>
+                                        <m:t>𝑏</m:t>
+                                      </m:r>
+                                    </m:e>
+                                    <m:sub>
+                                      <m:r>
+                                        <a:rPr lang="en-US" i="1">
+                                          <a:solidFill>
+                                            <a:schemeClr val="tx1"/>
+                                          </a:solidFill>
+                                          <a:latin typeface="Cambria Math" panose="02040503050406030204" pitchFamily="18" charset="0"/>
+                                        </a:rPr>
+                                        <m:t>12</m:t>
+                                      </m:r>
+                                    </m:sub>
+                                  </m:sSub>
+                                  <m:sSub>
+                                    <m:sSubPr>
+                                      <m:ctrlPr>
+                                        <a:rPr lang="en-US" i="1">
+                                          <a:solidFill>
+                                            <a:schemeClr val="tx1"/>
+                                          </a:solidFill>
+                                          <a:latin typeface="Cambria Math" panose="02040503050406030204" pitchFamily="18" charset="0"/>
+                                        </a:rPr>
+                                      </m:ctrlPr>
+                                    </m:sSubPr>
+                                    <m:e>
+                                      <m:r>
+                                        <a:rPr lang="en-US" i="1">
+                                          <a:solidFill>
+                                            <a:schemeClr val="tx1"/>
+                                          </a:solidFill>
+                                          <a:latin typeface="Cambria Math" panose="02040503050406030204" pitchFamily="18" charset="0"/>
+                                        </a:rPr>
+                                        <m:t>𝑏</m:t>
+                                      </m:r>
+                                    </m:e>
+                                    <m:sub>
+                                      <m:r>
+                                        <a:rPr lang="en-US" i="1">
+                                          <a:solidFill>
+                                            <a:schemeClr val="tx1"/>
+                                          </a:solidFill>
+                                          <a:latin typeface="Cambria Math" panose="02040503050406030204" pitchFamily="18" charset="0"/>
+                                        </a:rPr>
+                                        <m:t>13</m:t>
+                                      </m:r>
+                                    </m:sub>
+                                  </m:sSub>
+                                  <m:sSub>
+                                    <m:sSubPr>
+                                      <m:ctrlPr>
+                                        <a:rPr lang="en-US" i="1">
+                                          <a:solidFill>
+                                            <a:schemeClr val="tx1"/>
+                                          </a:solidFill>
+                                          <a:latin typeface="Cambria Math" panose="02040503050406030204" pitchFamily="18" charset="0"/>
+                                        </a:rPr>
+                                      </m:ctrlPr>
+                                    </m:sSubPr>
+                                    <m:e>
+                                      <m:r>
+                                        <a:rPr lang="en-US" i="1">
+                                          <a:solidFill>
+                                            <a:schemeClr val="tx1"/>
+                                          </a:solidFill>
+                                          <a:latin typeface="Cambria Math" panose="02040503050406030204" pitchFamily="18" charset="0"/>
+                                        </a:rPr>
+                                        <m:t>𝑏</m:t>
+                                      </m:r>
+                                    </m:e>
+                                    <m:sub>
+                                      <m:r>
+                                        <a:rPr lang="en-US" i="1">
+                                          <a:solidFill>
+                                            <a:schemeClr val="tx1"/>
+                                          </a:solidFill>
+                                          <a:latin typeface="Cambria Math" panose="02040503050406030204" pitchFamily="18" charset="0"/>
+                                        </a:rPr>
+                                        <m:t>14</m:t>
+                                      </m:r>
+                                    </m:sub>
+                                  </m:sSub>
+                                  <m:sSub>
+                                    <m:sSubPr>
+                                      <m:ctrlPr>
+                                        <a:rPr lang="en-US" i="1">
+                                          <a:solidFill>
+                                            <a:schemeClr val="tx1"/>
+                                          </a:solidFill>
+                                          <a:latin typeface="Cambria Math" panose="02040503050406030204" pitchFamily="18" charset="0"/>
+                                        </a:rPr>
+                                      </m:ctrlPr>
+                                    </m:sSubPr>
+                                    <m:e>
+                                      <m:r>
+                                        <a:rPr lang="en-US" i="1">
+                                          <a:solidFill>
+                                            <a:schemeClr val="tx1"/>
+                                          </a:solidFill>
+                                          <a:latin typeface="Cambria Math" panose="02040503050406030204" pitchFamily="18" charset="0"/>
+                                        </a:rPr>
+                                        <m:t>𝑐</m:t>
+                                      </m:r>
+                                    </m:e>
+                                    <m:sub>
+                                      <m:r>
+                                        <a:rPr lang="en-US" i="1">
+                                          <a:solidFill>
+                                            <a:schemeClr val="tx1"/>
+                                          </a:solidFill>
+                                          <a:latin typeface="Cambria Math" panose="02040503050406030204" pitchFamily="18" charset="0"/>
+                                        </a:rPr>
+                                        <m:t>11</m:t>
+                                      </m:r>
+                                    </m:sub>
+                                  </m:sSub>
+                                </m:e>
+                                <m:e>
+                                  <m:sSub>
+                                    <m:sSubPr>
+                                      <m:ctrlPr>
+                                        <a:rPr lang="en-US" i="1">
+                                          <a:solidFill>
+                                            <a:schemeClr val="tx1"/>
+                                          </a:solidFill>
+                                          <a:latin typeface="Cambria Math" panose="02040503050406030204" pitchFamily="18" charset="0"/>
+                                        </a:rPr>
+                                      </m:ctrlPr>
+                                    </m:sSubPr>
+                                    <m:e>
+                                      <m:r>
+                                        <a:rPr lang="en-US" i="1">
+                                          <a:solidFill>
+                                            <a:schemeClr val="tx1"/>
+                                          </a:solidFill>
+                                          <a:latin typeface="Cambria Math" panose="02040503050406030204" pitchFamily="18" charset="0"/>
+                                        </a:rPr>
+                                        <m:t>𝑎</m:t>
+                                      </m:r>
+                                    </m:e>
+                                    <m:sub>
+                                      <m:r>
+                                        <a:rPr lang="en-US" b="0" i="1" smtClean="0">
+                                          <a:solidFill>
+                                            <a:schemeClr val="tx1"/>
+                                          </a:solidFill>
+                                          <a:latin typeface="Cambria Math" panose="02040503050406030204" pitchFamily="18" charset="0"/>
+                                        </a:rPr>
+                                        <m:t>2</m:t>
+                                      </m:r>
+                                      <m:r>
+                                        <a:rPr lang="en-US" i="1">
+                                          <a:solidFill>
+                                            <a:schemeClr val="tx1"/>
+                                          </a:solidFill>
+                                          <a:latin typeface="Cambria Math" panose="02040503050406030204" pitchFamily="18" charset="0"/>
+                                        </a:rPr>
+                                        <m:t>1</m:t>
+                                      </m:r>
+                                    </m:sub>
+                                  </m:sSub>
+                                  <m:sSub>
+                                    <m:sSubPr>
+                                      <m:ctrlPr>
+                                        <a:rPr lang="en-US" i="1">
+                                          <a:solidFill>
+                                            <a:schemeClr val="tx1"/>
+                                          </a:solidFill>
+                                          <a:latin typeface="Cambria Math" panose="02040503050406030204" pitchFamily="18" charset="0"/>
+                                        </a:rPr>
+                                      </m:ctrlPr>
+                                    </m:sSubPr>
+                                    <m:e>
+                                      <m:r>
+                                        <a:rPr lang="en-US" i="1">
+                                          <a:solidFill>
+                                            <a:schemeClr val="tx1"/>
+                                          </a:solidFill>
+                                          <a:latin typeface="Cambria Math" panose="02040503050406030204" pitchFamily="18" charset="0"/>
+                                        </a:rPr>
+                                        <m:t>𝑎</m:t>
+                                      </m:r>
+                                    </m:e>
+                                    <m:sub>
+                                      <m:r>
+                                        <a:rPr lang="en-US" b="0" i="1" smtClean="0">
+                                          <a:solidFill>
+                                            <a:schemeClr val="tx1"/>
+                                          </a:solidFill>
+                                          <a:latin typeface="Cambria Math" panose="02040503050406030204" pitchFamily="18" charset="0"/>
+                                        </a:rPr>
+                                        <m:t>2</m:t>
+                                      </m:r>
+                                      <m:r>
+                                        <a:rPr lang="en-US" i="1">
+                                          <a:solidFill>
+                                            <a:schemeClr val="tx1"/>
+                                          </a:solidFill>
+                                          <a:latin typeface="Cambria Math" panose="02040503050406030204" pitchFamily="18" charset="0"/>
+                                        </a:rPr>
+                                        <m:t>2</m:t>
+                                      </m:r>
+                                    </m:sub>
+                                  </m:sSub>
+                                  <m:sSub>
+                                    <m:sSubPr>
+                                      <m:ctrlPr>
+                                        <a:rPr lang="en-US" i="1">
+                                          <a:solidFill>
+                                            <a:schemeClr val="tx1"/>
+                                          </a:solidFill>
+                                          <a:latin typeface="Cambria Math" panose="02040503050406030204" pitchFamily="18" charset="0"/>
+                                        </a:rPr>
+                                      </m:ctrlPr>
+                                    </m:sSubPr>
+                                    <m:e>
+                                      <m:r>
+                                        <a:rPr lang="en-US" i="1">
+                                          <a:solidFill>
+                                            <a:schemeClr val="tx1"/>
+                                          </a:solidFill>
+                                          <a:latin typeface="Cambria Math" panose="02040503050406030204" pitchFamily="18" charset="0"/>
+                                        </a:rPr>
+                                        <m:t>𝑎</m:t>
+                                      </m:r>
+                                    </m:e>
+                                    <m:sub>
+                                      <m:r>
+                                        <a:rPr lang="en-US" b="0" i="1" smtClean="0">
+                                          <a:solidFill>
+                                            <a:schemeClr val="tx1"/>
+                                          </a:solidFill>
+                                          <a:latin typeface="Cambria Math" panose="02040503050406030204" pitchFamily="18" charset="0"/>
+                                        </a:rPr>
+                                        <m:t>2</m:t>
+                                      </m:r>
+                                      <m:r>
+                                        <a:rPr lang="en-US" i="1">
+                                          <a:solidFill>
+                                            <a:schemeClr val="tx1"/>
+                                          </a:solidFill>
+                                          <a:latin typeface="Cambria Math" panose="02040503050406030204" pitchFamily="18" charset="0"/>
+                                        </a:rPr>
+                                        <m:t>3</m:t>
+                                      </m:r>
+                                    </m:sub>
+                                  </m:sSub>
+                                  <m:sSub>
+                                    <m:sSubPr>
+                                      <m:ctrlPr>
+                                        <a:rPr lang="en-US" i="1">
+                                          <a:solidFill>
+                                            <a:schemeClr val="tx1"/>
+                                          </a:solidFill>
+                                          <a:latin typeface="Cambria Math" panose="02040503050406030204" pitchFamily="18" charset="0"/>
+                                        </a:rPr>
+                                      </m:ctrlPr>
+                                    </m:sSubPr>
+                                    <m:e>
+                                      <m:r>
+                                        <a:rPr lang="en-US" i="1">
+                                          <a:solidFill>
+                                            <a:schemeClr val="tx1"/>
+                                          </a:solidFill>
+                                          <a:latin typeface="Cambria Math" panose="02040503050406030204" pitchFamily="18" charset="0"/>
+                                        </a:rPr>
+                                        <m:t>…</m:t>
+                                      </m:r>
+                                      <m:r>
+                                        <a:rPr lang="en-US" i="1">
+                                          <a:solidFill>
+                                            <a:schemeClr val="tx1"/>
+                                          </a:solidFill>
+                                          <a:latin typeface="Cambria Math" panose="02040503050406030204" pitchFamily="18" charset="0"/>
+                                        </a:rPr>
+                                        <m:t>𝑎</m:t>
+                                      </m:r>
+                                    </m:e>
+                                    <m:sub>
+                                      <m:r>
+                                        <a:rPr lang="en-US" b="0" i="1" smtClean="0">
+                                          <a:solidFill>
+                                            <a:schemeClr val="tx1"/>
+                                          </a:solidFill>
+                                          <a:latin typeface="Cambria Math" panose="02040503050406030204" pitchFamily="18" charset="0"/>
+                                        </a:rPr>
+                                        <m:t>2</m:t>
+                                      </m:r>
+                                      <m:r>
+                                        <a:rPr lang="en-US" b="0" i="1" smtClean="0">
+                                          <a:solidFill>
+                                            <a:schemeClr val="tx1"/>
+                                          </a:solidFill>
+                                          <a:latin typeface="Cambria Math" panose="02040503050406030204" pitchFamily="18" charset="0"/>
+                                        </a:rPr>
+                                        <m:t>𝑛</m:t>
+                                      </m:r>
+                                    </m:sub>
+                                  </m:sSub>
+                                  <m:sSub>
+                                    <m:sSubPr>
+                                      <m:ctrlPr>
+                                        <a:rPr lang="en-US" i="1">
+                                          <a:solidFill>
+                                            <a:schemeClr val="tx1"/>
+                                          </a:solidFill>
+                                          <a:latin typeface="Cambria Math" panose="02040503050406030204" pitchFamily="18" charset="0"/>
+                                        </a:rPr>
+                                      </m:ctrlPr>
+                                    </m:sSubPr>
+                                    <m:e>
+                                      <m:r>
+                                        <a:rPr lang="en-US" i="1">
+                                          <a:solidFill>
+                                            <a:schemeClr val="tx1"/>
+                                          </a:solidFill>
+                                          <a:latin typeface="Cambria Math" panose="02040503050406030204" pitchFamily="18" charset="0"/>
+                                        </a:rPr>
+                                        <m:t>𝑏</m:t>
+                                      </m:r>
+                                    </m:e>
+                                    <m:sub>
+                                      <m:r>
+                                        <a:rPr lang="en-US" i="1">
+                                          <a:solidFill>
+                                            <a:schemeClr val="tx1"/>
+                                          </a:solidFill>
+                                          <a:latin typeface="Cambria Math" panose="02040503050406030204" pitchFamily="18" charset="0"/>
+                                        </a:rPr>
+                                        <m:t>11</m:t>
+                                      </m:r>
+                                    </m:sub>
+                                  </m:sSub>
+                                  <m:sSub>
+                                    <m:sSubPr>
+                                      <m:ctrlPr>
+                                        <a:rPr lang="en-US" i="1">
+                                          <a:solidFill>
+                                            <a:schemeClr val="tx1"/>
+                                          </a:solidFill>
+                                          <a:latin typeface="Cambria Math" panose="02040503050406030204" pitchFamily="18" charset="0"/>
+                                        </a:rPr>
+                                      </m:ctrlPr>
+                                    </m:sSubPr>
+                                    <m:e>
+                                      <m:r>
+                                        <a:rPr lang="en-US" i="1">
+                                          <a:solidFill>
+                                            <a:schemeClr val="tx1"/>
+                                          </a:solidFill>
+                                          <a:latin typeface="Cambria Math" panose="02040503050406030204" pitchFamily="18" charset="0"/>
+                                        </a:rPr>
+                                        <m:t>𝑏</m:t>
+                                      </m:r>
+                                    </m:e>
+                                    <m:sub>
+                                      <m:r>
+                                        <a:rPr lang="en-US" i="1">
+                                          <a:solidFill>
+                                            <a:schemeClr val="tx1"/>
+                                          </a:solidFill>
+                                          <a:latin typeface="Cambria Math" panose="02040503050406030204" pitchFamily="18" charset="0"/>
+                                        </a:rPr>
+                                        <m:t>12</m:t>
+                                      </m:r>
+                                    </m:sub>
+                                  </m:sSub>
+                                  <m:sSub>
+                                    <m:sSubPr>
+                                      <m:ctrlPr>
+                                        <a:rPr lang="en-US" i="1">
+                                          <a:solidFill>
+                                            <a:schemeClr val="tx1"/>
+                                          </a:solidFill>
+                                          <a:latin typeface="Cambria Math" panose="02040503050406030204" pitchFamily="18" charset="0"/>
+                                        </a:rPr>
+                                      </m:ctrlPr>
+                                    </m:sSubPr>
+                                    <m:e>
+                                      <m:r>
+                                        <a:rPr lang="en-US" i="1">
+                                          <a:solidFill>
+                                            <a:schemeClr val="tx1"/>
+                                          </a:solidFill>
+                                          <a:latin typeface="Cambria Math" panose="02040503050406030204" pitchFamily="18" charset="0"/>
+                                        </a:rPr>
+                                        <m:t>𝑏</m:t>
+                                      </m:r>
+                                    </m:e>
+                                    <m:sub>
+                                      <m:r>
+                                        <a:rPr lang="en-US" i="1">
+                                          <a:solidFill>
+                                            <a:schemeClr val="tx1"/>
+                                          </a:solidFill>
+                                          <a:latin typeface="Cambria Math" panose="02040503050406030204" pitchFamily="18" charset="0"/>
+                                        </a:rPr>
+                                        <m:t>13</m:t>
+                                      </m:r>
+                                    </m:sub>
+                                  </m:sSub>
+                                  <m:sSub>
+                                    <m:sSubPr>
+                                      <m:ctrlPr>
+                                        <a:rPr lang="en-US" i="1">
+                                          <a:solidFill>
+                                            <a:schemeClr val="tx1"/>
+                                          </a:solidFill>
+                                          <a:latin typeface="Cambria Math" panose="02040503050406030204" pitchFamily="18" charset="0"/>
+                                        </a:rPr>
+                                      </m:ctrlPr>
+                                    </m:sSubPr>
+                                    <m:e>
+                                      <m:r>
+                                        <a:rPr lang="en-US" i="1">
+                                          <a:solidFill>
+                                            <a:schemeClr val="tx1"/>
+                                          </a:solidFill>
+                                          <a:latin typeface="Cambria Math" panose="02040503050406030204" pitchFamily="18" charset="0"/>
+                                        </a:rPr>
+                                        <m:t>𝑏</m:t>
+                                      </m:r>
+                                    </m:e>
+                                    <m:sub>
+                                      <m:r>
+                                        <a:rPr lang="en-US" i="1">
+                                          <a:solidFill>
+                                            <a:schemeClr val="tx1"/>
+                                          </a:solidFill>
+                                          <a:latin typeface="Cambria Math" panose="02040503050406030204" pitchFamily="18" charset="0"/>
+                                        </a:rPr>
+                                        <m:t>14</m:t>
+                                      </m:r>
+                                    </m:sub>
+                                  </m:sSub>
+                                  <m:sSub>
+                                    <m:sSubPr>
+                                      <m:ctrlPr>
+                                        <a:rPr lang="en-US" i="1">
+                                          <a:solidFill>
+                                            <a:schemeClr val="tx1"/>
+                                          </a:solidFill>
+                                          <a:latin typeface="Cambria Math" panose="02040503050406030204" pitchFamily="18" charset="0"/>
+                                        </a:rPr>
+                                      </m:ctrlPr>
+                                    </m:sSubPr>
+                                    <m:e>
+                                      <m:r>
+                                        <a:rPr lang="en-US" i="1">
+                                          <a:solidFill>
+                                            <a:schemeClr val="tx1"/>
+                                          </a:solidFill>
+                                          <a:latin typeface="Cambria Math" panose="02040503050406030204" pitchFamily="18" charset="0"/>
+                                        </a:rPr>
+                                        <m:t>𝑐</m:t>
+                                      </m:r>
+                                    </m:e>
+                                    <m:sub>
+                                      <m:r>
+                                        <a:rPr lang="en-US" b="0" i="1" smtClean="0">
+                                          <a:solidFill>
+                                            <a:schemeClr val="tx1"/>
+                                          </a:solidFill>
+                                          <a:latin typeface="Cambria Math" panose="02040503050406030204" pitchFamily="18" charset="0"/>
+                                        </a:rPr>
+                                        <m:t>2</m:t>
+                                      </m:r>
+                                      <m:r>
+                                        <a:rPr lang="en-US" i="1">
+                                          <a:solidFill>
+                                            <a:schemeClr val="tx1"/>
+                                          </a:solidFill>
+                                          <a:latin typeface="Cambria Math" panose="02040503050406030204" pitchFamily="18" charset="0"/>
+                                        </a:rPr>
+                                        <m:t>1</m:t>
+                                      </m:r>
+                                    </m:sub>
+                                  </m:sSub>
+                                </m:e>
+                                <m:e>
+                                  <m:r>
+                                    <a:rPr lang="en-US" b="0" i="1" smtClean="0">
+                                      <a:solidFill>
+                                        <a:schemeClr val="tx1"/>
+                                      </a:solidFill>
+                                      <a:latin typeface="Cambria Math" panose="02040503050406030204" pitchFamily="18" charset="0"/>
+                                    </a:rPr>
+                                    <m:t>…</m:t>
+                                  </m:r>
+                                </m:e>
+                                <m:e>
+                                  <m:sSub>
+                                    <m:sSubPr>
+                                      <m:ctrlPr>
+                                        <a:rPr lang="en-US" i="1">
+                                          <a:solidFill>
+                                            <a:schemeClr val="tx1"/>
+                                          </a:solidFill>
+                                          <a:latin typeface="Cambria Math" panose="02040503050406030204" pitchFamily="18" charset="0"/>
+                                        </a:rPr>
+                                      </m:ctrlPr>
+                                    </m:sSubPr>
+                                    <m:e>
+                                      <m:r>
+                                        <a:rPr lang="en-US" i="1">
+                                          <a:solidFill>
+                                            <a:schemeClr val="tx1"/>
+                                          </a:solidFill>
+                                          <a:latin typeface="Cambria Math" panose="02040503050406030204" pitchFamily="18" charset="0"/>
+                                        </a:rPr>
+                                        <m:t>𝑎</m:t>
+                                      </m:r>
+                                    </m:e>
+                                    <m:sub>
+                                      <m:r>
+                                        <a:rPr lang="en-US" b="0" i="1" smtClean="0">
+                                          <a:solidFill>
+                                            <a:schemeClr val="tx1"/>
+                                          </a:solidFill>
+                                          <a:latin typeface="Cambria Math" panose="02040503050406030204" pitchFamily="18" charset="0"/>
+                                        </a:rPr>
+                                        <m:t>𝑚</m:t>
+                                      </m:r>
+                                      <m:r>
+                                        <a:rPr lang="en-US" i="1">
+                                          <a:solidFill>
+                                            <a:schemeClr val="tx1"/>
+                                          </a:solidFill>
+                                          <a:latin typeface="Cambria Math" panose="02040503050406030204" pitchFamily="18" charset="0"/>
+                                        </a:rPr>
+                                        <m:t>1</m:t>
+                                      </m:r>
+                                    </m:sub>
+                                  </m:sSub>
+                                  <m:sSub>
+                                    <m:sSubPr>
+                                      <m:ctrlPr>
+                                        <a:rPr lang="en-US" i="1">
+                                          <a:solidFill>
+                                            <a:schemeClr val="tx1"/>
+                                          </a:solidFill>
+                                          <a:latin typeface="Cambria Math" panose="02040503050406030204" pitchFamily="18" charset="0"/>
+                                        </a:rPr>
+                                      </m:ctrlPr>
+                                    </m:sSubPr>
+                                    <m:e>
+                                      <m:r>
+                                        <a:rPr lang="en-US" i="1">
+                                          <a:solidFill>
+                                            <a:schemeClr val="tx1"/>
+                                          </a:solidFill>
+                                          <a:latin typeface="Cambria Math" panose="02040503050406030204" pitchFamily="18" charset="0"/>
+                                        </a:rPr>
+                                        <m:t>𝑎</m:t>
+                                      </m:r>
+                                    </m:e>
+                                    <m:sub>
+                                      <m:r>
+                                        <a:rPr lang="en-US" b="0" i="1" smtClean="0">
+                                          <a:solidFill>
+                                            <a:schemeClr val="tx1"/>
+                                          </a:solidFill>
+                                          <a:latin typeface="Cambria Math" panose="02040503050406030204" pitchFamily="18" charset="0"/>
+                                        </a:rPr>
+                                        <m:t>𝑚</m:t>
+                                      </m:r>
+                                      <m:r>
+                                        <a:rPr lang="en-US" i="1">
+                                          <a:solidFill>
+                                            <a:schemeClr val="tx1"/>
+                                          </a:solidFill>
+                                          <a:latin typeface="Cambria Math" panose="02040503050406030204" pitchFamily="18" charset="0"/>
+                                        </a:rPr>
+                                        <m:t>2</m:t>
+                                      </m:r>
+                                    </m:sub>
+                                  </m:sSub>
+                                  <m:sSub>
+                                    <m:sSubPr>
+                                      <m:ctrlPr>
+                                        <a:rPr lang="en-US" i="1">
+                                          <a:solidFill>
+                                            <a:schemeClr val="tx1"/>
+                                          </a:solidFill>
+                                          <a:latin typeface="Cambria Math" panose="02040503050406030204" pitchFamily="18" charset="0"/>
+                                        </a:rPr>
+                                      </m:ctrlPr>
+                                    </m:sSubPr>
+                                    <m:e>
+                                      <m:r>
+                                        <a:rPr lang="en-US" i="1">
+                                          <a:solidFill>
+                                            <a:schemeClr val="tx1"/>
+                                          </a:solidFill>
+                                          <a:latin typeface="Cambria Math" panose="02040503050406030204" pitchFamily="18" charset="0"/>
+                                        </a:rPr>
+                                        <m:t>𝑎</m:t>
+                                      </m:r>
+                                    </m:e>
+                                    <m:sub>
+                                      <m:r>
+                                        <a:rPr lang="en-US" b="0" i="1" smtClean="0">
+                                          <a:solidFill>
+                                            <a:schemeClr val="tx1"/>
+                                          </a:solidFill>
+                                          <a:latin typeface="Cambria Math" panose="02040503050406030204" pitchFamily="18" charset="0"/>
+                                        </a:rPr>
+                                        <m:t>𝑚</m:t>
+                                      </m:r>
+                                      <m:r>
+                                        <a:rPr lang="en-US" i="1">
+                                          <a:solidFill>
+                                            <a:schemeClr val="tx1"/>
+                                          </a:solidFill>
+                                          <a:latin typeface="Cambria Math" panose="02040503050406030204" pitchFamily="18" charset="0"/>
+                                        </a:rPr>
+                                        <m:t>3</m:t>
+                                      </m:r>
+                                    </m:sub>
+                                  </m:sSub>
+                                  <m:sSub>
+                                    <m:sSubPr>
+                                      <m:ctrlPr>
+                                        <a:rPr lang="en-US" i="1">
+                                          <a:solidFill>
+                                            <a:schemeClr val="tx1"/>
+                                          </a:solidFill>
+                                          <a:latin typeface="Cambria Math" panose="02040503050406030204" pitchFamily="18" charset="0"/>
+                                        </a:rPr>
+                                      </m:ctrlPr>
+                                    </m:sSubPr>
+                                    <m:e>
+                                      <m:r>
+                                        <a:rPr lang="en-US" i="1">
+                                          <a:solidFill>
+                                            <a:schemeClr val="tx1"/>
+                                          </a:solidFill>
+                                          <a:latin typeface="Cambria Math" panose="02040503050406030204" pitchFamily="18" charset="0"/>
+                                        </a:rPr>
+                                        <m:t>…</m:t>
+                                      </m:r>
+                                      <m:r>
+                                        <a:rPr lang="en-US" i="1">
+                                          <a:solidFill>
+                                            <a:schemeClr val="tx1"/>
+                                          </a:solidFill>
+                                          <a:latin typeface="Cambria Math" panose="02040503050406030204" pitchFamily="18" charset="0"/>
+                                        </a:rPr>
+                                        <m:t>𝑎</m:t>
+                                      </m:r>
+                                    </m:e>
+                                    <m:sub>
+                                      <m:r>
+                                        <a:rPr lang="en-US" b="0" i="1" smtClean="0">
+                                          <a:solidFill>
+                                            <a:schemeClr val="tx1"/>
+                                          </a:solidFill>
+                                          <a:latin typeface="Cambria Math" panose="02040503050406030204" pitchFamily="18" charset="0"/>
+                                        </a:rPr>
+                                        <m:t>𝑚</m:t>
+                                      </m:r>
+                                      <m:r>
+                                        <a:rPr lang="en-US" i="1">
+                                          <a:solidFill>
+                                            <a:schemeClr val="tx1"/>
+                                          </a:solidFill>
+                                          <a:latin typeface="Cambria Math" panose="02040503050406030204" pitchFamily="18" charset="0"/>
+                                        </a:rPr>
+                                        <m:t>𝑛</m:t>
+                                      </m:r>
+                                    </m:sub>
+                                  </m:sSub>
+                                  <m:sSub>
+                                    <m:sSubPr>
+                                      <m:ctrlPr>
+                                        <a:rPr lang="en-US" i="1">
+                                          <a:solidFill>
+                                            <a:schemeClr val="tx1"/>
+                                          </a:solidFill>
+                                          <a:latin typeface="Cambria Math" panose="02040503050406030204" pitchFamily="18" charset="0"/>
+                                        </a:rPr>
+                                      </m:ctrlPr>
+                                    </m:sSubPr>
+                                    <m:e>
+                                      <m:r>
+                                        <a:rPr lang="en-US" i="1">
+                                          <a:solidFill>
+                                            <a:schemeClr val="tx1"/>
+                                          </a:solidFill>
+                                          <a:latin typeface="Cambria Math" panose="02040503050406030204" pitchFamily="18" charset="0"/>
+                                        </a:rPr>
+                                        <m:t>𝑏</m:t>
+                                      </m:r>
+                                    </m:e>
+                                    <m:sub>
+                                      <m:r>
+                                        <a:rPr lang="en-US" i="1">
+                                          <a:solidFill>
+                                            <a:schemeClr val="tx1"/>
+                                          </a:solidFill>
+                                          <a:latin typeface="Cambria Math" panose="02040503050406030204" pitchFamily="18" charset="0"/>
+                                        </a:rPr>
+                                        <m:t>𝑚</m:t>
+                                      </m:r>
+                                      <m:r>
+                                        <a:rPr lang="en-US" i="1">
+                                          <a:solidFill>
+                                            <a:schemeClr val="tx1"/>
+                                          </a:solidFill>
+                                          <a:latin typeface="Cambria Math" panose="02040503050406030204" pitchFamily="18" charset="0"/>
+                                        </a:rPr>
+                                        <m:t>1</m:t>
+                                      </m:r>
+                                    </m:sub>
+                                  </m:sSub>
+                                  <m:sSub>
+                                    <m:sSubPr>
+                                      <m:ctrlPr>
+                                        <a:rPr lang="en-US" i="1">
+                                          <a:solidFill>
+                                            <a:schemeClr val="tx1"/>
+                                          </a:solidFill>
+                                          <a:latin typeface="Cambria Math" panose="02040503050406030204" pitchFamily="18" charset="0"/>
+                                        </a:rPr>
+                                      </m:ctrlPr>
+                                    </m:sSubPr>
+                                    <m:e>
+                                      <m:r>
+                                        <a:rPr lang="en-US" i="1">
+                                          <a:solidFill>
+                                            <a:schemeClr val="tx1"/>
+                                          </a:solidFill>
+                                          <a:latin typeface="Cambria Math" panose="02040503050406030204" pitchFamily="18" charset="0"/>
+                                        </a:rPr>
+                                        <m:t>𝑏</m:t>
+                                      </m:r>
+                                    </m:e>
+                                    <m:sub>
+                                      <m:r>
+                                        <a:rPr lang="en-US" i="1">
+                                          <a:solidFill>
+                                            <a:schemeClr val="tx1"/>
+                                          </a:solidFill>
+                                          <a:latin typeface="Cambria Math" panose="02040503050406030204" pitchFamily="18" charset="0"/>
+                                        </a:rPr>
+                                        <m:t>𝑚</m:t>
+                                      </m:r>
+                                      <m:r>
+                                        <a:rPr lang="en-US" i="1">
+                                          <a:solidFill>
+                                            <a:schemeClr val="tx1"/>
+                                          </a:solidFill>
+                                          <a:latin typeface="Cambria Math" panose="02040503050406030204" pitchFamily="18" charset="0"/>
+                                        </a:rPr>
+                                        <m:t>2</m:t>
+                                      </m:r>
+                                    </m:sub>
+                                  </m:sSub>
+                                  <m:sSub>
+                                    <m:sSubPr>
+                                      <m:ctrlPr>
+                                        <a:rPr lang="en-US" i="1">
+                                          <a:solidFill>
+                                            <a:schemeClr val="tx1"/>
+                                          </a:solidFill>
+                                          <a:latin typeface="Cambria Math" panose="02040503050406030204" pitchFamily="18" charset="0"/>
+                                        </a:rPr>
+                                      </m:ctrlPr>
+                                    </m:sSubPr>
+                                    <m:e>
+                                      <m:r>
+                                        <a:rPr lang="en-US" i="1">
+                                          <a:solidFill>
+                                            <a:schemeClr val="tx1"/>
+                                          </a:solidFill>
+                                          <a:latin typeface="Cambria Math" panose="02040503050406030204" pitchFamily="18" charset="0"/>
+                                        </a:rPr>
+                                        <m:t>𝑏</m:t>
+                                      </m:r>
+                                    </m:e>
+                                    <m:sub>
+                                      <m:r>
+                                        <a:rPr lang="en-US" i="1">
+                                          <a:solidFill>
+                                            <a:schemeClr val="tx1"/>
+                                          </a:solidFill>
+                                          <a:latin typeface="Cambria Math" panose="02040503050406030204" pitchFamily="18" charset="0"/>
+                                        </a:rPr>
+                                        <m:t>𝑚</m:t>
+                                      </m:r>
+                                      <m:r>
+                                        <a:rPr lang="en-US" i="1">
+                                          <a:solidFill>
+                                            <a:schemeClr val="tx1"/>
+                                          </a:solidFill>
+                                          <a:latin typeface="Cambria Math" panose="02040503050406030204" pitchFamily="18" charset="0"/>
+                                        </a:rPr>
+                                        <m:t>3</m:t>
+                                      </m:r>
+                                    </m:sub>
+                                  </m:sSub>
+                                  <m:sSub>
+                                    <m:sSubPr>
+                                      <m:ctrlPr>
+                                        <a:rPr lang="en-US" i="1">
+                                          <a:solidFill>
+                                            <a:schemeClr val="tx1"/>
+                                          </a:solidFill>
+                                          <a:latin typeface="Cambria Math" panose="02040503050406030204" pitchFamily="18" charset="0"/>
+                                        </a:rPr>
+                                      </m:ctrlPr>
+                                    </m:sSubPr>
+                                    <m:e>
+                                      <m:r>
+                                        <a:rPr lang="en-US" i="1">
+                                          <a:solidFill>
+                                            <a:schemeClr val="tx1"/>
+                                          </a:solidFill>
+                                          <a:latin typeface="Cambria Math" panose="02040503050406030204" pitchFamily="18" charset="0"/>
+                                        </a:rPr>
+                                        <m:t>𝑏</m:t>
+                                      </m:r>
+                                    </m:e>
+                                    <m:sub>
+                                      <m:r>
+                                        <a:rPr lang="en-US" i="1">
+                                          <a:solidFill>
+                                            <a:schemeClr val="tx1"/>
+                                          </a:solidFill>
+                                          <a:latin typeface="Cambria Math" panose="02040503050406030204" pitchFamily="18" charset="0"/>
+                                        </a:rPr>
+                                        <m:t>𝑚</m:t>
+                                      </m:r>
+                                      <m:r>
+                                        <a:rPr lang="en-US" i="1">
+                                          <a:solidFill>
+                                            <a:schemeClr val="tx1"/>
+                                          </a:solidFill>
+                                          <a:latin typeface="Cambria Math" panose="02040503050406030204" pitchFamily="18" charset="0"/>
+                                        </a:rPr>
+                                        <m:t>4</m:t>
+                                      </m:r>
+                                    </m:sub>
+                                  </m:sSub>
+                                  <m:sSub>
+                                    <m:sSubPr>
+                                      <m:ctrlPr>
+                                        <a:rPr lang="en-US" i="1">
+                                          <a:solidFill>
+                                            <a:schemeClr val="tx1"/>
+                                          </a:solidFill>
+                                          <a:latin typeface="Cambria Math" panose="02040503050406030204" pitchFamily="18" charset="0"/>
+                                        </a:rPr>
+                                      </m:ctrlPr>
+                                    </m:sSubPr>
+                                    <m:e>
+                                      <m:r>
+                                        <a:rPr lang="en-US" i="1">
+                                          <a:solidFill>
+                                            <a:schemeClr val="tx1"/>
+                                          </a:solidFill>
+                                          <a:latin typeface="Cambria Math" panose="02040503050406030204" pitchFamily="18" charset="0"/>
+                                        </a:rPr>
+                                        <m:t>𝑐</m:t>
+                                      </m:r>
+                                    </m:e>
+                                    <m:sub>
+                                      <m:r>
+                                        <a:rPr lang="en-US" b="0" i="1" smtClean="0">
+                                          <a:solidFill>
+                                            <a:schemeClr val="tx1"/>
+                                          </a:solidFill>
+                                          <a:latin typeface="Cambria Math" panose="02040503050406030204" pitchFamily="18" charset="0"/>
+                                        </a:rPr>
+                                        <m:t>𝑚</m:t>
+                                      </m:r>
+                                      <m:r>
+                                        <a:rPr lang="en-US" i="1">
+                                          <a:solidFill>
+                                            <a:schemeClr val="tx1"/>
+                                          </a:solidFill>
+                                          <a:latin typeface="Cambria Math" panose="02040503050406030204" pitchFamily="18" charset="0"/>
+                                        </a:rPr>
+                                        <m:t>1</m:t>
+                                      </m:r>
+                                    </m:sub>
+                                  </m:sSub>
+                                </m:e>
+                              </m:eqArr>
+                            </m:e>
+                          </m:d>
+                        </m:oMath>
+                      </m:oMathPara>
+                    </a14:m>
+                    <a:endParaRPr lang="en-US">
+                      <a:solidFill>
+                        <a:schemeClr val="tx1"/>
+                      </a:solidFill>
+                    </a:endParaRPr>
+                  </a:p>
+                  <a:p>
+                    <a:endParaRPr lang="en-US">
+                      <a:solidFill>
+                        <a:schemeClr val="tx1"/>
+                      </a:solidFill>
+                    </a:endParaRPr>
+                  </a:p>
+                </p:txBody>
+              </p:sp>
+            </mc:Choice>
+            <mc:Fallback>
+              <p:sp>
+                <p:nvSpPr>
+                  <p:cNvPr id="37" name="Rectangle 36"/>
+                  <p:cNvSpPr>
+                    <a:spLocks noRot="1" noChangeAspect="1" noMove="1" noResize="1" noEditPoints="1" noAdjustHandles="1" noChangeArrowheads="1" noChangeShapeType="1" noTextEdit="1"/>
+                  </p:cNvSpPr>
+                  <p:nvPr/>
+                </p:nvSpPr>
+                <p:spPr>
+                  <a:xfrm>
+                    <a:off x="8040344" y="3969575"/>
+                    <a:ext cx="4289563" cy="1554369"/>
+                  </a:xfrm>
+                  <a:prstGeom prst="rect">
+                    <a:avLst/>
+                  </a:prstGeom>
+                  <a:blipFill>
+                    <a:blip r:embed="rId5"/>
+                    <a:stretch>
+                      <a:fillRect/>
+                    </a:stretch>
+                  </a:blipFill>
+                  <a:ln>
+                    <a:solidFill>
+                      <a:schemeClr val="tx1"/>
+                    </a:solidFill>
+                  </a:ln>
+                </p:spPr>
+                <p:txBody>
+                  <a:bodyPr/>
+                  <a:lstStyle/>
+                  <a:p>
+                    <a:r>
+                      <a:rPr lang="en-US">
+                        <a:noFill/>
+                      </a:rPr>
+                      <a:t> </a:t>
+                    </a:r>
+                  </a:p>
+                </p:txBody>
+              </p:sp>
+            </mc:Fallback>
+          </mc:AlternateContent>
+          <p:cxnSp>
+            <p:nvCxnSpPr>
+              <p:cNvPr id="38" name="Connector: Elbow 37"/>
+              <p:cNvCxnSpPr>
+                <a:stCxn id="29" idx="3"/>
+                <a:endCxn id="37" idx="1"/>
+              </p:cNvCxnSpPr>
+              <p:nvPr/>
+            </p:nvCxnSpPr>
+            <p:spPr>
+              <a:xfrm flipV="1">
+                <a:off x="6283190" y="4746760"/>
+                <a:ext cx="1757154" cy="1"/>
+              </a:xfrm>
+              <a:prstGeom prst="bentConnector3">
+                <a:avLst/>
+              </a:prstGeom>
+              <a:ln w="19050">
+                <a:solidFill>
+                  <a:schemeClr val="tx1"/>
+                </a:solidFill>
+                <a:tailEnd type="triangle"/>
+              </a:ln>
+            </p:spPr>
+            <p:style>
+              <a:lnRef idx="1">
+                <a:schemeClr val="accent1"/>
+              </a:lnRef>
+              <a:fillRef idx="0">
+                <a:schemeClr val="accent1"/>
+              </a:fillRef>
+              <a:effectRef idx="0">
+                <a:schemeClr val="accent1"/>
+              </a:effectRef>
+              <a:fontRef idx="minor">
+                <a:schemeClr val="tx1"/>
+              </a:fontRef>
+            </p:style>
+          </p:cxnSp>
+          <p:cxnSp>
+            <p:nvCxnSpPr>
+              <p:cNvPr id="45" name="Connector: Elbow 44"/>
+              <p:cNvCxnSpPr>
+                <a:stCxn id="31" idx="3"/>
+                <a:endCxn id="37" idx="1"/>
+              </p:cNvCxnSpPr>
+              <p:nvPr/>
+            </p:nvCxnSpPr>
+            <p:spPr>
+              <a:xfrm flipV="1">
+                <a:off x="6283190" y="4746760"/>
+                <a:ext cx="1757154" cy="1758396"/>
+              </a:xfrm>
+              <a:prstGeom prst="bentConnector3">
+                <a:avLst/>
+              </a:prstGeom>
+              <a:ln w="19050">
+                <a:solidFill>
+                  <a:schemeClr val="tx1"/>
+                </a:solidFill>
+                <a:tailEnd type="triangle"/>
+              </a:ln>
+            </p:spPr>
+            <p:style>
+              <a:lnRef idx="1">
+                <a:schemeClr val="accent1"/>
+              </a:lnRef>
+              <a:fillRef idx="0">
+                <a:schemeClr val="accent1"/>
+              </a:fillRef>
+              <a:effectRef idx="0">
+                <a:schemeClr val="accent1"/>
+              </a:effectRef>
+              <a:fontRef idx="minor">
+                <a:schemeClr val="tx1"/>
+              </a:fontRef>
+            </p:style>
+          </p:cxnSp>
+          <p:cxnSp>
+            <p:nvCxnSpPr>
+              <p:cNvPr id="68" name="Connector: Elbow 67"/>
+              <p:cNvCxnSpPr>
+                <a:stCxn id="6" idx="3"/>
+                <a:endCxn id="5" idx="2"/>
+              </p:cNvCxnSpPr>
+              <p:nvPr/>
+            </p:nvCxnSpPr>
+            <p:spPr>
+              <a:xfrm flipV="1">
+                <a:off x="-1185654" y="555762"/>
+                <a:ext cx="1757156" cy="4190997"/>
+              </a:xfrm>
+              <a:prstGeom prst="bentConnector3">
+                <a:avLst>
+                  <a:gd name="adj1" fmla="val 50000"/>
+                </a:avLst>
+              </a:prstGeom>
+              <a:ln w="19050">
+                <a:solidFill>
+                  <a:schemeClr val="tx1"/>
+                </a:solidFill>
+                <a:tailEnd type="triangle"/>
+              </a:ln>
+            </p:spPr>
+            <p:style>
+              <a:lnRef idx="1">
+                <a:schemeClr val="accent1"/>
+              </a:lnRef>
+              <a:fillRef idx="0">
+                <a:schemeClr val="accent1"/>
+              </a:fillRef>
+              <a:effectRef idx="0">
+                <a:schemeClr val="accent1"/>
+              </a:effectRef>
+              <a:fontRef idx="minor">
+                <a:schemeClr val="tx1"/>
+              </a:fontRef>
+            </p:style>
+          </p:cxnSp>
+          <p:cxnSp>
+            <p:nvCxnSpPr>
+              <p:cNvPr id="71" name="Connector: Elbow 70"/>
+              <p:cNvCxnSpPr>
+                <a:stCxn id="6" idx="3"/>
+                <a:endCxn id="4" idx="2"/>
+              </p:cNvCxnSpPr>
+              <p:nvPr/>
+            </p:nvCxnSpPr>
+            <p:spPr>
+              <a:xfrm>
+                <a:off x="-1185654" y="4746759"/>
+                <a:ext cx="1757154" cy="2"/>
+              </a:xfrm>
+              <a:prstGeom prst="bentConnector3">
+                <a:avLst>
+                  <a:gd name="adj1" fmla="val 50000"/>
+                </a:avLst>
+              </a:prstGeom>
+              <a:ln w="19050">
+                <a:solidFill>
+                  <a:schemeClr val="tx1"/>
+                </a:solidFill>
+                <a:tailEnd type="triangle"/>
+              </a:ln>
+            </p:spPr>
+            <p:style>
+              <a:lnRef idx="1">
+                <a:schemeClr val="accent1"/>
+              </a:lnRef>
+              <a:fillRef idx="0">
+                <a:schemeClr val="accent1"/>
+              </a:fillRef>
+              <a:effectRef idx="0">
+                <a:schemeClr val="accent1"/>
+              </a:effectRef>
+              <a:fontRef idx="minor">
+                <a:schemeClr val="tx1"/>
+              </a:fontRef>
+            </p:style>
+          </p:cxnSp>
+          <p:cxnSp>
+            <p:nvCxnSpPr>
+              <p:cNvPr id="74" name="Connector: Elbow 73"/>
+              <p:cNvCxnSpPr>
+                <a:stCxn id="6" idx="3"/>
+                <a:endCxn id="30" idx="2"/>
+              </p:cNvCxnSpPr>
+              <p:nvPr/>
+            </p:nvCxnSpPr>
+            <p:spPr>
+              <a:xfrm>
+                <a:off x="-1185654" y="4746759"/>
+                <a:ext cx="1757154" cy="1758397"/>
+              </a:xfrm>
+              <a:prstGeom prst="bentConnector3">
+                <a:avLst>
+                  <a:gd name="adj1" fmla="val 50000"/>
+                </a:avLst>
+              </a:prstGeom>
+              <a:ln w="19050">
+                <a:solidFill>
+                  <a:schemeClr val="tx1"/>
+                </a:solidFill>
+                <a:tailEnd type="triangle"/>
+              </a:ln>
+            </p:spPr>
+            <p:style>
+              <a:lnRef idx="1">
+                <a:schemeClr val="accent1"/>
+              </a:lnRef>
+              <a:fillRef idx="0">
+                <a:schemeClr val="accent1"/>
+              </a:fillRef>
+              <a:effectRef idx="0">
+                <a:schemeClr val="accent1"/>
+              </a:effectRef>
+              <a:fontRef idx="minor">
+                <a:schemeClr val="tx1"/>
+              </a:fontRef>
+            </p:style>
+          </p:cxnSp>
+        </p:grpSp>
+        <p:sp>
+          <p:nvSpPr>
+            <p:cNvPr id="81" name="Rectangle 80"/>
+            <p:cNvSpPr/>
+            <p:nvPr/>
+          </p:nvSpPr>
+          <p:spPr>
+            <a:xfrm>
+              <a:off x="11241158" y="4607471"/>
+              <a:ext cx="1958006" cy="545275"/>
+            </a:xfrm>
+            <a:prstGeom prst="rect">
+              <a:avLst/>
+            </a:prstGeom>
+            <a:noFill/>
+            <a:ln>
+              <a:solidFill>
+                <a:schemeClr val="tx1"/>
+              </a:solidFill>
+            </a:ln>
+          </p:spPr>
+          <p:style>
+            <a:lnRef idx="2">
+              <a:schemeClr val="accent1">
+                <a:shade val="50000"/>
+              </a:schemeClr>
+            </a:lnRef>
+            <a:fillRef idx="1">
+              <a:schemeClr val="accent1"/>
+            </a:fillRef>
+            <a:effectRef idx="0">
+              <a:schemeClr val="accent1"/>
+            </a:effectRef>
+            <a:fontRef idx="minor">
+              <a:schemeClr val="lt1"/>
+            </a:fontRef>
+          </p:style>
+          <p:txBody>
+            <a:bodyPr rtlCol="0" anchor="ctr"/>
+            <a:lstStyle/>
+            <a:p>
+              <a:pPr algn="ctr"/>
+              <a:r>
+                <a:rPr lang="en-US">
+                  <a:solidFill>
+                    <a:schemeClr val="tx1"/>
+                  </a:solidFill>
+                </a:rPr>
+                <a:t>SVM</a:t>
+              </a:r>
+              <a:endParaRPr lang="en-US">
+                <a:solidFill>
+                  <a:schemeClr val="tx1"/>
+                </a:solidFill>
+              </a:endParaRPr>
+            </a:p>
+          </p:txBody>
+        </p:sp>
+        <p:cxnSp>
+          <p:nvCxnSpPr>
+            <p:cNvPr id="82" name="Straight Arrow Connector 81"/>
+            <p:cNvCxnSpPr>
+              <a:endCxn id="81" idx="1"/>
+            </p:cNvCxnSpPr>
+            <p:nvPr/>
+          </p:nvCxnSpPr>
+          <p:spPr>
+            <a:xfrm>
+              <a:off x="10463007" y="4880109"/>
+              <a:ext cx="778151" cy="0"/>
+            </a:xfrm>
+            <a:prstGeom prst="straightConnector1">
+              <a:avLst/>
+            </a:prstGeom>
+            <a:ln w="19050">
+              <a:solidFill>
+                <a:schemeClr val="tx1"/>
+              </a:solidFill>
+              <a:tailEnd type="triangle"/>
+            </a:ln>
+          </p:spPr>
+          <p:style>
+            <a:lnRef idx="1">
+              <a:schemeClr val="accent1"/>
+            </a:lnRef>
+            <a:fillRef idx="0">
+              <a:schemeClr val="accent1"/>
+            </a:fillRef>
+            <a:effectRef idx="0">
+              <a:schemeClr val="accent1"/>
+            </a:effectRef>
+            <a:fontRef idx="minor">
+              <a:schemeClr val="tx1"/>
+            </a:fontRef>
+          </p:style>
+        </p:cxnSp>
+      </p:grpSp>
     </p:spTree>
     <p:extLst>
       <p:ext uri="{BB962C8B-B14F-4D97-AF65-F5344CB8AC3E}">

</xml_diff>

<commit_message>
tam thoi sua format mot so cho theo gop y cua Lanh
</commit_message>
<xml_diff>
--- a/mohinh.pptx
+++ b/mohinh.pptx
@@ -11,6 +11,7 @@
     <p:sldId id="262" r:id="rId5"/>
     <p:sldId id="263" r:id="rId6"/>
     <p:sldId id="264" r:id="rId7"/>
+    <p:sldId id="265" r:id="rId8"/>
   </p:sldIdLst>
   <p:sldSz cx="12192000" cy="6858000"/>
   <p:notesSz cx="6858000" cy="9144000"/>
@@ -2039,7 +2040,7 @@
           <a:p>
             <a:fld id="{4A5F161B-FF7E-4ABE-89D0-93661BD281ED}" type="datetimeFigureOut">
               <a:rPr lang="en-US" smtClean="0"/>
-              <a:t>12/10/2016</a:t>
+              <a:t>12/12/2016</a:t>
             </a:fld>
             <a:endParaRPr lang="en-US"/>
           </a:p>
@@ -2207,7 +2208,7 @@
           <a:p>
             <a:fld id="{4A5F161B-FF7E-4ABE-89D0-93661BD281ED}" type="datetimeFigureOut">
               <a:rPr lang="en-US" smtClean="0"/>
-              <a:t>12/10/2016</a:t>
+              <a:t>12/12/2016</a:t>
             </a:fld>
             <a:endParaRPr lang="en-US"/>
           </a:p>
@@ -2385,7 +2386,7 @@
           <a:p>
             <a:fld id="{4A5F161B-FF7E-4ABE-89D0-93661BD281ED}" type="datetimeFigureOut">
               <a:rPr lang="en-US" smtClean="0"/>
-              <a:t>12/10/2016</a:t>
+              <a:t>12/12/2016</a:t>
             </a:fld>
             <a:endParaRPr lang="en-US"/>
           </a:p>
@@ -2553,7 +2554,7 @@
           <a:p>
             <a:fld id="{4A5F161B-FF7E-4ABE-89D0-93661BD281ED}" type="datetimeFigureOut">
               <a:rPr lang="en-US" smtClean="0"/>
-              <a:t>12/10/2016</a:t>
+              <a:t>12/12/2016</a:t>
             </a:fld>
             <a:endParaRPr lang="en-US"/>
           </a:p>
@@ -2798,7 +2799,7 @@
           <a:p>
             <a:fld id="{4A5F161B-FF7E-4ABE-89D0-93661BD281ED}" type="datetimeFigureOut">
               <a:rPr lang="en-US" smtClean="0"/>
-              <a:t>12/10/2016</a:t>
+              <a:t>12/12/2016</a:t>
             </a:fld>
             <a:endParaRPr lang="en-US"/>
           </a:p>
@@ -3027,7 +3028,7 @@
           <a:p>
             <a:fld id="{4A5F161B-FF7E-4ABE-89D0-93661BD281ED}" type="datetimeFigureOut">
               <a:rPr lang="en-US" smtClean="0"/>
-              <a:t>12/10/2016</a:t>
+              <a:t>12/12/2016</a:t>
             </a:fld>
             <a:endParaRPr lang="en-US"/>
           </a:p>
@@ -3391,7 +3392,7 @@
           <a:p>
             <a:fld id="{4A5F161B-FF7E-4ABE-89D0-93661BD281ED}" type="datetimeFigureOut">
               <a:rPr lang="en-US" smtClean="0"/>
-              <a:t>12/10/2016</a:t>
+              <a:t>12/12/2016</a:t>
             </a:fld>
             <a:endParaRPr lang="en-US"/>
           </a:p>
@@ -3508,7 +3509,7 @@
           <a:p>
             <a:fld id="{4A5F161B-FF7E-4ABE-89D0-93661BD281ED}" type="datetimeFigureOut">
               <a:rPr lang="en-US" smtClean="0"/>
-              <a:t>12/10/2016</a:t>
+              <a:t>12/12/2016</a:t>
             </a:fld>
             <a:endParaRPr lang="en-US"/>
           </a:p>
@@ -3603,7 +3604,7 @@
           <a:p>
             <a:fld id="{4A5F161B-FF7E-4ABE-89D0-93661BD281ED}" type="datetimeFigureOut">
               <a:rPr lang="en-US" smtClean="0"/>
-              <a:t>12/10/2016</a:t>
+              <a:t>12/12/2016</a:t>
             </a:fld>
             <a:endParaRPr lang="en-US"/>
           </a:p>
@@ -3878,7 +3879,7 @@
           <a:p>
             <a:fld id="{4A5F161B-FF7E-4ABE-89D0-93661BD281ED}" type="datetimeFigureOut">
               <a:rPr lang="en-US" smtClean="0"/>
-              <a:t>12/10/2016</a:t>
+              <a:t>12/12/2016</a:t>
             </a:fld>
             <a:endParaRPr lang="en-US"/>
           </a:p>
@@ -4130,7 +4131,7 @@
           <a:p>
             <a:fld id="{4A5F161B-FF7E-4ABE-89D0-93661BD281ED}" type="datetimeFigureOut">
               <a:rPr lang="en-US" smtClean="0"/>
-              <a:t>12/10/2016</a:t>
+              <a:t>12/12/2016</a:t>
             </a:fld>
             <a:endParaRPr lang="en-US"/>
           </a:p>
@@ -4341,7 +4342,7 @@
           <a:p>
             <a:fld id="{4A5F161B-FF7E-4ABE-89D0-93661BD281ED}" type="datetimeFigureOut">
               <a:rPr lang="en-US" smtClean="0"/>
-              <a:t>12/10/2016</a:t>
+              <a:t>12/12/2016</a:t>
             </a:fld>
             <a:endParaRPr lang="en-US"/>
           </a:p>
@@ -9834,11 +9835,6 @@
                   </a:rPr>
                   <a:t>N-gram</a:t>
                 </a:r>
-                <a:endParaRPr lang="en-US">
-                  <a:solidFill>
-                    <a:schemeClr val="tx1"/>
-                  </a:solidFill>
-                </a:endParaRPr>
               </a:p>
             </p:txBody>
           </p:sp>
@@ -9889,11 +9885,6 @@
                   </a:rPr>
                   <a:t>Change phrase</a:t>
                 </a:r>
-                <a:endParaRPr lang="en-US">
-                  <a:solidFill>
-                    <a:schemeClr val="tx1"/>
-                  </a:solidFill>
-                </a:endParaRPr>
               </a:p>
             </p:txBody>
           </p:sp>
@@ -9944,11 +9935,6 @@
                   </a:rPr>
                   <a:t>Đặc trưng phủ định</a:t>
                 </a:r>
-                <a:endParaRPr lang="en-US">
-                  <a:solidFill>
-                    <a:schemeClr val="tx1"/>
-                  </a:solidFill>
-                </a:endParaRPr>
               </a:p>
             </p:txBody>
           </p:sp>
@@ -10002,11 +9988,6 @@
                   </a:rPr>
                   <a:t>Tập dữ liệu training</a:t>
                 </a:r>
-                <a:endParaRPr lang="en-US">
-                  <a:solidFill>
-                    <a:schemeClr val="tx1"/>
-                  </a:solidFill>
-                </a:endParaRPr>
               </a:p>
             </p:txBody>
           </p:sp>
@@ -10060,11 +10041,6 @@
                   </a:rPr>
                   <a:t>Thay các từ phủ định bằng nhãn NEGATION</a:t>
                 </a:r>
-                <a:endParaRPr lang="en-US">
-                  <a:solidFill>
-                    <a:schemeClr val="tx1"/>
-                  </a:solidFill>
-                </a:endParaRPr>
               </a:p>
             </p:txBody>
           </p:sp>
@@ -10180,8 +10156,8 @@
               </a:fontRef>
             </p:style>
           </p:cxnSp>
-          <mc:AlternateContent xmlns:mc="http://schemas.openxmlformats.org/markup-compatibility/2006">
-            <mc:Choice xmlns:a14="http://schemas.microsoft.com/office/drawing/2010/main" Requires="a14">
+          <mc:AlternateContent xmlns:mc="http://schemas.openxmlformats.org/markup-compatibility/2006" xmlns:a14="http://schemas.microsoft.com/office/drawing/2010/main">
+            <mc:Choice Requires="a14">
               <p:sp>
                 <p:nvSpPr>
                   <p:cNvPr id="26" name="Rectangle 25"/>
@@ -10223,6 +10199,7 @@
                   <a:bodyPr rtlCol="0" anchor="ctr"/>
                   <a:lstStyle/>
                   <a:p>
+                    <a:pPr/>
                     <a14:m>
                       <m:oMathPara xmlns:m="http://schemas.openxmlformats.org/officeDocument/2006/math">
                         <m:oMathParaPr>
@@ -10809,7 +10786,7 @@
                 </p:txBody>
               </p:sp>
             </mc:Choice>
-            <mc:Fallback>
+            <mc:Fallback xmlns="">
               <p:sp>
                 <p:nvSpPr>
                   <p:cNvPr id="26" name="Rectangle 25"/>
@@ -10876,31 +10853,14 @@
               <a:p>
                 <a:r>
                   <a:rPr lang="en-US" i="1"/>
-                  <a:t>m</a:t>
-                </a:r>
-                <a:r>
-                  <a:rPr lang="en-US" i="1"/>
-                  <a:t>:số lượng câu</a:t>
+                  <a:t>m:số lượng câu</a:t>
                 </a:r>
               </a:p>
               <a:p>
                 <a:r>
                   <a:rPr lang="en-US" i="1"/>
-                  <a:t>n</a:t>
+                  <a:t>n:kích thước tập từ vựng</a:t>
                 </a:r>
-                <a:r>
-                  <a:rPr lang="en-US" i="1"/>
-                  <a:t>:kích </a:t>
-                </a:r>
-                <a:r>
-                  <a:rPr lang="en-US" i="1"/>
-                  <a:t>thước tập </a:t>
-                </a:r>
-                <a:r>
-                  <a:rPr lang="en-US" i="1"/>
-                  <a:t>từ vựng</a:t>
-                </a:r>
-                <a:endParaRPr lang="en-US" i="1"/>
               </a:p>
             </p:txBody>
           </p:sp>
@@ -10940,8 +10900,8 @@
               </a:fontRef>
             </p:style>
           </p:cxnSp>
-          <mc:AlternateContent xmlns:mc="http://schemas.openxmlformats.org/markup-compatibility/2006">
-            <mc:Choice xmlns:a14="http://schemas.microsoft.com/office/drawing/2010/main" Requires="a14">
+          <mc:AlternateContent xmlns:mc="http://schemas.openxmlformats.org/markup-compatibility/2006" xmlns:a14="http://schemas.microsoft.com/office/drawing/2010/main">
+            <mc:Choice Requires="a14">
               <p:sp>
                 <p:nvSpPr>
                   <p:cNvPr id="29" name="Rectangle 28"/>
@@ -10983,6 +10943,7 @@
                   <a:bodyPr rtlCol="0" anchor="ctr"/>
                   <a:lstStyle/>
                   <a:p>
+                    <a:pPr/>
                     <a14:m>
                       <m:oMathPara xmlns:m="http://schemas.openxmlformats.org/officeDocument/2006/math">
                         <m:oMathParaPr>
@@ -11497,7 +11458,7 @@
                 </p:txBody>
               </p:sp>
             </mc:Choice>
-            <mc:Fallback>
+            <mc:Fallback xmlns="">
               <p:sp>
                 <p:nvSpPr>
                   <p:cNvPr id="29" name="Rectangle 28"/>
@@ -11588,16 +11549,11 @@
                   </a:rPr>
                   <a:t>SO-CAL</a:t>
                 </a:r>
-                <a:endParaRPr lang="en-US">
-                  <a:solidFill>
-                    <a:schemeClr val="tx1"/>
-                  </a:solidFill>
-                </a:endParaRPr>
               </a:p>
             </p:txBody>
           </p:sp>
-          <mc:AlternateContent xmlns:mc="http://schemas.openxmlformats.org/markup-compatibility/2006">
-            <mc:Choice xmlns:a14="http://schemas.microsoft.com/office/drawing/2010/main" Requires="a14">
+          <mc:AlternateContent xmlns:mc="http://schemas.openxmlformats.org/markup-compatibility/2006" xmlns:a14="http://schemas.microsoft.com/office/drawing/2010/main">
+            <mc:Choice Requires="a14">
               <p:sp>
                 <p:nvSpPr>
                   <p:cNvPr id="31" name="Rectangle 30"/>
@@ -11639,6 +11595,7 @@
                   <a:bodyPr rtlCol="0" anchor="ctr"/>
                   <a:lstStyle/>
                   <a:p>
+                    <a:pPr/>
                     <a14:m>
                       <m:oMathPara xmlns:m="http://schemas.openxmlformats.org/officeDocument/2006/math">
                         <m:oMathParaPr>
@@ -11829,7 +11786,7 @@
                 </p:txBody>
               </p:sp>
             </mc:Choice>
-            <mc:Fallback>
+            <mc:Fallback xmlns="">
               <p:sp>
                 <p:nvSpPr>
                   <p:cNvPr id="31" name="Rectangle 30"/>
@@ -11950,8 +11907,8 @@
               </a:fontRef>
             </p:style>
           </p:cxnSp>
-          <mc:AlternateContent xmlns:mc="http://schemas.openxmlformats.org/markup-compatibility/2006">
-            <mc:Choice xmlns:a14="http://schemas.microsoft.com/office/drawing/2010/main" Requires="a14">
+          <mc:AlternateContent xmlns:mc="http://schemas.openxmlformats.org/markup-compatibility/2006" xmlns:a14="http://schemas.microsoft.com/office/drawing/2010/main">
+            <mc:Choice Requires="a14">
               <p:sp>
                 <p:nvSpPr>
                   <p:cNvPr id="37" name="Rectangle 36"/>
@@ -11993,6 +11950,7 @@
                   <a:bodyPr rtlCol="0" anchor="ctr"/>
                   <a:lstStyle/>
                   <a:p>
+                    <a:pPr/>
                     <a14:m>
                       <m:oMathPara xmlns:m="http://schemas.openxmlformats.org/officeDocument/2006/math">
                         <m:oMathParaPr>
@@ -13143,7 +13101,7 @@
                 </p:txBody>
               </p:sp>
             </mc:Choice>
-            <mc:Fallback>
+            <mc:Fallback xmlns="">
               <p:sp>
                 <p:nvSpPr>
                   <p:cNvPr id="37" name="Rectangle 36"/>
@@ -13439,11 +13397,6 @@
                 </a:rPr>
                 <a:t>SVM</a:t>
               </a:r>
-              <a:endParaRPr lang="en-US">
-                <a:solidFill>
-                  <a:schemeClr val="tx1"/>
-                </a:solidFill>
-              </a:endParaRPr>
             </a:p>
           </p:txBody>
         </p:sp>
@@ -13490,6 +13443,80 @@
     <p:extLst>
       <p:ext uri="{BB962C8B-B14F-4D97-AF65-F5344CB8AC3E}">
         <p14:creationId xmlns:p14="http://schemas.microsoft.com/office/powerpoint/2010/main" val="2402387845"/>
+      </p:ext>
+    </p:extLst>
+  </p:cSld>
+  <p:clrMapOvr>
+    <a:masterClrMapping/>
+  </p:clrMapOvr>
+</p:sld>
+</file>
+
+<file path=ppt/slides/slide7.xml><?xml version="1.0" encoding="utf-8"?>
+<p:sld xmlns:a="http://schemas.openxmlformats.org/drawingml/2006/main" xmlns:r="http://schemas.openxmlformats.org/officeDocument/2006/relationships" xmlns:p="http://schemas.openxmlformats.org/presentationml/2006/main">
+  <p:cSld>
+    <p:spTree>
+      <p:nvGrpSpPr>
+        <p:cNvPr id="1" name=""/>
+        <p:cNvGrpSpPr/>
+        <p:nvPr/>
+      </p:nvGrpSpPr>
+      <p:grpSpPr>
+        <a:xfrm>
+          <a:off x="0" y="0"/>
+          <a:ext cx="0" cy="0"/>
+          <a:chOff x="0" y="0"/>
+          <a:chExt cx="0" cy="0"/>
+        </a:xfrm>
+      </p:grpSpPr>
+      <p:pic>
+        <p:nvPicPr>
+          <p:cNvPr id="4" name="Picture 3"/>
+          <p:cNvPicPr>
+            <a:picLocks noChangeAspect="1"/>
+          </p:cNvPicPr>
+          <p:nvPr/>
+        </p:nvPicPr>
+        <p:blipFill>
+          <a:blip r:embed="rId2">
+            <a:extLst>
+              <a:ext uri="{28A0092B-C50C-407E-A947-70E740481C1C}">
+                <a14:useLocalDpi xmlns:a14="http://schemas.microsoft.com/office/drawing/2010/main" val="0"/>
+              </a:ext>
+            </a:extLst>
+          </a:blip>
+          <a:stretch>
+            <a:fillRect/>
+          </a:stretch>
+        </p:blipFill>
+        <p:spPr>
+          <a:xfrm>
+            <a:off x="-1" y="569843"/>
+            <a:ext cx="12166523" cy="6288157"/>
+          </a:xfrm>
+          <a:prstGeom prst="rect">
+            <a:avLst/>
+          </a:prstGeom>
+          <a:ln w="38100" cap="sq">
+            <a:solidFill>
+              <a:srgbClr val="000000"/>
+            </a:solidFill>
+            <a:prstDash val="solid"/>
+            <a:miter lim="800000"/>
+          </a:ln>
+          <a:effectLst>
+            <a:outerShdw blurRad="50800" dist="38100" dir="2700000" algn="tl" rotWithShape="0">
+              <a:srgbClr val="000000">
+                <a:alpha val="43000"/>
+              </a:srgbClr>
+            </a:outerShdw>
+          </a:effectLst>
+        </p:spPr>
+      </p:pic>
+    </p:spTree>
+    <p:extLst>
+      <p:ext uri="{BB962C8B-B14F-4D97-AF65-F5344CB8AC3E}">
+        <p14:creationId xmlns:p14="http://schemas.microsoft.com/office/powerpoint/2010/main" val="973510874"/>
       </p:ext>
     </p:extLst>
   </p:cSld>

</xml_diff>

<commit_message>
xong nghien cuu lien quan
</commit_message>
<xml_diff>
--- a/mohinh.pptx
+++ b/mohinh.pptx
@@ -12,6 +12,12 @@
     <p:sldId id="263" r:id="rId6"/>
     <p:sldId id="264" r:id="rId7"/>
     <p:sldId id="265" r:id="rId8"/>
+    <p:sldId id="266" r:id="rId9"/>
+    <p:sldId id="267" r:id="rId10"/>
+    <p:sldId id="268" r:id="rId11"/>
+    <p:sldId id="269" r:id="rId12"/>
+    <p:sldId id="270" r:id="rId13"/>
+    <p:sldId id="271" r:id="rId14"/>
   </p:sldIdLst>
   <p:sldSz cx="12192000" cy="6858000"/>
   <p:notesSz cx="6858000" cy="9144000"/>
@@ -825,6 +831,1680 @@
 </c:chartSpace>
 </file>
 
+<file path=ppt/charts/chart3.xml><?xml version="1.0" encoding="utf-8"?>
+<c:chartSpace xmlns:c="http://schemas.openxmlformats.org/drawingml/2006/chart" xmlns:a="http://schemas.openxmlformats.org/drawingml/2006/main" xmlns:r="http://schemas.openxmlformats.org/officeDocument/2006/relationships" xmlns:c16r2="http://schemas.microsoft.com/office/drawing/2015/06/chart">
+  <c:date1904 val="0"/>
+  <c:lang val="en-US"/>
+  <c:roundedCorners val="0"/>
+  <mc:AlternateContent xmlns:mc="http://schemas.openxmlformats.org/markup-compatibility/2006">
+    <mc:Choice xmlns:c14="http://schemas.microsoft.com/office/drawing/2007/8/2/chart" Requires="c14">
+      <c14:style val="102"/>
+    </mc:Choice>
+    <mc:Fallback>
+      <c:style val="2"/>
+    </mc:Fallback>
+  </mc:AlternateContent>
+  <c:chart>
+    <c:autoTitleDeleted val="1"/>
+    <c:plotArea>
+      <c:layout/>
+      <c:barChart>
+        <c:barDir val="col"/>
+        <c:grouping val="clustered"/>
+        <c:varyColors val="0"/>
+        <c:ser>
+          <c:idx val="0"/>
+          <c:order val="0"/>
+          <c:tx>
+            <c:strRef>
+              <c:f>Sheet2!$J$17</c:f>
+              <c:strCache>
+                <c:ptCount val="1"/>
+                <c:pt idx="0">
+                  <c:v>Đặc trưng cơ bản</c:v>
+                </c:pt>
+              </c:strCache>
+            </c:strRef>
+          </c:tx>
+          <c:spPr>
+            <a:pattFill prst="wdDnDiag">
+              <a:fgClr>
+                <a:schemeClr val="tx1"/>
+              </a:fgClr>
+              <a:bgClr>
+                <a:schemeClr val="bg1"/>
+              </a:bgClr>
+            </a:pattFill>
+            <a:ln>
+              <a:solidFill>
+                <a:sysClr val="windowText" lastClr="000000"/>
+              </a:solidFill>
+            </a:ln>
+            <a:effectLst/>
+          </c:spPr>
+          <c:invertIfNegative val="0"/>
+          <c:cat>
+            <c:numRef>
+              <c:f>Sheet2!$I$18:$I$21</c:f>
+              <c:numCache>
+                <c:formatCode>General</c:formatCode>
+                <c:ptCount val="4"/>
+                <c:pt idx="0">
+                  <c:v>1</c:v>
+                </c:pt>
+                <c:pt idx="1">
+                  <c:v>2</c:v>
+                </c:pt>
+                <c:pt idx="2">
+                  <c:v>3</c:v>
+                </c:pt>
+                <c:pt idx="3">
+                  <c:v>4</c:v>
+                </c:pt>
+              </c:numCache>
+            </c:numRef>
+          </c:cat>
+          <c:val>
+            <c:numRef>
+              <c:f>Sheet2!$J$18:$J$21</c:f>
+              <c:numCache>
+                <c:formatCode>General</c:formatCode>
+                <c:ptCount val="4"/>
+                <c:pt idx="0">
+                  <c:v>67.961736446250001</c:v>
+                </c:pt>
+                <c:pt idx="1">
+                  <c:v>69.167660186961101</c:v>
+                </c:pt>
+                <c:pt idx="2">
+                  <c:v>70.047152275260302</c:v>
+                </c:pt>
+                <c:pt idx="3">
+                  <c:v>69.986807138885993</c:v>
+                </c:pt>
+              </c:numCache>
+            </c:numRef>
+          </c:val>
+          <c:extLst>
+            <c:ext xmlns:c16="http://schemas.microsoft.com/office/drawing/2014/chart" uri="{C3380CC4-5D6E-409C-BE32-E72D297353CC}">
+              <c16:uniqueId val="{00000000-D8BF-47CC-96BE-9F0EBA3D7C7D}"/>
+            </c:ext>
+          </c:extLst>
+        </c:ser>
+        <c:ser>
+          <c:idx val="1"/>
+          <c:order val="1"/>
+          <c:tx>
+            <c:strRef>
+              <c:f>Sheet2!$K$17</c:f>
+              <c:strCache>
+                <c:ptCount val="1"/>
+                <c:pt idx="0">
+                  <c:v>Đặc trưng cơ bản + SO-CAL</c:v>
+                </c:pt>
+              </c:strCache>
+            </c:strRef>
+          </c:tx>
+          <c:spPr>
+            <a:solidFill>
+              <a:schemeClr val="tx1"/>
+            </a:solidFill>
+            <a:ln>
+              <a:solidFill>
+                <a:sysClr val="windowText" lastClr="000000"/>
+              </a:solidFill>
+            </a:ln>
+            <a:effectLst/>
+          </c:spPr>
+          <c:invertIfNegative val="0"/>
+          <c:cat>
+            <c:numRef>
+              <c:f>Sheet2!$I$18:$I$21</c:f>
+              <c:numCache>
+                <c:formatCode>General</c:formatCode>
+                <c:ptCount val="4"/>
+                <c:pt idx="0">
+                  <c:v>1</c:v>
+                </c:pt>
+                <c:pt idx="1">
+                  <c:v>2</c:v>
+                </c:pt>
+                <c:pt idx="2">
+                  <c:v>3</c:v>
+                </c:pt>
+                <c:pt idx="3">
+                  <c:v>4</c:v>
+                </c:pt>
+              </c:numCache>
+            </c:numRef>
+          </c:cat>
+          <c:val>
+            <c:numRef>
+              <c:f>Sheet2!$K$18:$K$21</c:f>
+              <c:numCache>
+                <c:formatCode>General</c:formatCode>
+                <c:ptCount val="4"/>
+                <c:pt idx="0">
+                  <c:v>68.2747585114667</c:v>
+                </c:pt>
+                <c:pt idx="1">
+                  <c:v>70.033995487667298</c:v>
+                </c:pt>
+                <c:pt idx="2">
+                  <c:v>70.742754403914503</c:v>
+                </c:pt>
+                <c:pt idx="3">
+                  <c:v>70.59631712177719</c:v>
+                </c:pt>
+              </c:numCache>
+            </c:numRef>
+          </c:val>
+          <c:extLst>
+            <c:ext xmlns:c16="http://schemas.microsoft.com/office/drawing/2014/chart" uri="{C3380CC4-5D6E-409C-BE32-E72D297353CC}">
+              <c16:uniqueId val="{00000001-D8BF-47CC-96BE-9F0EBA3D7C7D}"/>
+            </c:ext>
+          </c:extLst>
+        </c:ser>
+        <c:dLbls>
+          <c:showLegendKey val="0"/>
+          <c:showVal val="0"/>
+          <c:showCatName val="0"/>
+          <c:showSerName val="0"/>
+          <c:showPercent val="0"/>
+          <c:showBubbleSize val="0"/>
+        </c:dLbls>
+        <c:gapWidth val="219"/>
+        <c:overlap val="-27"/>
+        <c:axId val="416497024"/>
+        <c:axId val="416496696"/>
+      </c:barChart>
+      <c:catAx>
+        <c:axId val="416497024"/>
+        <c:scaling>
+          <c:orientation val="minMax"/>
+        </c:scaling>
+        <c:delete val="0"/>
+        <c:axPos val="b"/>
+        <c:numFmt formatCode="General" sourceLinked="1"/>
+        <c:majorTickMark val="none"/>
+        <c:minorTickMark val="none"/>
+        <c:tickLblPos val="nextTo"/>
+        <c:spPr>
+          <a:noFill/>
+          <a:ln w="9525" cap="flat" cmpd="sng" algn="ctr">
+            <a:solidFill>
+              <a:schemeClr val="tx1">
+                <a:lumMod val="15000"/>
+                <a:lumOff val="85000"/>
+              </a:schemeClr>
+            </a:solidFill>
+            <a:round/>
+          </a:ln>
+          <a:effectLst/>
+        </c:spPr>
+        <c:txPr>
+          <a:bodyPr rot="-60000000" spcFirstLastPara="1" vertOverflow="ellipsis" vert="horz" wrap="square" anchor="ctr" anchorCtr="1"/>
+          <a:lstStyle/>
+          <a:p>
+            <a:pPr>
+              <a:defRPr sz="2000" b="0" i="0" u="none" strike="noStrike" kern="1200" baseline="0">
+                <a:solidFill>
+                  <a:schemeClr val="tx1"/>
+                </a:solidFill>
+                <a:latin typeface="+mn-lt"/>
+                <a:ea typeface="+mn-ea"/>
+                <a:cs typeface="+mn-cs"/>
+              </a:defRPr>
+            </a:pPr>
+            <a:endParaRPr lang="en-US"/>
+          </a:p>
+        </c:txPr>
+        <c:crossAx val="416496696"/>
+        <c:crosses val="autoZero"/>
+        <c:auto val="1"/>
+        <c:lblAlgn val="ctr"/>
+        <c:lblOffset val="100"/>
+        <c:noMultiLvlLbl val="0"/>
+      </c:catAx>
+      <c:valAx>
+        <c:axId val="416496696"/>
+        <c:scaling>
+          <c:orientation val="minMax"/>
+        </c:scaling>
+        <c:delete val="0"/>
+        <c:axPos val="l"/>
+        <c:majorGridlines>
+          <c:spPr>
+            <a:ln w="9525" cap="flat" cmpd="sng" algn="ctr">
+              <a:solidFill>
+                <a:schemeClr val="tx1">
+                  <a:lumMod val="15000"/>
+                  <a:lumOff val="85000"/>
+                </a:schemeClr>
+              </a:solidFill>
+              <a:round/>
+            </a:ln>
+            <a:effectLst/>
+          </c:spPr>
+        </c:majorGridlines>
+        <c:title>
+          <c:tx>
+            <c:rich>
+              <a:bodyPr rot="-5400000" spcFirstLastPara="1" vertOverflow="ellipsis" vert="horz" wrap="square" anchor="ctr" anchorCtr="1"/>
+              <a:lstStyle/>
+              <a:p>
+                <a:pPr>
+                  <a:defRPr sz="1000" b="0" i="0" u="none" strike="noStrike" kern="1200" baseline="0">
+                    <a:solidFill>
+                      <a:schemeClr val="tx1"/>
+                    </a:solidFill>
+                    <a:latin typeface="+mn-lt"/>
+                    <a:ea typeface="+mn-ea"/>
+                    <a:cs typeface="+mn-cs"/>
+                  </a:defRPr>
+                </a:pPr>
+                <a:r>
+                  <a:rPr lang="en-US" sz="2000">
+                    <a:solidFill>
+                      <a:schemeClr val="tx1"/>
+                    </a:solidFill>
+                  </a:rPr>
+                  <a:t>F-Measure</a:t>
+                </a:r>
+              </a:p>
+            </c:rich>
+          </c:tx>
+          <c:overlay val="0"/>
+          <c:spPr>
+            <a:noFill/>
+            <a:ln>
+              <a:noFill/>
+            </a:ln>
+            <a:effectLst/>
+          </c:spPr>
+          <c:txPr>
+            <a:bodyPr rot="-5400000" spcFirstLastPara="1" vertOverflow="ellipsis" vert="horz" wrap="square" anchor="ctr" anchorCtr="1"/>
+            <a:lstStyle/>
+            <a:p>
+              <a:pPr>
+                <a:defRPr sz="1000" b="0" i="0" u="none" strike="noStrike" kern="1200" baseline="0">
+                  <a:solidFill>
+                    <a:schemeClr val="tx1"/>
+                  </a:solidFill>
+                  <a:latin typeface="+mn-lt"/>
+                  <a:ea typeface="+mn-ea"/>
+                  <a:cs typeface="+mn-cs"/>
+                </a:defRPr>
+              </a:pPr>
+              <a:endParaRPr lang="en-US"/>
+            </a:p>
+          </c:txPr>
+        </c:title>
+        <c:numFmt formatCode="General" sourceLinked="1"/>
+        <c:majorTickMark val="none"/>
+        <c:minorTickMark val="none"/>
+        <c:tickLblPos val="nextTo"/>
+        <c:spPr>
+          <a:noFill/>
+          <a:ln>
+            <a:noFill/>
+          </a:ln>
+          <a:effectLst/>
+        </c:spPr>
+        <c:txPr>
+          <a:bodyPr rot="-60000000" spcFirstLastPara="1" vertOverflow="ellipsis" vert="horz" wrap="square" anchor="ctr" anchorCtr="1"/>
+          <a:lstStyle/>
+          <a:p>
+            <a:pPr>
+              <a:defRPr sz="2000" b="0" i="0" u="none" strike="noStrike" kern="1200" baseline="0">
+                <a:solidFill>
+                  <a:schemeClr val="tx1"/>
+                </a:solidFill>
+                <a:latin typeface="+mn-lt"/>
+                <a:ea typeface="+mn-ea"/>
+                <a:cs typeface="+mn-cs"/>
+              </a:defRPr>
+            </a:pPr>
+            <a:endParaRPr lang="en-US"/>
+          </a:p>
+        </c:txPr>
+        <c:crossAx val="416497024"/>
+        <c:crosses val="autoZero"/>
+        <c:crossBetween val="between"/>
+      </c:valAx>
+      <c:spPr>
+        <a:noFill/>
+        <a:ln>
+          <a:noFill/>
+        </a:ln>
+        <a:effectLst/>
+      </c:spPr>
+    </c:plotArea>
+    <c:legend>
+      <c:legendPos val="b"/>
+      <c:overlay val="0"/>
+      <c:spPr>
+        <a:noFill/>
+        <a:ln>
+          <a:noFill/>
+        </a:ln>
+        <a:effectLst/>
+      </c:spPr>
+      <c:txPr>
+        <a:bodyPr rot="0" spcFirstLastPara="1" vertOverflow="ellipsis" vert="horz" wrap="square" anchor="ctr" anchorCtr="1"/>
+        <a:lstStyle/>
+        <a:p>
+          <a:pPr>
+            <a:defRPr sz="2000" b="0" i="0" u="none" strike="noStrike" kern="1200" baseline="0">
+              <a:solidFill>
+                <a:schemeClr val="tx1"/>
+              </a:solidFill>
+              <a:latin typeface="+mn-lt"/>
+              <a:ea typeface="+mn-ea"/>
+              <a:cs typeface="+mn-cs"/>
+            </a:defRPr>
+          </a:pPr>
+          <a:endParaRPr lang="en-US"/>
+        </a:p>
+      </c:txPr>
+    </c:legend>
+    <c:plotVisOnly val="1"/>
+    <c:dispBlanksAs val="gap"/>
+    <c:showDLblsOverMax val="0"/>
+  </c:chart>
+  <c:spPr>
+    <a:noFill/>
+    <a:ln>
+      <a:noFill/>
+    </a:ln>
+    <a:effectLst/>
+  </c:spPr>
+  <c:txPr>
+    <a:bodyPr/>
+    <a:lstStyle/>
+    <a:p>
+      <a:pPr>
+        <a:defRPr/>
+      </a:pPr>
+      <a:endParaRPr lang="en-US"/>
+    </a:p>
+  </c:txPr>
+  <c:externalData r:id="rId3">
+    <c:autoUpdate val="0"/>
+  </c:externalData>
+</c:chartSpace>
+</file>
+
+<file path=ppt/charts/chart4.xml><?xml version="1.0" encoding="utf-8"?>
+<c:chartSpace xmlns:c="http://schemas.openxmlformats.org/drawingml/2006/chart" xmlns:a="http://schemas.openxmlformats.org/drawingml/2006/main" xmlns:r="http://schemas.openxmlformats.org/officeDocument/2006/relationships" xmlns:c16r2="http://schemas.microsoft.com/office/drawing/2015/06/chart">
+  <c:date1904 val="0"/>
+  <c:lang val="en-US"/>
+  <c:roundedCorners val="0"/>
+  <mc:AlternateContent xmlns:mc="http://schemas.openxmlformats.org/markup-compatibility/2006">
+    <mc:Choice xmlns:c14="http://schemas.microsoft.com/office/drawing/2007/8/2/chart" Requires="c14">
+      <c14:style val="102"/>
+    </mc:Choice>
+    <mc:Fallback>
+      <c:style val="2"/>
+    </mc:Fallback>
+  </mc:AlternateContent>
+  <c:chart>
+    <c:autoTitleDeleted val="1"/>
+    <c:plotArea>
+      <c:layout/>
+      <c:scatterChart>
+        <c:scatterStyle val="lineMarker"/>
+        <c:varyColors val="0"/>
+        <c:ser>
+          <c:idx val="0"/>
+          <c:order val="0"/>
+          <c:spPr>
+            <a:ln w="28575" cap="rnd">
+              <a:solidFill>
+                <a:sysClr val="windowText" lastClr="000000"/>
+              </a:solidFill>
+              <a:round/>
+            </a:ln>
+            <a:effectLst/>
+          </c:spPr>
+          <c:marker>
+            <c:symbol val="circle"/>
+            <c:size val="5"/>
+            <c:spPr>
+              <a:solidFill>
+                <a:schemeClr val="bg1"/>
+              </a:solidFill>
+              <a:ln w="28575">
+                <a:solidFill>
+                  <a:sysClr val="windowText" lastClr="000000"/>
+                </a:solidFill>
+              </a:ln>
+              <a:effectLst/>
+            </c:spPr>
+          </c:marker>
+          <c:xVal>
+            <c:numRef>
+              <c:f>Sheet4!$G$12:$G$19</c:f>
+              <c:numCache>
+                <c:formatCode>General</c:formatCode>
+                <c:ptCount val="8"/>
+                <c:pt idx="0">
+                  <c:v>316</c:v>
+                </c:pt>
+                <c:pt idx="1">
+                  <c:v>332</c:v>
+                </c:pt>
+                <c:pt idx="2">
+                  <c:v>352</c:v>
+                </c:pt>
+                <c:pt idx="3">
+                  <c:v>368</c:v>
+                </c:pt>
+                <c:pt idx="4">
+                  <c:v>388</c:v>
+                </c:pt>
+                <c:pt idx="5">
+                  <c:v>404</c:v>
+                </c:pt>
+                <c:pt idx="6">
+                  <c:v>420</c:v>
+                </c:pt>
+                <c:pt idx="7">
+                  <c:v>440</c:v>
+                </c:pt>
+              </c:numCache>
+            </c:numRef>
+          </c:xVal>
+          <c:yVal>
+            <c:numRef>
+              <c:f>Sheet4!$H$12:$H$19</c:f>
+              <c:numCache>
+                <c:formatCode>General</c:formatCode>
+                <c:ptCount val="8"/>
+                <c:pt idx="0">
+                  <c:v>421</c:v>
+                </c:pt>
+                <c:pt idx="1">
+                  <c:v>433</c:v>
+                </c:pt>
+                <c:pt idx="2">
+                  <c:v>439</c:v>
+                </c:pt>
+                <c:pt idx="3">
+                  <c:v>467</c:v>
+                </c:pt>
+                <c:pt idx="4">
+                  <c:v>488</c:v>
+                </c:pt>
+                <c:pt idx="5">
+                  <c:v>496</c:v>
+                </c:pt>
+                <c:pt idx="6">
+                  <c:v>532</c:v>
+                </c:pt>
+                <c:pt idx="7">
+                  <c:v>563</c:v>
+                </c:pt>
+              </c:numCache>
+            </c:numRef>
+          </c:yVal>
+          <c:smooth val="0"/>
+          <c:extLst>
+            <c:ext xmlns:c16="http://schemas.microsoft.com/office/drawing/2014/chart" uri="{C3380CC4-5D6E-409C-BE32-E72D297353CC}">
+              <c16:uniqueId val="{00000000-873F-4443-B1E7-1EDA03AF166F}"/>
+            </c:ext>
+          </c:extLst>
+        </c:ser>
+        <c:dLbls>
+          <c:showLegendKey val="0"/>
+          <c:showVal val="0"/>
+          <c:showCatName val="0"/>
+          <c:showSerName val="0"/>
+          <c:showPercent val="0"/>
+          <c:showBubbleSize val="0"/>
+        </c:dLbls>
+        <c:axId val="322926088"/>
+        <c:axId val="322927400"/>
+      </c:scatterChart>
+      <c:valAx>
+        <c:axId val="322926088"/>
+        <c:scaling>
+          <c:orientation val="minMax"/>
+          <c:min val="280"/>
+        </c:scaling>
+        <c:delete val="0"/>
+        <c:axPos val="b"/>
+        <c:majorGridlines>
+          <c:spPr>
+            <a:ln w="9525" cap="flat" cmpd="sng" algn="ctr">
+              <a:solidFill>
+                <a:schemeClr val="tx1">
+                  <a:lumMod val="15000"/>
+                  <a:lumOff val="85000"/>
+                </a:schemeClr>
+              </a:solidFill>
+              <a:round/>
+            </a:ln>
+            <a:effectLst/>
+          </c:spPr>
+        </c:majorGridlines>
+        <c:title>
+          <c:tx>
+            <c:rich>
+              <a:bodyPr rot="0" spcFirstLastPara="1" vertOverflow="ellipsis" vert="horz" wrap="square" anchor="ctr" anchorCtr="1"/>
+              <a:lstStyle/>
+              <a:p>
+                <a:pPr>
+                  <a:defRPr sz="1000" b="0" i="0" u="none" strike="noStrike" kern="1200" baseline="0">
+                    <a:solidFill>
+                      <a:schemeClr val="tx1">
+                        <a:lumMod val="65000"/>
+                        <a:lumOff val="35000"/>
+                      </a:schemeClr>
+                    </a:solidFill>
+                    <a:latin typeface="+mn-lt"/>
+                    <a:ea typeface="+mn-ea"/>
+                    <a:cs typeface="+mn-cs"/>
+                  </a:defRPr>
+                </a:pPr>
+                <a:r>
+                  <a:rPr lang="en-US" sz="2000">
+                    <a:solidFill>
+                      <a:schemeClr val="tx1"/>
+                    </a:solidFill>
+                  </a:rPr>
+                  <a:t>Sô</a:t>
+                </a:r>
+                <a:r>
+                  <a:rPr lang="en-US" sz="2000" baseline="0">
+                    <a:solidFill>
+                      <a:schemeClr val="tx1"/>
+                    </a:solidFill>
+                  </a:rPr>
+                  <a:t> câu trong tập huấn luyện</a:t>
+                </a:r>
+                <a:endParaRPr lang="en-US" sz="2000">
+                  <a:solidFill>
+                    <a:schemeClr val="tx1"/>
+                  </a:solidFill>
+                </a:endParaRPr>
+              </a:p>
+            </c:rich>
+          </c:tx>
+          <c:overlay val="0"/>
+          <c:spPr>
+            <a:noFill/>
+            <a:ln>
+              <a:noFill/>
+            </a:ln>
+            <a:effectLst/>
+          </c:spPr>
+          <c:txPr>
+            <a:bodyPr rot="0" spcFirstLastPara="1" vertOverflow="ellipsis" vert="horz" wrap="square" anchor="ctr" anchorCtr="1"/>
+            <a:lstStyle/>
+            <a:p>
+              <a:pPr>
+                <a:defRPr sz="1000" b="0" i="0" u="none" strike="noStrike" kern="1200" baseline="0">
+                  <a:solidFill>
+                    <a:schemeClr val="tx1">
+                      <a:lumMod val="65000"/>
+                      <a:lumOff val="35000"/>
+                    </a:schemeClr>
+                  </a:solidFill>
+                  <a:latin typeface="+mn-lt"/>
+                  <a:ea typeface="+mn-ea"/>
+                  <a:cs typeface="+mn-cs"/>
+                </a:defRPr>
+              </a:pPr>
+              <a:endParaRPr lang="en-US"/>
+            </a:p>
+          </c:txPr>
+        </c:title>
+        <c:numFmt formatCode="General" sourceLinked="1"/>
+        <c:majorTickMark val="none"/>
+        <c:minorTickMark val="none"/>
+        <c:tickLblPos val="nextTo"/>
+        <c:spPr>
+          <a:noFill/>
+          <a:ln w="9525" cap="flat" cmpd="sng" algn="ctr">
+            <a:solidFill>
+              <a:schemeClr val="tx1">
+                <a:lumMod val="25000"/>
+                <a:lumOff val="75000"/>
+              </a:schemeClr>
+            </a:solidFill>
+            <a:round/>
+          </a:ln>
+          <a:effectLst/>
+        </c:spPr>
+        <c:txPr>
+          <a:bodyPr rot="-60000000" spcFirstLastPara="1" vertOverflow="ellipsis" vert="horz" wrap="square" anchor="ctr" anchorCtr="1"/>
+          <a:lstStyle/>
+          <a:p>
+            <a:pPr>
+              <a:defRPr sz="2000" b="0" i="0" u="none" strike="noStrike" kern="1200" baseline="0">
+                <a:solidFill>
+                  <a:schemeClr val="tx1"/>
+                </a:solidFill>
+                <a:latin typeface="+mn-lt"/>
+                <a:ea typeface="+mn-ea"/>
+                <a:cs typeface="+mn-cs"/>
+              </a:defRPr>
+            </a:pPr>
+            <a:endParaRPr lang="en-US"/>
+          </a:p>
+        </c:txPr>
+        <c:crossAx val="322927400"/>
+        <c:crosses val="autoZero"/>
+        <c:crossBetween val="midCat"/>
+      </c:valAx>
+      <c:valAx>
+        <c:axId val="322927400"/>
+        <c:scaling>
+          <c:orientation val="minMax"/>
+          <c:max val="650"/>
+          <c:min val="300"/>
+        </c:scaling>
+        <c:delete val="0"/>
+        <c:axPos val="l"/>
+        <c:majorGridlines>
+          <c:spPr>
+            <a:ln w="9525" cap="flat" cmpd="sng" algn="ctr">
+              <a:solidFill>
+                <a:schemeClr val="tx1">
+                  <a:lumMod val="15000"/>
+                  <a:lumOff val="85000"/>
+                </a:schemeClr>
+              </a:solidFill>
+              <a:round/>
+            </a:ln>
+            <a:effectLst/>
+          </c:spPr>
+        </c:majorGridlines>
+        <c:title>
+          <c:tx>
+            <c:rich>
+              <a:bodyPr rot="-5400000" spcFirstLastPara="1" vertOverflow="ellipsis" vert="horz" wrap="square" anchor="ctr" anchorCtr="1"/>
+              <a:lstStyle/>
+              <a:p>
+                <a:pPr>
+                  <a:defRPr sz="2000" b="0" i="0" u="none" strike="noStrike" kern="1200" baseline="0">
+                    <a:solidFill>
+                      <a:schemeClr val="tx1"/>
+                    </a:solidFill>
+                    <a:latin typeface="+mn-lt"/>
+                    <a:ea typeface="+mn-ea"/>
+                    <a:cs typeface="+mn-cs"/>
+                  </a:defRPr>
+                </a:pPr>
+                <a:r>
+                  <a:rPr lang="en-US" sz="2000">
+                    <a:solidFill>
+                      <a:schemeClr val="tx1"/>
+                    </a:solidFill>
+                  </a:rPr>
+                  <a:t>Kích</a:t>
+                </a:r>
+                <a:r>
+                  <a:rPr lang="en-US" sz="2000" baseline="0">
+                    <a:solidFill>
+                      <a:schemeClr val="tx1"/>
+                    </a:solidFill>
+                  </a:rPr>
+                  <a:t> thước tập từ vựng T</a:t>
+                </a:r>
+                <a:endParaRPr lang="en-US" sz="2000">
+                  <a:solidFill>
+                    <a:schemeClr val="tx1"/>
+                  </a:solidFill>
+                </a:endParaRPr>
+              </a:p>
+            </c:rich>
+          </c:tx>
+          <c:layout>
+            <c:manualLayout>
+              <c:xMode val="edge"/>
+              <c:yMode val="edge"/>
+              <c:x val="2.4731182272221186E-3"/>
+              <c:y val="0.22827189565648062"/>
+            </c:manualLayout>
+          </c:layout>
+          <c:overlay val="0"/>
+          <c:spPr>
+            <a:noFill/>
+            <a:ln>
+              <a:noFill/>
+            </a:ln>
+            <a:effectLst/>
+          </c:spPr>
+          <c:txPr>
+            <a:bodyPr rot="-5400000" spcFirstLastPara="1" vertOverflow="ellipsis" vert="horz" wrap="square" anchor="ctr" anchorCtr="1"/>
+            <a:lstStyle/>
+            <a:p>
+              <a:pPr>
+                <a:defRPr sz="2000" b="0" i="0" u="none" strike="noStrike" kern="1200" baseline="0">
+                  <a:solidFill>
+                    <a:schemeClr val="tx1"/>
+                  </a:solidFill>
+                  <a:latin typeface="+mn-lt"/>
+                  <a:ea typeface="+mn-ea"/>
+                  <a:cs typeface="+mn-cs"/>
+                </a:defRPr>
+              </a:pPr>
+              <a:endParaRPr lang="en-US"/>
+            </a:p>
+          </c:txPr>
+        </c:title>
+        <c:numFmt formatCode="General" sourceLinked="1"/>
+        <c:majorTickMark val="none"/>
+        <c:minorTickMark val="none"/>
+        <c:tickLblPos val="nextTo"/>
+        <c:spPr>
+          <a:noFill/>
+          <a:ln w="9525" cap="flat" cmpd="sng" algn="ctr">
+            <a:solidFill>
+              <a:schemeClr val="tx1">
+                <a:lumMod val="25000"/>
+                <a:lumOff val="75000"/>
+              </a:schemeClr>
+            </a:solidFill>
+            <a:round/>
+          </a:ln>
+          <a:effectLst/>
+        </c:spPr>
+        <c:txPr>
+          <a:bodyPr rot="-60000000" spcFirstLastPara="1" vertOverflow="ellipsis" vert="horz" wrap="square" anchor="ctr" anchorCtr="1"/>
+          <a:lstStyle/>
+          <a:p>
+            <a:pPr>
+              <a:defRPr sz="2000" b="0" i="0" u="none" strike="noStrike" kern="1200" baseline="0">
+                <a:solidFill>
+                  <a:schemeClr val="tx1"/>
+                </a:solidFill>
+                <a:latin typeface="+mn-lt"/>
+                <a:ea typeface="+mn-ea"/>
+                <a:cs typeface="+mn-cs"/>
+              </a:defRPr>
+            </a:pPr>
+            <a:endParaRPr lang="en-US"/>
+          </a:p>
+        </c:txPr>
+        <c:crossAx val="322926088"/>
+        <c:crosses val="autoZero"/>
+        <c:crossBetween val="midCat"/>
+      </c:valAx>
+      <c:spPr>
+        <a:noFill/>
+        <a:ln>
+          <a:noFill/>
+        </a:ln>
+        <a:effectLst/>
+      </c:spPr>
+    </c:plotArea>
+    <c:plotVisOnly val="1"/>
+    <c:dispBlanksAs val="gap"/>
+    <c:showDLblsOverMax val="0"/>
+  </c:chart>
+  <c:spPr>
+    <a:noFill/>
+    <a:ln>
+      <a:noFill/>
+    </a:ln>
+    <a:effectLst/>
+  </c:spPr>
+  <c:txPr>
+    <a:bodyPr/>
+    <a:lstStyle/>
+    <a:p>
+      <a:pPr>
+        <a:defRPr/>
+      </a:pPr>
+      <a:endParaRPr lang="en-US"/>
+    </a:p>
+  </c:txPr>
+  <c:externalData r:id="rId3">
+    <c:autoUpdate val="0"/>
+  </c:externalData>
+</c:chartSpace>
+</file>
+
+<file path=ppt/charts/chart5.xml><?xml version="1.0" encoding="utf-8"?>
+<c:chartSpace xmlns:c="http://schemas.openxmlformats.org/drawingml/2006/chart" xmlns:a="http://schemas.openxmlformats.org/drawingml/2006/main" xmlns:r="http://schemas.openxmlformats.org/officeDocument/2006/relationships" xmlns:c16r2="http://schemas.microsoft.com/office/drawing/2015/06/chart">
+  <c:date1904 val="0"/>
+  <c:lang val="en-US"/>
+  <c:roundedCorners val="0"/>
+  <mc:AlternateContent xmlns:mc="http://schemas.openxmlformats.org/markup-compatibility/2006">
+    <mc:Choice xmlns:c14="http://schemas.microsoft.com/office/drawing/2007/8/2/chart" Requires="c14">
+      <c14:style val="102"/>
+    </mc:Choice>
+    <mc:Fallback>
+      <c:style val="2"/>
+    </mc:Fallback>
+  </mc:AlternateContent>
+  <c:chart>
+    <c:autoTitleDeleted val="1"/>
+    <c:plotArea>
+      <c:layout/>
+      <c:scatterChart>
+        <c:scatterStyle val="lineMarker"/>
+        <c:varyColors val="0"/>
+        <c:ser>
+          <c:idx val="0"/>
+          <c:order val="0"/>
+          <c:spPr>
+            <a:ln w="28575" cap="rnd">
+              <a:solidFill>
+                <a:sysClr val="windowText" lastClr="000000"/>
+              </a:solidFill>
+              <a:round/>
+            </a:ln>
+            <a:effectLst/>
+          </c:spPr>
+          <c:marker>
+            <c:symbol val="circle"/>
+            <c:size val="5"/>
+            <c:spPr>
+              <a:solidFill>
+                <a:schemeClr val="bg1"/>
+              </a:solidFill>
+              <a:ln w="28575">
+                <a:solidFill>
+                  <a:sysClr val="windowText" lastClr="000000"/>
+                </a:solidFill>
+              </a:ln>
+              <a:effectLst/>
+            </c:spPr>
+          </c:marker>
+          <c:trendline>
+            <c:spPr>
+              <a:ln w="28575" cap="rnd">
+                <a:solidFill>
+                  <a:schemeClr val="tx1"/>
+                </a:solidFill>
+                <a:prstDash val="sysDot"/>
+              </a:ln>
+              <a:effectLst/>
+            </c:spPr>
+            <c:trendlineType val="linear"/>
+            <c:dispRSqr val="0"/>
+            <c:dispEq val="0"/>
+          </c:trendline>
+          <c:xVal>
+            <c:numRef>
+              <c:f>Sheet4!$G$12:$G$19</c:f>
+              <c:numCache>
+                <c:formatCode>General</c:formatCode>
+                <c:ptCount val="8"/>
+                <c:pt idx="0">
+                  <c:v>316</c:v>
+                </c:pt>
+                <c:pt idx="1">
+                  <c:v>332</c:v>
+                </c:pt>
+                <c:pt idx="2">
+                  <c:v>352</c:v>
+                </c:pt>
+                <c:pt idx="3">
+                  <c:v>368</c:v>
+                </c:pt>
+                <c:pt idx="4">
+                  <c:v>388</c:v>
+                </c:pt>
+                <c:pt idx="5">
+                  <c:v>404</c:v>
+                </c:pt>
+                <c:pt idx="6">
+                  <c:v>420</c:v>
+                </c:pt>
+                <c:pt idx="7">
+                  <c:v>440</c:v>
+                </c:pt>
+              </c:numCache>
+            </c:numRef>
+          </c:xVal>
+          <c:yVal>
+            <c:numRef>
+              <c:f>Sheet4!$I$12:$I$19</c:f>
+              <c:numCache>
+                <c:formatCode>General</c:formatCode>
+                <c:ptCount val="8"/>
+                <c:pt idx="0">
+                  <c:v>0.64719082588178301</c:v>
+                </c:pt>
+                <c:pt idx="1">
+                  <c:v>0.64807561094343102</c:v>
+                </c:pt>
+                <c:pt idx="2">
+                  <c:v>0.65657418327467598</c:v>
+                </c:pt>
+                <c:pt idx="3">
+                  <c:v>0.66773183739432396</c:v>
+                </c:pt>
+                <c:pt idx="4">
+                  <c:v>0.67651327317715804</c:v>
+                </c:pt>
+                <c:pt idx="5">
+                  <c:v>0.67654469948501095</c:v>
+                </c:pt>
+                <c:pt idx="6">
+                  <c:v>0.68191580129639895</c:v>
+                </c:pt>
+                <c:pt idx="7">
+                  <c:v>0.67848340138447905</c:v>
+                </c:pt>
+              </c:numCache>
+            </c:numRef>
+          </c:yVal>
+          <c:smooth val="0"/>
+          <c:extLst>
+            <c:ext xmlns:c16="http://schemas.microsoft.com/office/drawing/2014/chart" uri="{C3380CC4-5D6E-409C-BE32-E72D297353CC}">
+              <c16:uniqueId val="{00000001-9638-4060-90DC-4BF669C58F74}"/>
+            </c:ext>
+          </c:extLst>
+        </c:ser>
+        <c:dLbls>
+          <c:showLegendKey val="0"/>
+          <c:showVal val="0"/>
+          <c:showCatName val="0"/>
+          <c:showSerName val="0"/>
+          <c:showPercent val="0"/>
+          <c:showBubbleSize val="0"/>
+        </c:dLbls>
+        <c:axId val="442722120"/>
+        <c:axId val="442728352"/>
+      </c:scatterChart>
+      <c:valAx>
+        <c:axId val="442722120"/>
+        <c:scaling>
+          <c:orientation val="minMax"/>
+          <c:min val="300"/>
+        </c:scaling>
+        <c:delete val="0"/>
+        <c:axPos val="b"/>
+        <c:majorGridlines>
+          <c:spPr>
+            <a:ln w="9525" cap="flat" cmpd="sng" algn="ctr">
+              <a:solidFill>
+                <a:schemeClr val="tx1">
+                  <a:lumMod val="15000"/>
+                  <a:lumOff val="85000"/>
+                </a:schemeClr>
+              </a:solidFill>
+              <a:round/>
+            </a:ln>
+            <a:effectLst/>
+          </c:spPr>
+        </c:majorGridlines>
+        <c:title>
+          <c:tx>
+            <c:rich>
+              <a:bodyPr rot="0" spcFirstLastPara="1" vertOverflow="ellipsis" vert="horz" wrap="square" anchor="ctr" anchorCtr="1"/>
+              <a:lstStyle/>
+              <a:p>
+                <a:pPr>
+                  <a:defRPr sz="2000" b="0" i="0" u="none" strike="noStrike" kern="1200" baseline="0">
+                    <a:solidFill>
+                      <a:schemeClr val="tx1"/>
+                    </a:solidFill>
+                    <a:latin typeface="+mn-lt"/>
+                    <a:ea typeface="+mn-ea"/>
+                    <a:cs typeface="+mn-cs"/>
+                  </a:defRPr>
+                </a:pPr>
+                <a:r>
+                  <a:rPr lang="en-US" sz="2000">
+                    <a:solidFill>
+                      <a:schemeClr val="tx1"/>
+                    </a:solidFill>
+                  </a:rPr>
+                  <a:t>Số</a:t>
+                </a:r>
+                <a:r>
+                  <a:rPr lang="en-US" sz="2000" baseline="0">
+                    <a:solidFill>
+                      <a:schemeClr val="tx1"/>
+                    </a:solidFill>
+                  </a:rPr>
+                  <a:t> câu trong tập huấn luyện</a:t>
+                </a:r>
+                <a:endParaRPr lang="en-US" sz="2000">
+                  <a:solidFill>
+                    <a:schemeClr val="tx1"/>
+                  </a:solidFill>
+                </a:endParaRPr>
+              </a:p>
+            </c:rich>
+          </c:tx>
+          <c:layout>
+            <c:manualLayout>
+              <c:xMode val="edge"/>
+              <c:yMode val="edge"/>
+              <c:x val="0.37713407148845801"/>
+              <c:y val="0.93406876582032672"/>
+            </c:manualLayout>
+          </c:layout>
+          <c:overlay val="0"/>
+          <c:spPr>
+            <a:noFill/>
+            <a:ln>
+              <a:noFill/>
+            </a:ln>
+            <a:effectLst/>
+          </c:spPr>
+          <c:txPr>
+            <a:bodyPr rot="0" spcFirstLastPara="1" vertOverflow="ellipsis" vert="horz" wrap="square" anchor="ctr" anchorCtr="1"/>
+            <a:lstStyle/>
+            <a:p>
+              <a:pPr>
+                <a:defRPr sz="2000" b="0" i="0" u="none" strike="noStrike" kern="1200" baseline="0">
+                  <a:solidFill>
+                    <a:schemeClr val="tx1"/>
+                  </a:solidFill>
+                  <a:latin typeface="+mn-lt"/>
+                  <a:ea typeface="+mn-ea"/>
+                  <a:cs typeface="+mn-cs"/>
+                </a:defRPr>
+              </a:pPr>
+              <a:endParaRPr lang="en-US"/>
+            </a:p>
+          </c:txPr>
+        </c:title>
+        <c:numFmt formatCode="General" sourceLinked="1"/>
+        <c:majorTickMark val="none"/>
+        <c:minorTickMark val="none"/>
+        <c:tickLblPos val="nextTo"/>
+        <c:spPr>
+          <a:noFill/>
+          <a:ln w="9525" cap="flat" cmpd="sng" algn="ctr">
+            <a:solidFill>
+              <a:schemeClr val="tx1">
+                <a:lumMod val="25000"/>
+                <a:lumOff val="75000"/>
+              </a:schemeClr>
+            </a:solidFill>
+            <a:round/>
+          </a:ln>
+          <a:effectLst/>
+        </c:spPr>
+        <c:txPr>
+          <a:bodyPr rot="-60000000" spcFirstLastPara="1" vertOverflow="ellipsis" vert="horz" wrap="square" anchor="ctr" anchorCtr="1"/>
+          <a:lstStyle/>
+          <a:p>
+            <a:pPr>
+              <a:defRPr sz="2000" b="0" i="0" u="none" strike="noStrike" kern="1200" baseline="0">
+                <a:solidFill>
+                  <a:schemeClr val="tx1"/>
+                </a:solidFill>
+                <a:latin typeface="+mn-lt"/>
+                <a:ea typeface="+mn-ea"/>
+                <a:cs typeface="+mn-cs"/>
+              </a:defRPr>
+            </a:pPr>
+            <a:endParaRPr lang="en-US"/>
+          </a:p>
+        </c:txPr>
+        <c:crossAx val="442728352"/>
+        <c:crosses val="autoZero"/>
+        <c:crossBetween val="midCat"/>
+      </c:valAx>
+      <c:valAx>
+        <c:axId val="442728352"/>
+        <c:scaling>
+          <c:orientation val="minMax"/>
+        </c:scaling>
+        <c:delete val="0"/>
+        <c:axPos val="l"/>
+        <c:majorGridlines>
+          <c:spPr>
+            <a:ln w="9525" cap="flat" cmpd="sng" algn="ctr">
+              <a:solidFill>
+                <a:schemeClr val="tx1">
+                  <a:lumMod val="15000"/>
+                  <a:lumOff val="85000"/>
+                </a:schemeClr>
+              </a:solidFill>
+              <a:round/>
+            </a:ln>
+            <a:effectLst/>
+          </c:spPr>
+        </c:majorGridlines>
+        <c:title>
+          <c:tx>
+            <c:rich>
+              <a:bodyPr rot="-5400000" spcFirstLastPara="1" vertOverflow="ellipsis" vert="horz" wrap="square" anchor="ctr" anchorCtr="1"/>
+              <a:lstStyle/>
+              <a:p>
+                <a:pPr>
+                  <a:defRPr sz="2000" b="0" i="0" u="none" strike="noStrike" kern="1200" baseline="0">
+                    <a:solidFill>
+                      <a:schemeClr val="tx1"/>
+                    </a:solidFill>
+                    <a:latin typeface="+mn-lt"/>
+                    <a:ea typeface="+mn-ea"/>
+                    <a:cs typeface="+mn-cs"/>
+                  </a:defRPr>
+                </a:pPr>
+                <a:r>
+                  <a:rPr lang="en-US" sz="2000">
+                    <a:solidFill>
+                      <a:schemeClr val="tx1"/>
+                    </a:solidFill>
+                  </a:rPr>
+                  <a:t>F-measure</a:t>
+                </a:r>
+              </a:p>
+            </c:rich>
+          </c:tx>
+          <c:layout>
+            <c:manualLayout>
+              <c:xMode val="edge"/>
+              <c:yMode val="edge"/>
+              <c:x val="0"/>
+              <c:y val="0.34579516635716684"/>
+            </c:manualLayout>
+          </c:layout>
+          <c:overlay val="0"/>
+          <c:spPr>
+            <a:noFill/>
+            <a:ln>
+              <a:noFill/>
+            </a:ln>
+            <a:effectLst/>
+          </c:spPr>
+          <c:txPr>
+            <a:bodyPr rot="-5400000" spcFirstLastPara="1" vertOverflow="ellipsis" vert="horz" wrap="square" anchor="ctr" anchorCtr="1"/>
+            <a:lstStyle/>
+            <a:p>
+              <a:pPr>
+                <a:defRPr sz="2000" b="0" i="0" u="none" strike="noStrike" kern="1200" baseline="0">
+                  <a:solidFill>
+                    <a:schemeClr val="tx1"/>
+                  </a:solidFill>
+                  <a:latin typeface="+mn-lt"/>
+                  <a:ea typeface="+mn-ea"/>
+                  <a:cs typeface="+mn-cs"/>
+                </a:defRPr>
+              </a:pPr>
+              <a:endParaRPr lang="en-US"/>
+            </a:p>
+          </c:txPr>
+        </c:title>
+        <c:numFmt formatCode="General" sourceLinked="1"/>
+        <c:majorTickMark val="none"/>
+        <c:minorTickMark val="none"/>
+        <c:tickLblPos val="nextTo"/>
+        <c:spPr>
+          <a:noFill/>
+          <a:ln w="9525" cap="flat" cmpd="sng" algn="ctr">
+            <a:solidFill>
+              <a:schemeClr val="tx1">
+                <a:lumMod val="25000"/>
+                <a:lumOff val="75000"/>
+              </a:schemeClr>
+            </a:solidFill>
+            <a:round/>
+          </a:ln>
+          <a:effectLst/>
+        </c:spPr>
+        <c:txPr>
+          <a:bodyPr rot="-60000000" spcFirstLastPara="1" vertOverflow="ellipsis" vert="horz" wrap="square" anchor="ctr" anchorCtr="1"/>
+          <a:lstStyle/>
+          <a:p>
+            <a:pPr>
+              <a:defRPr sz="2000" b="0" i="0" u="none" strike="noStrike" kern="1200" baseline="0">
+                <a:solidFill>
+                  <a:schemeClr val="tx1"/>
+                </a:solidFill>
+                <a:latin typeface="+mn-lt"/>
+                <a:ea typeface="+mn-ea"/>
+                <a:cs typeface="+mn-cs"/>
+              </a:defRPr>
+            </a:pPr>
+            <a:endParaRPr lang="en-US"/>
+          </a:p>
+        </c:txPr>
+        <c:crossAx val="442722120"/>
+        <c:crosses val="autoZero"/>
+        <c:crossBetween val="midCat"/>
+      </c:valAx>
+      <c:spPr>
+        <a:noFill/>
+        <a:ln>
+          <a:noFill/>
+        </a:ln>
+        <a:effectLst/>
+      </c:spPr>
+    </c:plotArea>
+    <c:plotVisOnly val="1"/>
+    <c:dispBlanksAs val="gap"/>
+    <c:showDLblsOverMax val="0"/>
+  </c:chart>
+  <c:spPr>
+    <a:noFill/>
+    <a:ln>
+      <a:noFill/>
+    </a:ln>
+    <a:effectLst/>
+  </c:spPr>
+  <c:txPr>
+    <a:bodyPr/>
+    <a:lstStyle/>
+    <a:p>
+      <a:pPr>
+        <a:defRPr/>
+      </a:pPr>
+      <a:endParaRPr lang="en-US"/>
+    </a:p>
+  </c:txPr>
+  <c:externalData r:id="rId3">
+    <c:autoUpdate val="0"/>
+  </c:externalData>
+</c:chartSpace>
+</file>
+
+<file path=ppt/charts/chart6.xml><?xml version="1.0" encoding="utf-8"?>
+<c:chartSpace xmlns:c="http://schemas.openxmlformats.org/drawingml/2006/chart" xmlns:a="http://schemas.openxmlformats.org/drawingml/2006/main" xmlns:r="http://schemas.openxmlformats.org/officeDocument/2006/relationships" xmlns:c16r2="http://schemas.microsoft.com/office/drawing/2015/06/chart">
+  <c:date1904 val="0"/>
+  <c:lang val="en-US"/>
+  <c:roundedCorners val="0"/>
+  <mc:AlternateContent xmlns:mc="http://schemas.openxmlformats.org/markup-compatibility/2006">
+    <mc:Choice xmlns:c14="http://schemas.microsoft.com/office/drawing/2007/8/2/chart" Requires="c14">
+      <c14:style val="102"/>
+    </mc:Choice>
+    <mc:Fallback>
+      <c:style val="2"/>
+    </mc:Fallback>
+  </mc:AlternateContent>
+  <c:chart>
+    <c:autoTitleDeleted val="1"/>
+    <c:plotArea>
+      <c:layout/>
+      <c:barChart>
+        <c:barDir val="col"/>
+        <c:grouping val="clustered"/>
+        <c:varyColors val="0"/>
+        <c:ser>
+          <c:idx val="0"/>
+          <c:order val="0"/>
+          <c:tx>
+            <c:strRef>
+              <c:f>Sheet2!$E$18</c:f>
+              <c:strCache>
+                <c:ptCount val="1"/>
+                <c:pt idx="0">
+                  <c:v>P</c:v>
+                </c:pt>
+              </c:strCache>
+            </c:strRef>
+          </c:tx>
+          <c:spPr>
+            <a:solidFill>
+              <a:schemeClr val="bg1"/>
+            </a:solidFill>
+            <a:ln>
+              <a:solidFill>
+                <a:schemeClr val="tx1"/>
+              </a:solidFill>
+            </a:ln>
+            <a:effectLst/>
+          </c:spPr>
+          <c:invertIfNegative val="0"/>
+          <c:cat>
+            <c:strRef>
+              <c:f>Sheet2!$F$17:$H$17</c:f>
+              <c:strCache>
+                <c:ptCount val="3"/>
+                <c:pt idx="0">
+                  <c:v>NEG</c:v>
+                </c:pt>
+                <c:pt idx="1">
+                  <c:v>NEU</c:v>
+                </c:pt>
+                <c:pt idx="2">
+                  <c:v>POS</c:v>
+                </c:pt>
+              </c:strCache>
+            </c:strRef>
+          </c:cat>
+          <c:val>
+            <c:numRef>
+              <c:f>Sheet2!$F$18:$H$18</c:f>
+              <c:numCache>
+                <c:formatCode>General</c:formatCode>
+                <c:ptCount val="3"/>
+                <c:pt idx="0">
+                  <c:v>0.52200776000000004</c:v>
+                </c:pt>
+                <c:pt idx="1">
+                  <c:v>0.70063297999999996</c:v>
+                </c:pt>
+                <c:pt idx="2">
+                  <c:v>0.77762600999999998</c:v>
+                </c:pt>
+              </c:numCache>
+            </c:numRef>
+          </c:val>
+          <c:extLst>
+            <c:ext xmlns:c16="http://schemas.microsoft.com/office/drawing/2014/chart" uri="{C3380CC4-5D6E-409C-BE32-E72D297353CC}">
+              <c16:uniqueId val="{00000000-42D7-42F9-8F13-35C7BF05B7F1}"/>
+            </c:ext>
+          </c:extLst>
+        </c:ser>
+        <c:ser>
+          <c:idx val="1"/>
+          <c:order val="1"/>
+          <c:tx>
+            <c:strRef>
+              <c:f>Sheet2!$E$19</c:f>
+              <c:strCache>
+                <c:ptCount val="1"/>
+                <c:pt idx="0">
+                  <c:v>R</c:v>
+                </c:pt>
+              </c:strCache>
+            </c:strRef>
+          </c:tx>
+          <c:spPr>
+            <a:pattFill prst="wdDnDiag">
+              <a:fgClr>
+                <a:schemeClr val="tx1"/>
+              </a:fgClr>
+              <a:bgClr>
+                <a:schemeClr val="bg1"/>
+              </a:bgClr>
+            </a:pattFill>
+            <a:ln>
+              <a:solidFill>
+                <a:schemeClr val="tx1"/>
+              </a:solidFill>
+            </a:ln>
+            <a:effectLst/>
+          </c:spPr>
+          <c:invertIfNegative val="0"/>
+          <c:cat>
+            <c:strRef>
+              <c:f>Sheet2!$F$17:$H$17</c:f>
+              <c:strCache>
+                <c:ptCount val="3"/>
+                <c:pt idx="0">
+                  <c:v>NEG</c:v>
+                </c:pt>
+                <c:pt idx="1">
+                  <c:v>NEU</c:v>
+                </c:pt>
+                <c:pt idx="2">
+                  <c:v>POS</c:v>
+                </c:pt>
+              </c:strCache>
+            </c:strRef>
+          </c:cat>
+          <c:val>
+            <c:numRef>
+              <c:f>Sheet2!$F$19:$H$19</c:f>
+              <c:numCache>
+                <c:formatCode>General</c:formatCode>
+                <c:ptCount val="3"/>
+                <c:pt idx="0">
+                  <c:v>0.51892349000000004</c:v>
+                </c:pt>
+                <c:pt idx="1">
+                  <c:v>0.77018145000000005</c:v>
+                </c:pt>
+                <c:pt idx="2">
+                  <c:v>0.70544719</c:v>
+                </c:pt>
+              </c:numCache>
+            </c:numRef>
+          </c:val>
+          <c:extLst>
+            <c:ext xmlns:c16="http://schemas.microsoft.com/office/drawing/2014/chart" uri="{C3380CC4-5D6E-409C-BE32-E72D297353CC}">
+              <c16:uniqueId val="{00000001-42D7-42F9-8F13-35C7BF05B7F1}"/>
+            </c:ext>
+          </c:extLst>
+        </c:ser>
+        <c:ser>
+          <c:idx val="2"/>
+          <c:order val="2"/>
+          <c:tx>
+            <c:strRef>
+              <c:f>Sheet2!$E$20</c:f>
+              <c:strCache>
+                <c:ptCount val="1"/>
+                <c:pt idx="0">
+                  <c:v>F1</c:v>
+                </c:pt>
+              </c:strCache>
+            </c:strRef>
+          </c:tx>
+          <c:spPr>
+            <a:solidFill>
+              <a:schemeClr val="tx1"/>
+            </a:solidFill>
+            <a:ln>
+              <a:noFill/>
+            </a:ln>
+            <a:effectLst/>
+          </c:spPr>
+          <c:invertIfNegative val="0"/>
+          <c:cat>
+            <c:strRef>
+              <c:f>Sheet2!$F$17:$H$17</c:f>
+              <c:strCache>
+                <c:ptCount val="3"/>
+                <c:pt idx="0">
+                  <c:v>NEG</c:v>
+                </c:pt>
+                <c:pt idx="1">
+                  <c:v>NEU</c:v>
+                </c:pt>
+                <c:pt idx="2">
+                  <c:v>POS</c:v>
+                </c:pt>
+              </c:strCache>
+            </c:strRef>
+          </c:cat>
+          <c:val>
+            <c:numRef>
+              <c:f>Sheet2!$F$20:$H$20</c:f>
+              <c:numCache>
+                <c:formatCode>General</c:formatCode>
+                <c:ptCount val="3"/>
+                <c:pt idx="0">
+                  <c:v>0.51167324999999997</c:v>
+                </c:pt>
+                <c:pt idx="1">
+                  <c:v>0.73158988000000003</c:v>
+                </c:pt>
+                <c:pt idx="2">
+                  <c:v>0.73806379</c:v>
+                </c:pt>
+              </c:numCache>
+            </c:numRef>
+          </c:val>
+          <c:extLst>
+            <c:ext xmlns:c16="http://schemas.microsoft.com/office/drawing/2014/chart" uri="{C3380CC4-5D6E-409C-BE32-E72D297353CC}">
+              <c16:uniqueId val="{00000002-42D7-42F9-8F13-35C7BF05B7F1}"/>
+            </c:ext>
+          </c:extLst>
+        </c:ser>
+        <c:dLbls>
+          <c:dLblPos val="outEnd"/>
+          <c:showLegendKey val="0"/>
+          <c:showVal val="0"/>
+          <c:showCatName val="0"/>
+          <c:showSerName val="0"/>
+          <c:showPercent val="0"/>
+          <c:showBubbleSize val="0"/>
+        </c:dLbls>
+        <c:gapWidth val="219"/>
+        <c:overlap val="-27"/>
+        <c:axId val="418907592"/>
+        <c:axId val="418910872"/>
+      </c:barChart>
+      <c:catAx>
+        <c:axId val="418907592"/>
+        <c:scaling>
+          <c:orientation val="minMax"/>
+        </c:scaling>
+        <c:delete val="0"/>
+        <c:axPos val="b"/>
+        <c:numFmt formatCode="General" sourceLinked="1"/>
+        <c:majorTickMark val="none"/>
+        <c:minorTickMark val="none"/>
+        <c:tickLblPos val="nextTo"/>
+        <c:spPr>
+          <a:noFill/>
+          <a:ln w="9525" cap="flat" cmpd="sng" algn="ctr">
+            <a:solidFill>
+              <a:schemeClr val="tx1">
+                <a:lumMod val="15000"/>
+                <a:lumOff val="85000"/>
+              </a:schemeClr>
+            </a:solidFill>
+            <a:round/>
+          </a:ln>
+          <a:effectLst/>
+        </c:spPr>
+        <c:txPr>
+          <a:bodyPr rot="-60000000" spcFirstLastPara="1" vertOverflow="ellipsis" vert="horz" wrap="square" anchor="ctr" anchorCtr="1"/>
+          <a:lstStyle/>
+          <a:p>
+            <a:pPr>
+              <a:defRPr sz="2000" b="0" i="0" u="none" strike="noStrike" kern="1200" baseline="0">
+                <a:solidFill>
+                  <a:schemeClr val="tx1"/>
+                </a:solidFill>
+                <a:latin typeface="+mn-lt"/>
+                <a:ea typeface="+mn-ea"/>
+                <a:cs typeface="+mn-cs"/>
+              </a:defRPr>
+            </a:pPr>
+            <a:endParaRPr lang="en-US"/>
+          </a:p>
+        </c:txPr>
+        <c:crossAx val="418910872"/>
+        <c:crosses val="autoZero"/>
+        <c:auto val="1"/>
+        <c:lblAlgn val="ctr"/>
+        <c:lblOffset val="100"/>
+        <c:noMultiLvlLbl val="0"/>
+      </c:catAx>
+      <c:valAx>
+        <c:axId val="418910872"/>
+        <c:scaling>
+          <c:orientation val="minMax"/>
+        </c:scaling>
+        <c:delete val="0"/>
+        <c:axPos val="l"/>
+        <c:majorGridlines>
+          <c:spPr>
+            <a:ln w="9525" cap="flat" cmpd="sng" algn="ctr">
+              <a:solidFill>
+                <a:schemeClr val="tx1">
+                  <a:lumMod val="15000"/>
+                  <a:lumOff val="85000"/>
+                </a:schemeClr>
+              </a:solidFill>
+              <a:round/>
+            </a:ln>
+            <a:effectLst/>
+          </c:spPr>
+        </c:majorGridlines>
+        <c:numFmt formatCode="General" sourceLinked="1"/>
+        <c:majorTickMark val="none"/>
+        <c:minorTickMark val="none"/>
+        <c:tickLblPos val="nextTo"/>
+        <c:spPr>
+          <a:noFill/>
+          <a:ln>
+            <a:noFill/>
+          </a:ln>
+          <a:effectLst/>
+        </c:spPr>
+        <c:txPr>
+          <a:bodyPr rot="-60000000" spcFirstLastPara="1" vertOverflow="ellipsis" vert="horz" wrap="square" anchor="ctr" anchorCtr="1"/>
+          <a:lstStyle/>
+          <a:p>
+            <a:pPr>
+              <a:defRPr sz="2000" b="0" i="0" u="none" strike="noStrike" kern="1200" baseline="0">
+                <a:solidFill>
+                  <a:schemeClr val="tx1"/>
+                </a:solidFill>
+                <a:latin typeface="+mn-lt"/>
+                <a:ea typeface="+mn-ea"/>
+                <a:cs typeface="+mn-cs"/>
+              </a:defRPr>
+            </a:pPr>
+            <a:endParaRPr lang="en-US"/>
+          </a:p>
+        </c:txPr>
+        <c:crossAx val="418907592"/>
+        <c:crosses val="autoZero"/>
+        <c:crossBetween val="between"/>
+      </c:valAx>
+      <c:spPr>
+        <a:noFill/>
+        <a:ln>
+          <a:noFill/>
+        </a:ln>
+        <a:effectLst/>
+      </c:spPr>
+    </c:plotArea>
+    <c:legend>
+      <c:legendPos val="b"/>
+      <c:overlay val="0"/>
+      <c:spPr>
+        <a:noFill/>
+        <a:ln>
+          <a:noFill/>
+        </a:ln>
+        <a:effectLst/>
+      </c:spPr>
+      <c:txPr>
+        <a:bodyPr rot="0" spcFirstLastPara="1" vertOverflow="ellipsis" vert="horz" wrap="square" anchor="ctr" anchorCtr="1"/>
+        <a:lstStyle/>
+        <a:p>
+          <a:pPr>
+            <a:defRPr sz="2000" b="0" i="0" u="none" strike="noStrike" kern="1200" baseline="0">
+              <a:solidFill>
+                <a:schemeClr val="tx1"/>
+              </a:solidFill>
+              <a:latin typeface="+mn-lt"/>
+              <a:ea typeface="+mn-ea"/>
+              <a:cs typeface="+mn-cs"/>
+            </a:defRPr>
+          </a:pPr>
+          <a:endParaRPr lang="en-US"/>
+        </a:p>
+      </c:txPr>
+    </c:legend>
+    <c:plotVisOnly val="1"/>
+    <c:dispBlanksAs val="gap"/>
+    <c:showDLblsOverMax val="0"/>
+  </c:chart>
+  <c:spPr>
+    <a:noFill/>
+    <a:ln>
+      <a:noFill/>
+    </a:ln>
+    <a:effectLst/>
+  </c:spPr>
+  <c:txPr>
+    <a:bodyPr/>
+    <a:lstStyle/>
+    <a:p>
+      <a:pPr>
+        <a:defRPr/>
+      </a:pPr>
+      <a:endParaRPr lang="en-US"/>
+    </a:p>
+  </c:txPr>
+  <c:externalData r:id="rId3">
+    <c:autoUpdate val="0"/>
+  </c:externalData>
+</c:chartSpace>
+</file>
+
 <file path=ppt/charts/colors1.xml><?xml version="1.0" encoding="utf-8"?>
 <cs:colorStyle xmlns:cs="http://schemas.microsoft.com/office/drawing/2012/chartStyle" xmlns:a="http://schemas.openxmlformats.org/drawingml/2006/main" meth="cycle" id="10">
   <a:schemeClr val="accent1"/>
@@ -866,6 +2546,166 @@
 </file>
 
 <file path=ppt/charts/colors2.xml><?xml version="1.0" encoding="utf-8"?>
+<cs:colorStyle xmlns:cs="http://schemas.microsoft.com/office/drawing/2012/chartStyle" xmlns:a="http://schemas.openxmlformats.org/drawingml/2006/main" meth="cycle" id="10">
+  <a:schemeClr val="accent1"/>
+  <a:schemeClr val="accent2"/>
+  <a:schemeClr val="accent3"/>
+  <a:schemeClr val="accent4"/>
+  <a:schemeClr val="accent5"/>
+  <a:schemeClr val="accent6"/>
+  <cs:variation/>
+  <cs:variation>
+    <a:lumMod val="60000"/>
+  </cs:variation>
+  <cs:variation>
+    <a:lumMod val="80000"/>
+    <a:lumOff val="20000"/>
+  </cs:variation>
+  <cs:variation>
+    <a:lumMod val="80000"/>
+  </cs:variation>
+  <cs:variation>
+    <a:lumMod val="60000"/>
+    <a:lumOff val="40000"/>
+  </cs:variation>
+  <cs:variation>
+    <a:lumMod val="50000"/>
+  </cs:variation>
+  <cs:variation>
+    <a:lumMod val="70000"/>
+    <a:lumOff val="30000"/>
+  </cs:variation>
+  <cs:variation>
+    <a:lumMod val="70000"/>
+  </cs:variation>
+  <cs:variation>
+    <a:lumMod val="50000"/>
+    <a:lumOff val="50000"/>
+  </cs:variation>
+</cs:colorStyle>
+</file>
+
+<file path=ppt/charts/colors3.xml><?xml version="1.0" encoding="utf-8"?>
+<cs:colorStyle xmlns:cs="http://schemas.microsoft.com/office/drawing/2012/chartStyle" xmlns:a="http://schemas.openxmlformats.org/drawingml/2006/main" meth="cycle" id="10">
+  <a:schemeClr val="accent1"/>
+  <a:schemeClr val="accent2"/>
+  <a:schemeClr val="accent3"/>
+  <a:schemeClr val="accent4"/>
+  <a:schemeClr val="accent5"/>
+  <a:schemeClr val="accent6"/>
+  <cs:variation/>
+  <cs:variation>
+    <a:lumMod val="60000"/>
+  </cs:variation>
+  <cs:variation>
+    <a:lumMod val="80000"/>
+    <a:lumOff val="20000"/>
+  </cs:variation>
+  <cs:variation>
+    <a:lumMod val="80000"/>
+  </cs:variation>
+  <cs:variation>
+    <a:lumMod val="60000"/>
+    <a:lumOff val="40000"/>
+  </cs:variation>
+  <cs:variation>
+    <a:lumMod val="50000"/>
+  </cs:variation>
+  <cs:variation>
+    <a:lumMod val="70000"/>
+    <a:lumOff val="30000"/>
+  </cs:variation>
+  <cs:variation>
+    <a:lumMod val="70000"/>
+  </cs:variation>
+  <cs:variation>
+    <a:lumMod val="50000"/>
+    <a:lumOff val="50000"/>
+  </cs:variation>
+</cs:colorStyle>
+</file>
+
+<file path=ppt/charts/colors4.xml><?xml version="1.0" encoding="utf-8"?>
+<cs:colorStyle xmlns:cs="http://schemas.microsoft.com/office/drawing/2012/chartStyle" xmlns:a="http://schemas.openxmlformats.org/drawingml/2006/main" meth="cycle" id="10">
+  <a:schemeClr val="accent1"/>
+  <a:schemeClr val="accent2"/>
+  <a:schemeClr val="accent3"/>
+  <a:schemeClr val="accent4"/>
+  <a:schemeClr val="accent5"/>
+  <a:schemeClr val="accent6"/>
+  <cs:variation/>
+  <cs:variation>
+    <a:lumMod val="60000"/>
+  </cs:variation>
+  <cs:variation>
+    <a:lumMod val="80000"/>
+    <a:lumOff val="20000"/>
+  </cs:variation>
+  <cs:variation>
+    <a:lumMod val="80000"/>
+  </cs:variation>
+  <cs:variation>
+    <a:lumMod val="60000"/>
+    <a:lumOff val="40000"/>
+  </cs:variation>
+  <cs:variation>
+    <a:lumMod val="50000"/>
+  </cs:variation>
+  <cs:variation>
+    <a:lumMod val="70000"/>
+    <a:lumOff val="30000"/>
+  </cs:variation>
+  <cs:variation>
+    <a:lumMod val="70000"/>
+  </cs:variation>
+  <cs:variation>
+    <a:lumMod val="50000"/>
+    <a:lumOff val="50000"/>
+  </cs:variation>
+</cs:colorStyle>
+</file>
+
+<file path=ppt/charts/colors5.xml><?xml version="1.0" encoding="utf-8"?>
+<cs:colorStyle xmlns:cs="http://schemas.microsoft.com/office/drawing/2012/chartStyle" xmlns:a="http://schemas.openxmlformats.org/drawingml/2006/main" meth="cycle" id="10">
+  <a:schemeClr val="accent1"/>
+  <a:schemeClr val="accent2"/>
+  <a:schemeClr val="accent3"/>
+  <a:schemeClr val="accent4"/>
+  <a:schemeClr val="accent5"/>
+  <a:schemeClr val="accent6"/>
+  <cs:variation/>
+  <cs:variation>
+    <a:lumMod val="60000"/>
+  </cs:variation>
+  <cs:variation>
+    <a:lumMod val="80000"/>
+    <a:lumOff val="20000"/>
+  </cs:variation>
+  <cs:variation>
+    <a:lumMod val="80000"/>
+  </cs:variation>
+  <cs:variation>
+    <a:lumMod val="60000"/>
+    <a:lumOff val="40000"/>
+  </cs:variation>
+  <cs:variation>
+    <a:lumMod val="50000"/>
+  </cs:variation>
+  <cs:variation>
+    <a:lumMod val="70000"/>
+    <a:lumOff val="30000"/>
+  </cs:variation>
+  <cs:variation>
+    <a:lumMod val="70000"/>
+  </cs:variation>
+  <cs:variation>
+    <a:lumMod val="50000"/>
+    <a:lumOff val="50000"/>
+  </cs:variation>
+</cs:colorStyle>
+</file>
+
+<file path=ppt/charts/colors6.xml><?xml version="1.0" encoding="utf-8"?>
 <cs:colorStyle xmlns:cs="http://schemas.microsoft.com/office/drawing/2012/chartStyle" xmlns:a="http://schemas.openxmlformats.org/drawingml/2006/main" meth="cycle" id="10">
   <a:schemeClr val="accent1"/>
   <a:schemeClr val="accent2"/>
@@ -1911,6 +3751,2044 @@
 </cs:chartStyle>
 </file>
 
+<file path=ppt/charts/style3.xml><?xml version="1.0" encoding="utf-8"?>
+<cs:chartStyle xmlns:cs="http://schemas.microsoft.com/office/drawing/2012/chartStyle" xmlns:a="http://schemas.openxmlformats.org/drawingml/2006/main" id="201">
+  <cs:axisTitle>
+    <cs:lnRef idx="0"/>
+    <cs:fillRef idx="0"/>
+    <cs:effectRef idx="0"/>
+    <cs:fontRef idx="minor">
+      <a:schemeClr val="tx1">
+        <a:lumMod val="65000"/>
+        <a:lumOff val="35000"/>
+      </a:schemeClr>
+    </cs:fontRef>
+    <cs:defRPr sz="1000" kern="1200"/>
+  </cs:axisTitle>
+  <cs:categoryAxis>
+    <cs:lnRef idx="0"/>
+    <cs:fillRef idx="0"/>
+    <cs:effectRef idx="0"/>
+    <cs:fontRef idx="minor">
+      <a:schemeClr val="tx1">
+        <a:lumMod val="65000"/>
+        <a:lumOff val="35000"/>
+      </a:schemeClr>
+    </cs:fontRef>
+    <cs:spPr>
+      <a:ln w="9525" cap="flat" cmpd="sng" algn="ctr">
+        <a:solidFill>
+          <a:schemeClr val="tx1">
+            <a:lumMod val="15000"/>
+            <a:lumOff val="85000"/>
+          </a:schemeClr>
+        </a:solidFill>
+        <a:round/>
+      </a:ln>
+    </cs:spPr>
+    <cs:defRPr sz="900" kern="1200"/>
+  </cs:categoryAxis>
+  <cs:chartArea mods="allowNoFillOverride allowNoLineOverride">
+    <cs:lnRef idx="0"/>
+    <cs:fillRef idx="0"/>
+    <cs:effectRef idx="0"/>
+    <cs:fontRef idx="minor">
+      <a:schemeClr val="tx1"/>
+    </cs:fontRef>
+    <cs:spPr>
+      <a:solidFill>
+        <a:schemeClr val="bg1"/>
+      </a:solidFill>
+      <a:ln w="9525" cap="flat" cmpd="sng" algn="ctr">
+        <a:solidFill>
+          <a:schemeClr val="tx1">
+            <a:lumMod val="15000"/>
+            <a:lumOff val="85000"/>
+          </a:schemeClr>
+        </a:solidFill>
+        <a:round/>
+      </a:ln>
+    </cs:spPr>
+    <cs:defRPr sz="1000" kern="1200"/>
+  </cs:chartArea>
+  <cs:dataLabel>
+    <cs:lnRef idx="0"/>
+    <cs:fillRef idx="0"/>
+    <cs:effectRef idx="0"/>
+    <cs:fontRef idx="minor">
+      <a:schemeClr val="tx1">
+        <a:lumMod val="75000"/>
+        <a:lumOff val="25000"/>
+      </a:schemeClr>
+    </cs:fontRef>
+    <cs:defRPr sz="900" kern="1200"/>
+  </cs:dataLabel>
+  <cs:dataLabelCallout>
+    <cs:lnRef idx="0"/>
+    <cs:fillRef idx="0"/>
+    <cs:effectRef idx="0"/>
+    <cs:fontRef idx="minor">
+      <a:schemeClr val="dk1">
+        <a:lumMod val="65000"/>
+        <a:lumOff val="35000"/>
+      </a:schemeClr>
+    </cs:fontRef>
+    <cs:spPr>
+      <a:solidFill>
+        <a:schemeClr val="lt1"/>
+      </a:solidFill>
+      <a:ln>
+        <a:solidFill>
+          <a:schemeClr val="dk1">
+            <a:lumMod val="25000"/>
+            <a:lumOff val="75000"/>
+          </a:schemeClr>
+        </a:solidFill>
+      </a:ln>
+    </cs:spPr>
+    <cs:defRPr sz="900" kern="1200"/>
+    <cs:bodyPr rot="0" spcFirstLastPara="1" vertOverflow="clip" horzOverflow="clip" vert="horz" wrap="square" lIns="36576" tIns="18288" rIns="36576" bIns="18288" anchor="ctr" anchorCtr="1">
+      <a:spAutoFit/>
+    </cs:bodyPr>
+  </cs:dataLabelCallout>
+  <cs:dataPoint>
+    <cs:lnRef idx="0"/>
+    <cs:fillRef idx="1">
+      <cs:styleClr val="auto"/>
+    </cs:fillRef>
+    <cs:effectRef idx="0"/>
+    <cs:fontRef idx="minor">
+      <a:schemeClr val="tx1"/>
+    </cs:fontRef>
+  </cs:dataPoint>
+  <cs:dataPoint3D>
+    <cs:lnRef idx="0"/>
+    <cs:fillRef idx="1">
+      <cs:styleClr val="auto"/>
+    </cs:fillRef>
+    <cs:effectRef idx="0"/>
+    <cs:fontRef idx="minor">
+      <a:schemeClr val="tx1"/>
+    </cs:fontRef>
+  </cs:dataPoint3D>
+  <cs:dataPointLine>
+    <cs:lnRef idx="0">
+      <cs:styleClr val="auto"/>
+    </cs:lnRef>
+    <cs:fillRef idx="1"/>
+    <cs:effectRef idx="0"/>
+    <cs:fontRef idx="minor">
+      <a:schemeClr val="tx1"/>
+    </cs:fontRef>
+    <cs:spPr>
+      <a:ln w="28575" cap="rnd">
+        <a:solidFill>
+          <a:schemeClr val="phClr"/>
+        </a:solidFill>
+        <a:round/>
+      </a:ln>
+    </cs:spPr>
+  </cs:dataPointLine>
+  <cs:dataPointMarker>
+    <cs:lnRef idx="0">
+      <cs:styleClr val="auto"/>
+    </cs:lnRef>
+    <cs:fillRef idx="1">
+      <cs:styleClr val="auto"/>
+    </cs:fillRef>
+    <cs:effectRef idx="0"/>
+    <cs:fontRef idx="minor">
+      <a:schemeClr val="tx1"/>
+    </cs:fontRef>
+    <cs:spPr>
+      <a:ln w="9525">
+        <a:solidFill>
+          <a:schemeClr val="phClr"/>
+        </a:solidFill>
+      </a:ln>
+    </cs:spPr>
+  </cs:dataPointMarker>
+  <cs:dataPointMarkerLayout symbol="circle" size="5"/>
+  <cs:dataPointWireframe>
+    <cs:lnRef idx="0">
+      <cs:styleClr val="auto"/>
+    </cs:lnRef>
+    <cs:fillRef idx="1"/>
+    <cs:effectRef idx="0"/>
+    <cs:fontRef idx="minor">
+      <a:schemeClr val="tx1"/>
+    </cs:fontRef>
+    <cs:spPr>
+      <a:ln w="9525" cap="rnd">
+        <a:solidFill>
+          <a:schemeClr val="phClr"/>
+        </a:solidFill>
+        <a:round/>
+      </a:ln>
+    </cs:spPr>
+  </cs:dataPointWireframe>
+  <cs:dataTable>
+    <cs:lnRef idx="0"/>
+    <cs:fillRef idx="0"/>
+    <cs:effectRef idx="0"/>
+    <cs:fontRef idx="minor">
+      <a:schemeClr val="tx1">
+        <a:lumMod val="65000"/>
+        <a:lumOff val="35000"/>
+      </a:schemeClr>
+    </cs:fontRef>
+    <cs:spPr>
+      <a:noFill/>
+      <a:ln w="9525" cap="flat" cmpd="sng" algn="ctr">
+        <a:solidFill>
+          <a:schemeClr val="tx1">
+            <a:lumMod val="15000"/>
+            <a:lumOff val="85000"/>
+          </a:schemeClr>
+        </a:solidFill>
+        <a:round/>
+      </a:ln>
+    </cs:spPr>
+    <cs:defRPr sz="900" kern="1200"/>
+  </cs:dataTable>
+  <cs:downBar>
+    <cs:lnRef idx="0"/>
+    <cs:fillRef idx="0"/>
+    <cs:effectRef idx="0"/>
+    <cs:fontRef idx="minor">
+      <a:schemeClr val="dk1"/>
+    </cs:fontRef>
+    <cs:spPr>
+      <a:solidFill>
+        <a:schemeClr val="dk1">
+          <a:lumMod val="65000"/>
+          <a:lumOff val="35000"/>
+        </a:schemeClr>
+      </a:solidFill>
+      <a:ln w="9525">
+        <a:solidFill>
+          <a:schemeClr val="tx1">
+            <a:lumMod val="65000"/>
+            <a:lumOff val="35000"/>
+          </a:schemeClr>
+        </a:solidFill>
+      </a:ln>
+    </cs:spPr>
+  </cs:downBar>
+  <cs:dropLine>
+    <cs:lnRef idx="0"/>
+    <cs:fillRef idx="0"/>
+    <cs:effectRef idx="0"/>
+    <cs:fontRef idx="minor">
+      <a:schemeClr val="tx1"/>
+    </cs:fontRef>
+    <cs:spPr>
+      <a:ln w="9525" cap="flat" cmpd="sng" algn="ctr">
+        <a:solidFill>
+          <a:schemeClr val="tx1">
+            <a:lumMod val="35000"/>
+            <a:lumOff val="65000"/>
+          </a:schemeClr>
+        </a:solidFill>
+        <a:round/>
+      </a:ln>
+    </cs:spPr>
+  </cs:dropLine>
+  <cs:errorBar>
+    <cs:lnRef idx="0"/>
+    <cs:fillRef idx="0"/>
+    <cs:effectRef idx="0"/>
+    <cs:fontRef idx="minor">
+      <a:schemeClr val="tx1"/>
+    </cs:fontRef>
+    <cs:spPr>
+      <a:ln w="9525" cap="flat" cmpd="sng" algn="ctr">
+        <a:solidFill>
+          <a:schemeClr val="tx1">
+            <a:lumMod val="65000"/>
+            <a:lumOff val="35000"/>
+          </a:schemeClr>
+        </a:solidFill>
+        <a:round/>
+      </a:ln>
+    </cs:spPr>
+  </cs:errorBar>
+  <cs:floor>
+    <cs:lnRef idx="0"/>
+    <cs:fillRef idx="0"/>
+    <cs:effectRef idx="0"/>
+    <cs:fontRef idx="minor">
+      <a:schemeClr val="tx1"/>
+    </cs:fontRef>
+    <cs:spPr>
+      <a:noFill/>
+      <a:ln>
+        <a:noFill/>
+      </a:ln>
+    </cs:spPr>
+  </cs:floor>
+  <cs:gridlineMajor>
+    <cs:lnRef idx="0"/>
+    <cs:fillRef idx="0"/>
+    <cs:effectRef idx="0"/>
+    <cs:fontRef idx="minor">
+      <a:schemeClr val="tx1"/>
+    </cs:fontRef>
+    <cs:spPr>
+      <a:ln w="9525" cap="flat" cmpd="sng" algn="ctr">
+        <a:solidFill>
+          <a:schemeClr val="tx1">
+            <a:lumMod val="15000"/>
+            <a:lumOff val="85000"/>
+          </a:schemeClr>
+        </a:solidFill>
+        <a:round/>
+      </a:ln>
+    </cs:spPr>
+  </cs:gridlineMajor>
+  <cs:gridlineMinor>
+    <cs:lnRef idx="0"/>
+    <cs:fillRef idx="0"/>
+    <cs:effectRef idx="0"/>
+    <cs:fontRef idx="minor">
+      <a:schemeClr val="tx1"/>
+    </cs:fontRef>
+    <cs:spPr>
+      <a:ln w="9525" cap="flat" cmpd="sng" algn="ctr">
+        <a:solidFill>
+          <a:schemeClr val="tx1">
+            <a:lumMod val="5000"/>
+            <a:lumOff val="95000"/>
+          </a:schemeClr>
+        </a:solidFill>
+        <a:round/>
+      </a:ln>
+    </cs:spPr>
+  </cs:gridlineMinor>
+  <cs:hiLoLine>
+    <cs:lnRef idx="0"/>
+    <cs:fillRef idx="0"/>
+    <cs:effectRef idx="0"/>
+    <cs:fontRef idx="minor">
+      <a:schemeClr val="tx1"/>
+    </cs:fontRef>
+    <cs:spPr>
+      <a:ln w="9525" cap="flat" cmpd="sng" algn="ctr">
+        <a:solidFill>
+          <a:schemeClr val="tx1">
+            <a:lumMod val="75000"/>
+            <a:lumOff val="25000"/>
+          </a:schemeClr>
+        </a:solidFill>
+        <a:round/>
+      </a:ln>
+    </cs:spPr>
+  </cs:hiLoLine>
+  <cs:leaderLine>
+    <cs:lnRef idx="0"/>
+    <cs:fillRef idx="0"/>
+    <cs:effectRef idx="0"/>
+    <cs:fontRef idx="minor">
+      <a:schemeClr val="tx1"/>
+    </cs:fontRef>
+    <cs:spPr>
+      <a:ln w="9525" cap="flat" cmpd="sng" algn="ctr">
+        <a:solidFill>
+          <a:schemeClr val="tx1">
+            <a:lumMod val="35000"/>
+            <a:lumOff val="65000"/>
+          </a:schemeClr>
+        </a:solidFill>
+        <a:round/>
+      </a:ln>
+    </cs:spPr>
+  </cs:leaderLine>
+  <cs:legend>
+    <cs:lnRef idx="0"/>
+    <cs:fillRef idx="0"/>
+    <cs:effectRef idx="0"/>
+    <cs:fontRef idx="minor">
+      <a:schemeClr val="tx1">
+        <a:lumMod val="65000"/>
+        <a:lumOff val="35000"/>
+      </a:schemeClr>
+    </cs:fontRef>
+    <cs:defRPr sz="900" kern="1200"/>
+  </cs:legend>
+  <cs:plotArea mods="allowNoFillOverride allowNoLineOverride">
+    <cs:lnRef idx="0"/>
+    <cs:fillRef idx="0"/>
+    <cs:effectRef idx="0"/>
+    <cs:fontRef idx="minor">
+      <a:schemeClr val="tx1"/>
+    </cs:fontRef>
+  </cs:plotArea>
+  <cs:plotArea3D mods="allowNoFillOverride allowNoLineOverride">
+    <cs:lnRef idx="0"/>
+    <cs:fillRef idx="0"/>
+    <cs:effectRef idx="0"/>
+    <cs:fontRef idx="minor">
+      <a:schemeClr val="tx1"/>
+    </cs:fontRef>
+  </cs:plotArea3D>
+  <cs:seriesAxis>
+    <cs:lnRef idx="0"/>
+    <cs:fillRef idx="0"/>
+    <cs:effectRef idx="0"/>
+    <cs:fontRef idx="minor">
+      <a:schemeClr val="tx1">
+        <a:lumMod val="65000"/>
+        <a:lumOff val="35000"/>
+      </a:schemeClr>
+    </cs:fontRef>
+    <cs:defRPr sz="900" kern="1200"/>
+  </cs:seriesAxis>
+  <cs:seriesLine>
+    <cs:lnRef idx="0"/>
+    <cs:fillRef idx="0"/>
+    <cs:effectRef idx="0"/>
+    <cs:fontRef idx="minor">
+      <a:schemeClr val="tx1"/>
+    </cs:fontRef>
+    <cs:spPr>
+      <a:ln w="9525" cap="flat" cmpd="sng" algn="ctr">
+        <a:solidFill>
+          <a:schemeClr val="tx1">
+            <a:lumMod val="35000"/>
+            <a:lumOff val="65000"/>
+          </a:schemeClr>
+        </a:solidFill>
+        <a:round/>
+      </a:ln>
+    </cs:spPr>
+  </cs:seriesLine>
+  <cs:title>
+    <cs:lnRef idx="0"/>
+    <cs:fillRef idx="0"/>
+    <cs:effectRef idx="0"/>
+    <cs:fontRef idx="minor">
+      <a:schemeClr val="tx1">
+        <a:lumMod val="65000"/>
+        <a:lumOff val="35000"/>
+      </a:schemeClr>
+    </cs:fontRef>
+    <cs:defRPr sz="1400" b="0" kern="1200" spc="0" baseline="0"/>
+  </cs:title>
+  <cs:trendline>
+    <cs:lnRef idx="0">
+      <cs:styleClr val="auto"/>
+    </cs:lnRef>
+    <cs:fillRef idx="0"/>
+    <cs:effectRef idx="0"/>
+    <cs:fontRef idx="minor">
+      <a:schemeClr val="tx1"/>
+    </cs:fontRef>
+    <cs:spPr>
+      <a:ln w="19050" cap="rnd">
+        <a:solidFill>
+          <a:schemeClr val="phClr"/>
+        </a:solidFill>
+        <a:prstDash val="sysDot"/>
+      </a:ln>
+    </cs:spPr>
+  </cs:trendline>
+  <cs:trendlineLabel>
+    <cs:lnRef idx="0"/>
+    <cs:fillRef idx="0"/>
+    <cs:effectRef idx="0"/>
+    <cs:fontRef idx="minor">
+      <a:schemeClr val="tx1">
+        <a:lumMod val="65000"/>
+        <a:lumOff val="35000"/>
+      </a:schemeClr>
+    </cs:fontRef>
+    <cs:defRPr sz="900" kern="1200"/>
+  </cs:trendlineLabel>
+  <cs:upBar>
+    <cs:lnRef idx="0"/>
+    <cs:fillRef idx="0"/>
+    <cs:effectRef idx="0"/>
+    <cs:fontRef idx="minor">
+      <a:schemeClr val="dk1"/>
+    </cs:fontRef>
+    <cs:spPr>
+      <a:solidFill>
+        <a:schemeClr val="lt1"/>
+      </a:solidFill>
+      <a:ln w="9525">
+        <a:solidFill>
+          <a:schemeClr val="tx1">
+            <a:lumMod val="15000"/>
+            <a:lumOff val="85000"/>
+          </a:schemeClr>
+        </a:solidFill>
+      </a:ln>
+    </cs:spPr>
+  </cs:upBar>
+  <cs:valueAxis>
+    <cs:lnRef idx="0"/>
+    <cs:fillRef idx="0"/>
+    <cs:effectRef idx="0"/>
+    <cs:fontRef idx="minor">
+      <a:schemeClr val="tx1">
+        <a:lumMod val="65000"/>
+        <a:lumOff val="35000"/>
+      </a:schemeClr>
+    </cs:fontRef>
+    <cs:defRPr sz="900" kern="1200"/>
+  </cs:valueAxis>
+  <cs:wall>
+    <cs:lnRef idx="0"/>
+    <cs:fillRef idx="0"/>
+    <cs:effectRef idx="0"/>
+    <cs:fontRef idx="minor">
+      <a:schemeClr val="tx1"/>
+    </cs:fontRef>
+    <cs:spPr>
+      <a:noFill/>
+      <a:ln>
+        <a:noFill/>
+      </a:ln>
+    </cs:spPr>
+  </cs:wall>
+</cs:chartStyle>
+</file>
+
+<file path=ppt/charts/style4.xml><?xml version="1.0" encoding="utf-8"?>
+<cs:chartStyle xmlns:cs="http://schemas.microsoft.com/office/drawing/2012/chartStyle" xmlns:a="http://schemas.openxmlformats.org/drawingml/2006/main" id="240">
+  <cs:axisTitle>
+    <cs:lnRef idx="0"/>
+    <cs:fillRef idx="0"/>
+    <cs:effectRef idx="0"/>
+    <cs:fontRef idx="minor">
+      <a:schemeClr val="tx1">
+        <a:lumMod val="65000"/>
+        <a:lumOff val="35000"/>
+      </a:schemeClr>
+    </cs:fontRef>
+    <cs:defRPr sz="1000" kern="1200"/>
+  </cs:axisTitle>
+  <cs:categoryAxis>
+    <cs:lnRef idx="0"/>
+    <cs:fillRef idx="0"/>
+    <cs:effectRef idx="0"/>
+    <cs:fontRef idx="minor">
+      <a:schemeClr val="tx1">
+        <a:lumMod val="65000"/>
+        <a:lumOff val="35000"/>
+      </a:schemeClr>
+    </cs:fontRef>
+    <cs:spPr>
+      <a:ln w="9525" cap="flat" cmpd="sng" algn="ctr">
+        <a:solidFill>
+          <a:schemeClr val="tx1">
+            <a:lumMod val="25000"/>
+            <a:lumOff val="75000"/>
+          </a:schemeClr>
+        </a:solidFill>
+        <a:round/>
+      </a:ln>
+    </cs:spPr>
+    <cs:defRPr sz="900" kern="1200"/>
+  </cs:categoryAxis>
+  <cs:chartArea mods="allowNoFillOverride allowNoLineOverride">
+    <cs:lnRef idx="0"/>
+    <cs:fillRef idx="0"/>
+    <cs:effectRef idx="0"/>
+    <cs:fontRef idx="minor">
+      <a:schemeClr val="tx1"/>
+    </cs:fontRef>
+    <cs:spPr>
+      <a:solidFill>
+        <a:schemeClr val="bg1"/>
+      </a:solidFill>
+      <a:ln w="9525" cap="flat" cmpd="sng" algn="ctr">
+        <a:solidFill>
+          <a:schemeClr val="tx1">
+            <a:lumMod val="15000"/>
+            <a:lumOff val="85000"/>
+          </a:schemeClr>
+        </a:solidFill>
+        <a:round/>
+      </a:ln>
+    </cs:spPr>
+    <cs:defRPr sz="1000" kern="1200"/>
+  </cs:chartArea>
+  <cs:dataLabel>
+    <cs:lnRef idx="0"/>
+    <cs:fillRef idx="0"/>
+    <cs:effectRef idx="0"/>
+    <cs:fontRef idx="minor">
+      <a:schemeClr val="tx1">
+        <a:lumMod val="75000"/>
+        <a:lumOff val="25000"/>
+      </a:schemeClr>
+    </cs:fontRef>
+    <cs:defRPr sz="900" kern="1200"/>
+  </cs:dataLabel>
+  <cs:dataLabelCallout>
+    <cs:lnRef idx="0"/>
+    <cs:fillRef idx="0"/>
+    <cs:effectRef idx="0"/>
+    <cs:fontRef idx="minor">
+      <a:schemeClr val="dk1">
+        <a:lumMod val="65000"/>
+        <a:lumOff val="35000"/>
+      </a:schemeClr>
+    </cs:fontRef>
+    <cs:spPr>
+      <a:solidFill>
+        <a:schemeClr val="lt1"/>
+      </a:solidFill>
+      <a:ln>
+        <a:solidFill>
+          <a:schemeClr val="dk1">
+            <a:lumMod val="25000"/>
+            <a:lumOff val="75000"/>
+          </a:schemeClr>
+        </a:solidFill>
+      </a:ln>
+    </cs:spPr>
+    <cs:defRPr sz="900" kern="1200"/>
+    <cs:bodyPr rot="0" spcFirstLastPara="1" vertOverflow="clip" horzOverflow="clip" vert="horz" wrap="square" lIns="36576" tIns="18288" rIns="36576" bIns="18288" anchor="ctr" anchorCtr="1">
+      <a:spAutoFit/>
+    </cs:bodyPr>
+  </cs:dataLabelCallout>
+  <cs:dataPoint>
+    <cs:lnRef idx="0"/>
+    <cs:fillRef idx="1">
+      <cs:styleClr val="auto"/>
+    </cs:fillRef>
+    <cs:effectRef idx="0"/>
+    <cs:fontRef idx="minor">
+      <a:schemeClr val="tx1"/>
+    </cs:fontRef>
+  </cs:dataPoint>
+  <cs:dataPoint3D>
+    <cs:lnRef idx="0"/>
+    <cs:fillRef idx="1">
+      <cs:styleClr val="auto"/>
+    </cs:fillRef>
+    <cs:effectRef idx="0"/>
+    <cs:fontRef idx="minor">
+      <a:schemeClr val="tx1"/>
+    </cs:fontRef>
+  </cs:dataPoint3D>
+  <cs:dataPointLine>
+    <cs:lnRef idx="0">
+      <cs:styleClr val="auto"/>
+    </cs:lnRef>
+    <cs:fillRef idx="1"/>
+    <cs:effectRef idx="0"/>
+    <cs:fontRef idx="minor">
+      <a:schemeClr val="tx1"/>
+    </cs:fontRef>
+    <cs:spPr>
+      <a:ln w="19050" cap="rnd">
+        <a:solidFill>
+          <a:schemeClr val="phClr"/>
+        </a:solidFill>
+        <a:round/>
+      </a:ln>
+    </cs:spPr>
+  </cs:dataPointLine>
+  <cs:dataPointMarker>
+    <cs:lnRef idx="0">
+      <cs:styleClr val="auto"/>
+    </cs:lnRef>
+    <cs:fillRef idx="1">
+      <cs:styleClr val="auto"/>
+    </cs:fillRef>
+    <cs:effectRef idx="0"/>
+    <cs:fontRef idx="minor">
+      <a:schemeClr val="tx1"/>
+    </cs:fontRef>
+    <cs:spPr>
+      <a:ln w="9525">
+        <a:solidFill>
+          <a:schemeClr val="phClr"/>
+        </a:solidFill>
+      </a:ln>
+    </cs:spPr>
+  </cs:dataPointMarker>
+  <cs:dataPointMarkerLayout symbol="circle" size="5"/>
+  <cs:dataPointWireframe>
+    <cs:lnRef idx="0">
+      <cs:styleClr val="auto"/>
+    </cs:lnRef>
+    <cs:fillRef idx="0"/>
+    <cs:effectRef idx="0"/>
+    <cs:fontRef idx="minor">
+      <a:schemeClr val="dk1"/>
+    </cs:fontRef>
+    <cs:spPr>
+      <a:ln w="9525" cap="rnd">
+        <a:solidFill>
+          <a:schemeClr val="phClr"/>
+        </a:solidFill>
+        <a:round/>
+      </a:ln>
+    </cs:spPr>
+  </cs:dataPointWireframe>
+  <cs:dataTable>
+    <cs:lnRef idx="0"/>
+    <cs:fillRef idx="0"/>
+    <cs:effectRef idx="0"/>
+    <cs:fontRef idx="minor">
+      <a:schemeClr val="tx1">
+        <a:lumMod val="65000"/>
+        <a:lumOff val="35000"/>
+      </a:schemeClr>
+    </cs:fontRef>
+    <cs:spPr>
+      <a:noFill/>
+      <a:ln w="9525" cap="flat" cmpd="sng" algn="ctr">
+        <a:solidFill>
+          <a:schemeClr val="tx1">
+            <a:lumMod val="15000"/>
+            <a:lumOff val="85000"/>
+          </a:schemeClr>
+        </a:solidFill>
+        <a:round/>
+      </a:ln>
+    </cs:spPr>
+    <cs:defRPr sz="900" kern="1200"/>
+  </cs:dataTable>
+  <cs:downBar>
+    <cs:lnRef idx="0"/>
+    <cs:fillRef idx="0"/>
+    <cs:effectRef idx="0"/>
+    <cs:fontRef idx="minor">
+      <a:schemeClr val="tx1"/>
+    </cs:fontRef>
+    <cs:spPr>
+      <a:solidFill>
+        <a:schemeClr val="dk1">
+          <a:lumMod val="75000"/>
+          <a:lumOff val="25000"/>
+        </a:schemeClr>
+      </a:solidFill>
+      <a:ln w="9525" cap="flat" cmpd="sng" algn="ctr">
+        <a:solidFill>
+          <a:schemeClr val="tx1">
+            <a:lumMod val="65000"/>
+            <a:lumOff val="35000"/>
+          </a:schemeClr>
+        </a:solidFill>
+        <a:round/>
+      </a:ln>
+    </cs:spPr>
+  </cs:downBar>
+  <cs:dropLine>
+    <cs:lnRef idx="0"/>
+    <cs:fillRef idx="0"/>
+    <cs:effectRef idx="0"/>
+    <cs:fontRef idx="minor">
+      <a:schemeClr val="tx1"/>
+    </cs:fontRef>
+    <cs:spPr>
+      <a:ln w="9525" cap="flat" cmpd="sng" algn="ctr">
+        <a:solidFill>
+          <a:schemeClr val="tx1">
+            <a:lumMod val="35000"/>
+            <a:lumOff val="65000"/>
+          </a:schemeClr>
+        </a:solidFill>
+        <a:round/>
+      </a:ln>
+    </cs:spPr>
+  </cs:dropLine>
+  <cs:errorBar>
+    <cs:lnRef idx="0"/>
+    <cs:fillRef idx="0"/>
+    <cs:effectRef idx="0"/>
+    <cs:fontRef idx="minor">
+      <a:schemeClr val="tx1"/>
+    </cs:fontRef>
+    <cs:spPr>
+      <a:ln w="9525" cap="flat" cmpd="sng" algn="ctr">
+        <a:solidFill>
+          <a:schemeClr val="tx1">
+            <a:lumMod val="65000"/>
+            <a:lumOff val="35000"/>
+          </a:schemeClr>
+        </a:solidFill>
+        <a:round/>
+      </a:ln>
+    </cs:spPr>
+  </cs:errorBar>
+  <cs:floor>
+    <cs:lnRef idx="0"/>
+    <cs:fillRef idx="0"/>
+    <cs:effectRef idx="0"/>
+    <cs:fontRef idx="minor">
+      <a:schemeClr val="tx1"/>
+    </cs:fontRef>
+    <cs:spPr>
+      <a:noFill/>
+      <a:ln>
+        <a:noFill/>
+      </a:ln>
+    </cs:spPr>
+  </cs:floor>
+  <cs:gridlineMajor>
+    <cs:lnRef idx="0"/>
+    <cs:fillRef idx="0"/>
+    <cs:effectRef idx="0"/>
+    <cs:fontRef idx="minor">
+      <a:schemeClr val="tx1"/>
+    </cs:fontRef>
+    <cs:spPr>
+      <a:ln w="9525" cap="flat" cmpd="sng" algn="ctr">
+        <a:solidFill>
+          <a:schemeClr val="tx1">
+            <a:lumMod val="15000"/>
+            <a:lumOff val="85000"/>
+          </a:schemeClr>
+        </a:solidFill>
+        <a:round/>
+      </a:ln>
+    </cs:spPr>
+  </cs:gridlineMajor>
+  <cs:gridlineMinor>
+    <cs:lnRef idx="0"/>
+    <cs:fillRef idx="0"/>
+    <cs:effectRef idx="0"/>
+    <cs:fontRef idx="minor">
+      <a:schemeClr val="tx1"/>
+    </cs:fontRef>
+    <cs:spPr>
+      <a:ln w="9525" cap="flat" cmpd="sng" algn="ctr">
+        <a:solidFill>
+          <a:schemeClr val="tx1">
+            <a:lumMod val="5000"/>
+            <a:lumOff val="95000"/>
+          </a:schemeClr>
+        </a:solidFill>
+        <a:round/>
+      </a:ln>
+    </cs:spPr>
+  </cs:gridlineMinor>
+  <cs:hiLoLine>
+    <cs:lnRef idx="0"/>
+    <cs:fillRef idx="0"/>
+    <cs:effectRef idx="0"/>
+    <cs:fontRef idx="minor">
+      <a:schemeClr val="tx1"/>
+    </cs:fontRef>
+    <cs:spPr>
+      <a:ln w="9525" cap="flat" cmpd="sng" algn="ctr">
+        <a:solidFill>
+          <a:schemeClr val="tx1">
+            <a:lumMod val="50000"/>
+            <a:lumOff val="50000"/>
+          </a:schemeClr>
+        </a:solidFill>
+        <a:round/>
+      </a:ln>
+    </cs:spPr>
+  </cs:hiLoLine>
+  <cs:leaderLine>
+    <cs:lnRef idx="0"/>
+    <cs:fillRef idx="0"/>
+    <cs:effectRef idx="0"/>
+    <cs:fontRef idx="minor">
+      <a:schemeClr val="tx1"/>
+    </cs:fontRef>
+    <cs:spPr>
+      <a:ln w="9525" cap="flat" cmpd="sng" algn="ctr">
+        <a:solidFill>
+          <a:schemeClr val="tx1">
+            <a:lumMod val="35000"/>
+            <a:lumOff val="65000"/>
+          </a:schemeClr>
+        </a:solidFill>
+        <a:round/>
+      </a:ln>
+    </cs:spPr>
+  </cs:leaderLine>
+  <cs:legend>
+    <cs:lnRef idx="0"/>
+    <cs:fillRef idx="0"/>
+    <cs:effectRef idx="0"/>
+    <cs:fontRef idx="minor">
+      <a:schemeClr val="tx1">
+        <a:lumMod val="65000"/>
+        <a:lumOff val="35000"/>
+      </a:schemeClr>
+    </cs:fontRef>
+    <cs:defRPr sz="900" kern="1200"/>
+  </cs:legend>
+  <cs:plotArea mods="allowNoFillOverride allowNoLineOverride">
+    <cs:lnRef idx="0"/>
+    <cs:fillRef idx="0"/>
+    <cs:effectRef idx="0"/>
+    <cs:fontRef idx="minor">
+      <a:schemeClr val="tx1"/>
+    </cs:fontRef>
+  </cs:plotArea>
+  <cs:plotArea3D mods="allowNoFillOverride allowNoLineOverride">
+    <cs:lnRef idx="0"/>
+    <cs:fillRef idx="0"/>
+    <cs:effectRef idx="0"/>
+    <cs:fontRef idx="minor">
+      <a:schemeClr val="tx1"/>
+    </cs:fontRef>
+  </cs:plotArea3D>
+  <cs:seriesAxis>
+    <cs:lnRef idx="0"/>
+    <cs:fillRef idx="0"/>
+    <cs:effectRef idx="0"/>
+    <cs:fontRef idx="minor">
+      <a:schemeClr val="tx1">
+        <a:lumMod val="65000"/>
+        <a:lumOff val="35000"/>
+      </a:schemeClr>
+    </cs:fontRef>
+    <cs:defRPr sz="900" kern="1200"/>
+  </cs:seriesAxis>
+  <cs:seriesLine>
+    <cs:lnRef idx="0"/>
+    <cs:fillRef idx="0"/>
+    <cs:effectRef idx="0"/>
+    <cs:fontRef idx="minor">
+      <a:schemeClr val="tx1"/>
+    </cs:fontRef>
+    <cs:spPr>
+      <a:ln w="9525" cap="flat" cmpd="sng" algn="ctr">
+        <a:solidFill>
+          <a:schemeClr val="tx1">
+            <a:lumMod val="35000"/>
+            <a:lumOff val="65000"/>
+          </a:schemeClr>
+        </a:solidFill>
+        <a:round/>
+      </a:ln>
+    </cs:spPr>
+  </cs:seriesLine>
+  <cs:title>
+    <cs:lnRef idx="0"/>
+    <cs:fillRef idx="0"/>
+    <cs:effectRef idx="0"/>
+    <cs:fontRef idx="minor">
+      <a:schemeClr val="tx1">
+        <a:lumMod val="65000"/>
+        <a:lumOff val="35000"/>
+      </a:schemeClr>
+    </cs:fontRef>
+    <cs:defRPr sz="1400" b="0" kern="1200" spc="0" baseline="0"/>
+  </cs:title>
+  <cs:trendline>
+    <cs:lnRef idx="0">
+      <cs:styleClr val="auto"/>
+    </cs:lnRef>
+    <cs:fillRef idx="0"/>
+    <cs:effectRef idx="0"/>
+    <cs:fontRef idx="minor">
+      <a:schemeClr val="tx1"/>
+    </cs:fontRef>
+    <cs:spPr>
+      <a:ln w="19050" cap="rnd">
+        <a:solidFill>
+          <a:schemeClr val="phClr"/>
+        </a:solidFill>
+        <a:prstDash val="sysDot"/>
+      </a:ln>
+    </cs:spPr>
+  </cs:trendline>
+  <cs:trendlineLabel>
+    <cs:lnRef idx="0"/>
+    <cs:fillRef idx="0"/>
+    <cs:effectRef idx="0"/>
+    <cs:fontRef idx="minor">
+      <a:schemeClr val="tx1">
+        <a:lumMod val="65000"/>
+        <a:lumOff val="35000"/>
+      </a:schemeClr>
+    </cs:fontRef>
+    <cs:defRPr sz="900" kern="1200"/>
+  </cs:trendlineLabel>
+  <cs:upBar>
+    <cs:lnRef idx="0"/>
+    <cs:fillRef idx="0"/>
+    <cs:effectRef idx="0"/>
+    <cs:fontRef idx="minor">
+      <a:schemeClr val="tx1"/>
+    </cs:fontRef>
+    <cs:spPr>
+      <a:solidFill>
+        <a:schemeClr val="lt1"/>
+      </a:solidFill>
+      <a:ln w="9525" cap="flat" cmpd="sng" algn="ctr">
+        <a:solidFill>
+          <a:schemeClr val="tx1">
+            <a:lumMod val="65000"/>
+            <a:lumOff val="35000"/>
+          </a:schemeClr>
+        </a:solidFill>
+        <a:round/>
+      </a:ln>
+    </cs:spPr>
+  </cs:upBar>
+  <cs:valueAxis>
+    <cs:lnRef idx="0"/>
+    <cs:fillRef idx="0"/>
+    <cs:effectRef idx="0"/>
+    <cs:fontRef idx="minor">
+      <a:schemeClr val="tx1">
+        <a:lumMod val="65000"/>
+        <a:lumOff val="35000"/>
+      </a:schemeClr>
+    </cs:fontRef>
+    <cs:spPr>
+      <a:ln w="9525" cap="flat" cmpd="sng" algn="ctr">
+        <a:solidFill>
+          <a:schemeClr val="tx1">
+            <a:lumMod val="25000"/>
+            <a:lumOff val="75000"/>
+          </a:schemeClr>
+        </a:solidFill>
+        <a:round/>
+      </a:ln>
+    </cs:spPr>
+    <cs:defRPr sz="900" kern="1200"/>
+  </cs:valueAxis>
+  <cs:wall>
+    <cs:lnRef idx="0"/>
+    <cs:fillRef idx="0"/>
+    <cs:effectRef idx="0"/>
+    <cs:fontRef idx="minor">
+      <a:schemeClr val="tx1"/>
+    </cs:fontRef>
+    <cs:spPr>
+      <a:noFill/>
+      <a:ln>
+        <a:noFill/>
+      </a:ln>
+    </cs:spPr>
+  </cs:wall>
+</cs:chartStyle>
+</file>
+
+<file path=ppt/charts/style5.xml><?xml version="1.0" encoding="utf-8"?>
+<cs:chartStyle xmlns:cs="http://schemas.microsoft.com/office/drawing/2012/chartStyle" xmlns:a="http://schemas.openxmlformats.org/drawingml/2006/main" id="240">
+  <cs:axisTitle>
+    <cs:lnRef idx="0"/>
+    <cs:fillRef idx="0"/>
+    <cs:effectRef idx="0"/>
+    <cs:fontRef idx="minor">
+      <a:schemeClr val="tx1">
+        <a:lumMod val="65000"/>
+        <a:lumOff val="35000"/>
+      </a:schemeClr>
+    </cs:fontRef>
+    <cs:defRPr sz="1000" kern="1200"/>
+  </cs:axisTitle>
+  <cs:categoryAxis>
+    <cs:lnRef idx="0"/>
+    <cs:fillRef idx="0"/>
+    <cs:effectRef idx="0"/>
+    <cs:fontRef idx="minor">
+      <a:schemeClr val="tx1">
+        <a:lumMod val="65000"/>
+        <a:lumOff val="35000"/>
+      </a:schemeClr>
+    </cs:fontRef>
+    <cs:spPr>
+      <a:ln w="9525" cap="flat" cmpd="sng" algn="ctr">
+        <a:solidFill>
+          <a:schemeClr val="tx1">
+            <a:lumMod val="25000"/>
+            <a:lumOff val="75000"/>
+          </a:schemeClr>
+        </a:solidFill>
+        <a:round/>
+      </a:ln>
+    </cs:spPr>
+    <cs:defRPr sz="900" kern="1200"/>
+  </cs:categoryAxis>
+  <cs:chartArea mods="allowNoFillOverride allowNoLineOverride">
+    <cs:lnRef idx="0"/>
+    <cs:fillRef idx="0"/>
+    <cs:effectRef idx="0"/>
+    <cs:fontRef idx="minor">
+      <a:schemeClr val="tx1"/>
+    </cs:fontRef>
+    <cs:spPr>
+      <a:solidFill>
+        <a:schemeClr val="bg1"/>
+      </a:solidFill>
+      <a:ln w="9525" cap="flat" cmpd="sng" algn="ctr">
+        <a:solidFill>
+          <a:schemeClr val="tx1">
+            <a:lumMod val="15000"/>
+            <a:lumOff val="85000"/>
+          </a:schemeClr>
+        </a:solidFill>
+        <a:round/>
+      </a:ln>
+    </cs:spPr>
+    <cs:defRPr sz="1000" kern="1200"/>
+  </cs:chartArea>
+  <cs:dataLabel>
+    <cs:lnRef idx="0"/>
+    <cs:fillRef idx="0"/>
+    <cs:effectRef idx="0"/>
+    <cs:fontRef idx="minor">
+      <a:schemeClr val="tx1">
+        <a:lumMod val="75000"/>
+        <a:lumOff val="25000"/>
+      </a:schemeClr>
+    </cs:fontRef>
+    <cs:defRPr sz="900" kern="1200"/>
+  </cs:dataLabel>
+  <cs:dataLabelCallout>
+    <cs:lnRef idx="0"/>
+    <cs:fillRef idx="0"/>
+    <cs:effectRef idx="0"/>
+    <cs:fontRef idx="minor">
+      <a:schemeClr val="dk1">
+        <a:lumMod val="65000"/>
+        <a:lumOff val="35000"/>
+      </a:schemeClr>
+    </cs:fontRef>
+    <cs:spPr>
+      <a:solidFill>
+        <a:schemeClr val="lt1"/>
+      </a:solidFill>
+      <a:ln>
+        <a:solidFill>
+          <a:schemeClr val="dk1">
+            <a:lumMod val="25000"/>
+            <a:lumOff val="75000"/>
+          </a:schemeClr>
+        </a:solidFill>
+      </a:ln>
+    </cs:spPr>
+    <cs:defRPr sz="900" kern="1200"/>
+    <cs:bodyPr rot="0" spcFirstLastPara="1" vertOverflow="clip" horzOverflow="clip" vert="horz" wrap="square" lIns="36576" tIns="18288" rIns="36576" bIns="18288" anchor="ctr" anchorCtr="1">
+      <a:spAutoFit/>
+    </cs:bodyPr>
+  </cs:dataLabelCallout>
+  <cs:dataPoint>
+    <cs:lnRef idx="0"/>
+    <cs:fillRef idx="1">
+      <cs:styleClr val="auto"/>
+    </cs:fillRef>
+    <cs:effectRef idx="0"/>
+    <cs:fontRef idx="minor">
+      <a:schemeClr val="tx1"/>
+    </cs:fontRef>
+  </cs:dataPoint>
+  <cs:dataPoint3D>
+    <cs:lnRef idx="0"/>
+    <cs:fillRef idx="1">
+      <cs:styleClr val="auto"/>
+    </cs:fillRef>
+    <cs:effectRef idx="0"/>
+    <cs:fontRef idx="minor">
+      <a:schemeClr val="tx1"/>
+    </cs:fontRef>
+  </cs:dataPoint3D>
+  <cs:dataPointLine>
+    <cs:lnRef idx="0">
+      <cs:styleClr val="auto"/>
+    </cs:lnRef>
+    <cs:fillRef idx="1"/>
+    <cs:effectRef idx="0"/>
+    <cs:fontRef idx="minor">
+      <a:schemeClr val="tx1"/>
+    </cs:fontRef>
+    <cs:spPr>
+      <a:ln w="19050" cap="rnd">
+        <a:solidFill>
+          <a:schemeClr val="phClr"/>
+        </a:solidFill>
+        <a:round/>
+      </a:ln>
+    </cs:spPr>
+  </cs:dataPointLine>
+  <cs:dataPointMarker>
+    <cs:lnRef idx="0">
+      <cs:styleClr val="auto"/>
+    </cs:lnRef>
+    <cs:fillRef idx="1">
+      <cs:styleClr val="auto"/>
+    </cs:fillRef>
+    <cs:effectRef idx="0"/>
+    <cs:fontRef idx="minor">
+      <a:schemeClr val="tx1"/>
+    </cs:fontRef>
+    <cs:spPr>
+      <a:ln w="9525">
+        <a:solidFill>
+          <a:schemeClr val="phClr"/>
+        </a:solidFill>
+      </a:ln>
+    </cs:spPr>
+  </cs:dataPointMarker>
+  <cs:dataPointMarkerLayout symbol="circle" size="5"/>
+  <cs:dataPointWireframe>
+    <cs:lnRef idx="0">
+      <cs:styleClr val="auto"/>
+    </cs:lnRef>
+    <cs:fillRef idx="0"/>
+    <cs:effectRef idx="0"/>
+    <cs:fontRef idx="minor">
+      <a:schemeClr val="dk1"/>
+    </cs:fontRef>
+    <cs:spPr>
+      <a:ln w="9525" cap="rnd">
+        <a:solidFill>
+          <a:schemeClr val="phClr"/>
+        </a:solidFill>
+        <a:round/>
+      </a:ln>
+    </cs:spPr>
+  </cs:dataPointWireframe>
+  <cs:dataTable>
+    <cs:lnRef idx="0"/>
+    <cs:fillRef idx="0"/>
+    <cs:effectRef idx="0"/>
+    <cs:fontRef idx="minor">
+      <a:schemeClr val="tx1">
+        <a:lumMod val="65000"/>
+        <a:lumOff val="35000"/>
+      </a:schemeClr>
+    </cs:fontRef>
+    <cs:spPr>
+      <a:noFill/>
+      <a:ln w="9525" cap="flat" cmpd="sng" algn="ctr">
+        <a:solidFill>
+          <a:schemeClr val="tx1">
+            <a:lumMod val="15000"/>
+            <a:lumOff val="85000"/>
+          </a:schemeClr>
+        </a:solidFill>
+        <a:round/>
+      </a:ln>
+    </cs:spPr>
+    <cs:defRPr sz="900" kern="1200"/>
+  </cs:dataTable>
+  <cs:downBar>
+    <cs:lnRef idx="0"/>
+    <cs:fillRef idx="0"/>
+    <cs:effectRef idx="0"/>
+    <cs:fontRef idx="minor">
+      <a:schemeClr val="tx1"/>
+    </cs:fontRef>
+    <cs:spPr>
+      <a:solidFill>
+        <a:schemeClr val="dk1">
+          <a:lumMod val="75000"/>
+          <a:lumOff val="25000"/>
+        </a:schemeClr>
+      </a:solidFill>
+      <a:ln w="9525" cap="flat" cmpd="sng" algn="ctr">
+        <a:solidFill>
+          <a:schemeClr val="tx1">
+            <a:lumMod val="65000"/>
+            <a:lumOff val="35000"/>
+          </a:schemeClr>
+        </a:solidFill>
+        <a:round/>
+      </a:ln>
+    </cs:spPr>
+  </cs:downBar>
+  <cs:dropLine>
+    <cs:lnRef idx="0"/>
+    <cs:fillRef idx="0"/>
+    <cs:effectRef idx="0"/>
+    <cs:fontRef idx="minor">
+      <a:schemeClr val="tx1"/>
+    </cs:fontRef>
+    <cs:spPr>
+      <a:ln w="9525" cap="flat" cmpd="sng" algn="ctr">
+        <a:solidFill>
+          <a:schemeClr val="tx1">
+            <a:lumMod val="35000"/>
+            <a:lumOff val="65000"/>
+          </a:schemeClr>
+        </a:solidFill>
+        <a:round/>
+      </a:ln>
+    </cs:spPr>
+  </cs:dropLine>
+  <cs:errorBar>
+    <cs:lnRef idx="0"/>
+    <cs:fillRef idx="0"/>
+    <cs:effectRef idx="0"/>
+    <cs:fontRef idx="minor">
+      <a:schemeClr val="tx1"/>
+    </cs:fontRef>
+    <cs:spPr>
+      <a:ln w="9525" cap="flat" cmpd="sng" algn="ctr">
+        <a:solidFill>
+          <a:schemeClr val="tx1">
+            <a:lumMod val="65000"/>
+            <a:lumOff val="35000"/>
+          </a:schemeClr>
+        </a:solidFill>
+        <a:round/>
+      </a:ln>
+    </cs:spPr>
+  </cs:errorBar>
+  <cs:floor>
+    <cs:lnRef idx="0"/>
+    <cs:fillRef idx="0"/>
+    <cs:effectRef idx="0"/>
+    <cs:fontRef idx="minor">
+      <a:schemeClr val="tx1"/>
+    </cs:fontRef>
+    <cs:spPr>
+      <a:noFill/>
+      <a:ln>
+        <a:noFill/>
+      </a:ln>
+    </cs:spPr>
+  </cs:floor>
+  <cs:gridlineMajor>
+    <cs:lnRef idx="0"/>
+    <cs:fillRef idx="0"/>
+    <cs:effectRef idx="0"/>
+    <cs:fontRef idx="minor">
+      <a:schemeClr val="tx1"/>
+    </cs:fontRef>
+    <cs:spPr>
+      <a:ln w="9525" cap="flat" cmpd="sng" algn="ctr">
+        <a:solidFill>
+          <a:schemeClr val="tx1">
+            <a:lumMod val="15000"/>
+            <a:lumOff val="85000"/>
+          </a:schemeClr>
+        </a:solidFill>
+        <a:round/>
+      </a:ln>
+    </cs:spPr>
+  </cs:gridlineMajor>
+  <cs:gridlineMinor>
+    <cs:lnRef idx="0"/>
+    <cs:fillRef idx="0"/>
+    <cs:effectRef idx="0"/>
+    <cs:fontRef idx="minor">
+      <a:schemeClr val="tx1"/>
+    </cs:fontRef>
+    <cs:spPr>
+      <a:ln w="9525" cap="flat" cmpd="sng" algn="ctr">
+        <a:solidFill>
+          <a:schemeClr val="tx1">
+            <a:lumMod val="5000"/>
+            <a:lumOff val="95000"/>
+          </a:schemeClr>
+        </a:solidFill>
+        <a:round/>
+      </a:ln>
+    </cs:spPr>
+  </cs:gridlineMinor>
+  <cs:hiLoLine>
+    <cs:lnRef idx="0"/>
+    <cs:fillRef idx="0"/>
+    <cs:effectRef idx="0"/>
+    <cs:fontRef idx="minor">
+      <a:schemeClr val="tx1"/>
+    </cs:fontRef>
+    <cs:spPr>
+      <a:ln w="9525" cap="flat" cmpd="sng" algn="ctr">
+        <a:solidFill>
+          <a:schemeClr val="tx1">
+            <a:lumMod val="50000"/>
+            <a:lumOff val="50000"/>
+          </a:schemeClr>
+        </a:solidFill>
+        <a:round/>
+      </a:ln>
+    </cs:spPr>
+  </cs:hiLoLine>
+  <cs:leaderLine>
+    <cs:lnRef idx="0"/>
+    <cs:fillRef idx="0"/>
+    <cs:effectRef idx="0"/>
+    <cs:fontRef idx="minor">
+      <a:schemeClr val="tx1"/>
+    </cs:fontRef>
+    <cs:spPr>
+      <a:ln w="9525" cap="flat" cmpd="sng" algn="ctr">
+        <a:solidFill>
+          <a:schemeClr val="tx1">
+            <a:lumMod val="35000"/>
+            <a:lumOff val="65000"/>
+          </a:schemeClr>
+        </a:solidFill>
+        <a:round/>
+      </a:ln>
+    </cs:spPr>
+  </cs:leaderLine>
+  <cs:legend>
+    <cs:lnRef idx="0"/>
+    <cs:fillRef idx="0"/>
+    <cs:effectRef idx="0"/>
+    <cs:fontRef idx="minor">
+      <a:schemeClr val="tx1">
+        <a:lumMod val="65000"/>
+        <a:lumOff val="35000"/>
+      </a:schemeClr>
+    </cs:fontRef>
+    <cs:defRPr sz="900" kern="1200"/>
+  </cs:legend>
+  <cs:plotArea mods="allowNoFillOverride allowNoLineOverride">
+    <cs:lnRef idx="0"/>
+    <cs:fillRef idx="0"/>
+    <cs:effectRef idx="0"/>
+    <cs:fontRef idx="minor">
+      <a:schemeClr val="tx1"/>
+    </cs:fontRef>
+  </cs:plotArea>
+  <cs:plotArea3D mods="allowNoFillOverride allowNoLineOverride">
+    <cs:lnRef idx="0"/>
+    <cs:fillRef idx="0"/>
+    <cs:effectRef idx="0"/>
+    <cs:fontRef idx="minor">
+      <a:schemeClr val="tx1"/>
+    </cs:fontRef>
+  </cs:plotArea3D>
+  <cs:seriesAxis>
+    <cs:lnRef idx="0"/>
+    <cs:fillRef idx="0"/>
+    <cs:effectRef idx="0"/>
+    <cs:fontRef idx="minor">
+      <a:schemeClr val="tx1">
+        <a:lumMod val="65000"/>
+        <a:lumOff val="35000"/>
+      </a:schemeClr>
+    </cs:fontRef>
+    <cs:defRPr sz="900" kern="1200"/>
+  </cs:seriesAxis>
+  <cs:seriesLine>
+    <cs:lnRef idx="0"/>
+    <cs:fillRef idx="0"/>
+    <cs:effectRef idx="0"/>
+    <cs:fontRef idx="minor">
+      <a:schemeClr val="tx1"/>
+    </cs:fontRef>
+    <cs:spPr>
+      <a:ln w="9525" cap="flat" cmpd="sng" algn="ctr">
+        <a:solidFill>
+          <a:schemeClr val="tx1">
+            <a:lumMod val="35000"/>
+            <a:lumOff val="65000"/>
+          </a:schemeClr>
+        </a:solidFill>
+        <a:round/>
+      </a:ln>
+    </cs:spPr>
+  </cs:seriesLine>
+  <cs:title>
+    <cs:lnRef idx="0"/>
+    <cs:fillRef idx="0"/>
+    <cs:effectRef idx="0"/>
+    <cs:fontRef idx="minor">
+      <a:schemeClr val="tx1">
+        <a:lumMod val="65000"/>
+        <a:lumOff val="35000"/>
+      </a:schemeClr>
+    </cs:fontRef>
+    <cs:defRPr sz="1400" b="0" kern="1200" spc="0" baseline="0"/>
+  </cs:title>
+  <cs:trendline>
+    <cs:lnRef idx="0">
+      <cs:styleClr val="auto"/>
+    </cs:lnRef>
+    <cs:fillRef idx="0"/>
+    <cs:effectRef idx="0"/>
+    <cs:fontRef idx="minor">
+      <a:schemeClr val="tx1"/>
+    </cs:fontRef>
+    <cs:spPr>
+      <a:ln w="19050" cap="rnd">
+        <a:solidFill>
+          <a:schemeClr val="phClr"/>
+        </a:solidFill>
+        <a:prstDash val="sysDot"/>
+      </a:ln>
+    </cs:spPr>
+  </cs:trendline>
+  <cs:trendlineLabel>
+    <cs:lnRef idx="0"/>
+    <cs:fillRef idx="0"/>
+    <cs:effectRef idx="0"/>
+    <cs:fontRef idx="minor">
+      <a:schemeClr val="tx1">
+        <a:lumMod val="65000"/>
+        <a:lumOff val="35000"/>
+      </a:schemeClr>
+    </cs:fontRef>
+    <cs:defRPr sz="900" kern="1200"/>
+  </cs:trendlineLabel>
+  <cs:upBar>
+    <cs:lnRef idx="0"/>
+    <cs:fillRef idx="0"/>
+    <cs:effectRef idx="0"/>
+    <cs:fontRef idx="minor">
+      <a:schemeClr val="tx1"/>
+    </cs:fontRef>
+    <cs:spPr>
+      <a:solidFill>
+        <a:schemeClr val="lt1"/>
+      </a:solidFill>
+      <a:ln w="9525" cap="flat" cmpd="sng" algn="ctr">
+        <a:solidFill>
+          <a:schemeClr val="tx1">
+            <a:lumMod val="65000"/>
+            <a:lumOff val="35000"/>
+          </a:schemeClr>
+        </a:solidFill>
+        <a:round/>
+      </a:ln>
+    </cs:spPr>
+  </cs:upBar>
+  <cs:valueAxis>
+    <cs:lnRef idx="0"/>
+    <cs:fillRef idx="0"/>
+    <cs:effectRef idx="0"/>
+    <cs:fontRef idx="minor">
+      <a:schemeClr val="tx1">
+        <a:lumMod val="65000"/>
+        <a:lumOff val="35000"/>
+      </a:schemeClr>
+    </cs:fontRef>
+    <cs:spPr>
+      <a:ln w="9525" cap="flat" cmpd="sng" algn="ctr">
+        <a:solidFill>
+          <a:schemeClr val="tx1">
+            <a:lumMod val="25000"/>
+            <a:lumOff val="75000"/>
+          </a:schemeClr>
+        </a:solidFill>
+        <a:round/>
+      </a:ln>
+    </cs:spPr>
+    <cs:defRPr sz="900" kern="1200"/>
+  </cs:valueAxis>
+  <cs:wall>
+    <cs:lnRef idx="0"/>
+    <cs:fillRef idx="0"/>
+    <cs:effectRef idx="0"/>
+    <cs:fontRef idx="minor">
+      <a:schemeClr val="tx1"/>
+    </cs:fontRef>
+    <cs:spPr>
+      <a:noFill/>
+      <a:ln>
+        <a:noFill/>
+      </a:ln>
+    </cs:spPr>
+  </cs:wall>
+</cs:chartStyle>
+</file>
+
+<file path=ppt/charts/style6.xml><?xml version="1.0" encoding="utf-8"?>
+<cs:chartStyle xmlns:cs="http://schemas.microsoft.com/office/drawing/2012/chartStyle" xmlns:a="http://schemas.openxmlformats.org/drawingml/2006/main" id="201">
+  <cs:axisTitle>
+    <cs:lnRef idx="0"/>
+    <cs:fillRef idx="0"/>
+    <cs:effectRef idx="0"/>
+    <cs:fontRef idx="minor">
+      <a:schemeClr val="tx1">
+        <a:lumMod val="65000"/>
+        <a:lumOff val="35000"/>
+      </a:schemeClr>
+    </cs:fontRef>
+    <cs:defRPr sz="1000" kern="1200"/>
+  </cs:axisTitle>
+  <cs:categoryAxis>
+    <cs:lnRef idx="0"/>
+    <cs:fillRef idx="0"/>
+    <cs:effectRef idx="0"/>
+    <cs:fontRef idx="minor">
+      <a:schemeClr val="tx1">
+        <a:lumMod val="65000"/>
+        <a:lumOff val="35000"/>
+      </a:schemeClr>
+    </cs:fontRef>
+    <cs:spPr>
+      <a:ln w="9525" cap="flat" cmpd="sng" algn="ctr">
+        <a:solidFill>
+          <a:schemeClr val="tx1">
+            <a:lumMod val="15000"/>
+            <a:lumOff val="85000"/>
+          </a:schemeClr>
+        </a:solidFill>
+        <a:round/>
+      </a:ln>
+    </cs:spPr>
+    <cs:defRPr sz="900" kern="1200"/>
+  </cs:categoryAxis>
+  <cs:chartArea mods="allowNoFillOverride allowNoLineOverride">
+    <cs:lnRef idx="0"/>
+    <cs:fillRef idx="0"/>
+    <cs:effectRef idx="0"/>
+    <cs:fontRef idx="minor">
+      <a:schemeClr val="tx1"/>
+    </cs:fontRef>
+    <cs:spPr>
+      <a:solidFill>
+        <a:schemeClr val="bg1"/>
+      </a:solidFill>
+      <a:ln w="9525" cap="flat" cmpd="sng" algn="ctr">
+        <a:solidFill>
+          <a:schemeClr val="tx1">
+            <a:lumMod val="15000"/>
+            <a:lumOff val="85000"/>
+          </a:schemeClr>
+        </a:solidFill>
+        <a:round/>
+      </a:ln>
+    </cs:spPr>
+    <cs:defRPr sz="1000" kern="1200"/>
+  </cs:chartArea>
+  <cs:dataLabel>
+    <cs:lnRef idx="0"/>
+    <cs:fillRef idx="0"/>
+    <cs:effectRef idx="0"/>
+    <cs:fontRef idx="minor">
+      <a:schemeClr val="tx1">
+        <a:lumMod val="75000"/>
+        <a:lumOff val="25000"/>
+      </a:schemeClr>
+    </cs:fontRef>
+    <cs:defRPr sz="900" kern="1200"/>
+  </cs:dataLabel>
+  <cs:dataLabelCallout>
+    <cs:lnRef idx="0"/>
+    <cs:fillRef idx="0"/>
+    <cs:effectRef idx="0"/>
+    <cs:fontRef idx="minor">
+      <a:schemeClr val="dk1">
+        <a:lumMod val="65000"/>
+        <a:lumOff val="35000"/>
+      </a:schemeClr>
+    </cs:fontRef>
+    <cs:spPr>
+      <a:solidFill>
+        <a:schemeClr val="lt1"/>
+      </a:solidFill>
+      <a:ln>
+        <a:solidFill>
+          <a:schemeClr val="dk1">
+            <a:lumMod val="25000"/>
+            <a:lumOff val="75000"/>
+          </a:schemeClr>
+        </a:solidFill>
+      </a:ln>
+    </cs:spPr>
+    <cs:defRPr sz="900" kern="1200"/>
+    <cs:bodyPr rot="0" spcFirstLastPara="1" vertOverflow="clip" horzOverflow="clip" vert="horz" wrap="square" lIns="36576" tIns="18288" rIns="36576" bIns="18288" anchor="ctr" anchorCtr="1">
+      <a:spAutoFit/>
+    </cs:bodyPr>
+  </cs:dataLabelCallout>
+  <cs:dataPoint>
+    <cs:lnRef idx="0"/>
+    <cs:fillRef idx="1">
+      <cs:styleClr val="auto"/>
+    </cs:fillRef>
+    <cs:effectRef idx="0"/>
+    <cs:fontRef idx="minor">
+      <a:schemeClr val="tx1"/>
+    </cs:fontRef>
+  </cs:dataPoint>
+  <cs:dataPoint3D>
+    <cs:lnRef idx="0"/>
+    <cs:fillRef idx="1">
+      <cs:styleClr val="auto"/>
+    </cs:fillRef>
+    <cs:effectRef idx="0"/>
+    <cs:fontRef idx="minor">
+      <a:schemeClr val="tx1"/>
+    </cs:fontRef>
+  </cs:dataPoint3D>
+  <cs:dataPointLine>
+    <cs:lnRef idx="0">
+      <cs:styleClr val="auto"/>
+    </cs:lnRef>
+    <cs:fillRef idx="1"/>
+    <cs:effectRef idx="0"/>
+    <cs:fontRef idx="minor">
+      <a:schemeClr val="tx1"/>
+    </cs:fontRef>
+    <cs:spPr>
+      <a:ln w="28575" cap="rnd">
+        <a:solidFill>
+          <a:schemeClr val="phClr"/>
+        </a:solidFill>
+        <a:round/>
+      </a:ln>
+    </cs:spPr>
+  </cs:dataPointLine>
+  <cs:dataPointMarker>
+    <cs:lnRef idx="0">
+      <cs:styleClr val="auto"/>
+    </cs:lnRef>
+    <cs:fillRef idx="1">
+      <cs:styleClr val="auto"/>
+    </cs:fillRef>
+    <cs:effectRef idx="0"/>
+    <cs:fontRef idx="minor">
+      <a:schemeClr val="tx1"/>
+    </cs:fontRef>
+    <cs:spPr>
+      <a:ln w="9525">
+        <a:solidFill>
+          <a:schemeClr val="phClr"/>
+        </a:solidFill>
+      </a:ln>
+    </cs:spPr>
+  </cs:dataPointMarker>
+  <cs:dataPointMarkerLayout symbol="circle" size="5"/>
+  <cs:dataPointWireframe>
+    <cs:lnRef idx="0">
+      <cs:styleClr val="auto"/>
+    </cs:lnRef>
+    <cs:fillRef idx="1"/>
+    <cs:effectRef idx="0"/>
+    <cs:fontRef idx="minor">
+      <a:schemeClr val="tx1"/>
+    </cs:fontRef>
+    <cs:spPr>
+      <a:ln w="9525" cap="rnd">
+        <a:solidFill>
+          <a:schemeClr val="phClr"/>
+        </a:solidFill>
+        <a:round/>
+      </a:ln>
+    </cs:spPr>
+  </cs:dataPointWireframe>
+  <cs:dataTable>
+    <cs:lnRef idx="0"/>
+    <cs:fillRef idx="0"/>
+    <cs:effectRef idx="0"/>
+    <cs:fontRef idx="minor">
+      <a:schemeClr val="tx1">
+        <a:lumMod val="65000"/>
+        <a:lumOff val="35000"/>
+      </a:schemeClr>
+    </cs:fontRef>
+    <cs:spPr>
+      <a:noFill/>
+      <a:ln w="9525" cap="flat" cmpd="sng" algn="ctr">
+        <a:solidFill>
+          <a:schemeClr val="tx1">
+            <a:lumMod val="15000"/>
+            <a:lumOff val="85000"/>
+          </a:schemeClr>
+        </a:solidFill>
+        <a:round/>
+      </a:ln>
+    </cs:spPr>
+    <cs:defRPr sz="900" kern="1200"/>
+  </cs:dataTable>
+  <cs:downBar>
+    <cs:lnRef idx="0"/>
+    <cs:fillRef idx="0"/>
+    <cs:effectRef idx="0"/>
+    <cs:fontRef idx="minor">
+      <a:schemeClr val="dk1"/>
+    </cs:fontRef>
+    <cs:spPr>
+      <a:solidFill>
+        <a:schemeClr val="dk1">
+          <a:lumMod val="65000"/>
+          <a:lumOff val="35000"/>
+        </a:schemeClr>
+      </a:solidFill>
+      <a:ln w="9525">
+        <a:solidFill>
+          <a:schemeClr val="tx1">
+            <a:lumMod val="65000"/>
+            <a:lumOff val="35000"/>
+          </a:schemeClr>
+        </a:solidFill>
+      </a:ln>
+    </cs:spPr>
+  </cs:downBar>
+  <cs:dropLine>
+    <cs:lnRef idx="0"/>
+    <cs:fillRef idx="0"/>
+    <cs:effectRef idx="0"/>
+    <cs:fontRef idx="minor">
+      <a:schemeClr val="tx1"/>
+    </cs:fontRef>
+    <cs:spPr>
+      <a:ln w="9525" cap="flat" cmpd="sng" algn="ctr">
+        <a:solidFill>
+          <a:schemeClr val="tx1">
+            <a:lumMod val="35000"/>
+            <a:lumOff val="65000"/>
+          </a:schemeClr>
+        </a:solidFill>
+        <a:round/>
+      </a:ln>
+    </cs:spPr>
+  </cs:dropLine>
+  <cs:errorBar>
+    <cs:lnRef idx="0"/>
+    <cs:fillRef idx="0"/>
+    <cs:effectRef idx="0"/>
+    <cs:fontRef idx="minor">
+      <a:schemeClr val="tx1"/>
+    </cs:fontRef>
+    <cs:spPr>
+      <a:ln w="9525" cap="flat" cmpd="sng" algn="ctr">
+        <a:solidFill>
+          <a:schemeClr val="tx1">
+            <a:lumMod val="65000"/>
+            <a:lumOff val="35000"/>
+          </a:schemeClr>
+        </a:solidFill>
+        <a:round/>
+      </a:ln>
+    </cs:spPr>
+  </cs:errorBar>
+  <cs:floor>
+    <cs:lnRef idx="0"/>
+    <cs:fillRef idx="0"/>
+    <cs:effectRef idx="0"/>
+    <cs:fontRef idx="minor">
+      <a:schemeClr val="tx1"/>
+    </cs:fontRef>
+    <cs:spPr>
+      <a:noFill/>
+      <a:ln>
+        <a:noFill/>
+      </a:ln>
+    </cs:spPr>
+  </cs:floor>
+  <cs:gridlineMajor>
+    <cs:lnRef idx="0"/>
+    <cs:fillRef idx="0"/>
+    <cs:effectRef idx="0"/>
+    <cs:fontRef idx="minor">
+      <a:schemeClr val="tx1"/>
+    </cs:fontRef>
+    <cs:spPr>
+      <a:ln w="9525" cap="flat" cmpd="sng" algn="ctr">
+        <a:solidFill>
+          <a:schemeClr val="tx1">
+            <a:lumMod val="15000"/>
+            <a:lumOff val="85000"/>
+          </a:schemeClr>
+        </a:solidFill>
+        <a:round/>
+      </a:ln>
+    </cs:spPr>
+  </cs:gridlineMajor>
+  <cs:gridlineMinor>
+    <cs:lnRef idx="0"/>
+    <cs:fillRef idx="0"/>
+    <cs:effectRef idx="0"/>
+    <cs:fontRef idx="minor">
+      <a:schemeClr val="tx1"/>
+    </cs:fontRef>
+    <cs:spPr>
+      <a:ln w="9525" cap="flat" cmpd="sng" algn="ctr">
+        <a:solidFill>
+          <a:schemeClr val="tx1">
+            <a:lumMod val="5000"/>
+            <a:lumOff val="95000"/>
+          </a:schemeClr>
+        </a:solidFill>
+        <a:round/>
+      </a:ln>
+    </cs:spPr>
+  </cs:gridlineMinor>
+  <cs:hiLoLine>
+    <cs:lnRef idx="0"/>
+    <cs:fillRef idx="0"/>
+    <cs:effectRef idx="0"/>
+    <cs:fontRef idx="minor">
+      <a:schemeClr val="tx1"/>
+    </cs:fontRef>
+    <cs:spPr>
+      <a:ln w="9525" cap="flat" cmpd="sng" algn="ctr">
+        <a:solidFill>
+          <a:schemeClr val="tx1">
+            <a:lumMod val="75000"/>
+            <a:lumOff val="25000"/>
+          </a:schemeClr>
+        </a:solidFill>
+        <a:round/>
+      </a:ln>
+    </cs:spPr>
+  </cs:hiLoLine>
+  <cs:leaderLine>
+    <cs:lnRef idx="0"/>
+    <cs:fillRef idx="0"/>
+    <cs:effectRef idx="0"/>
+    <cs:fontRef idx="minor">
+      <a:schemeClr val="tx1"/>
+    </cs:fontRef>
+    <cs:spPr>
+      <a:ln w="9525" cap="flat" cmpd="sng" algn="ctr">
+        <a:solidFill>
+          <a:schemeClr val="tx1">
+            <a:lumMod val="35000"/>
+            <a:lumOff val="65000"/>
+          </a:schemeClr>
+        </a:solidFill>
+        <a:round/>
+      </a:ln>
+    </cs:spPr>
+  </cs:leaderLine>
+  <cs:legend>
+    <cs:lnRef idx="0"/>
+    <cs:fillRef idx="0"/>
+    <cs:effectRef idx="0"/>
+    <cs:fontRef idx="minor">
+      <a:schemeClr val="tx1">
+        <a:lumMod val="65000"/>
+        <a:lumOff val="35000"/>
+      </a:schemeClr>
+    </cs:fontRef>
+    <cs:defRPr sz="900" kern="1200"/>
+  </cs:legend>
+  <cs:plotArea mods="allowNoFillOverride allowNoLineOverride">
+    <cs:lnRef idx="0"/>
+    <cs:fillRef idx="0"/>
+    <cs:effectRef idx="0"/>
+    <cs:fontRef idx="minor">
+      <a:schemeClr val="tx1"/>
+    </cs:fontRef>
+  </cs:plotArea>
+  <cs:plotArea3D mods="allowNoFillOverride allowNoLineOverride">
+    <cs:lnRef idx="0"/>
+    <cs:fillRef idx="0"/>
+    <cs:effectRef idx="0"/>
+    <cs:fontRef idx="minor">
+      <a:schemeClr val="tx1"/>
+    </cs:fontRef>
+  </cs:plotArea3D>
+  <cs:seriesAxis>
+    <cs:lnRef idx="0"/>
+    <cs:fillRef idx="0"/>
+    <cs:effectRef idx="0"/>
+    <cs:fontRef idx="minor">
+      <a:schemeClr val="tx1">
+        <a:lumMod val="65000"/>
+        <a:lumOff val="35000"/>
+      </a:schemeClr>
+    </cs:fontRef>
+    <cs:defRPr sz="900" kern="1200"/>
+  </cs:seriesAxis>
+  <cs:seriesLine>
+    <cs:lnRef idx="0"/>
+    <cs:fillRef idx="0"/>
+    <cs:effectRef idx="0"/>
+    <cs:fontRef idx="minor">
+      <a:schemeClr val="tx1"/>
+    </cs:fontRef>
+    <cs:spPr>
+      <a:ln w="9525" cap="flat" cmpd="sng" algn="ctr">
+        <a:solidFill>
+          <a:schemeClr val="tx1">
+            <a:lumMod val="35000"/>
+            <a:lumOff val="65000"/>
+          </a:schemeClr>
+        </a:solidFill>
+        <a:round/>
+      </a:ln>
+    </cs:spPr>
+  </cs:seriesLine>
+  <cs:title>
+    <cs:lnRef idx="0"/>
+    <cs:fillRef idx="0"/>
+    <cs:effectRef idx="0"/>
+    <cs:fontRef idx="minor">
+      <a:schemeClr val="tx1">
+        <a:lumMod val="65000"/>
+        <a:lumOff val="35000"/>
+      </a:schemeClr>
+    </cs:fontRef>
+    <cs:defRPr sz="1400" b="0" kern="1200" spc="0" baseline="0"/>
+  </cs:title>
+  <cs:trendline>
+    <cs:lnRef idx="0">
+      <cs:styleClr val="auto"/>
+    </cs:lnRef>
+    <cs:fillRef idx="0"/>
+    <cs:effectRef idx="0"/>
+    <cs:fontRef idx="minor">
+      <a:schemeClr val="tx1"/>
+    </cs:fontRef>
+    <cs:spPr>
+      <a:ln w="19050" cap="rnd">
+        <a:solidFill>
+          <a:schemeClr val="phClr"/>
+        </a:solidFill>
+        <a:prstDash val="sysDot"/>
+      </a:ln>
+    </cs:spPr>
+  </cs:trendline>
+  <cs:trendlineLabel>
+    <cs:lnRef idx="0"/>
+    <cs:fillRef idx="0"/>
+    <cs:effectRef idx="0"/>
+    <cs:fontRef idx="minor">
+      <a:schemeClr val="tx1">
+        <a:lumMod val="65000"/>
+        <a:lumOff val="35000"/>
+      </a:schemeClr>
+    </cs:fontRef>
+    <cs:defRPr sz="900" kern="1200"/>
+  </cs:trendlineLabel>
+  <cs:upBar>
+    <cs:lnRef idx="0"/>
+    <cs:fillRef idx="0"/>
+    <cs:effectRef idx="0"/>
+    <cs:fontRef idx="minor">
+      <a:schemeClr val="dk1"/>
+    </cs:fontRef>
+    <cs:spPr>
+      <a:solidFill>
+        <a:schemeClr val="lt1"/>
+      </a:solidFill>
+      <a:ln w="9525">
+        <a:solidFill>
+          <a:schemeClr val="tx1">
+            <a:lumMod val="15000"/>
+            <a:lumOff val="85000"/>
+          </a:schemeClr>
+        </a:solidFill>
+      </a:ln>
+    </cs:spPr>
+  </cs:upBar>
+  <cs:valueAxis>
+    <cs:lnRef idx="0"/>
+    <cs:fillRef idx="0"/>
+    <cs:effectRef idx="0"/>
+    <cs:fontRef idx="minor">
+      <a:schemeClr val="tx1">
+        <a:lumMod val="65000"/>
+        <a:lumOff val="35000"/>
+      </a:schemeClr>
+    </cs:fontRef>
+    <cs:defRPr sz="900" kern="1200"/>
+  </cs:valueAxis>
+  <cs:wall>
+    <cs:lnRef idx="0"/>
+    <cs:fillRef idx="0"/>
+    <cs:effectRef idx="0"/>
+    <cs:fontRef idx="minor">
+      <a:schemeClr val="tx1"/>
+    </cs:fontRef>
+    <cs:spPr>
+      <a:noFill/>
+      <a:ln>
+        <a:noFill/>
+      </a:ln>
+    </cs:spPr>
+  </cs:wall>
+</cs:chartStyle>
+</file>
+
 <file path=ppt/slideLayouts/slideLayout1.xml><?xml version="1.0" encoding="utf-8"?>
 <p:sldLayout xmlns:a="http://schemas.openxmlformats.org/drawingml/2006/main" xmlns:r="http://schemas.openxmlformats.org/officeDocument/2006/relationships" xmlns:p="http://schemas.openxmlformats.org/presentationml/2006/main" type="title" preserve="1">
   <p:cSld name="Title Slide">
@@ -2040,7 +5918,7 @@
           <a:p>
             <a:fld id="{4A5F161B-FF7E-4ABE-89D0-93661BD281ED}" type="datetimeFigureOut">
               <a:rPr lang="en-US" smtClean="0"/>
-              <a:t>12/12/2016</a:t>
+              <a:t>12/14/2016</a:t>
             </a:fld>
             <a:endParaRPr lang="en-US"/>
           </a:p>
@@ -2208,7 +6086,7 @@
           <a:p>
             <a:fld id="{4A5F161B-FF7E-4ABE-89D0-93661BD281ED}" type="datetimeFigureOut">
               <a:rPr lang="en-US" smtClean="0"/>
-              <a:t>12/12/2016</a:t>
+              <a:t>12/14/2016</a:t>
             </a:fld>
             <a:endParaRPr lang="en-US"/>
           </a:p>
@@ -2386,7 +6264,7 @@
           <a:p>
             <a:fld id="{4A5F161B-FF7E-4ABE-89D0-93661BD281ED}" type="datetimeFigureOut">
               <a:rPr lang="en-US" smtClean="0"/>
-              <a:t>12/12/2016</a:t>
+              <a:t>12/14/2016</a:t>
             </a:fld>
             <a:endParaRPr lang="en-US"/>
           </a:p>
@@ -2554,7 +6432,7 @@
           <a:p>
             <a:fld id="{4A5F161B-FF7E-4ABE-89D0-93661BD281ED}" type="datetimeFigureOut">
               <a:rPr lang="en-US" smtClean="0"/>
-              <a:t>12/12/2016</a:t>
+              <a:t>12/14/2016</a:t>
             </a:fld>
             <a:endParaRPr lang="en-US"/>
           </a:p>
@@ -2799,7 +6677,7 @@
           <a:p>
             <a:fld id="{4A5F161B-FF7E-4ABE-89D0-93661BD281ED}" type="datetimeFigureOut">
               <a:rPr lang="en-US" smtClean="0"/>
-              <a:t>12/12/2016</a:t>
+              <a:t>12/14/2016</a:t>
             </a:fld>
             <a:endParaRPr lang="en-US"/>
           </a:p>
@@ -3028,7 +6906,7 @@
           <a:p>
             <a:fld id="{4A5F161B-FF7E-4ABE-89D0-93661BD281ED}" type="datetimeFigureOut">
               <a:rPr lang="en-US" smtClean="0"/>
-              <a:t>12/12/2016</a:t>
+              <a:t>12/14/2016</a:t>
             </a:fld>
             <a:endParaRPr lang="en-US"/>
           </a:p>
@@ -3392,7 +7270,7 @@
           <a:p>
             <a:fld id="{4A5F161B-FF7E-4ABE-89D0-93661BD281ED}" type="datetimeFigureOut">
               <a:rPr lang="en-US" smtClean="0"/>
-              <a:t>12/12/2016</a:t>
+              <a:t>12/14/2016</a:t>
             </a:fld>
             <a:endParaRPr lang="en-US"/>
           </a:p>
@@ -3509,7 +7387,7 @@
           <a:p>
             <a:fld id="{4A5F161B-FF7E-4ABE-89D0-93661BD281ED}" type="datetimeFigureOut">
               <a:rPr lang="en-US" smtClean="0"/>
-              <a:t>12/12/2016</a:t>
+              <a:t>12/14/2016</a:t>
             </a:fld>
             <a:endParaRPr lang="en-US"/>
           </a:p>
@@ -3604,7 +7482,7 @@
           <a:p>
             <a:fld id="{4A5F161B-FF7E-4ABE-89D0-93661BD281ED}" type="datetimeFigureOut">
               <a:rPr lang="en-US" smtClean="0"/>
-              <a:t>12/12/2016</a:t>
+              <a:t>12/14/2016</a:t>
             </a:fld>
             <a:endParaRPr lang="en-US"/>
           </a:p>
@@ -3879,7 +7757,7 @@
           <a:p>
             <a:fld id="{4A5F161B-FF7E-4ABE-89D0-93661BD281ED}" type="datetimeFigureOut">
               <a:rPr lang="en-US" smtClean="0"/>
-              <a:t>12/12/2016</a:t>
+              <a:t>12/14/2016</a:t>
             </a:fld>
             <a:endParaRPr lang="en-US"/>
           </a:p>
@@ -4131,7 +8009,7 @@
           <a:p>
             <a:fld id="{4A5F161B-FF7E-4ABE-89D0-93661BD281ED}" type="datetimeFigureOut">
               <a:rPr lang="en-US" smtClean="0"/>
-              <a:t>12/12/2016</a:t>
+              <a:t>12/14/2016</a:t>
             </a:fld>
             <a:endParaRPr lang="en-US"/>
           </a:p>
@@ -4342,7 +8220,7 @@
           <a:p>
             <a:fld id="{4A5F161B-FF7E-4ABE-89D0-93661BD281ED}" type="datetimeFigureOut">
               <a:rPr lang="en-US" smtClean="0"/>
-              <a:t>12/12/2016</a:t>
+              <a:t>12/14/2016</a:t>
             </a:fld>
             <a:endParaRPr lang="en-US"/>
           </a:p>
@@ -6492,6 +10370,775 @@
     <p:extLst>
       <p:ext uri="{BB962C8B-B14F-4D97-AF65-F5344CB8AC3E}">
         <p14:creationId xmlns:p14="http://schemas.microsoft.com/office/powerpoint/2010/main" val="3133560946"/>
+      </p:ext>
+    </p:extLst>
+  </p:cSld>
+  <p:clrMapOvr>
+    <a:masterClrMapping/>
+  </p:clrMapOvr>
+</p:sld>
+</file>
+
+<file path=ppt/slides/slide10.xml><?xml version="1.0" encoding="utf-8"?>
+<p:sld xmlns:a="http://schemas.openxmlformats.org/drawingml/2006/main" xmlns:r="http://schemas.openxmlformats.org/officeDocument/2006/relationships" xmlns:p="http://schemas.openxmlformats.org/presentationml/2006/main">
+  <p:cSld>
+    <p:spTree>
+      <p:nvGrpSpPr>
+        <p:cNvPr id="1" name=""/>
+        <p:cNvGrpSpPr/>
+        <p:nvPr/>
+      </p:nvGrpSpPr>
+      <p:grpSpPr>
+        <a:xfrm>
+          <a:off x="0" y="0"/>
+          <a:ext cx="0" cy="0"/>
+          <a:chOff x="0" y="0"/>
+          <a:chExt cx="0" cy="0"/>
+        </a:xfrm>
+      </p:grpSpPr>
+      <p:graphicFrame>
+        <p:nvGraphicFramePr>
+          <p:cNvPr id="6" name="Chart 5">
+            <a:extLst>
+              <a:ext uri="{FF2B5EF4-FFF2-40B4-BE49-F238E27FC236}">
+                <a16:creationId xmlns:a16="http://schemas.microsoft.com/office/drawing/2014/main" id="{31BE5226-22C0-427C-B78D-2696F9F91730}"/>
+              </a:ext>
+            </a:extLst>
+          </p:cNvPr>
+          <p:cNvGraphicFramePr>
+            <a:graphicFrameLocks/>
+          </p:cNvGraphicFramePr>
+          <p:nvPr>
+            <p:extLst>
+              <p:ext uri="{D42A27DB-BD31-4B8C-83A1-F6EECF244321}">
+                <p14:modId xmlns:p14="http://schemas.microsoft.com/office/powerpoint/2010/main" val="2538254537"/>
+              </p:ext>
+            </p:extLst>
+          </p:nvPr>
+        </p:nvGraphicFramePr>
+        <p:xfrm>
+          <a:off x="861647" y="325667"/>
+          <a:ext cx="10406575" cy="6243945"/>
+        </p:xfrm>
+        <a:graphic>
+          <a:graphicData uri="http://schemas.openxmlformats.org/drawingml/2006/chart">
+            <c:chart xmlns:c="http://schemas.openxmlformats.org/drawingml/2006/chart" xmlns:r="http://schemas.openxmlformats.org/officeDocument/2006/relationships" r:id="rId2"/>
+          </a:graphicData>
+        </a:graphic>
+      </p:graphicFrame>
+    </p:spTree>
+    <p:extLst>
+      <p:ext uri="{BB962C8B-B14F-4D97-AF65-F5344CB8AC3E}">
+        <p14:creationId xmlns:p14="http://schemas.microsoft.com/office/powerpoint/2010/main" val="2596786218"/>
+      </p:ext>
+    </p:extLst>
+  </p:cSld>
+  <p:clrMapOvr>
+    <a:masterClrMapping/>
+  </p:clrMapOvr>
+</p:sld>
+</file>
+
+<file path=ppt/slides/slide11.xml><?xml version="1.0" encoding="utf-8"?>
+<p:sld xmlns:a="http://schemas.openxmlformats.org/drawingml/2006/main" xmlns:r="http://schemas.openxmlformats.org/officeDocument/2006/relationships" xmlns:p="http://schemas.openxmlformats.org/presentationml/2006/main">
+  <p:cSld>
+    <p:spTree>
+      <p:nvGrpSpPr>
+        <p:cNvPr id="1" name=""/>
+        <p:cNvGrpSpPr/>
+        <p:nvPr/>
+      </p:nvGrpSpPr>
+      <p:grpSpPr>
+        <a:xfrm>
+          <a:off x="0" y="0"/>
+          <a:ext cx="0" cy="0"/>
+          <a:chOff x="0" y="0"/>
+          <a:chExt cx="0" cy="0"/>
+        </a:xfrm>
+      </p:grpSpPr>
+      <p:graphicFrame>
+        <p:nvGraphicFramePr>
+          <p:cNvPr id="5" name="Chart 4">
+            <a:extLst>
+              <a:ext uri="{FF2B5EF4-FFF2-40B4-BE49-F238E27FC236}">
+                <a16:creationId xmlns:a16="http://schemas.microsoft.com/office/drawing/2014/main" id="{071E210C-112B-4F56-B685-EA787C93E81B}"/>
+              </a:ext>
+            </a:extLst>
+          </p:cNvPr>
+          <p:cNvGraphicFramePr>
+            <a:graphicFrameLocks/>
+          </p:cNvGraphicFramePr>
+          <p:nvPr>
+            <p:extLst>
+              <p:ext uri="{D42A27DB-BD31-4B8C-83A1-F6EECF244321}">
+                <p14:modId xmlns:p14="http://schemas.microsoft.com/office/powerpoint/2010/main" val="2158502446"/>
+              </p:ext>
+            </p:extLst>
+          </p:nvPr>
+        </p:nvGraphicFramePr>
+        <p:xfrm>
+          <a:off x="755374" y="212035"/>
+          <a:ext cx="10247243" cy="6148346"/>
+        </p:xfrm>
+        <a:graphic>
+          <a:graphicData uri="http://schemas.openxmlformats.org/drawingml/2006/chart">
+            <c:chart xmlns:c="http://schemas.openxmlformats.org/drawingml/2006/chart" xmlns:r="http://schemas.openxmlformats.org/officeDocument/2006/relationships" r:id="rId2"/>
+          </a:graphicData>
+        </a:graphic>
+      </p:graphicFrame>
+    </p:spTree>
+    <p:extLst>
+      <p:ext uri="{BB962C8B-B14F-4D97-AF65-F5344CB8AC3E}">
+        <p14:creationId xmlns:p14="http://schemas.microsoft.com/office/powerpoint/2010/main" val="3650156860"/>
+      </p:ext>
+    </p:extLst>
+  </p:cSld>
+  <p:clrMapOvr>
+    <a:masterClrMapping/>
+  </p:clrMapOvr>
+</p:sld>
+</file>
+
+<file path=ppt/slides/slide12.xml><?xml version="1.0" encoding="utf-8"?>
+<p:sld xmlns:a="http://schemas.openxmlformats.org/drawingml/2006/main" xmlns:r="http://schemas.openxmlformats.org/officeDocument/2006/relationships" xmlns:p="http://schemas.openxmlformats.org/presentationml/2006/main">
+  <p:cSld>
+    <p:spTree>
+      <p:nvGrpSpPr>
+        <p:cNvPr id="1" name=""/>
+        <p:cNvGrpSpPr/>
+        <p:nvPr/>
+      </p:nvGrpSpPr>
+      <p:grpSpPr>
+        <a:xfrm>
+          <a:off x="0" y="0"/>
+          <a:ext cx="0" cy="0"/>
+          <a:chOff x="0" y="0"/>
+          <a:chExt cx="0" cy="0"/>
+        </a:xfrm>
+      </p:grpSpPr>
+      <p:grpSp>
+        <p:nvGrpSpPr>
+          <p:cNvPr id="14" name="Group 13"/>
+          <p:cNvGrpSpPr/>
+          <p:nvPr/>
+        </p:nvGrpSpPr>
+        <p:grpSpPr>
+          <a:xfrm>
+            <a:off x="1125416" y="3024554"/>
+            <a:ext cx="10548423" cy="1420837"/>
+            <a:chOff x="1125416" y="3024554"/>
+            <a:chExt cx="10548423" cy="1420837"/>
+          </a:xfrm>
+        </p:grpSpPr>
+        <p:sp>
+          <p:nvSpPr>
+            <p:cNvPr id="4" name="Flowchart: Data 3"/>
+            <p:cNvSpPr/>
+            <p:nvPr/>
+          </p:nvSpPr>
+          <p:spPr>
+            <a:xfrm>
+              <a:off x="1125416" y="3024554"/>
+              <a:ext cx="2855741" cy="1420837"/>
+            </a:xfrm>
+            <a:prstGeom prst="flowChartInputOutput">
+              <a:avLst/>
+            </a:prstGeom>
+            <a:ln w="28575">
+              <a:solidFill>
+                <a:schemeClr val="tx1"/>
+              </a:solidFill>
+            </a:ln>
+          </p:spPr>
+          <p:style>
+            <a:lnRef idx="2">
+              <a:schemeClr val="accent6"/>
+            </a:lnRef>
+            <a:fillRef idx="1">
+              <a:schemeClr val="lt1"/>
+            </a:fillRef>
+            <a:effectRef idx="0">
+              <a:schemeClr val="accent6"/>
+            </a:effectRef>
+            <a:fontRef idx="minor">
+              <a:schemeClr val="dk1"/>
+            </a:fontRef>
+          </p:style>
+          <p:txBody>
+            <a:bodyPr rtlCol="0" anchor="ctr"/>
+            <a:lstStyle/>
+            <a:p>
+              <a:pPr algn="ctr"/>
+              <a:r>
+                <a:rPr lang="en-US" sz="2800"/>
+                <a:t>Dữ liệu đầu vào</a:t>
+              </a:r>
+              <a:endParaRPr lang="en-US" sz="2800"/>
+            </a:p>
+          </p:txBody>
+        </p:sp>
+        <p:sp>
+          <p:nvSpPr>
+            <p:cNvPr id="6" name="Flowchart: Data 5"/>
+            <p:cNvSpPr/>
+            <p:nvPr/>
+          </p:nvSpPr>
+          <p:spPr>
+            <a:xfrm>
+              <a:off x="8818098" y="3024554"/>
+              <a:ext cx="2855741" cy="1420837"/>
+            </a:xfrm>
+            <a:prstGeom prst="flowChartInputOutput">
+              <a:avLst/>
+            </a:prstGeom>
+            <a:ln w="28575">
+              <a:solidFill>
+                <a:schemeClr val="tx1"/>
+              </a:solidFill>
+            </a:ln>
+          </p:spPr>
+          <p:style>
+            <a:lnRef idx="2">
+              <a:schemeClr val="accent6"/>
+            </a:lnRef>
+            <a:fillRef idx="1">
+              <a:schemeClr val="lt1"/>
+            </a:fillRef>
+            <a:effectRef idx="0">
+              <a:schemeClr val="accent6"/>
+            </a:effectRef>
+            <a:fontRef idx="minor">
+              <a:schemeClr val="dk1"/>
+            </a:fontRef>
+          </p:style>
+          <p:txBody>
+            <a:bodyPr rtlCol="0" anchor="ctr"/>
+            <a:lstStyle/>
+            <a:p>
+              <a:pPr algn="ctr"/>
+              <a:r>
+                <a:rPr lang="en-US" sz="2800"/>
+                <a:t>Kết quả phân tích</a:t>
+              </a:r>
+              <a:endParaRPr lang="en-US" sz="2800"/>
+            </a:p>
+          </p:txBody>
+        </p:sp>
+        <p:sp>
+          <p:nvSpPr>
+            <p:cNvPr id="7" name="Rectangle 6"/>
+            <p:cNvSpPr/>
+            <p:nvPr/>
+          </p:nvSpPr>
+          <p:spPr>
+            <a:xfrm>
+              <a:off x="5407856" y="3024554"/>
+              <a:ext cx="2132428" cy="1420837"/>
+            </a:xfrm>
+            <a:prstGeom prst="rect">
+              <a:avLst/>
+            </a:prstGeom>
+            <a:ln w="28575">
+              <a:solidFill>
+                <a:schemeClr val="tx1"/>
+              </a:solidFill>
+            </a:ln>
+          </p:spPr>
+          <p:style>
+            <a:lnRef idx="2">
+              <a:schemeClr val="accent6"/>
+            </a:lnRef>
+            <a:fillRef idx="1">
+              <a:schemeClr val="lt1"/>
+            </a:fillRef>
+            <a:effectRef idx="0">
+              <a:schemeClr val="accent6"/>
+            </a:effectRef>
+            <a:fontRef idx="minor">
+              <a:schemeClr val="dk1"/>
+            </a:fontRef>
+          </p:style>
+          <p:txBody>
+            <a:bodyPr rtlCol="0" anchor="ctr"/>
+            <a:lstStyle/>
+            <a:p>
+              <a:pPr algn="ctr"/>
+              <a:r>
+                <a:rPr lang="en-US" sz="2800"/>
+                <a:t>Hệ thống phân tích</a:t>
+              </a:r>
+              <a:endParaRPr lang="en-US" sz="2800"/>
+            </a:p>
+          </p:txBody>
+        </p:sp>
+        <p:cxnSp>
+          <p:nvCxnSpPr>
+            <p:cNvPr id="9" name="Straight Arrow Connector 8"/>
+            <p:cNvCxnSpPr>
+              <a:stCxn id="4" idx="5"/>
+              <a:endCxn id="7" idx="1"/>
+            </p:cNvCxnSpPr>
+            <p:nvPr/>
+          </p:nvCxnSpPr>
+          <p:spPr>
+            <a:xfrm>
+              <a:off x="3695583" y="3734973"/>
+              <a:ext cx="1712273" cy="0"/>
+            </a:xfrm>
+            <a:prstGeom prst="straightConnector1">
+              <a:avLst/>
+            </a:prstGeom>
+            <a:ln w="28575">
+              <a:solidFill>
+                <a:schemeClr val="tx1"/>
+              </a:solidFill>
+              <a:tailEnd type="triangle"/>
+            </a:ln>
+          </p:spPr>
+          <p:style>
+            <a:lnRef idx="1">
+              <a:schemeClr val="accent1"/>
+            </a:lnRef>
+            <a:fillRef idx="0">
+              <a:schemeClr val="accent1"/>
+            </a:fillRef>
+            <a:effectRef idx="0">
+              <a:schemeClr val="accent1"/>
+            </a:effectRef>
+            <a:fontRef idx="minor">
+              <a:schemeClr val="tx1"/>
+            </a:fontRef>
+          </p:style>
+        </p:cxnSp>
+        <p:cxnSp>
+          <p:nvCxnSpPr>
+            <p:cNvPr id="11" name="Straight Arrow Connector 10"/>
+            <p:cNvCxnSpPr>
+              <a:stCxn id="7" idx="3"/>
+              <a:endCxn id="6" idx="2"/>
+            </p:cNvCxnSpPr>
+            <p:nvPr/>
+          </p:nvCxnSpPr>
+          <p:spPr>
+            <a:xfrm>
+              <a:off x="7540284" y="3734973"/>
+              <a:ext cx="1563388" cy="0"/>
+            </a:xfrm>
+            <a:prstGeom prst="straightConnector1">
+              <a:avLst/>
+            </a:prstGeom>
+            <a:ln w="28575">
+              <a:solidFill>
+                <a:schemeClr val="tx1"/>
+              </a:solidFill>
+              <a:tailEnd type="triangle"/>
+            </a:ln>
+          </p:spPr>
+          <p:style>
+            <a:lnRef idx="1">
+              <a:schemeClr val="accent1"/>
+            </a:lnRef>
+            <a:fillRef idx="0">
+              <a:schemeClr val="accent1"/>
+            </a:fillRef>
+            <a:effectRef idx="0">
+              <a:schemeClr val="accent1"/>
+            </a:effectRef>
+            <a:fontRef idx="minor">
+              <a:schemeClr val="tx1"/>
+            </a:fontRef>
+          </p:style>
+        </p:cxnSp>
+      </p:grpSp>
+    </p:spTree>
+    <p:extLst>
+      <p:ext uri="{BB962C8B-B14F-4D97-AF65-F5344CB8AC3E}">
+        <p14:creationId xmlns:p14="http://schemas.microsoft.com/office/powerpoint/2010/main" val="4173760773"/>
+      </p:ext>
+    </p:extLst>
+  </p:cSld>
+  <p:clrMapOvr>
+    <a:masterClrMapping/>
+  </p:clrMapOvr>
+</p:sld>
+</file>
+
+<file path=ppt/slides/slide13.xml><?xml version="1.0" encoding="utf-8"?>
+<p:sld xmlns:a="http://schemas.openxmlformats.org/drawingml/2006/main" xmlns:r="http://schemas.openxmlformats.org/officeDocument/2006/relationships" xmlns:p="http://schemas.openxmlformats.org/presentationml/2006/main">
+  <p:cSld>
+    <p:spTree>
+      <p:nvGrpSpPr>
+        <p:cNvPr id="1" name=""/>
+        <p:cNvGrpSpPr/>
+        <p:nvPr/>
+      </p:nvGrpSpPr>
+      <p:grpSpPr>
+        <a:xfrm>
+          <a:off x="0" y="0"/>
+          <a:ext cx="0" cy="0"/>
+          <a:chOff x="0" y="0"/>
+          <a:chExt cx="0" cy="0"/>
+        </a:xfrm>
+      </p:grpSpPr>
+      <p:grpSp>
+        <p:nvGrpSpPr>
+          <p:cNvPr id="16" name="Group 15"/>
+          <p:cNvGrpSpPr/>
+          <p:nvPr/>
+        </p:nvGrpSpPr>
+        <p:grpSpPr>
+          <a:xfrm>
+            <a:off x="2546252" y="851096"/>
+            <a:ext cx="5915465" cy="5073745"/>
+            <a:chOff x="2546252" y="851096"/>
+            <a:chExt cx="5915465" cy="5073745"/>
+          </a:xfrm>
+        </p:grpSpPr>
+        <p:sp>
+          <p:nvSpPr>
+            <p:cNvPr id="4" name="Rectangle 3"/>
+            <p:cNvSpPr/>
+            <p:nvPr/>
+          </p:nvSpPr>
+          <p:spPr>
+            <a:xfrm>
+              <a:off x="2546252" y="2867463"/>
+              <a:ext cx="1983545" cy="1041009"/>
+            </a:xfrm>
+            <a:prstGeom prst="rect">
+              <a:avLst/>
+            </a:prstGeom>
+            <a:noFill/>
+            <a:ln w="28575">
+              <a:solidFill>
+                <a:schemeClr val="tx1"/>
+              </a:solidFill>
+            </a:ln>
+          </p:spPr>
+          <p:style>
+            <a:lnRef idx="2">
+              <a:schemeClr val="accent1">
+                <a:shade val="50000"/>
+              </a:schemeClr>
+            </a:lnRef>
+            <a:fillRef idx="1">
+              <a:schemeClr val="accent1"/>
+            </a:fillRef>
+            <a:effectRef idx="0">
+              <a:schemeClr val="accent1"/>
+            </a:effectRef>
+            <a:fontRef idx="minor">
+              <a:schemeClr val="lt1"/>
+            </a:fontRef>
+          </p:style>
+          <p:txBody>
+            <a:bodyPr rtlCol="0" anchor="ctr"/>
+            <a:lstStyle/>
+            <a:p>
+              <a:pPr algn="ctr"/>
+              <a:r>
+                <a:rPr lang="en-US" sz="2800">
+                  <a:solidFill>
+                    <a:schemeClr val="tx1"/>
+                  </a:solidFill>
+                </a:rPr>
+                <a:t>Phân tích cảm xúc</a:t>
+              </a:r>
+              <a:endParaRPr lang="en-US" sz="2800">
+                <a:solidFill>
+                  <a:schemeClr val="tx1"/>
+                </a:solidFill>
+              </a:endParaRPr>
+            </a:p>
+          </p:txBody>
+        </p:sp>
+        <p:sp>
+          <p:nvSpPr>
+            <p:cNvPr id="5" name="Rectangle 4"/>
+            <p:cNvSpPr/>
+            <p:nvPr/>
+          </p:nvSpPr>
+          <p:spPr>
+            <a:xfrm>
+              <a:off x="6475828" y="4883832"/>
+              <a:ext cx="1983545" cy="1041009"/>
+            </a:xfrm>
+            <a:prstGeom prst="rect">
+              <a:avLst/>
+            </a:prstGeom>
+            <a:noFill/>
+            <a:ln w="28575">
+              <a:solidFill>
+                <a:schemeClr val="tx1"/>
+              </a:solidFill>
+            </a:ln>
+          </p:spPr>
+          <p:style>
+            <a:lnRef idx="2">
+              <a:schemeClr val="accent1">
+                <a:shade val="50000"/>
+              </a:schemeClr>
+            </a:lnRef>
+            <a:fillRef idx="1">
+              <a:schemeClr val="accent1"/>
+            </a:fillRef>
+            <a:effectRef idx="0">
+              <a:schemeClr val="accent1"/>
+            </a:effectRef>
+            <a:fontRef idx="minor">
+              <a:schemeClr val="lt1"/>
+            </a:fontRef>
+          </p:style>
+          <p:txBody>
+            <a:bodyPr rtlCol="0" anchor="ctr"/>
+            <a:lstStyle/>
+            <a:p>
+              <a:pPr algn="ctr"/>
+              <a:r>
+                <a:rPr lang="en-US" sz="2800">
+                  <a:solidFill>
+                    <a:schemeClr val="tx1"/>
+                  </a:solidFill>
+                </a:rPr>
+                <a:t>Kết hợp 2 cách trên</a:t>
+              </a:r>
+              <a:endParaRPr lang="en-US" sz="2800">
+                <a:solidFill>
+                  <a:schemeClr val="tx1"/>
+                </a:solidFill>
+              </a:endParaRPr>
+            </a:p>
+          </p:txBody>
+        </p:sp>
+        <p:sp>
+          <p:nvSpPr>
+            <p:cNvPr id="6" name="Rectangle 5"/>
+            <p:cNvSpPr/>
+            <p:nvPr/>
+          </p:nvSpPr>
+          <p:spPr>
+            <a:xfrm>
+              <a:off x="6478172" y="2867464"/>
+              <a:ext cx="1983545" cy="1041009"/>
+            </a:xfrm>
+            <a:prstGeom prst="rect">
+              <a:avLst/>
+            </a:prstGeom>
+            <a:noFill/>
+            <a:ln w="28575">
+              <a:solidFill>
+                <a:schemeClr val="tx1"/>
+              </a:solidFill>
+            </a:ln>
+          </p:spPr>
+          <p:style>
+            <a:lnRef idx="2">
+              <a:schemeClr val="accent1">
+                <a:shade val="50000"/>
+              </a:schemeClr>
+            </a:lnRef>
+            <a:fillRef idx="1">
+              <a:schemeClr val="accent1"/>
+            </a:fillRef>
+            <a:effectRef idx="0">
+              <a:schemeClr val="accent1"/>
+            </a:effectRef>
+            <a:fontRef idx="minor">
+              <a:schemeClr val="lt1"/>
+            </a:fontRef>
+          </p:style>
+          <p:txBody>
+            <a:bodyPr rtlCol="0" anchor="ctr"/>
+            <a:lstStyle/>
+            <a:p>
+              <a:pPr algn="ctr"/>
+              <a:r>
+                <a:rPr lang="en-US" sz="2800">
+                  <a:solidFill>
+                    <a:schemeClr val="tx1"/>
+                  </a:solidFill>
+                </a:rPr>
+                <a:t>Dựa trên   từ vựng</a:t>
+              </a:r>
+              <a:endParaRPr lang="en-US" sz="2800">
+                <a:solidFill>
+                  <a:schemeClr val="tx1"/>
+                </a:solidFill>
+              </a:endParaRPr>
+            </a:p>
+          </p:txBody>
+        </p:sp>
+        <p:sp>
+          <p:nvSpPr>
+            <p:cNvPr id="7" name="Rectangle 6"/>
+            <p:cNvSpPr/>
+            <p:nvPr/>
+          </p:nvSpPr>
+          <p:spPr>
+            <a:xfrm>
+              <a:off x="6478172" y="851096"/>
+              <a:ext cx="1983545" cy="1041009"/>
+            </a:xfrm>
+            <a:prstGeom prst="rect">
+              <a:avLst/>
+            </a:prstGeom>
+            <a:noFill/>
+            <a:ln w="28575">
+              <a:solidFill>
+                <a:schemeClr val="tx1"/>
+              </a:solidFill>
+            </a:ln>
+          </p:spPr>
+          <p:style>
+            <a:lnRef idx="2">
+              <a:schemeClr val="accent1">
+                <a:shade val="50000"/>
+              </a:schemeClr>
+            </a:lnRef>
+            <a:fillRef idx="1">
+              <a:schemeClr val="accent1"/>
+            </a:fillRef>
+            <a:effectRef idx="0">
+              <a:schemeClr val="accent1"/>
+            </a:effectRef>
+            <a:fontRef idx="minor">
+              <a:schemeClr val="lt1"/>
+            </a:fontRef>
+          </p:style>
+          <p:txBody>
+            <a:bodyPr rtlCol="0" anchor="ctr"/>
+            <a:lstStyle/>
+            <a:p>
+              <a:pPr algn="ctr"/>
+              <a:r>
+                <a:rPr lang="en-US" sz="2800">
+                  <a:solidFill>
+                    <a:schemeClr val="tx1"/>
+                  </a:solidFill>
+                </a:rPr>
+                <a:t>Dựa trên học máy</a:t>
+              </a:r>
+              <a:endParaRPr lang="en-US" sz="2800">
+                <a:solidFill>
+                  <a:schemeClr val="tx1"/>
+                </a:solidFill>
+              </a:endParaRPr>
+            </a:p>
+          </p:txBody>
+        </p:sp>
+        <p:cxnSp>
+          <p:nvCxnSpPr>
+            <p:cNvPr id="9" name="Straight Arrow Connector 8"/>
+            <p:cNvCxnSpPr>
+              <a:stCxn id="4" idx="3"/>
+              <a:endCxn id="7" idx="1"/>
+            </p:cNvCxnSpPr>
+            <p:nvPr/>
+          </p:nvCxnSpPr>
+          <p:spPr>
+            <a:xfrm flipV="1">
+              <a:off x="4529797" y="1371601"/>
+              <a:ext cx="1948375" cy="2016367"/>
+            </a:xfrm>
+            <a:prstGeom prst="straightConnector1">
+              <a:avLst/>
+            </a:prstGeom>
+            <a:ln w="28575">
+              <a:tailEnd type="triangle"/>
+            </a:ln>
+          </p:spPr>
+          <p:style>
+            <a:lnRef idx="1">
+              <a:schemeClr val="dk1"/>
+            </a:lnRef>
+            <a:fillRef idx="0">
+              <a:schemeClr val="dk1"/>
+            </a:fillRef>
+            <a:effectRef idx="0">
+              <a:schemeClr val="dk1"/>
+            </a:effectRef>
+            <a:fontRef idx="minor">
+              <a:schemeClr val="tx1"/>
+            </a:fontRef>
+          </p:style>
+        </p:cxnSp>
+        <p:cxnSp>
+          <p:nvCxnSpPr>
+            <p:cNvPr id="10" name="Straight Arrow Connector 9"/>
+            <p:cNvCxnSpPr>
+              <a:stCxn id="4" idx="3"/>
+              <a:endCxn id="6" idx="1"/>
+            </p:cNvCxnSpPr>
+            <p:nvPr/>
+          </p:nvCxnSpPr>
+          <p:spPr>
+            <a:xfrm>
+              <a:off x="4529797" y="3387968"/>
+              <a:ext cx="1948375" cy="1"/>
+            </a:xfrm>
+            <a:prstGeom prst="straightConnector1">
+              <a:avLst/>
+            </a:prstGeom>
+            <a:ln w="28575">
+              <a:tailEnd type="triangle"/>
+            </a:ln>
+          </p:spPr>
+          <p:style>
+            <a:lnRef idx="1">
+              <a:schemeClr val="dk1"/>
+            </a:lnRef>
+            <a:fillRef idx="0">
+              <a:schemeClr val="dk1"/>
+            </a:fillRef>
+            <a:effectRef idx="0">
+              <a:schemeClr val="dk1"/>
+            </a:effectRef>
+            <a:fontRef idx="minor">
+              <a:schemeClr val="tx1"/>
+            </a:fontRef>
+          </p:style>
+        </p:cxnSp>
+        <p:cxnSp>
+          <p:nvCxnSpPr>
+            <p:cNvPr id="13" name="Straight Arrow Connector 12"/>
+            <p:cNvCxnSpPr>
+              <a:stCxn id="4" idx="3"/>
+              <a:endCxn id="5" idx="1"/>
+            </p:cNvCxnSpPr>
+            <p:nvPr/>
+          </p:nvCxnSpPr>
+          <p:spPr>
+            <a:xfrm>
+              <a:off x="4529797" y="3387968"/>
+              <a:ext cx="1946031" cy="2016369"/>
+            </a:xfrm>
+            <a:prstGeom prst="straightConnector1">
+              <a:avLst/>
+            </a:prstGeom>
+            <a:ln w="28575">
+              <a:tailEnd type="triangle"/>
+            </a:ln>
+          </p:spPr>
+          <p:style>
+            <a:lnRef idx="1">
+              <a:schemeClr val="dk1"/>
+            </a:lnRef>
+            <a:fillRef idx="0">
+              <a:schemeClr val="dk1"/>
+            </a:fillRef>
+            <a:effectRef idx="0">
+              <a:schemeClr val="dk1"/>
+            </a:effectRef>
+            <a:fontRef idx="minor">
+              <a:schemeClr val="tx1"/>
+            </a:fontRef>
+          </p:style>
+        </p:cxnSp>
+      </p:grpSp>
+    </p:spTree>
+    <p:extLst>
+      <p:ext uri="{BB962C8B-B14F-4D97-AF65-F5344CB8AC3E}">
+        <p14:creationId xmlns:p14="http://schemas.microsoft.com/office/powerpoint/2010/main" val="1966196458"/>
       </p:ext>
     </p:extLst>
   </p:cSld>
@@ -13526,6 +18173,126 @@
 </p:sld>
 </file>
 
+<file path=ppt/slides/slide8.xml><?xml version="1.0" encoding="utf-8"?>
+<p:sld xmlns:a="http://schemas.openxmlformats.org/drawingml/2006/main" xmlns:r="http://schemas.openxmlformats.org/officeDocument/2006/relationships" xmlns:p="http://schemas.openxmlformats.org/presentationml/2006/main">
+  <p:cSld>
+    <p:spTree>
+      <p:nvGrpSpPr>
+        <p:cNvPr id="1" name=""/>
+        <p:cNvGrpSpPr/>
+        <p:nvPr/>
+      </p:nvGrpSpPr>
+      <p:grpSpPr>
+        <a:xfrm>
+          <a:off x="0" y="0"/>
+          <a:ext cx="0" cy="0"/>
+          <a:chOff x="0" y="0"/>
+          <a:chExt cx="0" cy="0"/>
+        </a:xfrm>
+      </p:grpSpPr>
+      <p:graphicFrame>
+        <p:nvGraphicFramePr>
+          <p:cNvPr id="4" name="Chart 3">
+            <a:extLst>
+              <a:ext uri="{FF2B5EF4-FFF2-40B4-BE49-F238E27FC236}">
+                <a16:creationId xmlns:a16="http://schemas.microsoft.com/office/drawing/2014/main" id="{412E5A9B-BB33-478B-A61E-CF0B970F80DC}"/>
+              </a:ext>
+            </a:extLst>
+          </p:cNvPr>
+          <p:cNvGraphicFramePr>
+            <a:graphicFrameLocks/>
+          </p:cNvGraphicFramePr>
+          <p:nvPr>
+            <p:extLst>
+              <p:ext uri="{D42A27DB-BD31-4B8C-83A1-F6EECF244321}">
+                <p14:modId xmlns:p14="http://schemas.microsoft.com/office/powerpoint/2010/main" val="1371857868"/>
+              </p:ext>
+            </p:extLst>
+          </p:nvPr>
+        </p:nvGraphicFramePr>
+        <p:xfrm>
+          <a:off x="798602" y="341024"/>
+          <a:ext cx="10399077" cy="6217784"/>
+        </p:xfrm>
+        <a:graphic>
+          <a:graphicData uri="http://schemas.openxmlformats.org/drawingml/2006/chart">
+            <c:chart xmlns:c="http://schemas.openxmlformats.org/drawingml/2006/chart" xmlns:r="http://schemas.openxmlformats.org/officeDocument/2006/relationships" r:id="rId2"/>
+          </a:graphicData>
+        </a:graphic>
+      </p:graphicFrame>
+    </p:spTree>
+    <p:extLst>
+      <p:ext uri="{BB962C8B-B14F-4D97-AF65-F5344CB8AC3E}">
+        <p14:creationId xmlns:p14="http://schemas.microsoft.com/office/powerpoint/2010/main" val="315018865"/>
+      </p:ext>
+    </p:extLst>
+  </p:cSld>
+  <p:clrMapOvr>
+    <a:masterClrMapping/>
+  </p:clrMapOvr>
+</p:sld>
+</file>
+
+<file path=ppt/slides/slide9.xml><?xml version="1.0" encoding="utf-8"?>
+<p:sld xmlns:a="http://schemas.openxmlformats.org/drawingml/2006/main" xmlns:r="http://schemas.openxmlformats.org/officeDocument/2006/relationships" xmlns:p="http://schemas.openxmlformats.org/presentationml/2006/main">
+  <p:cSld>
+    <p:spTree>
+      <p:nvGrpSpPr>
+        <p:cNvPr id="1" name=""/>
+        <p:cNvGrpSpPr/>
+        <p:nvPr/>
+      </p:nvGrpSpPr>
+      <p:grpSpPr>
+        <a:xfrm>
+          <a:off x="0" y="0"/>
+          <a:ext cx="0" cy="0"/>
+          <a:chOff x="0" y="0"/>
+          <a:chExt cx="0" cy="0"/>
+        </a:xfrm>
+      </p:grpSpPr>
+      <p:graphicFrame>
+        <p:nvGraphicFramePr>
+          <p:cNvPr id="5" name="Chart 4">
+            <a:extLst>
+              <a:ext uri="{FF2B5EF4-FFF2-40B4-BE49-F238E27FC236}">
+                <a16:creationId xmlns:a16="http://schemas.microsoft.com/office/drawing/2014/main" id="{61206AE4-5FBE-453C-8170-046A6807143B}"/>
+              </a:ext>
+            </a:extLst>
+          </p:cNvPr>
+          <p:cNvGraphicFramePr>
+            <a:graphicFrameLocks/>
+          </p:cNvGraphicFramePr>
+          <p:nvPr>
+            <p:extLst>
+              <p:ext uri="{D42A27DB-BD31-4B8C-83A1-F6EECF244321}">
+                <p14:modId xmlns:p14="http://schemas.microsoft.com/office/powerpoint/2010/main" val="3839055164"/>
+              </p:ext>
+            </p:extLst>
+          </p:nvPr>
+        </p:nvGraphicFramePr>
+        <p:xfrm>
+          <a:off x="1120913" y="251791"/>
+          <a:ext cx="10270435" cy="6162261"/>
+        </p:xfrm>
+        <a:graphic>
+          <a:graphicData uri="http://schemas.openxmlformats.org/drawingml/2006/chart">
+            <c:chart xmlns:c="http://schemas.openxmlformats.org/drawingml/2006/chart" xmlns:r="http://schemas.openxmlformats.org/officeDocument/2006/relationships" r:id="rId2"/>
+          </a:graphicData>
+        </a:graphic>
+      </p:graphicFrame>
+    </p:spTree>
+    <p:extLst>
+      <p:ext uri="{BB962C8B-B14F-4D97-AF65-F5344CB8AC3E}">
+        <p14:creationId xmlns:p14="http://schemas.microsoft.com/office/powerpoint/2010/main" val="1877765997"/>
+      </p:ext>
+    </p:extLst>
+  </p:cSld>
+  <p:clrMapOvr>
+    <a:masterClrMapping/>
+  </p:clrMapOvr>
+</p:sld>
+</file>
+
 <file path=ppt/theme/theme1.xml><?xml version="1.0" encoding="utf-8"?>
 <a:theme xmlns:a="http://schemas.openxmlformats.org/drawingml/2006/main" name="Office Theme">
   <a:themeElements>

</xml_diff>

<commit_message>
them mo hinh vao phan hien thuc
</commit_message>
<xml_diff>
--- a/mohinh.pptx
+++ b/mohinh.pptx
@@ -18,6 +18,8 @@
     <p:sldId id="269" r:id="rId12"/>
     <p:sldId id="270" r:id="rId13"/>
     <p:sldId id="271" r:id="rId14"/>
+    <p:sldId id="272" r:id="rId15"/>
+    <p:sldId id="273" r:id="rId16"/>
   </p:sldIdLst>
   <p:sldSz cx="12192000" cy="6858000"/>
   <p:notesSz cx="6858000" cy="9144000"/>
@@ -11134,6 +11136,186 @@
 </p:sld>
 </file>
 
+<file path=ppt/slides/slide14.xml><?xml version="1.0" encoding="utf-8"?>
+<p:sld xmlns:a="http://schemas.openxmlformats.org/drawingml/2006/main" xmlns:r="http://schemas.openxmlformats.org/officeDocument/2006/relationships" xmlns:p="http://schemas.openxmlformats.org/presentationml/2006/main">
+  <p:cSld>
+    <p:spTree>
+      <p:nvGrpSpPr>
+        <p:cNvPr id="1" name=""/>
+        <p:cNvGrpSpPr/>
+        <p:nvPr/>
+      </p:nvGrpSpPr>
+      <p:grpSpPr>
+        <a:xfrm>
+          <a:off x="0" y="0"/>
+          <a:ext cx="0" cy="0"/>
+          <a:chOff x="0" y="0"/>
+          <a:chExt cx="0" cy="0"/>
+        </a:xfrm>
+      </p:grpSpPr>
+      <p:pic>
+        <p:nvPicPr>
+          <p:cNvPr id="5" name="Picture 4"/>
+          <p:cNvPicPr>
+            <a:picLocks noChangeAspect="1"/>
+          </p:cNvPicPr>
+          <p:nvPr/>
+        </p:nvPicPr>
+        <p:blipFill>
+          <a:blip r:embed="rId2"/>
+          <a:stretch>
+            <a:fillRect/>
+          </a:stretch>
+        </p:blipFill>
+        <p:spPr>
+          <a:xfrm>
+            <a:off x="166850" y="528952"/>
+            <a:ext cx="2600000" cy="5038095"/>
+          </a:xfrm>
+          <a:prstGeom prst="rect">
+            <a:avLst/>
+          </a:prstGeom>
+        </p:spPr>
+      </p:pic>
+      <p:pic>
+        <p:nvPicPr>
+          <p:cNvPr id="6" name="Picture 5"/>
+          <p:cNvPicPr>
+            <a:picLocks noChangeAspect="1"/>
+          </p:cNvPicPr>
+          <p:nvPr/>
+        </p:nvPicPr>
+        <p:blipFill>
+          <a:blip r:embed="rId3"/>
+          <a:stretch>
+            <a:fillRect/>
+          </a:stretch>
+        </p:blipFill>
+        <p:spPr>
+          <a:xfrm>
+            <a:off x="2766850" y="528952"/>
+            <a:ext cx="2695238" cy="5304762"/>
+          </a:xfrm>
+          <a:prstGeom prst="rect">
+            <a:avLst/>
+          </a:prstGeom>
+        </p:spPr>
+      </p:pic>
+      <p:pic>
+        <p:nvPicPr>
+          <p:cNvPr id="7" name="Picture 6"/>
+          <p:cNvPicPr>
+            <a:picLocks noChangeAspect="1"/>
+          </p:cNvPicPr>
+          <p:nvPr/>
+        </p:nvPicPr>
+        <p:blipFill>
+          <a:blip r:embed="rId4"/>
+          <a:stretch>
+            <a:fillRect/>
+          </a:stretch>
+        </p:blipFill>
+        <p:spPr>
+          <a:xfrm>
+            <a:off x="5748502" y="452761"/>
+            <a:ext cx="2638095" cy="5114286"/>
+          </a:xfrm>
+          <a:prstGeom prst="rect">
+            <a:avLst/>
+          </a:prstGeom>
+        </p:spPr>
+      </p:pic>
+    </p:spTree>
+    <p:extLst>
+      <p:ext uri="{BB962C8B-B14F-4D97-AF65-F5344CB8AC3E}">
+        <p14:creationId xmlns:p14="http://schemas.microsoft.com/office/powerpoint/2010/main" val="70955814"/>
+      </p:ext>
+    </p:extLst>
+  </p:cSld>
+  <p:clrMapOvr>
+    <a:masterClrMapping/>
+  </p:clrMapOvr>
+</p:sld>
+</file>
+
+<file path=ppt/slides/slide15.xml><?xml version="1.0" encoding="utf-8"?>
+<p:sld xmlns:a="http://schemas.openxmlformats.org/drawingml/2006/main" xmlns:r="http://schemas.openxmlformats.org/officeDocument/2006/relationships" xmlns:p="http://schemas.openxmlformats.org/presentationml/2006/main">
+  <p:cSld>
+    <p:spTree>
+      <p:nvGrpSpPr>
+        <p:cNvPr id="1" name=""/>
+        <p:cNvGrpSpPr/>
+        <p:nvPr/>
+      </p:nvGrpSpPr>
+      <p:grpSpPr>
+        <a:xfrm>
+          <a:off x="0" y="0"/>
+          <a:ext cx="0" cy="0"/>
+          <a:chOff x="0" y="0"/>
+          <a:chExt cx="0" cy="0"/>
+        </a:xfrm>
+      </p:grpSpPr>
+      <p:pic>
+        <p:nvPicPr>
+          <p:cNvPr id="4" name="Picture 3"/>
+          <p:cNvPicPr>
+            <a:picLocks noChangeAspect="1"/>
+          </p:cNvPicPr>
+          <p:nvPr/>
+        </p:nvPicPr>
+        <p:blipFill>
+          <a:blip r:embed="rId2"/>
+          <a:stretch>
+            <a:fillRect/>
+          </a:stretch>
+        </p:blipFill>
+        <p:spPr>
+          <a:xfrm>
+            <a:off x="424200" y="881407"/>
+            <a:ext cx="5400000" cy="5514286"/>
+          </a:xfrm>
+          <a:prstGeom prst="rect">
+            <a:avLst/>
+          </a:prstGeom>
+        </p:spPr>
+      </p:pic>
+      <p:pic>
+        <p:nvPicPr>
+          <p:cNvPr id="5" name="Picture 4"/>
+          <p:cNvPicPr>
+            <a:picLocks noChangeAspect="1"/>
+          </p:cNvPicPr>
+          <p:nvPr/>
+        </p:nvPicPr>
+        <p:blipFill>
+          <a:blip r:embed="rId3"/>
+          <a:stretch>
+            <a:fillRect/>
+          </a:stretch>
+        </p:blipFill>
+        <p:spPr>
+          <a:xfrm>
+            <a:off x="6496699" y="528952"/>
+            <a:ext cx="5171429" cy="5495238"/>
+          </a:xfrm>
+          <a:prstGeom prst="rect">
+            <a:avLst/>
+          </a:prstGeom>
+        </p:spPr>
+      </p:pic>
+    </p:spTree>
+    <p:extLst>
+      <p:ext uri="{BB962C8B-B14F-4D97-AF65-F5344CB8AC3E}">
+        <p14:creationId xmlns:p14="http://schemas.microsoft.com/office/powerpoint/2010/main" val="1608343957"/>
+      </p:ext>
+    </p:extLst>
+  </p:cSld>
+  <p:clrMapOvr>
+    <a:masterClrMapping/>
+  </p:clrMapOvr>
+</p:sld>
+</file>
+
 <file path=ppt/slides/slide2.xml><?xml version="1.0" encoding="utf-8"?>
 <p:sld xmlns:a="http://schemas.openxmlformats.org/drawingml/2006/main" xmlns:r="http://schemas.openxmlformats.org/officeDocument/2006/relationships" xmlns:p="http://schemas.openxmlformats.org/presentationml/2006/main">
   <p:cSld>

</xml_diff>

<commit_message>
ban final nop khoa
</commit_message>
<xml_diff>
--- a/mohinh.pptx
+++ b/mohinh.pptx
@@ -22,6 +22,7 @@
     <p:sldId id="273" r:id="rId16"/>
     <p:sldId id="274" r:id="rId17"/>
     <p:sldId id="275" r:id="rId18"/>
+    <p:sldId id="276" r:id="rId19"/>
   </p:sldIdLst>
   <p:sldSz cx="12192000" cy="6858000"/>
   <p:notesSz cx="6858000" cy="9144000"/>
@@ -2760,11 +2761,6 @@
                   </a:rPr>
                   <a:t>C</a:t>
                 </a:r>
-                <a:endParaRPr lang="en-US" sz="2000">
-                  <a:solidFill>
-                    <a:schemeClr val="tx1"/>
-                  </a:solidFill>
-                </a:endParaRPr>
               </a:p>
             </c:rich>
           </c:tx>
@@ -2882,11 +2878,6 @@
                   </a:rPr>
                   <a:t>F-measure</a:t>
                 </a:r>
-                <a:endParaRPr lang="en-US" sz="2000">
-                  <a:solidFill>
-                    <a:schemeClr val="tx1"/>
-                  </a:solidFill>
-                </a:endParaRPr>
               </a:p>
             </c:rich>
           </c:tx>
@@ -12390,8 +12381,8 @@
             <a:chExt cx="9415670" cy="12368625"/>
           </a:xfrm>
         </p:grpSpPr>
-        <mc:AlternateContent xmlns:mc="http://schemas.openxmlformats.org/markup-compatibility/2006">
-          <mc:Choice xmlns:a14="http://schemas.microsoft.com/office/drawing/2010/main" Requires="a14">
+        <mc:AlternateContent xmlns:mc="http://schemas.openxmlformats.org/markup-compatibility/2006" xmlns:a14="http://schemas.microsoft.com/office/drawing/2010/main">
+          <mc:Choice Requires="a14">
             <p:sp>
               <p:nvSpPr>
                 <p:cNvPr id="4" name="TextBox 3"/>
@@ -12414,6 +12405,7 @@
                 </a:bodyPr>
                 <a:lstStyle/>
                 <a:p>
+                  <a:pPr/>
                   <a14:m>
                     <m:oMathPara xmlns:m="http://schemas.openxmlformats.org/officeDocument/2006/math">
                       <m:oMathParaPr>
@@ -12552,7 +12544,7 @@
               </p:txBody>
             </p:sp>
           </mc:Choice>
-          <mc:Fallback>
+          <mc:Fallback xmlns="">
             <p:sp>
               <p:nvSpPr>
                 <p:cNvPr id="4" name="TextBox 3"/>
@@ -12641,11 +12633,6 @@
                 </a:rPr>
                 <a:t>Tập dữ liệu huấn luyện</a:t>
               </a:r>
-              <a:endParaRPr lang="en-US">
-                <a:solidFill>
-                  <a:schemeClr val="tx1"/>
-                </a:solidFill>
-              </a:endParaRPr>
             </a:p>
           </p:txBody>
         </p:sp>
@@ -12699,7 +12686,6 @@
                 <a:rPr lang="en-US"/>
                 <a:t>đặc trưng N-gram</a:t>
               </a:r>
-              <a:endParaRPr lang="en-US"/>
             </a:p>
           </p:txBody>
         </p:sp>
@@ -12746,7 +12732,6 @@
                 <a:rPr lang="en-US"/>
                 <a:t>Rút trích đặc trưng Thay đổi trạng thái</a:t>
               </a:r>
-              <a:endParaRPr lang="en-US"/>
             </a:p>
           </p:txBody>
         </p:sp>
@@ -12800,7 +12785,6 @@
                 <a:rPr lang="en-US"/>
                 <a:t>đặc trưng SO-CAL</a:t>
               </a:r>
-              <a:endParaRPr lang="en-US"/>
             </a:p>
           </p:txBody>
         </p:sp>
@@ -12854,7 +12838,6 @@
                 <a:rPr lang="en-US"/>
                 <a:t>đặc trưng Phủ định</a:t>
               </a:r>
-              <a:endParaRPr lang="en-US"/>
             </a:p>
           </p:txBody>
         </p:sp>
@@ -13006,8 +12989,8 @@
             </a:fontRef>
           </p:style>
         </p:cxnSp>
-        <mc:AlternateContent xmlns:mc="http://schemas.openxmlformats.org/markup-compatibility/2006">
-          <mc:Choice xmlns:a14="http://schemas.microsoft.com/office/drawing/2010/main" Requires="a14">
+        <mc:AlternateContent xmlns:mc="http://schemas.openxmlformats.org/markup-compatibility/2006" xmlns:a14="http://schemas.microsoft.com/office/drawing/2010/main">
+          <mc:Choice Requires="a14">
             <p:sp>
               <p:nvSpPr>
                 <p:cNvPr id="38" name="TextBox 37"/>
@@ -13030,6 +13013,7 @@
                 </a:bodyPr>
                 <a:lstStyle/>
                 <a:p>
+                  <a:pPr/>
                   <a14:m>
                     <m:oMathPara xmlns:m="http://schemas.openxmlformats.org/officeDocument/2006/math">
                       <m:oMathParaPr>
@@ -13501,7 +13485,7 @@
               </p:txBody>
             </p:sp>
           </mc:Choice>
-          <mc:Fallback>
+          <mc:Fallback xmlns="">
             <p:sp>
               <p:nvSpPr>
                 <p:cNvPr id="38" name="TextBox 37"/>
@@ -13540,8 +13524,8 @@
             </p:sp>
           </mc:Fallback>
         </mc:AlternateContent>
-        <mc:AlternateContent xmlns:mc="http://schemas.openxmlformats.org/markup-compatibility/2006">
-          <mc:Choice xmlns:a14="http://schemas.microsoft.com/office/drawing/2010/main" Requires="a14">
+        <mc:AlternateContent xmlns:mc="http://schemas.openxmlformats.org/markup-compatibility/2006" xmlns:a14="http://schemas.microsoft.com/office/drawing/2010/main">
+          <mc:Choice Requires="a14">
             <p:sp>
               <p:nvSpPr>
                 <p:cNvPr id="39" name="TextBox 38"/>
@@ -13564,6 +13548,7 @@
                 </a:bodyPr>
                 <a:lstStyle/>
                 <a:p>
+                  <a:pPr/>
                   <a14:m>
                     <m:oMathPara xmlns:m="http://schemas.openxmlformats.org/officeDocument/2006/math">
                       <m:oMathParaPr>
@@ -14020,7 +14005,7 @@
               </p:txBody>
             </p:sp>
           </mc:Choice>
-          <mc:Fallback>
+          <mc:Fallback xmlns="">
             <p:sp>
               <p:nvSpPr>
                 <p:cNvPr id="39" name="TextBox 38"/>
@@ -14167,8 +14152,8 @@
             </a:fontRef>
           </p:style>
         </p:cxnSp>
-        <mc:AlternateContent xmlns:mc="http://schemas.openxmlformats.org/markup-compatibility/2006">
-          <mc:Choice xmlns:a14="http://schemas.microsoft.com/office/drawing/2010/main" Requires="a14">
+        <mc:AlternateContent xmlns:mc="http://schemas.openxmlformats.org/markup-compatibility/2006" xmlns:a14="http://schemas.microsoft.com/office/drawing/2010/main">
+          <mc:Choice Requires="a14">
             <p:sp>
               <p:nvSpPr>
                 <p:cNvPr id="51" name="TextBox 50"/>
@@ -14191,6 +14176,7 @@
                 </a:bodyPr>
                 <a:lstStyle/>
                 <a:p>
+                  <a:pPr/>
                   <a14:m>
                     <m:oMathPara xmlns:m="http://schemas.openxmlformats.org/officeDocument/2006/math">
                       <m:oMathParaPr>
@@ -14269,13 +14255,7 @@
                                       <a:rPr lang="en-US" i="1">
                                         <a:latin typeface="Cambria Math" panose="02040503050406030204" pitchFamily="18" charset="0"/>
                                       </a:rPr>
-                                      <m:t>1</m:t>
-                                    </m:r>
-                                    <m:r>
-                                      <a:rPr lang="en-US" i="1">
-                                        <a:latin typeface="Cambria Math" panose="02040503050406030204" pitchFamily="18" charset="0"/>
-                                      </a:rPr>
-                                      <m:t>2</m:t>
+                                      <m:t>12</m:t>
                                     </m:r>
                                   </m:sub>
                                 </m:sSub>
@@ -14387,13 +14367,7 @@
                                       <a:rPr lang="en-US" i="1">
                                         <a:latin typeface="Cambria Math" panose="02040503050406030204" pitchFamily="18" charset="0"/>
                                       </a:rPr>
-                                      <m:t>1</m:t>
-                                    </m:r>
-                                    <m:r>
-                                      <a:rPr lang="en-US" i="1">
-                                        <a:latin typeface="Cambria Math" panose="02040503050406030204" pitchFamily="18" charset="0"/>
-                                      </a:rPr>
-                                      <m:t>2</m:t>
+                                      <m:t>12</m:t>
                                     </m:r>
                                   </m:sub>
                                 </m:sSub>
@@ -14424,13 +14398,7 @@
                                       <a:rPr lang="en-US" i="1">
                                         <a:latin typeface="Cambria Math" panose="02040503050406030204" pitchFamily="18" charset="0"/>
                                       </a:rPr>
-                                      <m:t>1</m:t>
-                                    </m:r>
-                                    <m:r>
-                                      <a:rPr lang="en-US" i="1">
-                                        <a:latin typeface="Cambria Math" panose="02040503050406030204" pitchFamily="18" charset="0"/>
-                                      </a:rPr>
-                                      <m:t>3</m:t>
+                                      <m:t>13</m:t>
                                     </m:r>
                                   </m:sub>
                                 </m:sSub>
@@ -14461,13 +14429,7 @@
                                       <a:rPr lang="en-US" i="1">
                                         <a:latin typeface="Cambria Math" panose="02040503050406030204" pitchFamily="18" charset="0"/>
                                       </a:rPr>
-                                      <m:t>1</m:t>
-                                    </m:r>
-                                    <m:r>
-                                      <a:rPr lang="en-US" i="1">
-                                        <a:latin typeface="Cambria Math" panose="02040503050406030204" pitchFamily="18" charset="0"/>
-                                      </a:rPr>
-                                      <m:t>4</m:t>
+                                      <m:t>14</m:t>
                                     </m:r>
                                   </m:sub>
                                 </m:sSub>
@@ -14525,13 +14487,7 @@
                                       <a:rPr lang="en-US" i="1">
                                         <a:latin typeface="Cambria Math" panose="02040503050406030204" pitchFamily="18" charset="0"/>
                                       </a:rPr>
-                                      <m:t>2</m:t>
-                                    </m:r>
-                                    <m:r>
-                                      <a:rPr lang="en-US" i="1">
-                                        <a:latin typeface="Cambria Math" panose="02040503050406030204" pitchFamily="18" charset="0"/>
-                                      </a:rPr>
-                                      <m:t>1</m:t>
+                                      <m:t>21</m:t>
                                     </m:r>
                                   </m:sub>
                                 </m:sSub>
@@ -14562,13 +14518,7 @@
                                       <a:rPr lang="en-US" i="1">
                                         <a:latin typeface="Cambria Math" panose="02040503050406030204" pitchFamily="18" charset="0"/>
                                       </a:rPr>
-                                      <m:t>2</m:t>
-                                    </m:r>
-                                    <m:r>
-                                      <a:rPr lang="en-US" i="1">
-                                        <a:latin typeface="Cambria Math" panose="02040503050406030204" pitchFamily="18" charset="0"/>
-                                      </a:rPr>
-                                      <m:t>2</m:t>
+                                      <m:t>22</m:t>
                                     </m:r>
                                   </m:sub>
                                 </m:sSub>
@@ -14649,13 +14599,7 @@
                                       <a:rPr lang="en-US" i="1">
                                         <a:latin typeface="Cambria Math" panose="02040503050406030204" pitchFamily="18" charset="0"/>
                                       </a:rPr>
-                                      <m:t>2</m:t>
-                                    </m:r>
-                                    <m:r>
-                                      <a:rPr lang="en-US" i="1">
-                                        <a:latin typeface="Cambria Math" panose="02040503050406030204" pitchFamily="18" charset="0"/>
-                                      </a:rPr>
-                                      <m:t>1</m:t>
+                                      <m:t>21</m:t>
                                     </m:r>
                                   </m:sub>
                                 </m:sSub>
@@ -14686,13 +14630,7 @@
                                       <a:rPr lang="en-US" i="1">
                                         <a:latin typeface="Cambria Math" panose="02040503050406030204" pitchFamily="18" charset="0"/>
                                       </a:rPr>
-                                      <m:t>2</m:t>
-                                    </m:r>
-                                    <m:r>
-                                      <a:rPr lang="en-US" i="1">
-                                        <a:latin typeface="Cambria Math" panose="02040503050406030204" pitchFamily="18" charset="0"/>
-                                      </a:rPr>
-                                      <m:t>2</m:t>
+                                      <m:t>22</m:t>
                                     </m:r>
                                   </m:sub>
                                 </m:sSub>
@@ -14723,13 +14661,7 @@
                                       <a:rPr lang="en-US" i="1">
                                         <a:latin typeface="Cambria Math" panose="02040503050406030204" pitchFamily="18" charset="0"/>
                                       </a:rPr>
-                                      <m:t>2</m:t>
-                                    </m:r>
-                                    <m:r>
-                                      <a:rPr lang="en-US" i="1">
-                                        <a:latin typeface="Cambria Math" panose="02040503050406030204" pitchFamily="18" charset="0"/>
-                                      </a:rPr>
-                                      <m:t>3</m:t>
+                                      <m:t>23</m:t>
                                     </m:r>
                                   </m:sub>
                                 </m:sSub>
@@ -14760,13 +14692,7 @@
                                       <a:rPr lang="en-US" i="1">
                                         <a:latin typeface="Cambria Math" panose="02040503050406030204" pitchFamily="18" charset="0"/>
                                       </a:rPr>
-                                      <m:t>2</m:t>
-                                    </m:r>
-                                    <m:r>
-                                      <a:rPr lang="en-US" i="1">
-                                        <a:latin typeface="Cambria Math" panose="02040503050406030204" pitchFamily="18" charset="0"/>
-                                      </a:rPr>
-                                      <m:t>4</m:t>
+                                      <m:t>24</m:t>
                                     </m:r>
                                   </m:sub>
                                 </m:sSub>
@@ -15204,13 +15130,7 @@
                                       <a:rPr lang="en-US" i="1">
                                         <a:latin typeface="Cambria Math" panose="02040503050406030204" pitchFamily="18" charset="0"/>
                                       </a:rPr>
-                                      <m:t>𝑚</m:t>
-                                    </m:r>
-                                    <m:r>
-                                      <a:rPr lang="en-US" i="1">
-                                        <a:latin typeface="Cambria Math" panose="02040503050406030204" pitchFamily="18" charset="0"/>
-                                      </a:rPr>
-                                      <m:t>𝑛</m:t>
+                                      <m:t>𝑚𝑛</m:t>
                                     </m:r>
                                   </m:sub>
                                 </m:sSub>
@@ -15344,13 +15264,7 @@
                                       <a:rPr lang="en-US" b="0" i="1" smtClean="0">
                                         <a:latin typeface="Cambria Math" panose="02040503050406030204" pitchFamily="18" charset="0"/>
                                       </a:rPr>
-                                      <m:t>  </m:t>
-                                    </m:r>
-                                    <m:r>
-                                      <a:rPr lang="en-US" b="0" i="1" smtClean="0">
-                                        <a:latin typeface="Cambria Math" panose="02040503050406030204" pitchFamily="18" charset="0"/>
-                                      </a:rPr>
-                                      <m:t> </m:t>
+                                      <m:t>   </m:t>
                                     </m:r>
                                     <m:r>
                                       <a:rPr lang="en-US" i="1">
@@ -15423,7 +15337,7 @@
               </p:txBody>
             </p:sp>
           </mc:Choice>
-          <mc:Fallback>
+          <mc:Fallback xmlns="">
             <p:sp>
               <p:nvSpPr>
                 <p:cNvPr id="51" name="TextBox 50"/>
@@ -15614,7 +15528,6 @@
                 <a:rPr lang="en-US"/>
                 <a:t>Chuẩn hóa</a:t>
               </a:r>
-              <a:endParaRPr lang="en-US"/>
             </a:p>
           </p:txBody>
         </p:sp>
@@ -15653,8 +15566,8 @@
             </a:fontRef>
           </p:style>
         </p:cxnSp>
-        <mc:AlternateContent xmlns:mc="http://schemas.openxmlformats.org/markup-compatibility/2006">
-          <mc:Choice xmlns:a14="http://schemas.microsoft.com/office/drawing/2010/main" Requires="a14">
+        <mc:AlternateContent xmlns:mc="http://schemas.openxmlformats.org/markup-compatibility/2006" xmlns:a14="http://schemas.microsoft.com/office/drawing/2010/main">
+          <mc:Choice Requires="a14">
             <p:sp>
               <p:nvSpPr>
                 <p:cNvPr id="71" name="TextBox 70"/>
@@ -15677,6 +15590,7 @@
                 </a:bodyPr>
                 <a:lstStyle/>
                 <a:p>
+                  <a:pPr/>
                   <a14:m>
                     <m:oMathPara xmlns:m="http://schemas.openxmlformats.org/officeDocument/2006/math">
                       <m:oMathParaPr>
@@ -15767,13 +15681,7 @@
                                       <a:rPr lang="en-US" i="1">
                                         <a:latin typeface="Cambria Math" panose="02040503050406030204" pitchFamily="18" charset="0"/>
                                       </a:rPr>
-                                      <m:t>1</m:t>
-                                    </m:r>
-                                    <m:r>
-                                      <a:rPr lang="en-US" i="1">
-                                        <a:latin typeface="Cambria Math" panose="02040503050406030204" pitchFamily="18" charset="0"/>
-                                      </a:rPr>
-                                      <m:t>2</m:t>
+                                      <m:t>12</m:t>
                                     </m:r>
                                   </m:sub>
                                 </m:sSub>
@@ -15903,13 +15811,7 @@
                                       <a:rPr lang="en-US" i="1">
                                         <a:latin typeface="Cambria Math" panose="02040503050406030204" pitchFamily="18" charset="0"/>
                                       </a:rPr>
-                                      <m:t>1</m:t>
-                                    </m:r>
-                                    <m:r>
-                                      <a:rPr lang="en-US" i="1">
-                                        <a:latin typeface="Cambria Math" panose="02040503050406030204" pitchFamily="18" charset="0"/>
-                                      </a:rPr>
-                                      <m:t>2</m:t>
+                                      <m:t>12</m:t>
                                     </m:r>
                                   </m:sub>
                                 </m:sSub>
@@ -15946,13 +15848,7 @@
                                       <a:rPr lang="en-US" i="1">
                                         <a:latin typeface="Cambria Math" panose="02040503050406030204" pitchFamily="18" charset="0"/>
                                       </a:rPr>
-                                      <m:t>1</m:t>
-                                    </m:r>
-                                    <m:r>
-                                      <a:rPr lang="en-US" i="1">
-                                        <a:latin typeface="Cambria Math" panose="02040503050406030204" pitchFamily="18" charset="0"/>
-                                      </a:rPr>
-                                      <m:t>3</m:t>
+                                      <m:t>13</m:t>
                                     </m:r>
                                   </m:sub>
                                 </m:sSub>
@@ -15989,13 +15885,7 @@
                                       <a:rPr lang="en-US" i="1">
                                         <a:latin typeface="Cambria Math" panose="02040503050406030204" pitchFamily="18" charset="0"/>
                                       </a:rPr>
-                                      <m:t>1</m:t>
-                                    </m:r>
-                                    <m:r>
-                                      <a:rPr lang="en-US" i="1">
-                                        <a:latin typeface="Cambria Math" panose="02040503050406030204" pitchFamily="18" charset="0"/>
-                                      </a:rPr>
-                                      <m:t>4</m:t>
+                                      <m:t>14</m:t>
                                     </m:r>
                                   </m:sub>
                                 </m:sSub>
@@ -16065,13 +15955,7 @@
                                       <a:rPr lang="en-US" i="1">
                                         <a:latin typeface="Cambria Math" panose="02040503050406030204" pitchFamily="18" charset="0"/>
                                       </a:rPr>
-                                      <m:t>2</m:t>
-                                    </m:r>
-                                    <m:r>
-                                      <a:rPr lang="en-US" i="1">
-                                        <a:latin typeface="Cambria Math" panose="02040503050406030204" pitchFamily="18" charset="0"/>
-                                      </a:rPr>
-                                      <m:t>1</m:t>
+                                      <m:t>21</m:t>
                                     </m:r>
                                   </m:sub>
                                 </m:sSub>
@@ -16108,13 +15992,7 @@
                                       <a:rPr lang="en-US" i="1">
                                         <a:latin typeface="Cambria Math" panose="02040503050406030204" pitchFamily="18" charset="0"/>
                                       </a:rPr>
-                                      <m:t>2</m:t>
-                                    </m:r>
-                                    <m:r>
-                                      <a:rPr lang="en-US" i="1">
-                                        <a:latin typeface="Cambria Math" panose="02040503050406030204" pitchFamily="18" charset="0"/>
-                                      </a:rPr>
-                                      <m:t>2</m:t>
+                                      <m:t>22</m:t>
                                     </m:r>
                                   </m:sub>
                                 </m:sSub>
@@ -16207,13 +16085,7 @@
                                       <a:rPr lang="en-US" i="1">
                                         <a:latin typeface="Cambria Math" panose="02040503050406030204" pitchFamily="18" charset="0"/>
                                       </a:rPr>
-                                      <m:t>2</m:t>
-                                    </m:r>
-                                    <m:r>
-                                      <a:rPr lang="en-US" i="1">
-                                        <a:latin typeface="Cambria Math" panose="02040503050406030204" pitchFamily="18" charset="0"/>
-                                      </a:rPr>
-                                      <m:t>1</m:t>
+                                      <m:t>21</m:t>
                                     </m:r>
                                   </m:sub>
                                 </m:sSub>
@@ -16250,13 +16122,7 @@
                                       <a:rPr lang="en-US" i="1">
                                         <a:latin typeface="Cambria Math" panose="02040503050406030204" pitchFamily="18" charset="0"/>
                                       </a:rPr>
-                                      <m:t>2</m:t>
-                                    </m:r>
-                                    <m:r>
-                                      <a:rPr lang="en-US" i="1">
-                                        <a:latin typeface="Cambria Math" panose="02040503050406030204" pitchFamily="18" charset="0"/>
-                                      </a:rPr>
-                                      <m:t>2</m:t>
+                                      <m:t>22</m:t>
                                     </m:r>
                                   </m:sub>
                                 </m:sSub>
@@ -16293,13 +16159,7 @@
                                       <a:rPr lang="en-US" i="1">
                                         <a:latin typeface="Cambria Math" panose="02040503050406030204" pitchFamily="18" charset="0"/>
                                       </a:rPr>
-                                      <m:t>2</m:t>
-                                    </m:r>
-                                    <m:r>
-                                      <a:rPr lang="en-US" i="1">
-                                        <a:latin typeface="Cambria Math" panose="02040503050406030204" pitchFamily="18" charset="0"/>
-                                      </a:rPr>
-                                      <m:t>3</m:t>
+                                      <m:t>23</m:t>
                                     </m:r>
                                   </m:sub>
                                 </m:sSub>
@@ -16336,13 +16196,7 @@
                                       <a:rPr lang="en-US" i="1">
                                         <a:latin typeface="Cambria Math" panose="02040503050406030204" pitchFamily="18" charset="0"/>
                                       </a:rPr>
-                                      <m:t>2</m:t>
-                                    </m:r>
-                                    <m:r>
-                                      <a:rPr lang="en-US" i="1">
-                                        <a:latin typeface="Cambria Math" panose="02040503050406030204" pitchFamily="18" charset="0"/>
-                                      </a:rPr>
-                                      <m:t>4</m:t>
+                                      <m:t>24</m:t>
                                     </m:r>
                                   </m:sub>
                                 </m:sSub>
@@ -16852,13 +16706,7 @@
                                       <a:rPr lang="en-US" i="1">
                                         <a:latin typeface="Cambria Math" panose="02040503050406030204" pitchFamily="18" charset="0"/>
                                       </a:rPr>
-                                      <m:t>𝑚</m:t>
-                                    </m:r>
-                                    <m:r>
-                                      <a:rPr lang="en-US" i="1">
-                                        <a:latin typeface="Cambria Math" panose="02040503050406030204" pitchFamily="18" charset="0"/>
-                                      </a:rPr>
-                                      <m:t>𝑛</m:t>
+                                      <m:t>𝑚𝑛</m:t>
                                     </m:r>
                                   </m:sub>
                                 </m:sSub>
@@ -17010,13 +16858,7 @@
                                       <a:rPr lang="en-US" b="0" i="1" smtClean="0">
                                         <a:latin typeface="Cambria Math" panose="02040503050406030204" pitchFamily="18" charset="0"/>
                                       </a:rPr>
-                                      <m:t>  </m:t>
-                                    </m:r>
-                                    <m:r>
-                                      <a:rPr lang="en-US" b="0" i="1" smtClean="0">
-                                        <a:latin typeface="Cambria Math" panose="02040503050406030204" pitchFamily="18" charset="0"/>
-                                      </a:rPr>
-                                      <m:t> </m:t>
+                                      <m:t>   </m:t>
                                     </m:r>
                                     <m:r>
                                       <a:rPr lang="en-US" i="1">
@@ -17101,7 +16943,7 @@
               </p:txBody>
             </p:sp>
           </mc:Choice>
-          <mc:Fallback>
+          <mc:Fallback xmlns="">
             <p:sp>
               <p:nvSpPr>
                 <p:cNvPr id="71" name="TextBox 70"/>
@@ -17219,7 +17061,6 @@
                 <a:rPr lang="en-US"/>
                 <a:t>Huấn luyện với SVM</a:t>
               </a:r>
-              <a:endParaRPr lang="en-US"/>
             </a:p>
           </p:txBody>
         </p:sp>
@@ -17324,6 +17165,383 @@
     <p:extLst>
       <p:ext uri="{BB962C8B-B14F-4D97-AF65-F5344CB8AC3E}">
         <p14:creationId xmlns:p14="http://schemas.microsoft.com/office/powerpoint/2010/main" val="502550390"/>
+      </p:ext>
+    </p:extLst>
+  </p:cSld>
+  <p:clrMapOvr>
+    <a:masterClrMapping/>
+  </p:clrMapOvr>
+</p:sld>
+</file>
+
+<file path=ppt/slides/slide18.xml><?xml version="1.0" encoding="utf-8"?>
+<p:sld xmlns:a="http://schemas.openxmlformats.org/drawingml/2006/main" xmlns:r="http://schemas.openxmlformats.org/officeDocument/2006/relationships" xmlns:p="http://schemas.openxmlformats.org/presentationml/2006/main">
+  <p:cSld>
+    <p:spTree>
+      <p:nvGrpSpPr>
+        <p:cNvPr id="1" name=""/>
+        <p:cNvGrpSpPr/>
+        <p:nvPr/>
+      </p:nvGrpSpPr>
+      <p:grpSpPr>
+        <a:xfrm>
+          <a:off x="0" y="0"/>
+          <a:ext cx="0" cy="0"/>
+          <a:chOff x="0" y="0"/>
+          <a:chExt cx="0" cy="0"/>
+        </a:xfrm>
+      </p:grpSpPr>
+      <p:grpSp>
+        <p:nvGrpSpPr>
+          <p:cNvPr id="21" name="Group 20"/>
+          <p:cNvGrpSpPr/>
+          <p:nvPr/>
+        </p:nvGrpSpPr>
+        <p:grpSpPr>
+          <a:xfrm>
+            <a:off x="1258957" y="2239617"/>
+            <a:ext cx="8786189" cy="2922105"/>
+            <a:chOff x="1258957" y="2239617"/>
+            <a:chExt cx="8786189" cy="2922105"/>
+          </a:xfrm>
+        </p:grpSpPr>
+        <p:sp>
+          <p:nvSpPr>
+            <p:cNvPr id="4" name="Rectangle 3"/>
+            <p:cNvSpPr/>
+            <p:nvPr/>
+          </p:nvSpPr>
+          <p:spPr>
+            <a:xfrm>
+              <a:off x="1258957" y="2239617"/>
+              <a:ext cx="1961321" cy="1086679"/>
+            </a:xfrm>
+            <a:prstGeom prst="rect">
+              <a:avLst/>
+            </a:prstGeom>
+            <a:ln>
+              <a:solidFill>
+                <a:schemeClr val="tx1"/>
+              </a:solidFill>
+            </a:ln>
+          </p:spPr>
+          <p:style>
+            <a:lnRef idx="2">
+              <a:schemeClr val="accent6"/>
+            </a:lnRef>
+            <a:fillRef idx="1">
+              <a:schemeClr val="lt1"/>
+            </a:fillRef>
+            <a:effectRef idx="0">
+              <a:schemeClr val="accent6"/>
+            </a:effectRef>
+            <a:fontRef idx="minor">
+              <a:schemeClr val="dk1"/>
+            </a:fontRef>
+          </p:style>
+          <p:txBody>
+            <a:bodyPr rtlCol="0" anchor="ctr"/>
+            <a:lstStyle/>
+            <a:p>
+              <a:pPr algn="ctr"/>
+              <a:r>
+                <a:rPr lang="en-US"/>
+                <a:t>Thuật ngữ y học</a:t>
+              </a:r>
+              <a:endParaRPr lang="en-US"/>
+            </a:p>
+          </p:txBody>
+        </p:sp>
+        <p:sp>
+          <p:nvSpPr>
+            <p:cNvPr id="5" name="Rectangle 4"/>
+            <p:cNvSpPr/>
+            <p:nvPr/>
+          </p:nvSpPr>
+          <p:spPr>
+            <a:xfrm>
+              <a:off x="4671391" y="2239617"/>
+              <a:ext cx="1961321" cy="1086679"/>
+            </a:xfrm>
+            <a:prstGeom prst="rect">
+              <a:avLst/>
+            </a:prstGeom>
+            <a:ln>
+              <a:solidFill>
+                <a:schemeClr val="tx1"/>
+              </a:solidFill>
+            </a:ln>
+          </p:spPr>
+          <p:style>
+            <a:lnRef idx="2">
+              <a:schemeClr val="accent6"/>
+            </a:lnRef>
+            <a:fillRef idx="1">
+              <a:schemeClr val="lt1"/>
+            </a:fillRef>
+            <a:effectRef idx="0">
+              <a:schemeClr val="accent6"/>
+            </a:effectRef>
+            <a:fontRef idx="minor">
+              <a:schemeClr val="dk1"/>
+            </a:fontRef>
+          </p:style>
+          <p:txBody>
+            <a:bodyPr rtlCol="0" anchor="ctr"/>
+            <a:lstStyle/>
+            <a:p>
+              <a:pPr algn="ctr"/>
+              <a:r>
+                <a:rPr lang="en-US"/>
+                <a:t>Metamap</a:t>
+              </a:r>
+              <a:endParaRPr lang="en-US"/>
+            </a:p>
+          </p:txBody>
+        </p:sp>
+        <p:sp>
+          <p:nvSpPr>
+            <p:cNvPr id="6" name="Rectangle 5"/>
+            <p:cNvSpPr/>
+            <p:nvPr/>
+          </p:nvSpPr>
+          <p:spPr>
+            <a:xfrm>
+              <a:off x="8083825" y="2239617"/>
+              <a:ext cx="1961321" cy="1086679"/>
+            </a:xfrm>
+            <a:prstGeom prst="rect">
+              <a:avLst/>
+            </a:prstGeom>
+            <a:ln>
+              <a:solidFill>
+                <a:schemeClr val="tx1"/>
+              </a:solidFill>
+            </a:ln>
+          </p:spPr>
+          <p:style>
+            <a:lnRef idx="2">
+              <a:schemeClr val="accent6"/>
+            </a:lnRef>
+            <a:fillRef idx="1">
+              <a:schemeClr val="lt1"/>
+            </a:fillRef>
+            <a:effectRef idx="0">
+              <a:schemeClr val="accent6"/>
+            </a:effectRef>
+            <a:fontRef idx="minor">
+              <a:schemeClr val="dk1"/>
+            </a:fontRef>
+          </p:style>
+          <p:txBody>
+            <a:bodyPr rtlCol="0" anchor="ctr"/>
+            <a:lstStyle/>
+            <a:p>
+              <a:pPr algn="ctr"/>
+              <a:r>
+                <a:rPr lang="en-US"/>
+                <a:t>Tên nhãn </a:t>
+              </a:r>
+            </a:p>
+            <a:p>
+              <a:pPr algn="ctr"/>
+              <a:r>
+                <a:rPr lang="en-US"/>
+                <a:t>ngữ nghĩa</a:t>
+              </a:r>
+              <a:endParaRPr lang="en-US"/>
+            </a:p>
+          </p:txBody>
+        </p:sp>
+        <p:sp>
+          <p:nvSpPr>
+            <p:cNvPr id="7" name="Rectangle 6"/>
+            <p:cNvSpPr/>
+            <p:nvPr/>
+          </p:nvSpPr>
+          <p:spPr>
+            <a:xfrm>
+              <a:off x="4671391" y="4075043"/>
+              <a:ext cx="1961321" cy="1086679"/>
+            </a:xfrm>
+            <a:prstGeom prst="rect">
+              <a:avLst/>
+            </a:prstGeom>
+            <a:ln>
+              <a:solidFill>
+                <a:schemeClr val="tx1"/>
+              </a:solidFill>
+            </a:ln>
+          </p:spPr>
+          <p:style>
+            <a:lnRef idx="2">
+              <a:schemeClr val="accent6"/>
+            </a:lnRef>
+            <a:fillRef idx="1">
+              <a:schemeClr val="lt1"/>
+            </a:fillRef>
+            <a:effectRef idx="0">
+              <a:schemeClr val="accent6"/>
+            </a:effectRef>
+            <a:fontRef idx="minor">
+              <a:schemeClr val="dk1"/>
+            </a:fontRef>
+          </p:style>
+          <p:txBody>
+            <a:bodyPr rtlCol="0" anchor="ctr"/>
+            <a:lstStyle/>
+            <a:p>
+              <a:pPr algn="ctr"/>
+              <a:r>
+                <a:rPr lang="en-US"/>
+                <a:t>UMLS</a:t>
+              </a:r>
+              <a:endParaRPr lang="en-US"/>
+            </a:p>
+          </p:txBody>
+        </p:sp>
+        <p:cxnSp>
+          <p:nvCxnSpPr>
+            <p:cNvPr id="9" name="Straight Arrow Connector 8"/>
+            <p:cNvCxnSpPr>
+              <a:stCxn id="4" idx="3"/>
+              <a:endCxn id="5" idx="1"/>
+            </p:cNvCxnSpPr>
+            <p:nvPr/>
+          </p:nvCxnSpPr>
+          <p:spPr>
+            <a:xfrm>
+              <a:off x="3220278" y="2782957"/>
+              <a:ext cx="1451113" cy="0"/>
+            </a:xfrm>
+            <a:prstGeom prst="straightConnector1">
+              <a:avLst/>
+            </a:prstGeom>
+            <a:ln w="12700">
+              <a:tailEnd type="triangle"/>
+            </a:ln>
+          </p:spPr>
+          <p:style>
+            <a:lnRef idx="1">
+              <a:schemeClr val="dk1"/>
+            </a:lnRef>
+            <a:fillRef idx="0">
+              <a:schemeClr val="dk1"/>
+            </a:fillRef>
+            <a:effectRef idx="0">
+              <a:schemeClr val="dk1"/>
+            </a:effectRef>
+            <a:fontRef idx="minor">
+              <a:schemeClr val="tx1"/>
+            </a:fontRef>
+          </p:style>
+        </p:cxnSp>
+        <p:cxnSp>
+          <p:nvCxnSpPr>
+            <p:cNvPr id="10" name="Straight Arrow Connector 9"/>
+            <p:cNvCxnSpPr/>
+            <p:nvPr/>
+          </p:nvCxnSpPr>
+          <p:spPr>
+            <a:xfrm>
+              <a:off x="6632712" y="2782956"/>
+              <a:ext cx="1451113" cy="0"/>
+            </a:xfrm>
+            <a:prstGeom prst="straightConnector1">
+              <a:avLst/>
+            </a:prstGeom>
+            <a:ln w="12700">
+              <a:tailEnd type="triangle"/>
+            </a:ln>
+          </p:spPr>
+          <p:style>
+            <a:lnRef idx="1">
+              <a:schemeClr val="dk1"/>
+            </a:lnRef>
+            <a:fillRef idx="0">
+              <a:schemeClr val="dk1"/>
+            </a:fillRef>
+            <a:effectRef idx="0">
+              <a:schemeClr val="dk1"/>
+            </a:effectRef>
+            <a:fontRef idx="minor">
+              <a:schemeClr val="tx1"/>
+            </a:fontRef>
+          </p:style>
+        </p:cxnSp>
+        <p:cxnSp>
+          <p:nvCxnSpPr>
+            <p:cNvPr id="11" name="Straight Arrow Connector 10"/>
+            <p:cNvCxnSpPr/>
+            <p:nvPr/>
+          </p:nvCxnSpPr>
+          <p:spPr>
+            <a:xfrm>
+              <a:off x="5466523" y="3326296"/>
+              <a:ext cx="0" cy="748747"/>
+            </a:xfrm>
+            <a:prstGeom prst="straightConnector1">
+              <a:avLst/>
+            </a:prstGeom>
+            <a:ln w="12700">
+              <a:prstDash val="dash"/>
+              <a:tailEnd type="triangle"/>
+            </a:ln>
+          </p:spPr>
+          <p:style>
+            <a:lnRef idx="1">
+              <a:schemeClr val="dk1"/>
+            </a:lnRef>
+            <a:fillRef idx="0">
+              <a:schemeClr val="dk1"/>
+            </a:fillRef>
+            <a:effectRef idx="0">
+              <a:schemeClr val="dk1"/>
+            </a:effectRef>
+            <a:fontRef idx="minor">
+              <a:schemeClr val="tx1"/>
+            </a:fontRef>
+          </p:style>
+        </p:cxnSp>
+        <p:cxnSp>
+          <p:nvCxnSpPr>
+            <p:cNvPr id="17" name="Straight Arrow Connector 16"/>
+            <p:cNvCxnSpPr/>
+            <p:nvPr/>
+          </p:nvCxnSpPr>
+          <p:spPr>
+            <a:xfrm flipV="1">
+              <a:off x="5837580" y="3326296"/>
+              <a:ext cx="0" cy="748747"/>
+            </a:xfrm>
+            <a:prstGeom prst="straightConnector1">
+              <a:avLst/>
+            </a:prstGeom>
+            <a:ln w="12700">
+              <a:prstDash val="dash"/>
+              <a:tailEnd type="triangle"/>
+            </a:ln>
+          </p:spPr>
+          <p:style>
+            <a:lnRef idx="1">
+              <a:schemeClr val="dk1"/>
+            </a:lnRef>
+            <a:fillRef idx="0">
+              <a:schemeClr val="dk1"/>
+            </a:fillRef>
+            <a:effectRef idx="0">
+              <a:schemeClr val="dk1"/>
+            </a:effectRef>
+            <a:fontRef idx="minor">
+              <a:schemeClr val="tx1"/>
+            </a:fontRef>
+          </p:style>
+        </p:cxnSp>
+      </p:grpSp>
+    </p:spTree>
+    <p:extLst>
+      <p:ext uri="{BB962C8B-B14F-4D97-AF65-F5344CB8AC3E}">
+        <p14:creationId xmlns:p14="http://schemas.microsoft.com/office/powerpoint/2010/main" val="2675582303"/>
       </p:ext>
     </p:extLst>
   </p:cSld>

</xml_diff>

<commit_message>
Sua sau khi ra hoi dong
</commit_message>
<xml_diff>
--- a/mohinh.pptx
+++ b/mohinh.pptx
@@ -6963,7 +6963,7 @@
           <a:p>
             <a:fld id="{4A5F161B-FF7E-4ABE-89D0-93661BD281ED}" type="datetimeFigureOut">
               <a:rPr lang="en-US" smtClean="0"/>
-              <a:t>12/16/2016</a:t>
+              <a:t>12/28/2016</a:t>
             </a:fld>
             <a:endParaRPr lang="en-US"/>
           </a:p>
@@ -7131,7 +7131,7 @@
           <a:p>
             <a:fld id="{4A5F161B-FF7E-4ABE-89D0-93661BD281ED}" type="datetimeFigureOut">
               <a:rPr lang="en-US" smtClean="0"/>
-              <a:t>12/16/2016</a:t>
+              <a:t>12/28/2016</a:t>
             </a:fld>
             <a:endParaRPr lang="en-US"/>
           </a:p>
@@ -7309,7 +7309,7 @@
           <a:p>
             <a:fld id="{4A5F161B-FF7E-4ABE-89D0-93661BD281ED}" type="datetimeFigureOut">
               <a:rPr lang="en-US" smtClean="0"/>
-              <a:t>12/16/2016</a:t>
+              <a:t>12/28/2016</a:t>
             </a:fld>
             <a:endParaRPr lang="en-US"/>
           </a:p>
@@ -7477,7 +7477,7 @@
           <a:p>
             <a:fld id="{4A5F161B-FF7E-4ABE-89D0-93661BD281ED}" type="datetimeFigureOut">
               <a:rPr lang="en-US" smtClean="0"/>
-              <a:t>12/16/2016</a:t>
+              <a:t>12/28/2016</a:t>
             </a:fld>
             <a:endParaRPr lang="en-US"/>
           </a:p>
@@ -7722,7 +7722,7 @@
           <a:p>
             <a:fld id="{4A5F161B-FF7E-4ABE-89D0-93661BD281ED}" type="datetimeFigureOut">
               <a:rPr lang="en-US" smtClean="0"/>
-              <a:t>12/16/2016</a:t>
+              <a:t>12/28/2016</a:t>
             </a:fld>
             <a:endParaRPr lang="en-US"/>
           </a:p>
@@ -7951,7 +7951,7 @@
           <a:p>
             <a:fld id="{4A5F161B-FF7E-4ABE-89D0-93661BD281ED}" type="datetimeFigureOut">
               <a:rPr lang="en-US" smtClean="0"/>
-              <a:t>12/16/2016</a:t>
+              <a:t>12/28/2016</a:t>
             </a:fld>
             <a:endParaRPr lang="en-US"/>
           </a:p>
@@ -8315,7 +8315,7 @@
           <a:p>
             <a:fld id="{4A5F161B-FF7E-4ABE-89D0-93661BD281ED}" type="datetimeFigureOut">
               <a:rPr lang="en-US" smtClean="0"/>
-              <a:t>12/16/2016</a:t>
+              <a:t>12/28/2016</a:t>
             </a:fld>
             <a:endParaRPr lang="en-US"/>
           </a:p>
@@ -8432,7 +8432,7 @@
           <a:p>
             <a:fld id="{4A5F161B-FF7E-4ABE-89D0-93661BD281ED}" type="datetimeFigureOut">
               <a:rPr lang="en-US" smtClean="0"/>
-              <a:t>12/16/2016</a:t>
+              <a:t>12/28/2016</a:t>
             </a:fld>
             <a:endParaRPr lang="en-US"/>
           </a:p>
@@ -8527,7 +8527,7 @@
           <a:p>
             <a:fld id="{4A5F161B-FF7E-4ABE-89D0-93661BD281ED}" type="datetimeFigureOut">
               <a:rPr lang="en-US" smtClean="0"/>
-              <a:t>12/16/2016</a:t>
+              <a:t>12/28/2016</a:t>
             </a:fld>
             <a:endParaRPr lang="en-US"/>
           </a:p>
@@ -8802,7 +8802,7 @@
           <a:p>
             <a:fld id="{4A5F161B-FF7E-4ABE-89D0-93661BD281ED}" type="datetimeFigureOut">
               <a:rPr lang="en-US" smtClean="0"/>
-              <a:t>12/16/2016</a:t>
+              <a:t>12/28/2016</a:t>
             </a:fld>
             <a:endParaRPr lang="en-US"/>
           </a:p>
@@ -9054,7 +9054,7 @@
           <a:p>
             <a:fld id="{4A5F161B-FF7E-4ABE-89D0-93661BD281ED}" type="datetimeFigureOut">
               <a:rPr lang="en-US" smtClean="0"/>
-              <a:t>12/16/2016</a:t>
+              <a:t>12/28/2016</a:t>
             </a:fld>
             <a:endParaRPr lang="en-US"/>
           </a:p>
@@ -9265,7 +9265,7 @@
           <a:p>
             <a:fld id="{4A5F161B-FF7E-4ABE-89D0-93661BD281ED}" type="datetimeFigureOut">
               <a:rPr lang="en-US" smtClean="0"/>
-              <a:t>12/16/2016</a:t>
+              <a:t>12/28/2016</a:t>
             </a:fld>
             <a:endParaRPr lang="en-US"/>
           </a:p>
@@ -17248,7 +17248,6 @@
                 <a:rPr lang="en-US"/>
                 <a:t>Thuật ngữ y học</a:t>
               </a:r>
-              <a:endParaRPr lang="en-US"/>
             </a:p>
           </p:txBody>
         </p:sp>
@@ -17295,7 +17294,6 @@
                 <a:rPr lang="en-US"/>
                 <a:t>Metamap</a:t>
               </a:r>
-              <a:endParaRPr lang="en-US"/>
             </a:p>
           </p:txBody>
         </p:sp>
@@ -17349,7 +17347,6 @@
                 <a:rPr lang="en-US"/>
                 <a:t>ngữ nghĩa</a:t>
               </a:r>
-              <a:endParaRPr lang="en-US"/>
             </a:p>
           </p:txBody>
         </p:sp>
@@ -17396,7 +17393,6 @@
                 <a:rPr lang="en-US"/>
                 <a:t>UMLS</a:t>
               </a:r>
-              <a:endParaRPr lang="en-US"/>
             </a:p>
           </p:txBody>
         </p:sp>
@@ -24608,7 +24604,7 @@
           <p:nvPr>
             <p:extLst>
               <p:ext uri="{D42A27DB-BD31-4B8C-83A1-F6EECF244321}">
-                <p14:modId xmlns:p14="http://schemas.microsoft.com/office/powerpoint/2010/main" val="1371857868"/>
+                <p14:modId xmlns:p14="http://schemas.microsoft.com/office/powerpoint/2010/main" val="3446770773"/>
               </p:ext>
             </p:extLst>
           </p:nvPr>

</xml_diff>

<commit_message>
Update: sua loi chinh ta, trinh bay
</commit_message>
<xml_diff>
--- a/mohinh.pptx
+++ b/mohinh.pptx
@@ -6963,7 +6963,7 @@
           <a:p>
             <a:fld id="{4A5F161B-FF7E-4ABE-89D0-93661BD281ED}" type="datetimeFigureOut">
               <a:rPr lang="en-US" smtClean="0"/>
-              <a:t>12/28/2016</a:t>
+              <a:t>1/11/2017</a:t>
             </a:fld>
             <a:endParaRPr lang="en-US"/>
           </a:p>
@@ -7131,7 +7131,7 @@
           <a:p>
             <a:fld id="{4A5F161B-FF7E-4ABE-89D0-93661BD281ED}" type="datetimeFigureOut">
               <a:rPr lang="en-US" smtClean="0"/>
-              <a:t>12/28/2016</a:t>
+              <a:t>1/11/2017</a:t>
             </a:fld>
             <a:endParaRPr lang="en-US"/>
           </a:p>
@@ -7309,7 +7309,7 @@
           <a:p>
             <a:fld id="{4A5F161B-FF7E-4ABE-89D0-93661BD281ED}" type="datetimeFigureOut">
               <a:rPr lang="en-US" smtClean="0"/>
-              <a:t>12/28/2016</a:t>
+              <a:t>1/11/2017</a:t>
             </a:fld>
             <a:endParaRPr lang="en-US"/>
           </a:p>
@@ -7477,7 +7477,7 @@
           <a:p>
             <a:fld id="{4A5F161B-FF7E-4ABE-89D0-93661BD281ED}" type="datetimeFigureOut">
               <a:rPr lang="en-US" smtClean="0"/>
-              <a:t>12/28/2016</a:t>
+              <a:t>1/11/2017</a:t>
             </a:fld>
             <a:endParaRPr lang="en-US"/>
           </a:p>
@@ -7722,7 +7722,7 @@
           <a:p>
             <a:fld id="{4A5F161B-FF7E-4ABE-89D0-93661BD281ED}" type="datetimeFigureOut">
               <a:rPr lang="en-US" smtClean="0"/>
-              <a:t>12/28/2016</a:t>
+              <a:t>1/11/2017</a:t>
             </a:fld>
             <a:endParaRPr lang="en-US"/>
           </a:p>
@@ -7951,7 +7951,7 @@
           <a:p>
             <a:fld id="{4A5F161B-FF7E-4ABE-89D0-93661BD281ED}" type="datetimeFigureOut">
               <a:rPr lang="en-US" smtClean="0"/>
-              <a:t>12/28/2016</a:t>
+              <a:t>1/11/2017</a:t>
             </a:fld>
             <a:endParaRPr lang="en-US"/>
           </a:p>
@@ -8315,7 +8315,7 @@
           <a:p>
             <a:fld id="{4A5F161B-FF7E-4ABE-89D0-93661BD281ED}" type="datetimeFigureOut">
               <a:rPr lang="en-US" smtClean="0"/>
-              <a:t>12/28/2016</a:t>
+              <a:t>1/11/2017</a:t>
             </a:fld>
             <a:endParaRPr lang="en-US"/>
           </a:p>
@@ -8432,7 +8432,7 @@
           <a:p>
             <a:fld id="{4A5F161B-FF7E-4ABE-89D0-93661BD281ED}" type="datetimeFigureOut">
               <a:rPr lang="en-US" smtClean="0"/>
-              <a:t>12/28/2016</a:t>
+              <a:t>1/11/2017</a:t>
             </a:fld>
             <a:endParaRPr lang="en-US"/>
           </a:p>
@@ -8527,7 +8527,7 @@
           <a:p>
             <a:fld id="{4A5F161B-FF7E-4ABE-89D0-93661BD281ED}" type="datetimeFigureOut">
               <a:rPr lang="en-US" smtClean="0"/>
-              <a:t>12/28/2016</a:t>
+              <a:t>1/11/2017</a:t>
             </a:fld>
             <a:endParaRPr lang="en-US"/>
           </a:p>
@@ -8802,7 +8802,7 @@
           <a:p>
             <a:fld id="{4A5F161B-FF7E-4ABE-89D0-93661BD281ED}" type="datetimeFigureOut">
               <a:rPr lang="en-US" smtClean="0"/>
-              <a:t>12/28/2016</a:t>
+              <a:t>1/11/2017</a:t>
             </a:fld>
             <a:endParaRPr lang="en-US"/>
           </a:p>
@@ -9054,7 +9054,7 @@
           <a:p>
             <a:fld id="{4A5F161B-FF7E-4ABE-89D0-93661BD281ED}" type="datetimeFigureOut">
               <a:rPr lang="en-US" smtClean="0"/>
-              <a:t>12/28/2016</a:t>
+              <a:t>1/11/2017</a:t>
             </a:fld>
             <a:endParaRPr lang="en-US"/>
           </a:p>
@@ -9265,7 +9265,7 @@
           <a:p>
             <a:fld id="{4A5F161B-FF7E-4ABE-89D0-93661BD281ED}" type="datetimeFigureOut">
               <a:rPr lang="en-US" smtClean="0"/>
-              <a:t>12/28/2016</a:t>
+              <a:t>1/11/2017</a:t>
             </a:fld>
             <a:endParaRPr lang="en-US"/>
           </a:p>
@@ -12730,7 +12730,7 @@
               <a:pPr algn="ctr"/>
               <a:r>
                 <a:rPr lang="en-US"/>
-                <a:t>Rút trích đặc trưng Thay đổi trạng thái</a:t>
+                <a:t>Rút trích đặc trưng Chuyển đổi trạng thái</a:t>
               </a:r>
             </a:p>
           </p:txBody>

</xml_diff>